<commit_message>
Changes to Mexico presentation and files for survey answers
</commit_message>
<xml_diff>
--- a/Presentations/Workshop in Mexico/Mexico Workshop.pptx
+++ b/Presentations/Workshop in Mexico/Mexico Workshop.pptx
@@ -5,7 +5,7 @@
     <p:sldMasterId id="2147483648" r:id="rId1"/>
   </p:sldMasterIdLst>
   <p:notesMasterIdLst>
-    <p:notesMasterId r:id="rId29"/>
+    <p:notesMasterId r:id="rId20"/>
   </p:notesMasterIdLst>
   <p:sldIdLst>
     <p:sldId id="260" r:id="rId2"/>
@@ -17,24 +17,15 @@
     <p:sldId id="258" r:id="rId8"/>
     <p:sldId id="264" r:id="rId9"/>
     <p:sldId id="265" r:id="rId10"/>
-    <p:sldId id="268" r:id="rId11"/>
-    <p:sldId id="269" r:id="rId12"/>
-    <p:sldId id="270" r:id="rId13"/>
-    <p:sldId id="266" r:id="rId14"/>
-    <p:sldId id="271" r:id="rId15"/>
-    <p:sldId id="272" r:id="rId16"/>
-    <p:sldId id="279" r:id="rId17"/>
-    <p:sldId id="285" r:id="rId18"/>
-    <p:sldId id="282" r:id="rId19"/>
-    <p:sldId id="283" r:id="rId20"/>
-    <p:sldId id="256" r:id="rId21"/>
-    <p:sldId id="257" r:id="rId22"/>
-    <p:sldId id="262" r:id="rId23"/>
-    <p:sldId id="274" r:id="rId24"/>
-    <p:sldId id="284" r:id="rId25"/>
-    <p:sldId id="280" r:id="rId26"/>
-    <p:sldId id="278" r:id="rId27"/>
-    <p:sldId id="281" r:id="rId28"/>
+    <p:sldId id="279" r:id="rId11"/>
+    <p:sldId id="282" r:id="rId12"/>
+    <p:sldId id="283" r:id="rId13"/>
+    <p:sldId id="256" r:id="rId14"/>
+    <p:sldId id="257" r:id="rId15"/>
+    <p:sldId id="274" r:id="rId16"/>
+    <p:sldId id="284" r:id="rId17"/>
+    <p:sldId id="272" r:id="rId18"/>
+    <p:sldId id="262" r:id="rId19"/>
   </p:sldIdLst>
   <p:sldSz cx="12190413" cy="6858000"/>
   <p:notesSz cx="6858000" cy="9144000"/>
@@ -525,7 +516,7 @@
       </p:grpSpPr>
       <p:sp>
         <p:nvSpPr>
-          <p:cNvPr id="2" name="Slide Image Placeholder 1"/>
+          <p:cNvPr id="2" name="Espaço Reservado para Imagem de Slide 1"/>
           <p:cNvSpPr>
             <a:spLocks noGrp="1" noRot="1" noChangeAspect="1"/>
           </p:cNvSpPr>
@@ -537,7 +528,7 @@
       </p:sp>
       <p:sp>
         <p:nvSpPr>
-          <p:cNvPr id="3" name="Notes Placeholder 2"/>
+          <p:cNvPr id="3" name="Espaço Reservado para Anotações 2"/>
           <p:cNvSpPr>
             <a:spLocks noGrp="1"/>
           </p:cNvSpPr>
@@ -550,13 +541,33 @@
           <a:bodyPr/>
           <a:lstStyle/>
           <a:p>
+            <a:r>
+              <a:rPr lang="en-US" dirty="0" err="1" smtClean="0"/>
+              <a:t>Colocar</a:t>
+            </a:r>
+            <a:r>
+              <a:rPr lang="en-US" dirty="0" smtClean="0"/>
+              <a:t> </a:t>
+            </a:r>
+            <a:r>
+              <a:rPr lang="en-US" dirty="0" err="1" smtClean="0"/>
+              <a:t>fotos</a:t>
+            </a:r>
+            <a:r>
+              <a:rPr lang="en-US" dirty="0" smtClean="0"/>
+              <a:t> </a:t>
+            </a:r>
+            <a:r>
+              <a:rPr lang="en-US" dirty="0" err="1" smtClean="0"/>
+              <a:t>maiores</a:t>
+            </a:r>
             <a:endParaRPr lang="en-US" dirty="0"/>
           </a:p>
         </p:txBody>
       </p:sp>
       <p:sp>
         <p:nvSpPr>
-          <p:cNvPr id="4" name="Slide Number Placeholder 3"/>
+          <p:cNvPr id="4" name="Espaço Reservado para Número de Slide 3"/>
           <p:cNvSpPr>
             <a:spLocks noGrp="1"/>
           </p:cNvSpPr>
@@ -569,19 +580,19 @@
           <a:bodyPr/>
           <a:lstStyle/>
           <a:p>
-            <a:fld id="{B58D2887-055A-41B0-AC51-1F18A5DF3030}" type="slidenum">
-              <a:rPr lang="en-US" smtClean="0"/>
+            <a:fld id="{280912AB-7E2A-4726-8C73-C75F6266AA28}" type="slidenum">
+              <a:rPr lang="es-MX" smtClean="0"/>
               <a:pPr/>
-              <a:t>6</a:t>
+              <a:t>3</a:t>
             </a:fld>
-            <a:endParaRPr lang="en-US"/>
+            <a:endParaRPr lang="es-MX"/>
           </a:p>
         </p:txBody>
       </p:sp>
     </p:spTree>
     <p:extLst>
       <p:ext uri="{BB962C8B-B14F-4D97-AF65-F5344CB8AC3E}">
-        <p14:creationId xmlns:p14="http://schemas.microsoft.com/office/powerpoint/2010/main" val="3247054436"/>
+        <p14:creationId xmlns:p14="http://schemas.microsoft.com/office/powerpoint/2010/main" val="3478287038"/>
       </p:ext>
     </p:extLst>
   </p:cSld>
@@ -657,7 +668,7 @@
             <a:fld id="{B58D2887-055A-41B0-AC51-1F18A5DF3030}" type="slidenum">
               <a:rPr lang="en-US" smtClean="0"/>
               <a:pPr/>
-              <a:t>13</a:t>
+              <a:t>6</a:t>
             </a:fld>
             <a:endParaRPr lang="en-US"/>
           </a:p>
@@ -666,7 +677,7 @@
     </p:spTree>
     <p:extLst>
       <p:ext uri="{BB962C8B-B14F-4D97-AF65-F5344CB8AC3E}">
-        <p14:creationId xmlns:p14="http://schemas.microsoft.com/office/powerpoint/2010/main" val="3815525976"/>
+        <p14:creationId xmlns:p14="http://schemas.microsoft.com/office/powerpoint/2010/main" val="3247054436"/>
       </p:ext>
     </p:extLst>
   </p:cSld>
@@ -695,6 +706,95 @@
       </p:grpSpPr>
       <p:sp>
         <p:nvSpPr>
+          <p:cNvPr id="2" name="Espaço Reservado para Imagem de Slide 1"/>
+          <p:cNvSpPr>
+            <a:spLocks noGrp="1" noRot="1" noChangeAspect="1"/>
+          </p:cNvSpPr>
+          <p:nvPr>
+            <p:ph type="sldImg"/>
+          </p:nvPr>
+        </p:nvSpPr>
+        <p:spPr/>
+      </p:sp>
+      <p:sp>
+        <p:nvSpPr>
+          <p:cNvPr id="3" name="Espaço Reservado para Anotações 2"/>
+          <p:cNvSpPr>
+            <a:spLocks noGrp="1"/>
+          </p:cNvSpPr>
+          <p:nvPr>
+            <p:ph type="body" idx="1"/>
+          </p:nvPr>
+        </p:nvSpPr>
+        <p:spPr/>
+        <p:txBody>
+          <a:bodyPr/>
+          <a:lstStyle/>
+          <a:p>
+            <a:r>
+              <a:rPr lang="en-US" dirty="0" err="1" smtClean="0"/>
+              <a:t>Tabela</a:t>
+            </a:r>
+            <a:endParaRPr lang="en-US" dirty="0"/>
+          </a:p>
+        </p:txBody>
+      </p:sp>
+      <p:sp>
+        <p:nvSpPr>
+          <p:cNvPr id="4" name="Espaço Reservado para Número de Slide 3"/>
+          <p:cNvSpPr>
+            <a:spLocks noGrp="1"/>
+          </p:cNvSpPr>
+          <p:nvPr>
+            <p:ph type="sldNum" sz="quarter" idx="10"/>
+          </p:nvPr>
+        </p:nvSpPr>
+        <p:spPr/>
+        <p:txBody>
+          <a:bodyPr/>
+          <a:lstStyle/>
+          <a:p>
+            <a:fld id="{280912AB-7E2A-4726-8C73-C75F6266AA28}" type="slidenum">
+              <a:rPr lang="es-MX" smtClean="0"/>
+              <a:pPr/>
+              <a:t>7</a:t>
+            </a:fld>
+            <a:endParaRPr lang="es-MX"/>
+          </a:p>
+        </p:txBody>
+      </p:sp>
+    </p:spTree>
+    <p:extLst>
+      <p:ext uri="{BB962C8B-B14F-4D97-AF65-F5344CB8AC3E}">
+        <p14:creationId xmlns:p14="http://schemas.microsoft.com/office/powerpoint/2010/main" val="1333304386"/>
+      </p:ext>
+    </p:extLst>
+  </p:cSld>
+  <p:clrMapOvr>
+    <a:masterClrMapping/>
+  </p:clrMapOvr>
+</p:notes>
+</file>
+
+<file path=ppt/notesSlides/notesSlide4.xml><?xml version="1.0" encoding="utf-8"?>
+<p:notes xmlns:a="http://schemas.openxmlformats.org/drawingml/2006/main" xmlns:r="http://schemas.openxmlformats.org/officeDocument/2006/relationships" xmlns:p="http://schemas.openxmlformats.org/presentationml/2006/main">
+  <p:cSld>
+    <p:spTree>
+      <p:nvGrpSpPr>
+        <p:cNvPr id="1" name=""/>
+        <p:cNvGrpSpPr/>
+        <p:nvPr/>
+      </p:nvGrpSpPr>
+      <p:grpSpPr>
+        <a:xfrm>
+          <a:off x="0" y="0"/>
+          <a:ext cx="0" cy="0"/>
+          <a:chOff x="0" y="0"/>
+          <a:chExt cx="0" cy="0"/>
+        </a:xfrm>
+      </p:grpSpPr>
+      <p:sp>
+        <p:nvSpPr>
           <p:cNvPr id="2" name="1 Marcador de imagen de diapositiva"/>
           <p:cNvSpPr>
             <a:spLocks noGrp="1" noRot="1" noChangeAspect="1"/>
@@ -2350,7 +2450,7 @@
             <a:fld id="{CE662E41-B9A8-4F82-BC8B-A810787C1BEE}" type="slidenum">
               <a:rPr lang="es-MX" smtClean="0"/>
               <a:pPr/>
-              <a:t>15</a:t>
+              <a:t>17</a:t>
             </a:fld>
             <a:endParaRPr lang="es-MX"/>
           </a:p>
@@ -5379,19 +5479,7 @@
                   </a:outerShdw>
                 </a:effectLst>
               </a:rPr>
-              <a:t>Análisis </a:t>
-            </a:r>
-            <a:r>
-              <a:rPr lang="es-MX" sz="5400" b="1" dirty="0" smtClean="0">
-                <a:effectLst>
-                  <a:outerShdw blurRad="38100" dist="38100" dir="2700000" algn="tl">
-                    <a:srgbClr val="000000">
-                      <a:alpha val="43137"/>
-                    </a:srgbClr>
-                  </a:outerShdw>
-                </a:effectLst>
-              </a:rPr>
-              <a:t>preliminares</a:t>
+              <a:t>Análisis preliminares</a:t>
             </a:r>
             <a:br>
               <a:rPr lang="es-MX" sz="5400" b="1" dirty="0" smtClean="0">
@@ -5414,43 +5502,7 @@
                   </a:outerShdw>
                 </a:effectLst>
               </a:rPr>
-              <a:t>de </a:t>
-            </a:r>
-            <a:r>
-              <a:rPr lang="es-MX" sz="5400" b="1" dirty="0" smtClean="0">
-                <a:effectLst>
-                  <a:outerShdw blurRad="38100" dist="38100" dir="2700000" algn="tl">
-                    <a:srgbClr val="000000">
-                      <a:alpha val="43137"/>
-                    </a:srgbClr>
-                  </a:outerShdw>
-                </a:effectLst>
-              </a:rPr>
-              <a:t>ZRP </a:t>
-            </a:r>
-            <a:r>
-              <a:rPr lang="es-MX" sz="5400" b="1" dirty="0" smtClean="0">
-                <a:effectLst>
-                  <a:outerShdw blurRad="38100" dist="38100" dir="2700000" algn="tl">
-                    <a:srgbClr val="000000">
-                      <a:alpha val="43137"/>
-                    </a:srgbClr>
-                  </a:outerShdw>
-                </a:effectLst>
-              </a:rPr>
-              <a:t>en Quintana </a:t>
-            </a:r>
-            <a:r>
-              <a:rPr lang="es-MX" sz="5400" b="1" dirty="0" smtClean="0">
-                <a:effectLst>
-                  <a:outerShdw blurRad="38100" dist="38100" dir="2700000" algn="tl">
-                    <a:srgbClr val="000000">
-                      <a:alpha val="43137"/>
-                    </a:srgbClr>
-                  </a:outerShdw>
-                </a:effectLst>
-              </a:rPr>
-              <a:t>Roo</a:t>
+              <a:t>de ZRP en Quintana Roo</a:t>
             </a:r>
             <a:endParaRPr lang="es-MX" sz="5400" b="1" dirty="0">
               <a:effectLst>
@@ -5460,64 +5512,6 @@
                   </a:srgbClr>
                 </a:outerShdw>
               </a:effectLst>
-            </a:endParaRPr>
-          </a:p>
-        </p:txBody>
-      </p:sp>
-      <p:sp>
-        <p:nvSpPr>
-          <p:cNvPr id="5" name="4 Subtítulo"/>
-          <p:cNvSpPr>
-            <a:spLocks noGrp="1"/>
-          </p:cNvSpPr>
-          <p:nvPr>
-            <p:ph type="subTitle" idx="1"/>
-          </p:nvPr>
-        </p:nvSpPr>
-        <p:spPr>
-          <a:xfrm>
-            <a:off x="0" y="5105400"/>
-            <a:ext cx="8533289" cy="1752600"/>
-          </a:xfrm>
-        </p:spPr>
-        <p:txBody>
-          <a:bodyPr anchor="b">
-            <a:normAutofit/>
-          </a:bodyPr>
-          <a:lstStyle/>
-          <a:p>
-            <a:pPr algn="l"/>
-            <a:r>
-              <a:rPr lang="es-MX" sz="2000" dirty="0" smtClean="0">
-                <a:solidFill>
-                  <a:schemeClr val="tx1"/>
-                </a:solidFill>
-              </a:rPr>
-              <a:t>Juan Carlos Villaseñor-Derbez</a:t>
-            </a:r>
-          </a:p>
-          <a:p>
-            <a:pPr algn="l"/>
-            <a:r>
-              <a:rPr lang="es-MX" sz="2000" dirty="0" smtClean="0">
-                <a:solidFill>
-                  <a:schemeClr val="tx1"/>
-                </a:solidFill>
-              </a:rPr>
-              <a:t>La Paz, 10 Octubre, </a:t>
-            </a:r>
-            <a:r>
-              <a:rPr lang="es-MX" sz="2000" dirty="0" smtClean="0">
-                <a:solidFill>
-                  <a:schemeClr val="tx1"/>
-                </a:solidFill>
-              </a:rPr>
-              <a:t>2016</a:t>
-            </a:r>
-            <a:endParaRPr lang="es-MX" sz="2000" dirty="0">
-              <a:solidFill>
-                <a:schemeClr val="tx1"/>
-              </a:solidFill>
             </a:endParaRPr>
           </a:p>
         </p:txBody>
@@ -5661,7 +5655,7 @@
                   </a:outerShdw>
                 </a:effectLst>
               </a:rPr>
-              <a:t>Selección de indicadores</a:t>
+              <a:t>ZRP Quintana Roo</a:t>
             </a:r>
             <a:endParaRPr lang="es-MX" b="1" dirty="0">
               <a:effectLst>
@@ -5682,7 +5676,7 @@
             <a:spLocks noGrp="1"/>
           </p:cNvSpPr>
           <p:nvPr>
-            <p:ph idx="1"/>
+            <p:ph sz="half" idx="1"/>
           </p:nvPr>
         </p:nvSpPr>
         <p:spPr/>
@@ -5692,492 +5686,68 @@
           <a:p>
             <a:r>
               <a:rPr lang="es-MX" dirty="0" smtClean="0"/>
-              <a:t>Alinear indicadores con objetivos </a:t>
-            </a:r>
-            <a:r>
-              <a:rPr lang="es-MX" sz="2400" dirty="0" smtClean="0"/>
-              <a:t>(y monitoreo)</a:t>
-            </a:r>
+              <a:t>3 Comunidades</a:t>
+            </a:r>
+          </a:p>
+          <a:p>
+            <a:pPr lvl="1"/>
             <a:r>
               <a:rPr lang="es-MX" dirty="0" smtClean="0"/>
-              <a:t> de reservas e instituciones</a:t>
-            </a:r>
-            <a:endParaRPr lang="es-MX" sz="2400" dirty="0" smtClean="0"/>
-          </a:p>
-          <a:p>
-            <a:endParaRPr lang="es-MX" sz="2800" dirty="0"/>
-          </a:p>
-        </p:txBody>
-      </p:sp>
-      <p:sp>
-        <p:nvSpPr>
-          <p:cNvPr id="4" name="3 Triángulo isósceles"/>
-          <p:cNvSpPr/>
-          <p:nvPr/>
-        </p:nvSpPr>
-        <p:spPr>
-          <a:xfrm>
-            <a:off x="2638822" y="4211796"/>
-            <a:ext cx="1224136" cy="1224136"/>
-          </a:xfrm>
-          <a:prstGeom prst="triangle">
-            <a:avLst/>
-          </a:prstGeom>
-        </p:spPr>
-        <p:style>
-          <a:lnRef idx="2">
-            <a:schemeClr val="accent1">
-              <a:shade val="50000"/>
-            </a:schemeClr>
-          </a:lnRef>
-          <a:fillRef idx="1">
-            <a:schemeClr val="accent1"/>
-          </a:fillRef>
-          <a:effectRef idx="0">
-            <a:schemeClr val="accent1"/>
-          </a:effectRef>
-          <a:fontRef idx="minor">
-            <a:schemeClr val="lt1"/>
-          </a:fontRef>
-        </p:style>
-        <p:txBody>
-          <a:bodyPr rtlCol="0" anchor="ctr"/>
+              <a:t>Maria Elena</a:t>
+            </a:r>
+          </a:p>
+          <a:p>
+            <a:r>
+              <a:rPr lang="es-MX" dirty="0" smtClean="0"/>
+              <a:t>4 </a:t>
+            </a:r>
+            <a:r>
+              <a:rPr lang="es-MX" dirty="0" smtClean="0"/>
+              <a:t>ZRP analizadas</a:t>
+            </a:r>
+          </a:p>
+          <a:p>
+            <a:pPr lvl="1"/>
+            <a:r>
+              <a:rPr lang="es-MX" dirty="0" smtClean="0"/>
+              <a:t>Monitoreos anuales</a:t>
+            </a:r>
+          </a:p>
+          <a:p>
+            <a:pPr lvl="1"/>
+            <a:r>
+              <a:rPr lang="es-MX" dirty="0" smtClean="0"/>
+              <a:t>Pesca – No Pesca</a:t>
+            </a:r>
+          </a:p>
+        </p:txBody>
+      </p:sp>
+      <p:sp>
+        <p:nvSpPr>
+          <p:cNvPr id="6" name="5 Marcador de contenido"/>
+          <p:cNvSpPr>
+            <a:spLocks noGrp="1"/>
+          </p:cNvSpPr>
+          <p:nvPr>
+            <p:ph sz="half" idx="2"/>
+          </p:nvPr>
+        </p:nvSpPr>
+        <p:spPr/>
+        <p:txBody>
+          <a:bodyPr/>
           <a:lstStyle/>
           <a:p>
-            <a:pPr algn="ctr"/>
-            <a:endParaRPr lang="es-MX"/>
-          </a:p>
-        </p:txBody>
-      </p:sp>
-      <p:cxnSp>
-        <p:nvCxnSpPr>
-          <p:cNvPr id="7" name="6 Conector recto"/>
-          <p:cNvCxnSpPr/>
-          <p:nvPr/>
-        </p:nvCxnSpPr>
-        <p:spPr>
-          <a:xfrm>
-            <a:off x="2062758" y="3635732"/>
-            <a:ext cx="2808312" cy="1368152"/>
-          </a:xfrm>
-          <a:prstGeom prst="line">
-            <a:avLst/>
-          </a:prstGeom>
-          <a:ln w="38100"/>
-        </p:spPr>
-        <p:style>
-          <a:lnRef idx="1">
-            <a:schemeClr val="accent1"/>
-          </a:lnRef>
-          <a:fillRef idx="0">
-            <a:schemeClr val="accent1"/>
-          </a:fillRef>
-          <a:effectRef idx="0">
-            <a:schemeClr val="accent1"/>
-          </a:effectRef>
-          <a:fontRef idx="minor">
-            <a:schemeClr val="tx1"/>
-          </a:fontRef>
-        </p:style>
-      </p:cxnSp>
-      <p:sp>
-        <p:nvSpPr>
-          <p:cNvPr id="9" name="8 CuadroTexto"/>
-          <p:cNvSpPr txBox="1"/>
-          <p:nvPr/>
-        </p:nvSpPr>
-        <p:spPr>
-          <a:xfrm>
-            <a:off x="2494806" y="5507940"/>
-            <a:ext cx="1366721" cy="369332"/>
-          </a:xfrm>
-          <a:prstGeom prst="rect">
-            <a:avLst/>
-          </a:prstGeom>
-          <a:noFill/>
-        </p:spPr>
-        <p:txBody>
-          <a:bodyPr wrap="none" rtlCol="0">
-            <a:spAutoFit/>
-          </a:bodyPr>
-          <a:lstStyle/>
-          <a:p>
-            <a:r>
-              <a:rPr lang="es-MX" b="1" dirty="0" smtClean="0">
-                <a:effectLst>
-                  <a:outerShdw blurRad="38100" dist="38100" dir="2700000" algn="tl">
-                    <a:srgbClr val="000000">
-                      <a:alpha val="43137"/>
-                    </a:srgbClr>
-                  </a:outerShdw>
-                </a:effectLst>
-              </a:rPr>
-              <a:t>Institución 1</a:t>
-            </a:r>
-            <a:endParaRPr lang="es-MX" b="1" dirty="0">
-              <a:effectLst>
-                <a:outerShdw blurRad="38100" dist="38100" dir="2700000" algn="tl">
-                  <a:srgbClr val="000000">
-                    <a:alpha val="43137"/>
-                  </a:srgbClr>
-                </a:outerShdw>
-              </a:effectLst>
-            </a:endParaRPr>
-          </a:p>
-        </p:txBody>
-      </p:sp>
-      <p:sp>
-        <p:nvSpPr>
-          <p:cNvPr id="10" name="9 CuadroTexto"/>
-          <p:cNvSpPr txBox="1"/>
-          <p:nvPr/>
-        </p:nvSpPr>
-        <p:spPr>
-          <a:xfrm>
-            <a:off x="8111430" y="5507940"/>
-            <a:ext cx="1366721" cy="369332"/>
-          </a:xfrm>
-          <a:prstGeom prst="rect">
-            <a:avLst/>
-          </a:prstGeom>
-          <a:noFill/>
-        </p:spPr>
-        <p:txBody>
-          <a:bodyPr wrap="none" rtlCol="0">
-            <a:spAutoFit/>
-          </a:bodyPr>
-          <a:lstStyle/>
-          <a:p>
-            <a:r>
-              <a:rPr lang="es-MX" b="1" dirty="0" smtClean="0">
-                <a:effectLst>
-                  <a:outerShdw blurRad="38100" dist="38100" dir="2700000" algn="tl">
-                    <a:srgbClr val="000000">
-                      <a:alpha val="43137"/>
-                    </a:srgbClr>
-                  </a:outerShdw>
-                </a:effectLst>
-              </a:rPr>
-              <a:t>Institución 2</a:t>
-            </a:r>
-            <a:endParaRPr lang="es-MX" b="1" dirty="0">
-              <a:effectLst>
-                <a:outerShdw blurRad="38100" dist="38100" dir="2700000" algn="tl">
-                  <a:srgbClr val="000000">
-                    <a:alpha val="43137"/>
-                  </a:srgbClr>
-                </a:outerShdw>
-              </a:effectLst>
-            </a:endParaRPr>
-          </a:p>
-        </p:txBody>
-      </p:sp>
-      <p:sp>
-        <p:nvSpPr>
-          <p:cNvPr id="11" name="10 Triángulo isósceles"/>
-          <p:cNvSpPr/>
-          <p:nvPr/>
-        </p:nvSpPr>
-        <p:spPr>
-          <a:xfrm flipH="1">
-            <a:off x="8111430" y="4221088"/>
-            <a:ext cx="1224136" cy="1224136"/>
-          </a:xfrm>
-          <a:prstGeom prst="triangle">
-            <a:avLst/>
-          </a:prstGeom>
-        </p:spPr>
-        <p:style>
-          <a:lnRef idx="2">
-            <a:schemeClr val="accent1">
-              <a:shade val="50000"/>
-            </a:schemeClr>
-          </a:lnRef>
-          <a:fillRef idx="1">
-            <a:schemeClr val="accent1"/>
-          </a:fillRef>
-          <a:effectRef idx="0">
-            <a:schemeClr val="accent1"/>
-          </a:effectRef>
-          <a:fontRef idx="minor">
-            <a:schemeClr val="lt1"/>
-          </a:fontRef>
-        </p:style>
-        <p:txBody>
-          <a:bodyPr rtlCol="0" anchor="ctr"/>
-          <a:lstStyle/>
-          <a:p>
-            <a:pPr algn="ctr"/>
-            <a:endParaRPr lang="es-MX"/>
-          </a:p>
-        </p:txBody>
-      </p:sp>
-      <p:cxnSp>
-        <p:nvCxnSpPr>
-          <p:cNvPr id="12" name="11 Conector recto"/>
-          <p:cNvCxnSpPr/>
-          <p:nvPr/>
-        </p:nvCxnSpPr>
-        <p:spPr>
-          <a:xfrm flipH="1">
-            <a:off x="7103318" y="3645024"/>
-            <a:ext cx="2808312" cy="1368152"/>
-          </a:xfrm>
-          <a:prstGeom prst="line">
-            <a:avLst/>
-          </a:prstGeom>
-          <a:ln w="38100"/>
-        </p:spPr>
-        <p:style>
-          <a:lnRef idx="1">
-            <a:schemeClr val="accent1"/>
-          </a:lnRef>
-          <a:fillRef idx="0">
-            <a:schemeClr val="accent1"/>
-          </a:fillRef>
-          <a:effectRef idx="0">
-            <a:schemeClr val="accent1"/>
-          </a:effectRef>
-          <a:fontRef idx="minor">
-            <a:schemeClr val="tx1"/>
-          </a:fontRef>
-        </p:style>
-      </p:cxnSp>
-      <p:sp>
-        <p:nvSpPr>
-          <p:cNvPr id="13" name="12 CuadroTexto"/>
-          <p:cNvSpPr txBox="1"/>
-          <p:nvPr/>
-        </p:nvSpPr>
-        <p:spPr>
-          <a:xfrm>
-            <a:off x="2134766" y="3356992"/>
-            <a:ext cx="3169137" cy="1477328"/>
-          </a:xfrm>
-          <a:prstGeom prst="rect">
-            <a:avLst/>
-          </a:prstGeom>
-          <a:noFill/>
-        </p:spPr>
-        <p:txBody>
-          <a:bodyPr wrap="none" rtlCol="0">
-            <a:spAutoFit/>
-          </a:bodyPr>
-          <a:lstStyle/>
-          <a:p>
-            <a:r>
-              <a:rPr lang="es-MX" b="1" dirty="0" smtClean="0">
-                <a:effectLst>
-                  <a:outerShdw blurRad="38100" dist="38100" dir="2700000" algn="tl">
-                    <a:srgbClr val="000000">
-                      <a:alpha val="43137"/>
-                    </a:srgbClr>
-                  </a:outerShdw>
-                </a:effectLst>
-              </a:rPr>
-              <a:t>Socioeconómicos</a:t>
-            </a:r>
-          </a:p>
-          <a:p>
-            <a:endParaRPr lang="es-MX" b="1" dirty="0">
-              <a:effectLst>
-                <a:outerShdw blurRad="38100" dist="38100" dir="2700000" algn="tl">
-                  <a:srgbClr val="000000">
-                    <a:alpha val="43137"/>
-                  </a:srgbClr>
-                </a:outerShdw>
-              </a:effectLst>
-            </a:endParaRPr>
-          </a:p>
-          <a:p>
-            <a:r>
-              <a:rPr lang="es-MX" b="1" dirty="0" smtClean="0">
-                <a:effectLst>
-                  <a:outerShdw blurRad="38100" dist="38100" dir="2700000" algn="tl">
-                    <a:srgbClr val="000000">
-                      <a:alpha val="43137"/>
-                    </a:srgbClr>
-                  </a:outerShdw>
-                </a:effectLst>
-              </a:rPr>
-              <a:t>	Gobernanza</a:t>
-            </a:r>
-          </a:p>
-          <a:p>
-            <a:endParaRPr lang="es-MX" b="1" dirty="0">
-              <a:effectLst>
-                <a:outerShdw blurRad="38100" dist="38100" dir="2700000" algn="tl">
-                  <a:srgbClr val="000000">
-                    <a:alpha val="43137"/>
-                  </a:srgbClr>
-                </a:outerShdw>
-              </a:effectLst>
-            </a:endParaRPr>
-          </a:p>
-          <a:p>
-            <a:r>
-              <a:rPr lang="es-MX" b="1" dirty="0" smtClean="0">
-                <a:effectLst>
-                  <a:outerShdw blurRad="38100" dist="38100" dir="2700000" algn="tl">
-                    <a:srgbClr val="000000">
-                      <a:alpha val="43137"/>
-                    </a:srgbClr>
-                  </a:outerShdw>
-                </a:effectLst>
-              </a:rPr>
-              <a:t>		     Biofísicos</a:t>
-            </a:r>
-            <a:endParaRPr lang="es-MX" b="1" dirty="0">
-              <a:effectLst>
-                <a:outerShdw blurRad="38100" dist="38100" dir="2700000" algn="tl">
-                  <a:srgbClr val="000000">
-                    <a:alpha val="43137"/>
-                  </a:srgbClr>
-                </a:outerShdw>
-              </a:effectLst>
-            </a:endParaRPr>
-          </a:p>
-        </p:txBody>
-      </p:sp>
-      <p:sp>
-        <p:nvSpPr>
-          <p:cNvPr id="14" name="13 CuadroTexto"/>
-          <p:cNvSpPr txBox="1"/>
-          <p:nvPr/>
-        </p:nvSpPr>
-        <p:spPr>
-          <a:xfrm>
-            <a:off x="6311230" y="3356992"/>
-            <a:ext cx="3672408" cy="1477328"/>
-          </a:xfrm>
-          <a:prstGeom prst="rect">
-            <a:avLst/>
-          </a:prstGeom>
-          <a:noFill/>
-        </p:spPr>
-        <p:txBody>
-          <a:bodyPr wrap="square" rtlCol="0">
-            <a:spAutoFit/>
-          </a:bodyPr>
-          <a:lstStyle/>
-          <a:p>
-            <a:r>
-              <a:rPr lang="es-MX" b="1" dirty="0" smtClean="0">
-                <a:effectLst>
-                  <a:outerShdw blurRad="38100" dist="38100" dir="2700000" algn="tl">
-                    <a:srgbClr val="000000">
-                      <a:alpha val="43137"/>
-                    </a:srgbClr>
-                  </a:outerShdw>
-                </a:effectLst>
-              </a:rPr>
-              <a:t>		              Biofísicos</a:t>
-            </a:r>
-          </a:p>
-          <a:p>
-            <a:endParaRPr lang="es-MX" b="1" dirty="0">
-              <a:effectLst>
-                <a:outerShdw blurRad="38100" dist="38100" dir="2700000" algn="tl">
-                  <a:srgbClr val="000000">
-                    <a:alpha val="43137"/>
-                  </a:srgbClr>
-                </a:outerShdw>
-              </a:effectLst>
-            </a:endParaRPr>
-          </a:p>
-          <a:p>
-            <a:r>
-              <a:rPr lang="es-MX" b="1" dirty="0" smtClean="0">
-                <a:effectLst>
-                  <a:outerShdw blurRad="38100" dist="38100" dir="2700000" algn="tl">
-                    <a:srgbClr val="000000">
-                      <a:alpha val="43137"/>
-                    </a:srgbClr>
-                  </a:outerShdw>
-                </a:effectLst>
-              </a:rPr>
-              <a:t>	      Gobernanza</a:t>
-            </a:r>
-          </a:p>
-          <a:p>
-            <a:endParaRPr lang="es-MX" b="1" dirty="0" smtClean="0">
-              <a:effectLst>
-                <a:outerShdw blurRad="38100" dist="38100" dir="2700000" algn="tl">
-                  <a:srgbClr val="000000">
-                    <a:alpha val="43137"/>
-                  </a:srgbClr>
-                </a:outerShdw>
-              </a:effectLst>
-            </a:endParaRPr>
-          </a:p>
-          <a:p>
-            <a:r>
-              <a:rPr lang="es-MX" b="1" dirty="0" smtClean="0">
-                <a:effectLst>
-                  <a:outerShdw blurRad="38100" dist="38100" dir="2700000" algn="tl">
-                    <a:srgbClr val="000000">
-                      <a:alpha val="43137"/>
-                    </a:srgbClr>
-                  </a:outerShdw>
-                </a:effectLst>
-              </a:rPr>
-              <a:t> Socioeconómicos</a:t>
-            </a:r>
-            <a:endParaRPr lang="es-MX" b="1" dirty="0">
-              <a:effectLst>
-                <a:outerShdw blurRad="38100" dist="38100" dir="2700000" algn="tl">
-                  <a:srgbClr val="000000">
-                    <a:alpha val="43137"/>
-                  </a:srgbClr>
-                </a:outerShdw>
-              </a:effectLst>
-            </a:endParaRPr>
-          </a:p>
-        </p:txBody>
-      </p:sp>
-      <p:sp>
-        <p:nvSpPr>
-          <p:cNvPr id="15" name="14 CuadroTexto"/>
-          <p:cNvSpPr txBox="1"/>
-          <p:nvPr/>
-        </p:nvSpPr>
-        <p:spPr>
-          <a:xfrm>
-            <a:off x="4078982" y="2132856"/>
-            <a:ext cx="3868367" cy="3154710"/>
-          </a:xfrm>
-          <a:prstGeom prst="rect">
-            <a:avLst/>
-          </a:prstGeom>
-          <a:noFill/>
-        </p:spPr>
-        <p:txBody>
-          <a:bodyPr wrap="none" rtlCol="0">
-            <a:spAutoFit/>
-          </a:bodyPr>
-          <a:lstStyle/>
-          <a:p>
-            <a:r>
-              <a:rPr lang="es-MX" sz="19900" b="1" dirty="0" smtClean="0">
-                <a:effectLst>
-                  <a:outerShdw blurRad="38100" dist="38100" dir="2700000" algn="tl">
-                    <a:srgbClr val="000000">
-                      <a:alpha val="43137"/>
-                    </a:srgbClr>
-                  </a:outerShdw>
-                </a:effectLst>
-              </a:rPr>
-              <a:t>1/2</a:t>
-            </a:r>
-            <a:endParaRPr lang="es-MX" b="1" dirty="0">
-              <a:effectLst>
-                <a:outerShdw blurRad="38100" dist="38100" dir="2700000" algn="tl">
-                  <a:srgbClr val="000000">
-                    <a:alpha val="43137"/>
-                  </a:srgbClr>
-                </a:outerShdw>
-              </a:effectLst>
-            </a:endParaRPr>
+            <a:r>
+              <a:rPr lang="es-MX" dirty="0" smtClean="0"/>
+              <a:t>Primera prueba de evaluación</a:t>
+            </a:r>
+          </a:p>
+          <a:p>
+            <a:r>
+              <a:rPr lang="es-MX" dirty="0" smtClean="0"/>
+              <a:t>Únicamente indicadores biofísicos</a:t>
+            </a:r>
+            <a:endParaRPr lang="es-MX" dirty="0"/>
           </a:p>
         </p:txBody>
       </p:sp>
@@ -6189,80 +5759,9 @@
   <p:timing>
     <p:tnLst>
       <p:par>
-        <p:cTn id="1" dur="indefinite" restart="never" nodeType="tmRoot">
-          <p:childTnLst>
-            <p:seq concurrent="1" nextAc="seek">
-              <p:cTn id="2" dur="indefinite" nodeType="mainSeq">
-                <p:childTnLst>
-                  <p:par>
-                    <p:cTn id="3" fill="hold">
-                      <p:stCondLst>
-                        <p:cond delay="indefinite"/>
-                      </p:stCondLst>
-                      <p:childTnLst>
-                        <p:par>
-                          <p:cTn id="4" fill="hold">
-                            <p:stCondLst>
-                              <p:cond delay="0"/>
-                            </p:stCondLst>
-                            <p:childTnLst>
-                              <p:par>
-                                <p:cTn id="5" presetID="1" presetClass="entr" presetSubtype="0" fill="hold" grpId="0" nodeType="clickEffect">
-                                  <p:stCondLst>
-                                    <p:cond delay="0"/>
-                                  </p:stCondLst>
-                                  <p:childTnLst>
-                                    <p:set>
-                                      <p:cBhvr>
-                                        <p:cTn id="6" dur="1" fill="hold">
-                                          <p:stCondLst>
-                                            <p:cond delay="0"/>
-                                          </p:stCondLst>
-                                        </p:cTn>
-                                        <p:tgtEl>
-                                          <p:spTgt spid="15"/>
-                                        </p:tgtEl>
-                                        <p:attrNameLst>
-                                          <p:attrName>style.visibility</p:attrName>
-                                        </p:attrNameLst>
-                                      </p:cBhvr>
-                                      <p:to>
-                                        <p:strVal val="visible"/>
-                                      </p:to>
-                                    </p:set>
-                                  </p:childTnLst>
-                                </p:cTn>
-                              </p:par>
-                            </p:childTnLst>
-                          </p:cTn>
-                        </p:par>
-                      </p:childTnLst>
-                    </p:cTn>
-                  </p:par>
-                </p:childTnLst>
-              </p:cTn>
-              <p:prevCondLst>
-                <p:cond evt="onPrev" delay="0">
-                  <p:tgtEl>
-                    <p:sldTgt/>
-                  </p:tgtEl>
-                </p:cond>
-              </p:prevCondLst>
-              <p:nextCondLst>
-                <p:cond evt="onNext" delay="0">
-                  <p:tgtEl>
-                    <p:sldTgt/>
-                  </p:tgtEl>
-                </p:cond>
-              </p:nextCondLst>
-            </p:seq>
-          </p:childTnLst>
-        </p:cTn>
+        <p:cTn id="1" dur="indefinite" restart="never" nodeType="tmRoot"/>
       </p:par>
     </p:tnLst>
-    <p:bldLst>
-      <p:bldP spid="15" grpId="0"/>
-    </p:bldLst>
   </p:timing>
 </p:sld>
 </file>
@@ -6309,7 +5808,7 @@
                   </a:outerShdw>
                 </a:effectLst>
               </a:rPr>
-              <a:t>Análisis</a:t>
+              <a:t>Objetivos</a:t>
             </a:r>
             <a:endParaRPr lang="es-MX" b="1" dirty="0">
               <a:effectLst>
@@ -6325,51 +5824,106 @@
       </p:sp>
       <p:sp>
         <p:nvSpPr>
-          <p:cNvPr id="3" name="2 Marcador de contenido"/>
-          <p:cNvSpPr>
-            <a:spLocks noGrp="1"/>
-          </p:cNvSpPr>
-          <p:nvPr>
-            <p:ph idx="1"/>
-          </p:nvPr>
-        </p:nvSpPr>
-        <p:spPr/>
-        <p:txBody>
-          <a:bodyPr/>
+          <p:cNvPr id="6" name="5 Rectángulo"/>
+          <p:cNvSpPr/>
+          <p:nvPr/>
+        </p:nvSpPr>
+        <p:spPr>
+          <a:xfrm>
+            <a:off x="1054647" y="1556792"/>
+            <a:ext cx="9937104" cy="2862322"/>
+          </a:xfrm>
+          <a:prstGeom prst="rect">
+            <a:avLst/>
+          </a:prstGeom>
+        </p:spPr>
+        <p:txBody>
+          <a:bodyPr wrap="square">
+            <a:spAutoFit/>
+          </a:bodyPr>
           <a:lstStyle/>
           <a:p>
+            <a:endParaRPr lang="es-MX" dirty="0" smtClean="0"/>
+          </a:p>
+          <a:p>
             <a:r>
               <a:rPr lang="es-MX" dirty="0" smtClean="0"/>
-              <a:t>Replicables</a:t>
-            </a:r>
-          </a:p>
-          <a:p>
+              <a:t>1. Contribuir a recuperar las poblaciones de especies objetivo de las pesquerías, como </a:t>
+            </a:r>
+            <a:r>
+              <a:rPr lang="es-MX" b="1" dirty="0" smtClean="0"/>
+              <a:t>langosta, caracol rosado y varias especies de peces</a:t>
+            </a:r>
             <a:r>
               <a:rPr lang="es-MX" dirty="0" smtClean="0"/>
-              <a:t>Estandarizados</a:t>
+              <a:t>, ayudando al reclutamiento, el crecimiento y la densidad para mejorar el éxito reproductivo. </a:t>
             </a:r>
           </a:p>
           <a:p>
             <a:r>
               <a:rPr lang="es-MX" dirty="0" smtClean="0"/>
-              <a:t>Sencillos</a:t>
-            </a:r>
-          </a:p>
-          <a:p>
+              <a:t>2. Contribuir </a:t>
+            </a:r>
+            <a:r>
+              <a:rPr lang="es-MX" b="1" dirty="0" smtClean="0"/>
+              <a:t>a mejorar la productividad </a:t>
+            </a:r>
             <a:r>
               <a:rPr lang="es-MX" dirty="0" smtClean="0"/>
-              <a:t>Robustos</a:t>
-            </a:r>
-          </a:p>
-          <a:p>
-            <a:endParaRPr lang="es-MX" dirty="0"/>
+              <a:t>pesquera a mediano plazo recuperando la biomasa. </a:t>
+            </a:r>
           </a:p>
           <a:p>
             <a:r>
               <a:rPr lang="es-MX" dirty="0" smtClean="0"/>
-              <a:t>A nivel de sitio (polígono) y localidad (comunidad)</a:t>
-            </a:r>
-            <a:endParaRPr lang="es-MX" dirty="0"/>
+              <a:t>3. Ayudar a </a:t>
+            </a:r>
+            <a:r>
+              <a:rPr lang="es-MX" b="1" dirty="0" smtClean="0"/>
+              <a:t>aumentar la resiliencia </a:t>
+            </a:r>
+            <a:r>
+              <a:rPr lang="es-MX" dirty="0" smtClean="0"/>
+              <a:t>de los ecosistemas y de la pesca ante perturbaciones climáticas o presiones </a:t>
+            </a:r>
+            <a:r>
+              <a:rPr lang="es-MX" dirty="0" err="1" smtClean="0"/>
+              <a:t>antropogénicas</a:t>
+            </a:r>
+            <a:r>
+              <a:rPr lang="es-MX" dirty="0" smtClean="0"/>
+              <a:t>. </a:t>
+            </a:r>
+          </a:p>
+          <a:p>
+            <a:r>
+              <a:rPr lang="es-MX" dirty="0" smtClean="0"/>
+              <a:t>4. </a:t>
+            </a:r>
+            <a:r>
+              <a:rPr lang="es-MX" b="1" dirty="0" smtClean="0"/>
+              <a:t>Proteger una porción del hábitat</a:t>
+            </a:r>
+            <a:r>
+              <a:rPr lang="es-MX" dirty="0" smtClean="0"/>
+              <a:t>, la biodiversidad y los procesos ecológicos de los ecosistemas coralinos, de la laguna </a:t>
+            </a:r>
+            <a:r>
+              <a:rPr lang="es-MX" dirty="0" err="1" smtClean="0"/>
+              <a:t>arrecifal</a:t>
+            </a:r>
+            <a:r>
+              <a:rPr lang="es-MX" dirty="0" smtClean="0"/>
+              <a:t> y de los humedales, </a:t>
+            </a:r>
+            <a:r>
+              <a:rPr lang="es-MX" b="1" dirty="0" smtClean="0"/>
+              <a:t>con la restauración de sus funciones tróficas</a:t>
+            </a:r>
+            <a:r>
+              <a:rPr lang="es-MX" dirty="0" smtClean="0"/>
+              <a:t> de importancia para las especies comerciales pesqueras. </a:t>
+            </a:r>
           </a:p>
         </p:txBody>
       </p:sp>
@@ -6407,12 +5961,12 @@
       </p:grpSpPr>
       <p:sp>
         <p:nvSpPr>
-          <p:cNvPr id="4" name="3 Título"/>
+          <p:cNvPr id="4" name="3 Marcador de texto"/>
           <p:cNvSpPr>
             <a:spLocks noGrp="1"/>
           </p:cNvSpPr>
           <p:nvPr>
-            <p:ph type="title"/>
+            <p:ph type="body" idx="1"/>
           </p:nvPr>
         </p:nvSpPr>
         <p:spPr/>
@@ -6421,50 +5975,8 @@
           <a:lstStyle/>
           <a:p>
             <a:r>
-              <a:rPr lang="es-MX" b="1" dirty="0" err="1" smtClean="0">
-                <a:effectLst>
-                  <a:outerShdw blurRad="38100" dist="38100" dir="2700000" algn="tl">
-                    <a:srgbClr val="000000">
-                      <a:alpha val="43137"/>
-                    </a:srgbClr>
-                  </a:outerShdw>
-                </a:effectLst>
-              </a:rPr>
-              <a:t>TURFeffect</a:t>
-            </a:r>
-            <a:endParaRPr lang="es-MX" b="1" dirty="0">
-              <a:effectLst>
-                <a:outerShdw blurRad="38100" dist="38100" dir="2700000" algn="tl">
-                  <a:srgbClr val="000000">
-                    <a:alpha val="43137"/>
-                  </a:srgbClr>
-                </a:outerShdw>
-              </a:effectLst>
-            </a:endParaRPr>
-          </a:p>
-        </p:txBody>
-      </p:sp>
-      <p:sp>
-        <p:nvSpPr>
-          <p:cNvPr id="5" name="4 Marcador de contenido"/>
-          <p:cNvSpPr>
-            <a:spLocks noGrp="1"/>
-          </p:cNvSpPr>
-          <p:nvPr>
-            <p:ph sz="half" idx="1"/>
-          </p:nvPr>
-        </p:nvSpPr>
-        <p:spPr/>
-        <p:txBody>
-          <a:bodyPr/>
-          <a:lstStyle/>
-          <a:p>
-            <a:pPr>
-              <a:buNone/>
-            </a:pPr>
-            <a:r>
               <a:rPr lang="es-MX" dirty="0" smtClean="0"/>
-              <a:t>	Manual de protocolo para la evaluación de zonas de no pesca en México</a:t>
+              <a:t>Indicadores</a:t>
             </a:r>
             <a:endParaRPr lang="es-MX" dirty="0"/>
           </a:p>
@@ -6472,7 +5984,7 @@
       </p:sp>
       <p:sp>
         <p:nvSpPr>
-          <p:cNvPr id="6" name="5 Marcador de contenido"/>
+          <p:cNvPr id="3" name="2 Marcador de contenido"/>
           <p:cNvSpPr>
             <a:spLocks noGrp="1"/>
           </p:cNvSpPr>
@@ -6485,12 +5997,84 @@
           <a:bodyPr/>
           <a:lstStyle/>
           <a:p>
-            <a:pPr>
+            <a:r>
+              <a:rPr lang="es-MX" dirty="0" smtClean="0"/>
+              <a:t>Densidad (p, i, o)</a:t>
+            </a:r>
+          </a:p>
+          <a:p>
+            <a:r>
+              <a:rPr lang="es-MX" dirty="0" smtClean="0"/>
+              <a:t>Riqueza (p)</a:t>
+            </a:r>
+          </a:p>
+          <a:p>
+            <a:r>
+              <a:rPr lang="es-MX" dirty="0" smtClean="0"/>
+              <a:t>Biomasa (p, o)</a:t>
+            </a:r>
+          </a:p>
+          <a:p>
+            <a:r>
+              <a:rPr lang="es-MX" dirty="0" smtClean="0"/>
+              <a:t>Estructura trófica (p)</a:t>
+            </a:r>
+          </a:p>
+        </p:txBody>
+      </p:sp>
+      <p:sp>
+        <p:nvSpPr>
+          <p:cNvPr id="5" name="4 Marcador de texto"/>
+          <p:cNvSpPr>
+            <a:spLocks noGrp="1"/>
+          </p:cNvSpPr>
+          <p:nvPr>
+            <p:ph type="body" sz="quarter" idx="3"/>
+          </p:nvPr>
+        </p:nvSpPr>
+        <p:spPr/>
+        <p:txBody>
+          <a:bodyPr/>
+          <a:lstStyle/>
+          <a:p>
+            <a:r>
+              <a:rPr lang="es-MX" dirty="0" smtClean="0"/>
+              <a:t>Análisis</a:t>
+            </a:r>
+            <a:endParaRPr lang="es-MX" dirty="0"/>
+          </a:p>
+        </p:txBody>
+      </p:sp>
+      <p:sp>
+        <p:nvSpPr>
+          <p:cNvPr id="6" name="5 Marcador de contenido"/>
+          <p:cNvSpPr>
+            <a:spLocks noGrp="1"/>
+          </p:cNvSpPr>
+          <p:nvPr>
+            <p:ph sz="quarter" idx="4"/>
+          </p:nvPr>
+        </p:nvSpPr>
+        <p:spPr/>
+        <p:txBody>
+          <a:bodyPr/>
+          <a:lstStyle/>
+          <a:p>
+            <a:r>
+              <a:rPr lang="es-MX" dirty="0" smtClean="0"/>
+              <a:t>Regresión lineal múltiple:</a:t>
+            </a:r>
+          </a:p>
+          <a:p>
+            <a:endParaRPr lang="es-MX" dirty="0" smtClean="0"/>
+          </a:p>
+          <a:p>
+            <a:pPr lvl="1">
               <a:buNone/>
             </a:pPr>
             <a:r>
               <a:rPr lang="es-MX" dirty="0" smtClean="0"/>
-              <a:t>	Aplicación basada en el manual para el análisis automatizado  y estandarizado</a:t>
+              <a:t>Indicador = Año + Zona + Año::Zona</a:t>
             </a:r>
             <a:endParaRPr lang="es-MX" dirty="0"/>
           </a:p>
@@ -6528,16 +6112,24 @@
           <a:chExt cx="0" cy="0"/>
         </a:xfrm>
       </p:grpSpPr>
-      <p:sp>
-        <p:nvSpPr>
-          <p:cNvPr id="6" name="Rectangle 5"/>
-          <p:cNvSpPr/>
+      <p:pic>
+        <p:nvPicPr>
+          <p:cNvPr id="1027" name="Picture 3" descr="C:\Users\JC\Documents\GitHub\QRoo\legend.png"/>
+          <p:cNvPicPr>
+            <a:picLocks noChangeAspect="1" noChangeArrowheads="1"/>
+          </p:cNvPicPr>
           <p:nvPr/>
-        </p:nvSpPr>
-        <p:spPr>
+        </p:nvPicPr>
+        <p:blipFill>
+          <a:blip r:embed="rId2" cstate="print"/>
+          <a:stretch>
+            <a:fillRect/>
+          </a:stretch>
+        </p:blipFill>
+        <p:spPr bwMode="auto">
           <a:xfrm>
-            <a:off x="1922892" y="2191407"/>
-            <a:ext cx="8344629" cy="4099034"/>
+            <a:off x="5064493" y="260649"/>
+            <a:ext cx="3767017" cy="572977"/>
           </a:xfrm>
           <a:prstGeom prst="rect">
             <a:avLst/>
@@ -6547,439 +6139,77 @@
             <a:noFill/>
           </a:ln>
         </p:spPr>
-        <p:style>
-          <a:lnRef idx="2">
-            <a:schemeClr val="accent1">
-              <a:shade val="50000"/>
-            </a:schemeClr>
-          </a:lnRef>
-          <a:fillRef idx="1">
-            <a:schemeClr val="accent1"/>
-          </a:fillRef>
-          <a:effectRef idx="0">
-            <a:schemeClr val="accent1"/>
-          </a:effectRef>
-          <a:fontRef idx="minor">
-            <a:schemeClr val="lt1"/>
-          </a:fontRef>
-        </p:style>
-        <p:txBody>
-          <a:bodyPr rtlCol="0" anchor="ctr"/>
-          <a:lstStyle/>
-          <a:p>
-            <a:pPr algn="ctr"/>
-            <a:endParaRPr lang="en-US"/>
-          </a:p>
-        </p:txBody>
-      </p:sp>
-      <p:sp>
-        <p:nvSpPr>
-          <p:cNvPr id="7" name="Title 1"/>
-          <p:cNvSpPr txBox="1">
-            <a:spLocks/>
-          </p:cNvSpPr>
-          <p:nvPr/>
+      </p:pic>
+      <p:sp>
+        <p:nvSpPr>
+          <p:cNvPr id="4" name="3 Título"/>
+          <p:cNvSpPr>
+            <a:spLocks noGrp="1"/>
+          </p:cNvSpPr>
+          <p:nvPr>
+            <p:ph type="title"/>
+          </p:nvPr>
         </p:nvSpPr>
         <p:spPr>
           <a:xfrm>
-            <a:off x="1918742" y="1556792"/>
-            <a:ext cx="8640959" cy="4896544"/>
+            <a:off x="0" y="0"/>
+            <a:ext cx="4837613" cy="1143000"/>
           </a:xfrm>
-          <a:prstGeom prst="rect">
-            <a:avLst/>
-          </a:prstGeom>
         </p:spPr>
         <p:txBody>
-          <a:bodyPr vert="horz" lIns="91440" tIns="45720" rIns="91440" bIns="45720" rtlCol="0" anchor="t">
-            <a:noAutofit/>
+          <a:bodyPr>
+            <a:normAutofit fontScale="90000"/>
           </a:bodyPr>
-          <a:lstStyle>
-            <a:lvl1pPr algn="l" defTabSz="914400" rtl="0" eaLnBrk="1" latinLnBrk="0" hangingPunct="1">
-              <a:lnSpc>
-                <a:spcPct val="90000"/>
-              </a:lnSpc>
-              <a:spcBef>
-                <a:spcPct val="0"/>
-              </a:spcBef>
-              <a:buNone/>
-              <a:defRPr sz="4400" kern="1200">
-                <a:solidFill>
-                  <a:schemeClr val="tx1"/>
-                </a:solidFill>
-                <a:latin typeface="+mj-lt"/>
-                <a:ea typeface="+mj-ea"/>
-                <a:cs typeface="+mj-cs"/>
-              </a:defRPr>
-            </a:lvl1pPr>
-          </a:lstStyle>
-          <a:p>
-            <a:pPr marL="228600" lvl="0" indent="-228600">
-              <a:spcBef>
-                <a:spcPts val="1000"/>
-              </a:spcBef>
-              <a:buFont typeface="Arial" panose="020B0604020202020204" pitchFamily="34" charset="0"/>
-              <a:buChar char="•"/>
-            </a:pPr>
-            <a:r>
-              <a:rPr lang="en-US" sz="2800" dirty="0" err="1" smtClean="0">
-                <a:latin typeface="Calibri" panose="020F0502020204030204"/>
-                <a:ea typeface="+mn-ea"/>
-                <a:cs typeface="+mn-cs"/>
-              </a:rPr>
-              <a:t>Introducción</a:t>
-            </a:r>
-            <a:endParaRPr lang="en-US" sz="2800" dirty="0" smtClean="0">
-              <a:latin typeface="Calibri" panose="020F0502020204030204"/>
-              <a:ea typeface="+mn-ea"/>
-              <a:cs typeface="+mn-cs"/>
-            </a:endParaRPr>
-          </a:p>
-          <a:p>
-            <a:pPr marL="228600" lvl="0" indent="-228600">
-              <a:spcBef>
-                <a:spcPts val="1000"/>
-              </a:spcBef>
-              <a:buFont typeface="Arial" panose="020B0604020202020204" pitchFamily="34" charset="0"/>
-              <a:buChar char="•"/>
-            </a:pPr>
-            <a:r>
-              <a:rPr lang="en-US" sz="2800" dirty="0" err="1" smtClean="0">
-                <a:latin typeface="Calibri" panose="020F0502020204030204"/>
-                <a:ea typeface="+mn-ea"/>
-                <a:cs typeface="+mn-cs"/>
-              </a:rPr>
-              <a:t>Selección</a:t>
-            </a:r>
-            <a:r>
-              <a:rPr lang="en-US" sz="2800" dirty="0" smtClean="0">
-                <a:latin typeface="Calibri" panose="020F0502020204030204"/>
-                <a:ea typeface="+mn-ea"/>
-                <a:cs typeface="+mn-cs"/>
-              </a:rPr>
-              <a:t> de </a:t>
-            </a:r>
-            <a:r>
-              <a:rPr lang="en-US" sz="2800" dirty="0" err="1" smtClean="0">
-                <a:latin typeface="Calibri" panose="020F0502020204030204"/>
-                <a:ea typeface="+mn-ea"/>
-                <a:cs typeface="+mn-cs"/>
-              </a:rPr>
-              <a:t>indicadores</a:t>
-            </a:r>
-            <a:endParaRPr lang="en-US" sz="2800" dirty="0" smtClean="0">
-              <a:latin typeface="Calibri" panose="020F0502020204030204"/>
-              <a:ea typeface="+mn-ea"/>
-              <a:cs typeface="+mn-cs"/>
-            </a:endParaRPr>
-          </a:p>
-          <a:p>
-            <a:pPr marL="228600" lvl="0" indent="-228600">
-              <a:spcBef>
-                <a:spcPts val="1000"/>
-              </a:spcBef>
-              <a:buFont typeface="Arial" panose="020B0604020202020204" pitchFamily="34" charset="0"/>
-              <a:buChar char="•"/>
-            </a:pPr>
-            <a:r>
-              <a:rPr lang="en-US" sz="2800" dirty="0" err="1" smtClean="0">
-                <a:latin typeface="Calibri" panose="020F0502020204030204"/>
-                <a:ea typeface="+mn-ea"/>
-                <a:cs typeface="+mn-cs"/>
-              </a:rPr>
-              <a:t>Protocolos</a:t>
-            </a:r>
-            <a:r>
-              <a:rPr lang="en-US" sz="2800" dirty="0" smtClean="0">
-                <a:latin typeface="Calibri" panose="020F0502020204030204"/>
-                <a:ea typeface="+mn-ea"/>
-                <a:cs typeface="+mn-cs"/>
-              </a:rPr>
-              <a:t> </a:t>
-            </a:r>
-            <a:r>
-              <a:rPr lang="en-US" sz="2800" dirty="0" err="1" smtClean="0">
-                <a:latin typeface="Calibri" panose="020F0502020204030204"/>
-                <a:ea typeface="+mn-ea"/>
-                <a:cs typeface="+mn-cs"/>
-              </a:rPr>
-              <a:t>para</a:t>
-            </a:r>
-            <a:r>
-              <a:rPr lang="en-US" sz="2800" dirty="0" smtClean="0">
-                <a:latin typeface="Calibri" panose="020F0502020204030204"/>
-                <a:ea typeface="+mn-ea"/>
-                <a:cs typeface="+mn-cs"/>
-              </a:rPr>
-              <a:t> </a:t>
-            </a:r>
-            <a:r>
-              <a:rPr lang="en-US" sz="2800" dirty="0" err="1" smtClean="0">
-                <a:latin typeface="Calibri" panose="020F0502020204030204"/>
-                <a:ea typeface="+mn-ea"/>
-                <a:cs typeface="+mn-cs"/>
-              </a:rPr>
-              <a:t>colecta</a:t>
-            </a:r>
-            <a:r>
-              <a:rPr lang="en-US" sz="2800" dirty="0" smtClean="0">
-                <a:latin typeface="Calibri" panose="020F0502020204030204"/>
-                <a:ea typeface="+mn-ea"/>
-                <a:cs typeface="+mn-cs"/>
-              </a:rPr>
-              <a:t> de </a:t>
-            </a:r>
-            <a:r>
-              <a:rPr lang="en-US" sz="2800" dirty="0" err="1" smtClean="0">
-                <a:latin typeface="Calibri" panose="020F0502020204030204"/>
-                <a:ea typeface="+mn-ea"/>
-                <a:cs typeface="+mn-cs"/>
-              </a:rPr>
-              <a:t>datos</a:t>
-            </a:r>
-            <a:endParaRPr lang="en-US" sz="2800" dirty="0" smtClean="0">
-              <a:latin typeface="Calibri" panose="020F0502020204030204"/>
-              <a:ea typeface="+mn-ea"/>
-              <a:cs typeface="+mn-cs"/>
-            </a:endParaRPr>
-          </a:p>
-          <a:p>
-            <a:pPr marL="228600" lvl="0" indent="-228600">
-              <a:spcBef>
-                <a:spcPts val="1000"/>
-              </a:spcBef>
-              <a:buFont typeface="Arial" panose="020B0604020202020204" pitchFamily="34" charset="0"/>
-              <a:buChar char="•"/>
-            </a:pPr>
-            <a:r>
-              <a:rPr lang="en-US" sz="2800" dirty="0" err="1" smtClean="0">
-                <a:latin typeface="Calibri" panose="020F0502020204030204"/>
-                <a:ea typeface="+mn-ea"/>
-                <a:cs typeface="+mn-cs"/>
-              </a:rPr>
-              <a:t>Formato</a:t>
-            </a:r>
-            <a:r>
-              <a:rPr lang="en-US" sz="2800" dirty="0" smtClean="0">
-                <a:latin typeface="Calibri" panose="020F0502020204030204"/>
-                <a:ea typeface="+mn-ea"/>
-                <a:cs typeface="+mn-cs"/>
-              </a:rPr>
-              <a:t> de </a:t>
-            </a:r>
-            <a:r>
-              <a:rPr lang="en-US" sz="2800" dirty="0" err="1" smtClean="0">
-                <a:latin typeface="Calibri" panose="020F0502020204030204"/>
-                <a:ea typeface="+mn-ea"/>
-                <a:cs typeface="+mn-cs"/>
-              </a:rPr>
-              <a:t>datos</a:t>
-            </a:r>
-            <a:endParaRPr lang="en-US" sz="2800" dirty="0" smtClean="0">
-              <a:latin typeface="Calibri" panose="020F0502020204030204"/>
-              <a:ea typeface="+mn-ea"/>
-              <a:cs typeface="+mn-cs"/>
-            </a:endParaRPr>
-          </a:p>
-          <a:p>
-            <a:pPr marL="228600" lvl="0" indent="-228600">
-              <a:spcBef>
-                <a:spcPts val="1000"/>
-              </a:spcBef>
-              <a:buFont typeface="Arial" panose="020B0604020202020204" pitchFamily="34" charset="0"/>
-              <a:buChar char="•"/>
-            </a:pPr>
-            <a:r>
-              <a:rPr lang="en-US" sz="2800" dirty="0" err="1" smtClean="0">
-                <a:latin typeface="Calibri" panose="020F0502020204030204"/>
-                <a:ea typeface="+mn-ea"/>
-                <a:cs typeface="+mn-cs"/>
-              </a:rPr>
-              <a:t>Análisis</a:t>
-            </a:r>
-            <a:endParaRPr lang="en-US" sz="2800" dirty="0" smtClean="0">
-              <a:latin typeface="Calibri" panose="020F0502020204030204"/>
-              <a:ea typeface="+mn-ea"/>
-              <a:cs typeface="+mn-cs"/>
-            </a:endParaRPr>
-          </a:p>
-          <a:p>
-            <a:pPr marL="228600" lvl="0" indent="-228600">
-              <a:spcBef>
-                <a:spcPts val="1000"/>
-              </a:spcBef>
-              <a:buFont typeface="Arial" panose="020B0604020202020204" pitchFamily="34" charset="0"/>
-              <a:buChar char="•"/>
-            </a:pPr>
-            <a:r>
-              <a:rPr lang="en-US" sz="2800" dirty="0" err="1" smtClean="0">
-                <a:latin typeface="Calibri" panose="020F0502020204030204"/>
-                <a:ea typeface="+mn-ea"/>
-                <a:cs typeface="+mn-cs"/>
-              </a:rPr>
-              <a:t>Interpretación</a:t>
-            </a:r>
-            <a:r>
-              <a:rPr lang="en-US" sz="2800" dirty="0" smtClean="0">
-                <a:latin typeface="Calibri" panose="020F0502020204030204"/>
-                <a:ea typeface="+mn-ea"/>
-                <a:cs typeface="+mn-cs"/>
-              </a:rPr>
-              <a:t> de los </a:t>
-            </a:r>
-            <a:r>
-              <a:rPr lang="en-US" sz="2800" dirty="0" err="1" smtClean="0">
-                <a:latin typeface="Calibri" panose="020F0502020204030204"/>
-                <a:ea typeface="+mn-ea"/>
-                <a:cs typeface="+mn-cs"/>
-              </a:rPr>
-              <a:t>resultados</a:t>
-            </a:r>
-            <a:endParaRPr lang="en-US" sz="2800" dirty="0" smtClean="0">
-              <a:latin typeface="Calibri" panose="020F0502020204030204"/>
-              <a:ea typeface="+mn-ea"/>
-              <a:cs typeface="+mn-cs"/>
-            </a:endParaRPr>
-          </a:p>
-          <a:p>
-            <a:pPr marL="228600" lvl="0" indent="-228600">
-              <a:spcBef>
-                <a:spcPts val="1000"/>
-              </a:spcBef>
-              <a:buFont typeface="Arial" panose="020B0604020202020204" pitchFamily="34" charset="0"/>
-              <a:buChar char="•"/>
-            </a:pPr>
-            <a:r>
-              <a:rPr lang="en-US" sz="2800" dirty="0" err="1" smtClean="0">
-                <a:latin typeface="Calibri" panose="020F0502020204030204"/>
-                <a:ea typeface="+mn-ea"/>
-                <a:cs typeface="+mn-cs"/>
-              </a:rPr>
-              <a:t>Recomendaciones</a:t>
-            </a:r>
-            <a:endParaRPr lang="en-US" sz="2800" dirty="0" smtClean="0">
-              <a:latin typeface="Calibri" panose="020F0502020204030204"/>
-              <a:ea typeface="+mn-ea"/>
-              <a:cs typeface="+mn-cs"/>
-            </a:endParaRPr>
-          </a:p>
-        </p:txBody>
-      </p:sp>
-      <p:sp>
-        <p:nvSpPr>
-          <p:cNvPr id="8" name="Rectangle 7"/>
-          <p:cNvSpPr/>
+          <a:lstStyle/>
+          <a:p>
+            <a:r>
+              <a:rPr lang="es-MX" dirty="0" smtClean="0"/>
+              <a:t>Maria Elena,</a:t>
+            </a:r>
+            <a:br>
+              <a:rPr lang="es-MX" dirty="0" smtClean="0"/>
+            </a:br>
+            <a:r>
+              <a:rPr lang="es-MX" dirty="0" smtClean="0"/>
+              <a:t>Gallinero</a:t>
+            </a:r>
+            <a:endParaRPr lang="es-MX" dirty="0"/>
+          </a:p>
+        </p:txBody>
+      </p:sp>
+      <p:pic>
+        <p:nvPicPr>
+          <p:cNvPr id="2050" name="Picture 2"/>
+          <p:cNvPicPr>
+            <a:picLocks noChangeAspect="1" noChangeArrowheads="1"/>
+          </p:cNvPicPr>
           <p:nvPr/>
-        </p:nvSpPr>
-        <p:spPr>
+        </p:nvPicPr>
+        <p:blipFill>
+          <a:blip r:embed="rId3" cstate="print"/>
+          <a:srcRect l="28030" t="8485" r="44852" b="6250"/>
+          <a:stretch>
+            <a:fillRect/>
+          </a:stretch>
+        </p:blipFill>
+        <p:spPr bwMode="auto">
           <a:xfrm>
-            <a:off x="1922892" y="591491"/>
-            <a:ext cx="8344629" cy="1079654"/>
+            <a:off x="5231110" y="894952"/>
+            <a:ext cx="3348000" cy="5918424"/>
           </a:xfrm>
           <a:prstGeom prst="rect">
             <a:avLst/>
           </a:prstGeom>
           <a:noFill/>
-          <a:ln>
+          <a:ln w="9525">
             <a:noFill/>
+            <a:miter lim="800000"/>
+            <a:headEnd/>
+            <a:tailEnd/>
           </a:ln>
         </p:spPr>
-        <p:style>
-          <a:lnRef idx="2">
-            <a:schemeClr val="accent1">
-              <a:shade val="50000"/>
-            </a:schemeClr>
-          </a:lnRef>
-          <a:fillRef idx="1">
-            <a:schemeClr val="accent1"/>
-          </a:fillRef>
-          <a:effectRef idx="0">
-            <a:schemeClr val="accent1"/>
-          </a:effectRef>
-          <a:fontRef idx="minor">
-            <a:schemeClr val="lt1"/>
-          </a:fontRef>
-        </p:style>
-        <p:txBody>
-          <a:bodyPr rtlCol="0" anchor="ctr"/>
-          <a:lstStyle/>
-          <a:p>
-            <a:pPr algn="ctr"/>
-            <a:endParaRPr lang="en-US"/>
-          </a:p>
-        </p:txBody>
-      </p:sp>
-      <p:sp>
-        <p:nvSpPr>
-          <p:cNvPr id="9" name="Title 1"/>
-          <p:cNvSpPr txBox="1">
-            <a:spLocks/>
-          </p:cNvSpPr>
-          <p:nvPr/>
-        </p:nvSpPr>
-        <p:spPr>
-          <a:xfrm>
-            <a:off x="1922892" y="468537"/>
-            <a:ext cx="8344629" cy="1325563"/>
-          </a:xfrm>
-          <a:prstGeom prst="rect">
-            <a:avLst/>
-          </a:prstGeom>
-        </p:spPr>
-        <p:txBody>
-          <a:bodyPr vert="horz" lIns="91440" tIns="45720" rIns="91440" bIns="45720" rtlCol="0" anchor="ctr">
-            <a:normAutofit/>
-          </a:bodyPr>
-          <a:lstStyle>
-            <a:lvl1pPr algn="l" defTabSz="914400" rtl="0" eaLnBrk="1" latinLnBrk="0" hangingPunct="1">
-              <a:lnSpc>
-                <a:spcPct val="90000"/>
-              </a:lnSpc>
-              <a:spcBef>
-                <a:spcPct val="0"/>
-              </a:spcBef>
-              <a:buNone/>
-              <a:defRPr sz="4400" kern="1200">
-                <a:solidFill>
-                  <a:schemeClr val="tx1"/>
-                </a:solidFill>
-                <a:latin typeface="+mj-lt"/>
-                <a:ea typeface="+mj-ea"/>
-                <a:cs typeface="+mj-cs"/>
-              </a:defRPr>
-            </a:lvl1pPr>
-          </a:lstStyle>
-          <a:p>
-            <a:pPr algn="ctr"/>
-            <a:r>
-              <a:rPr lang="en-US" b="1" dirty="0" smtClean="0">
-                <a:effectLst>
-                  <a:outerShdw blurRad="38100" dist="38100" dir="2700000" algn="tl">
-                    <a:srgbClr val="000000">
-                      <a:alpha val="43137"/>
-                    </a:srgbClr>
-                  </a:outerShdw>
-                </a:effectLst>
-              </a:rPr>
-              <a:t>Manual</a:t>
-            </a:r>
-            <a:endParaRPr lang="en-US" b="1" dirty="0">
-              <a:effectLst>
-                <a:outerShdw blurRad="38100" dist="38100" dir="2700000" algn="tl">
-                  <a:srgbClr val="000000">
-                    <a:alpha val="43137"/>
-                  </a:srgbClr>
-                </a:outerShdw>
-              </a:effectLst>
-            </a:endParaRPr>
-          </a:p>
-        </p:txBody>
-      </p:sp>
+      </p:pic>
     </p:spTree>
-    <p:extLst>
-      <p:ext uri="{BB962C8B-B14F-4D97-AF65-F5344CB8AC3E}">
-        <p14:creationId xmlns:p14="http://schemas.microsoft.com/office/powerpoint/2010/main" val="3117491265"/>
-      </p:ext>
-    </p:extLst>
   </p:cSld>
   <p:clrMapOvr>
     <a:masterClrMapping/>
@@ -7011,153 +6241,38 @@
           <a:chExt cx="0" cy="0"/>
         </a:xfrm>
       </p:grpSpPr>
-      <p:sp>
-        <p:nvSpPr>
-          <p:cNvPr id="2" name="1 Título"/>
-          <p:cNvSpPr>
-            <a:spLocks noGrp="1"/>
-          </p:cNvSpPr>
-          <p:nvPr>
-            <p:ph type="title"/>
-          </p:nvPr>
-        </p:nvSpPr>
-        <p:spPr/>
-        <p:txBody>
-          <a:bodyPr/>
-          <a:lstStyle/>
-          <a:p>
-            <a:r>
-              <a:rPr lang="es-MX" b="1" dirty="0" smtClean="0">
-                <a:effectLst>
-                  <a:outerShdw blurRad="38100" dist="38100" dir="2700000" algn="tl">
-                    <a:srgbClr val="000000">
-                      <a:alpha val="43137"/>
-                    </a:srgbClr>
-                  </a:outerShdw>
-                </a:effectLst>
-              </a:rPr>
-              <a:t>Aplicación</a:t>
-            </a:r>
-            <a:endParaRPr lang="es-MX" b="1" dirty="0">
-              <a:effectLst>
-                <a:outerShdw blurRad="38100" dist="38100" dir="2700000" algn="tl">
-                  <a:srgbClr val="000000">
-                    <a:alpha val="43137"/>
-                  </a:srgbClr>
-                </a:outerShdw>
-              </a:effectLst>
-            </a:endParaRPr>
-          </a:p>
-        </p:txBody>
-      </p:sp>
-      <p:sp>
-        <p:nvSpPr>
-          <p:cNvPr id="4" name="3 Marcador de contenido"/>
-          <p:cNvSpPr>
-            <a:spLocks noGrp="1"/>
-          </p:cNvSpPr>
-          <p:nvPr>
-            <p:ph idx="1"/>
-          </p:nvPr>
-        </p:nvSpPr>
-        <p:spPr>
+      <p:pic>
+        <p:nvPicPr>
+          <p:cNvPr id="3074" name="Picture 2"/>
+          <p:cNvPicPr>
+            <a:picLocks noChangeAspect="1" noChangeArrowheads="1"/>
+          </p:cNvPicPr>
+          <p:nvPr/>
+        </p:nvPicPr>
+        <p:blipFill>
+          <a:blip r:embed="rId2" cstate="print"/>
+          <a:srcRect l="29136" t="13407" r="21608" b="13750"/>
+          <a:stretch>
+            <a:fillRect/>
+          </a:stretch>
+        </p:blipFill>
+        <p:spPr bwMode="auto">
           <a:xfrm>
-            <a:off x="609521" y="1600201"/>
-            <a:ext cx="10742269" cy="2566857"/>
+            <a:off x="2062758" y="83460"/>
+            <a:ext cx="7920880" cy="6585900"/>
           </a:xfrm>
           <a:prstGeom prst="rect">
             <a:avLst/>
           </a:prstGeom>
+          <a:noFill/>
+          <a:ln w="9525">
+            <a:noFill/>
+            <a:miter lim="800000"/>
+            <a:headEnd/>
+            <a:tailEnd/>
+          </a:ln>
         </p:spPr>
-        <p:txBody>
-          <a:bodyPr wrap="square">
-            <a:spAutoFit/>
-          </a:bodyPr>
-          <a:lstStyle/>
-          <a:p>
-            <a:r>
-              <a:rPr lang="es-MX" dirty="0" err="1" smtClean="0"/>
-              <a:t>Shiny</a:t>
-            </a:r>
-            <a:r>
-              <a:rPr lang="es-MX" dirty="0" smtClean="0"/>
-              <a:t> </a:t>
-            </a:r>
-            <a:r>
-              <a:rPr lang="es-MX" dirty="0" err="1" smtClean="0"/>
-              <a:t>App</a:t>
-            </a:r>
-            <a:r>
-              <a:rPr lang="es-MX" dirty="0" smtClean="0"/>
-              <a:t>:</a:t>
-            </a:r>
-          </a:p>
-          <a:p>
-            <a:pPr lvl="1"/>
-            <a:r>
-              <a:rPr lang="es-MX" dirty="0" smtClean="0"/>
-              <a:t>Acceso abierto (R)</a:t>
-            </a:r>
-          </a:p>
-          <a:p>
-            <a:pPr lvl="1"/>
-            <a:r>
-              <a:rPr lang="es-MX" dirty="0" smtClean="0"/>
-              <a:t>Replicable y transparente (seaarroundus.org; datalimitedtoolkit.org, OHI.org)</a:t>
-            </a:r>
-          </a:p>
-          <a:p>
-            <a:pPr lvl="1"/>
-            <a:r>
-              <a:rPr lang="es-MX" dirty="0" smtClean="0"/>
-              <a:t>Facilidad de programación e implementación</a:t>
-            </a:r>
-          </a:p>
-        </p:txBody>
-      </p:sp>
-      <p:sp>
-        <p:nvSpPr>
-          <p:cNvPr id="5" name="4 Rectángulo"/>
-          <p:cNvSpPr/>
-          <p:nvPr/>
-        </p:nvSpPr>
-        <p:spPr>
-          <a:xfrm>
-            <a:off x="3646934" y="5157192"/>
-            <a:ext cx="4763035" cy="584775"/>
-          </a:xfrm>
-          <a:prstGeom prst="rect">
-            <a:avLst/>
-          </a:prstGeom>
-        </p:spPr>
-        <p:txBody>
-          <a:bodyPr wrap="none">
-            <a:spAutoFit/>
-          </a:bodyPr>
-          <a:lstStyle/>
-          <a:p>
-            <a:r>
-              <a:rPr lang="es-MX" sz="3200" dirty="0" smtClean="0">
-                <a:hlinkClick r:id="rId2"/>
-              </a:rPr>
-              <a:t>jcvd.shinyapps.io/</a:t>
-            </a:r>
-            <a:r>
-              <a:rPr lang="es-MX" sz="3200" dirty="0" err="1" smtClean="0">
-                <a:hlinkClick r:id="rId2"/>
-              </a:rPr>
-              <a:t>BetaApp</a:t>
-            </a:r>
-            <a:r>
-              <a:rPr lang="es-MX" sz="3200" dirty="0" smtClean="0">
-                <a:hlinkClick r:id="rId2"/>
-              </a:rPr>
-              <a:t>/</a:t>
-            </a:r>
-            <a:endParaRPr lang="es-MX" sz="3200" dirty="0" smtClean="0"/>
-          </a:p>
-        </p:txBody>
-      </p:sp>
+      </p:pic>
     </p:spTree>
   </p:cSld>
   <p:clrMapOvr>
@@ -7174,6 +6289,228 @@
 </file>
 
 <file path=ppt/slides/slide15.xml><?xml version="1.0" encoding="utf-8"?>
+<p:sld xmlns:a="http://schemas.openxmlformats.org/drawingml/2006/main" xmlns:r="http://schemas.openxmlformats.org/officeDocument/2006/relationships" xmlns:p="http://schemas.openxmlformats.org/presentationml/2006/main">
+  <p:cSld>
+    <p:spTree>
+      <p:nvGrpSpPr>
+        <p:cNvPr id="1" name=""/>
+        <p:cNvGrpSpPr/>
+        <p:nvPr/>
+      </p:nvGrpSpPr>
+      <p:grpSpPr>
+        <a:xfrm>
+          <a:off x="0" y="0"/>
+          <a:ext cx="0" cy="0"/>
+          <a:chOff x="0" y="0"/>
+          <a:chExt cx="0" cy="0"/>
+        </a:xfrm>
+      </p:grpSpPr>
+      <p:sp>
+        <p:nvSpPr>
+          <p:cNvPr id="2" name="1 Título"/>
+          <p:cNvSpPr>
+            <a:spLocks noGrp="1"/>
+          </p:cNvSpPr>
+          <p:nvPr>
+            <p:ph type="title"/>
+          </p:nvPr>
+        </p:nvSpPr>
+        <p:spPr/>
+        <p:txBody>
+          <a:bodyPr/>
+          <a:lstStyle/>
+          <a:p>
+            <a:r>
+              <a:rPr lang="es-MX" b="1" dirty="0" smtClean="0">
+                <a:effectLst>
+                  <a:outerShdw blurRad="38100" dist="38100" dir="2700000" algn="tl">
+                    <a:srgbClr val="000000">
+                      <a:alpha val="43137"/>
+                    </a:srgbClr>
+                  </a:outerShdw>
+                </a:effectLst>
+              </a:rPr>
+              <a:t>Resultados disponibles</a:t>
+            </a:r>
+            <a:endParaRPr lang="es-MX" b="1" dirty="0">
+              <a:effectLst>
+                <a:outerShdw blurRad="38100" dist="38100" dir="2700000" algn="tl">
+                  <a:srgbClr val="000000">
+                    <a:alpha val="43137"/>
+                  </a:srgbClr>
+                </a:outerShdw>
+              </a:effectLst>
+            </a:endParaRPr>
+          </a:p>
+        </p:txBody>
+      </p:sp>
+      <p:sp>
+        <p:nvSpPr>
+          <p:cNvPr id="3" name="2 Marcador de contenido"/>
+          <p:cNvSpPr>
+            <a:spLocks noGrp="1"/>
+          </p:cNvSpPr>
+          <p:nvPr>
+            <p:ph idx="1"/>
+          </p:nvPr>
+        </p:nvSpPr>
+        <p:spPr/>
+        <p:txBody>
+          <a:bodyPr/>
+          <a:lstStyle/>
+          <a:p>
+            <a:r>
+              <a:rPr lang="es-MX" dirty="0" smtClean="0">
+                <a:hlinkClick r:id="rId2"/>
+              </a:rPr>
+              <a:t>www.jcvdav.github.io/QRoo</a:t>
+            </a:r>
+            <a:endParaRPr lang="es-MX" dirty="0"/>
+          </a:p>
+          <a:p>
+            <a:endParaRPr lang="es-MX" dirty="0"/>
+          </a:p>
+        </p:txBody>
+      </p:sp>
+    </p:spTree>
+  </p:cSld>
+  <p:clrMapOvr>
+    <a:masterClrMapping/>
+  </p:clrMapOvr>
+  <p:timing>
+    <p:tnLst>
+      <p:par>
+        <p:cTn id="1" dur="indefinite" restart="never" nodeType="tmRoot"/>
+      </p:par>
+    </p:tnLst>
+  </p:timing>
+</p:sld>
+</file>
+
+<file path=ppt/slides/slide16.xml><?xml version="1.0" encoding="utf-8"?>
+<p:sld xmlns:a="http://schemas.openxmlformats.org/drawingml/2006/main" xmlns:r="http://schemas.openxmlformats.org/officeDocument/2006/relationships" xmlns:p="http://schemas.openxmlformats.org/presentationml/2006/main">
+  <p:cSld>
+    <p:spTree>
+      <p:nvGrpSpPr>
+        <p:cNvPr id="1" name=""/>
+        <p:cNvGrpSpPr/>
+        <p:nvPr/>
+      </p:nvGrpSpPr>
+      <p:grpSpPr>
+        <a:xfrm>
+          <a:off x="0" y="0"/>
+          <a:ext cx="0" cy="0"/>
+          <a:chOff x="0" y="0"/>
+          <a:chExt cx="0" cy="0"/>
+        </a:xfrm>
+      </p:grpSpPr>
+      <p:sp>
+        <p:nvSpPr>
+          <p:cNvPr id="2" name="1 Título"/>
+          <p:cNvSpPr>
+            <a:spLocks noGrp="1"/>
+          </p:cNvSpPr>
+          <p:nvPr>
+            <p:ph type="title"/>
+          </p:nvPr>
+        </p:nvSpPr>
+        <p:spPr/>
+        <p:txBody>
+          <a:bodyPr/>
+          <a:lstStyle/>
+          <a:p>
+            <a:r>
+              <a:rPr lang="es-MX" b="1" dirty="0" smtClean="0">
+                <a:effectLst>
+                  <a:outerShdw blurRad="38100" dist="38100" dir="2700000" algn="tl">
+                    <a:srgbClr val="000000">
+                      <a:alpha val="43137"/>
+                    </a:srgbClr>
+                  </a:outerShdw>
+                </a:effectLst>
+              </a:rPr>
+              <a:t>Encontramos</a:t>
+            </a:r>
+            <a:endParaRPr lang="es-MX" b="1" dirty="0">
+              <a:effectLst>
+                <a:outerShdw blurRad="38100" dist="38100" dir="2700000" algn="tl">
+                  <a:srgbClr val="000000">
+                    <a:alpha val="43137"/>
+                  </a:srgbClr>
+                </a:outerShdw>
+              </a:effectLst>
+            </a:endParaRPr>
+          </a:p>
+        </p:txBody>
+      </p:sp>
+      <p:sp>
+        <p:nvSpPr>
+          <p:cNvPr id="3" name="2 Marcador de contenido"/>
+          <p:cNvSpPr>
+            <a:spLocks noGrp="1"/>
+          </p:cNvSpPr>
+          <p:nvPr>
+            <p:ph idx="1"/>
+          </p:nvPr>
+        </p:nvSpPr>
+        <p:spPr/>
+        <p:txBody>
+          <a:bodyPr/>
+          <a:lstStyle/>
+          <a:p>
+            <a:r>
+              <a:rPr lang="es-MX" dirty="0" smtClean="0"/>
+              <a:t>Mayoría de sitios e indicadores en incremento significativo</a:t>
+            </a:r>
+          </a:p>
+          <a:p>
+            <a:pPr lvl="1"/>
+            <a:r>
+              <a:rPr lang="es-MX" dirty="0" smtClean="0"/>
+              <a:t>Riqueza (-)</a:t>
+            </a:r>
+          </a:p>
+          <a:p>
+            <a:pPr lvl="1"/>
+            <a:r>
+              <a:rPr lang="es-MX" dirty="0" smtClean="0"/>
+              <a:t>Densidad (+)</a:t>
+            </a:r>
+          </a:p>
+          <a:p>
+            <a:pPr lvl="1"/>
+            <a:r>
+              <a:rPr lang="es-MX" dirty="0" smtClean="0"/>
+              <a:t>Biomasa (+)</a:t>
+            </a:r>
+          </a:p>
+          <a:p>
+            <a:r>
+              <a:rPr lang="es-MX" dirty="0" smtClean="0"/>
+              <a:t>Tiempo de recuperación aproximado de langosta = 12 años (MSY)</a:t>
+            </a:r>
+          </a:p>
+          <a:p>
+            <a:endParaRPr lang="es-MX" dirty="0"/>
+          </a:p>
+        </p:txBody>
+      </p:sp>
+    </p:spTree>
+  </p:cSld>
+  <p:clrMapOvr>
+    <a:masterClrMapping/>
+  </p:clrMapOvr>
+  <p:timing>
+    <p:tnLst>
+      <p:par>
+        <p:cTn id="1" dur="indefinite" restart="never" nodeType="tmRoot"/>
+      </p:par>
+    </p:tnLst>
+  </p:timing>
+</p:sld>
+</file>
+
+<file path=ppt/slides/slide17.xml><?xml version="1.0" encoding="utf-8"?>
 <p:sld xmlns:a="http://schemas.openxmlformats.org/drawingml/2006/main" xmlns:r="http://schemas.openxmlformats.org/officeDocument/2006/relationships" xmlns:p="http://schemas.openxmlformats.org/presentationml/2006/main">
   <p:cSld>
     <p:spTree>
@@ -9070,898 +8407,7 @@
 </p:sld>
 </file>
 
-<file path=ppt/slides/slide16.xml><?xml version="1.0" encoding="utf-8"?>
-<p:sld xmlns:a="http://schemas.openxmlformats.org/drawingml/2006/main" xmlns:r="http://schemas.openxmlformats.org/officeDocument/2006/relationships" xmlns:p="http://schemas.openxmlformats.org/presentationml/2006/main">
-  <p:cSld>
-    <p:spTree>
-      <p:nvGrpSpPr>
-        <p:cNvPr id="1" name=""/>
-        <p:cNvGrpSpPr/>
-        <p:nvPr/>
-      </p:nvGrpSpPr>
-      <p:grpSpPr>
-        <a:xfrm>
-          <a:off x="0" y="0"/>
-          <a:ext cx="0" cy="0"/>
-          <a:chOff x="0" y="0"/>
-          <a:chExt cx="0" cy="0"/>
-        </a:xfrm>
-      </p:grpSpPr>
-      <p:sp>
-        <p:nvSpPr>
-          <p:cNvPr id="2" name="1 Título"/>
-          <p:cNvSpPr>
-            <a:spLocks noGrp="1"/>
-          </p:cNvSpPr>
-          <p:nvPr>
-            <p:ph type="title"/>
-          </p:nvPr>
-        </p:nvSpPr>
-        <p:spPr/>
-        <p:txBody>
-          <a:bodyPr/>
-          <a:lstStyle/>
-          <a:p>
-            <a:r>
-              <a:rPr lang="es-MX" b="1" dirty="0" smtClean="0">
-                <a:effectLst>
-                  <a:outerShdw blurRad="38100" dist="38100" dir="2700000" algn="tl">
-                    <a:srgbClr val="000000">
-                      <a:alpha val="43137"/>
-                    </a:srgbClr>
-                  </a:outerShdw>
-                </a:effectLst>
-              </a:rPr>
-              <a:t>ZRP Quintana Roo</a:t>
-            </a:r>
-            <a:endParaRPr lang="es-MX" b="1" dirty="0">
-              <a:effectLst>
-                <a:outerShdw blurRad="38100" dist="38100" dir="2700000" algn="tl">
-                  <a:srgbClr val="000000">
-                    <a:alpha val="43137"/>
-                  </a:srgbClr>
-                </a:outerShdw>
-              </a:effectLst>
-            </a:endParaRPr>
-          </a:p>
-        </p:txBody>
-      </p:sp>
-      <p:sp>
-        <p:nvSpPr>
-          <p:cNvPr id="3" name="2 Marcador de contenido"/>
-          <p:cNvSpPr>
-            <a:spLocks noGrp="1"/>
-          </p:cNvSpPr>
-          <p:nvPr>
-            <p:ph sz="half" idx="1"/>
-          </p:nvPr>
-        </p:nvSpPr>
-        <p:spPr/>
-        <p:txBody>
-          <a:bodyPr/>
-          <a:lstStyle/>
-          <a:p>
-            <a:r>
-              <a:rPr lang="es-MX" dirty="0" smtClean="0"/>
-              <a:t>3 Comunidades</a:t>
-            </a:r>
-          </a:p>
-          <a:p>
-            <a:pPr lvl="1"/>
-            <a:r>
-              <a:rPr lang="es-MX" dirty="0" smtClean="0"/>
-              <a:t>Maria Elena</a:t>
-            </a:r>
-          </a:p>
-          <a:p>
-            <a:pPr lvl="1"/>
-            <a:r>
-              <a:rPr lang="es-MX" dirty="0" smtClean="0"/>
-              <a:t>Punta Herrero</a:t>
-            </a:r>
-          </a:p>
-          <a:p>
-            <a:pPr lvl="1"/>
-            <a:r>
-              <a:rPr lang="es-MX" dirty="0" smtClean="0"/>
-              <a:t>Banco Chinchorro</a:t>
-            </a:r>
-          </a:p>
-          <a:p>
-            <a:r>
-              <a:rPr lang="es-MX" dirty="0" smtClean="0"/>
-              <a:t>8 ZRP analizadas</a:t>
-            </a:r>
-          </a:p>
-          <a:p>
-            <a:pPr lvl="1"/>
-            <a:r>
-              <a:rPr lang="es-MX" dirty="0" smtClean="0"/>
-              <a:t>Monitoreos anuales</a:t>
-            </a:r>
-          </a:p>
-          <a:p>
-            <a:pPr lvl="1"/>
-            <a:r>
-              <a:rPr lang="es-MX" dirty="0" smtClean="0"/>
-              <a:t>Pesca – No Pesca</a:t>
-            </a:r>
-          </a:p>
-        </p:txBody>
-      </p:sp>
-      <p:sp>
-        <p:nvSpPr>
-          <p:cNvPr id="6" name="5 Marcador de contenido"/>
-          <p:cNvSpPr>
-            <a:spLocks noGrp="1"/>
-          </p:cNvSpPr>
-          <p:nvPr>
-            <p:ph sz="half" idx="2"/>
-          </p:nvPr>
-        </p:nvSpPr>
-        <p:spPr/>
-        <p:txBody>
-          <a:bodyPr/>
-          <a:lstStyle/>
-          <a:p>
-            <a:r>
-              <a:rPr lang="es-MX" dirty="0" smtClean="0"/>
-              <a:t>Primera prueba de evaluación</a:t>
-            </a:r>
-          </a:p>
-          <a:p>
-            <a:r>
-              <a:rPr lang="es-MX" dirty="0" smtClean="0"/>
-              <a:t>Únicamente indicadores biofísicos</a:t>
-            </a:r>
-            <a:endParaRPr lang="es-MX" dirty="0"/>
-          </a:p>
-        </p:txBody>
-      </p:sp>
-    </p:spTree>
-  </p:cSld>
-  <p:clrMapOvr>
-    <a:masterClrMapping/>
-  </p:clrMapOvr>
-  <p:timing>
-    <p:tnLst>
-      <p:par>
-        <p:cTn id="1" dur="indefinite" restart="never" nodeType="tmRoot"/>
-      </p:par>
-    </p:tnLst>
-  </p:timing>
-</p:sld>
-</file>
-
-<file path=ppt/slides/slide17.xml><?xml version="1.0" encoding="utf-8"?>
-<p:sld xmlns:a="http://schemas.openxmlformats.org/drawingml/2006/main" xmlns:r="http://schemas.openxmlformats.org/officeDocument/2006/relationships" xmlns:p="http://schemas.openxmlformats.org/presentationml/2006/main">
-  <p:cSld>
-    <p:spTree>
-      <p:nvGrpSpPr>
-        <p:cNvPr id="1" name=""/>
-        <p:cNvGrpSpPr/>
-        <p:nvPr/>
-      </p:nvGrpSpPr>
-      <p:grpSpPr>
-        <a:xfrm>
-          <a:off x="0" y="0"/>
-          <a:ext cx="0" cy="0"/>
-          <a:chOff x="0" y="0"/>
-          <a:chExt cx="0" cy="0"/>
-        </a:xfrm>
-      </p:grpSpPr>
-      <p:sp>
-        <p:nvSpPr>
-          <p:cNvPr id="2" name="1 Título"/>
-          <p:cNvSpPr>
-            <a:spLocks noGrp="1"/>
-          </p:cNvSpPr>
-          <p:nvPr>
-            <p:ph type="title"/>
-          </p:nvPr>
-        </p:nvSpPr>
-        <p:spPr/>
-        <p:txBody>
-          <a:bodyPr/>
-          <a:lstStyle/>
-          <a:p>
-            <a:r>
-              <a:rPr lang="es-MX" dirty="0" err="1" smtClean="0"/>
-              <a:t>ZRP’s</a:t>
-            </a:r>
-            <a:endParaRPr lang="es-MX" dirty="0"/>
-          </a:p>
-        </p:txBody>
-      </p:sp>
-      <p:pic>
-        <p:nvPicPr>
-          <p:cNvPr id="5122" name="Picture 2"/>
-          <p:cNvPicPr>
-            <a:picLocks noChangeAspect="1" noChangeArrowheads="1"/>
-          </p:cNvPicPr>
-          <p:nvPr/>
-        </p:nvPicPr>
-        <p:blipFill>
-          <a:blip r:embed="rId2" cstate="print"/>
-          <a:srcRect l="15300" t="22266" r="13307" b="11782"/>
-          <a:stretch>
-            <a:fillRect/>
-          </a:stretch>
-        </p:blipFill>
-        <p:spPr bwMode="auto">
-          <a:xfrm>
-            <a:off x="1486694" y="1628800"/>
-            <a:ext cx="9289032" cy="4824536"/>
-          </a:xfrm>
-          <a:prstGeom prst="rect">
-            <a:avLst/>
-          </a:prstGeom>
-          <a:noFill/>
-          <a:ln w="9525">
-            <a:noFill/>
-            <a:miter lim="800000"/>
-            <a:headEnd/>
-            <a:tailEnd/>
-          </a:ln>
-        </p:spPr>
-      </p:pic>
-    </p:spTree>
-  </p:cSld>
-  <p:clrMapOvr>
-    <a:masterClrMapping/>
-  </p:clrMapOvr>
-  <p:timing>
-    <p:tnLst>
-      <p:par>
-        <p:cTn id="1" dur="indefinite" restart="never" nodeType="tmRoot"/>
-      </p:par>
-    </p:tnLst>
-  </p:timing>
-</p:sld>
-</file>
-
 <file path=ppt/slides/slide18.xml><?xml version="1.0" encoding="utf-8"?>
-<p:sld xmlns:a="http://schemas.openxmlformats.org/drawingml/2006/main" xmlns:r="http://schemas.openxmlformats.org/officeDocument/2006/relationships" xmlns:p="http://schemas.openxmlformats.org/presentationml/2006/main">
-  <p:cSld>
-    <p:spTree>
-      <p:nvGrpSpPr>
-        <p:cNvPr id="1" name=""/>
-        <p:cNvGrpSpPr/>
-        <p:nvPr/>
-      </p:nvGrpSpPr>
-      <p:grpSpPr>
-        <a:xfrm>
-          <a:off x="0" y="0"/>
-          <a:ext cx="0" cy="0"/>
-          <a:chOff x="0" y="0"/>
-          <a:chExt cx="0" cy="0"/>
-        </a:xfrm>
-      </p:grpSpPr>
-      <p:sp>
-        <p:nvSpPr>
-          <p:cNvPr id="2" name="1 Título"/>
-          <p:cNvSpPr>
-            <a:spLocks noGrp="1"/>
-          </p:cNvSpPr>
-          <p:nvPr>
-            <p:ph type="title"/>
-          </p:nvPr>
-        </p:nvSpPr>
-        <p:spPr/>
-        <p:txBody>
-          <a:bodyPr/>
-          <a:lstStyle/>
-          <a:p>
-            <a:r>
-              <a:rPr lang="es-MX" b="1" dirty="0" smtClean="0">
-                <a:effectLst>
-                  <a:outerShdw blurRad="38100" dist="38100" dir="2700000" algn="tl">
-                    <a:srgbClr val="000000">
-                      <a:alpha val="43137"/>
-                    </a:srgbClr>
-                  </a:outerShdw>
-                </a:effectLst>
-              </a:rPr>
-              <a:t>Objetivos</a:t>
-            </a:r>
-            <a:endParaRPr lang="es-MX" b="1" dirty="0">
-              <a:effectLst>
-                <a:outerShdw blurRad="38100" dist="38100" dir="2700000" algn="tl">
-                  <a:srgbClr val="000000">
-                    <a:alpha val="43137"/>
-                  </a:srgbClr>
-                </a:outerShdw>
-              </a:effectLst>
-            </a:endParaRPr>
-          </a:p>
-        </p:txBody>
-      </p:sp>
-      <p:sp>
-        <p:nvSpPr>
-          <p:cNvPr id="6" name="5 Rectángulo"/>
-          <p:cNvSpPr/>
-          <p:nvPr/>
-        </p:nvSpPr>
-        <p:spPr>
-          <a:xfrm>
-            <a:off x="1054647" y="1556792"/>
-            <a:ext cx="9937104" cy="2862322"/>
-          </a:xfrm>
-          <a:prstGeom prst="rect">
-            <a:avLst/>
-          </a:prstGeom>
-        </p:spPr>
-        <p:txBody>
-          <a:bodyPr wrap="square">
-            <a:spAutoFit/>
-          </a:bodyPr>
-          <a:lstStyle/>
-          <a:p>
-            <a:endParaRPr lang="es-MX" dirty="0" smtClean="0"/>
-          </a:p>
-          <a:p>
-            <a:r>
-              <a:rPr lang="es-MX" dirty="0" smtClean="0"/>
-              <a:t>1. Contribuir a recuperar las poblaciones de especies objetivo de las pesquerías, como </a:t>
-            </a:r>
-            <a:r>
-              <a:rPr lang="es-MX" b="1" dirty="0" smtClean="0"/>
-              <a:t>langosta, caracol rosado y varias especies de peces</a:t>
-            </a:r>
-            <a:r>
-              <a:rPr lang="es-MX" dirty="0" smtClean="0"/>
-              <a:t>, ayudando al reclutamiento, el crecimiento y la densidad para mejorar el éxito reproductivo. </a:t>
-            </a:r>
-          </a:p>
-          <a:p>
-            <a:r>
-              <a:rPr lang="es-MX" dirty="0" smtClean="0"/>
-              <a:t>2. Contribuir </a:t>
-            </a:r>
-            <a:r>
-              <a:rPr lang="es-MX" b="1" dirty="0" smtClean="0"/>
-              <a:t>a mejorar la productividad </a:t>
-            </a:r>
-            <a:r>
-              <a:rPr lang="es-MX" dirty="0" smtClean="0"/>
-              <a:t>pesquera a mediano plazo recuperando la biomasa. </a:t>
-            </a:r>
-          </a:p>
-          <a:p>
-            <a:r>
-              <a:rPr lang="es-MX" dirty="0" smtClean="0"/>
-              <a:t>3. Ayudar a </a:t>
-            </a:r>
-            <a:r>
-              <a:rPr lang="es-MX" b="1" dirty="0" smtClean="0"/>
-              <a:t>aumentar la resiliencia </a:t>
-            </a:r>
-            <a:r>
-              <a:rPr lang="es-MX" dirty="0" smtClean="0"/>
-              <a:t>de los ecosistemas y de la pesca ante perturbaciones climáticas o presiones </a:t>
-            </a:r>
-            <a:r>
-              <a:rPr lang="es-MX" dirty="0" err="1" smtClean="0"/>
-              <a:t>antropogénicas</a:t>
-            </a:r>
-            <a:r>
-              <a:rPr lang="es-MX" dirty="0" smtClean="0"/>
-              <a:t>. </a:t>
-            </a:r>
-          </a:p>
-          <a:p>
-            <a:r>
-              <a:rPr lang="es-MX" dirty="0" smtClean="0"/>
-              <a:t>4. </a:t>
-            </a:r>
-            <a:r>
-              <a:rPr lang="es-MX" b="1" dirty="0" smtClean="0"/>
-              <a:t>Proteger una porción del hábitat</a:t>
-            </a:r>
-            <a:r>
-              <a:rPr lang="es-MX" dirty="0" smtClean="0"/>
-              <a:t>, la biodiversidad y los procesos ecológicos de los ecosistemas coralinos, de la laguna </a:t>
-            </a:r>
-            <a:r>
-              <a:rPr lang="es-MX" dirty="0" err="1" smtClean="0"/>
-              <a:t>arrecifal</a:t>
-            </a:r>
-            <a:r>
-              <a:rPr lang="es-MX" dirty="0" smtClean="0"/>
-              <a:t> y de los humedales, </a:t>
-            </a:r>
-            <a:r>
-              <a:rPr lang="es-MX" b="1" dirty="0" smtClean="0"/>
-              <a:t>con la restauración de sus funciones tróficas</a:t>
-            </a:r>
-            <a:r>
-              <a:rPr lang="es-MX" dirty="0" smtClean="0"/>
-              <a:t> de importancia para las especies comerciales pesqueras. </a:t>
-            </a:r>
-          </a:p>
-        </p:txBody>
-      </p:sp>
-    </p:spTree>
-  </p:cSld>
-  <p:clrMapOvr>
-    <a:masterClrMapping/>
-  </p:clrMapOvr>
-  <p:timing>
-    <p:tnLst>
-      <p:par>
-        <p:cTn id="1" dur="indefinite" restart="never" nodeType="tmRoot"/>
-      </p:par>
-    </p:tnLst>
-  </p:timing>
-</p:sld>
-</file>
-
-<file path=ppt/slides/slide19.xml><?xml version="1.0" encoding="utf-8"?>
-<p:sld xmlns:a="http://schemas.openxmlformats.org/drawingml/2006/main" xmlns:r="http://schemas.openxmlformats.org/officeDocument/2006/relationships" xmlns:p="http://schemas.openxmlformats.org/presentationml/2006/main">
-  <p:cSld>
-    <p:spTree>
-      <p:nvGrpSpPr>
-        <p:cNvPr id="1" name=""/>
-        <p:cNvGrpSpPr/>
-        <p:nvPr/>
-      </p:nvGrpSpPr>
-      <p:grpSpPr>
-        <a:xfrm>
-          <a:off x="0" y="0"/>
-          <a:ext cx="0" cy="0"/>
-          <a:chOff x="0" y="0"/>
-          <a:chExt cx="0" cy="0"/>
-        </a:xfrm>
-      </p:grpSpPr>
-      <p:sp>
-        <p:nvSpPr>
-          <p:cNvPr id="4" name="3 Marcador de texto"/>
-          <p:cNvSpPr>
-            <a:spLocks noGrp="1"/>
-          </p:cNvSpPr>
-          <p:nvPr>
-            <p:ph type="body" idx="1"/>
-          </p:nvPr>
-        </p:nvSpPr>
-        <p:spPr/>
-        <p:txBody>
-          <a:bodyPr/>
-          <a:lstStyle/>
-          <a:p>
-            <a:r>
-              <a:rPr lang="es-MX" dirty="0" smtClean="0"/>
-              <a:t>Indicadores</a:t>
-            </a:r>
-            <a:endParaRPr lang="es-MX" dirty="0"/>
-          </a:p>
-        </p:txBody>
-      </p:sp>
-      <p:sp>
-        <p:nvSpPr>
-          <p:cNvPr id="3" name="2 Marcador de contenido"/>
-          <p:cNvSpPr>
-            <a:spLocks noGrp="1"/>
-          </p:cNvSpPr>
-          <p:nvPr>
-            <p:ph sz="half" idx="2"/>
-          </p:nvPr>
-        </p:nvSpPr>
-        <p:spPr/>
-        <p:txBody>
-          <a:bodyPr/>
-          <a:lstStyle/>
-          <a:p>
-            <a:r>
-              <a:rPr lang="es-MX" dirty="0" smtClean="0"/>
-              <a:t>Densidad (p, i, o)</a:t>
-            </a:r>
-          </a:p>
-          <a:p>
-            <a:r>
-              <a:rPr lang="es-MX" dirty="0" smtClean="0"/>
-              <a:t>Riqueza (p)</a:t>
-            </a:r>
-          </a:p>
-          <a:p>
-            <a:r>
-              <a:rPr lang="es-MX" dirty="0" smtClean="0"/>
-              <a:t>Biomasa (p, o)</a:t>
-            </a:r>
-          </a:p>
-          <a:p>
-            <a:r>
-              <a:rPr lang="es-MX" dirty="0" smtClean="0"/>
-              <a:t>Estructura trófica (p)</a:t>
-            </a:r>
-          </a:p>
-        </p:txBody>
-      </p:sp>
-      <p:sp>
-        <p:nvSpPr>
-          <p:cNvPr id="5" name="4 Marcador de texto"/>
-          <p:cNvSpPr>
-            <a:spLocks noGrp="1"/>
-          </p:cNvSpPr>
-          <p:nvPr>
-            <p:ph type="body" sz="quarter" idx="3"/>
-          </p:nvPr>
-        </p:nvSpPr>
-        <p:spPr/>
-        <p:txBody>
-          <a:bodyPr/>
-          <a:lstStyle/>
-          <a:p>
-            <a:r>
-              <a:rPr lang="es-MX" dirty="0" smtClean="0"/>
-              <a:t>Análisis</a:t>
-            </a:r>
-            <a:endParaRPr lang="es-MX" dirty="0"/>
-          </a:p>
-        </p:txBody>
-      </p:sp>
-      <p:sp>
-        <p:nvSpPr>
-          <p:cNvPr id="6" name="5 Marcador de contenido"/>
-          <p:cNvSpPr>
-            <a:spLocks noGrp="1"/>
-          </p:cNvSpPr>
-          <p:nvPr>
-            <p:ph sz="quarter" idx="4"/>
-          </p:nvPr>
-        </p:nvSpPr>
-        <p:spPr/>
-        <p:txBody>
-          <a:bodyPr/>
-          <a:lstStyle/>
-          <a:p>
-            <a:r>
-              <a:rPr lang="es-MX" dirty="0" smtClean="0"/>
-              <a:t>Regresión lineal múltiple:</a:t>
-            </a:r>
-          </a:p>
-          <a:p>
-            <a:endParaRPr lang="es-MX" dirty="0" smtClean="0"/>
-          </a:p>
-          <a:p>
-            <a:pPr lvl="1">
-              <a:buNone/>
-            </a:pPr>
-            <a:r>
-              <a:rPr lang="es-MX" dirty="0" smtClean="0"/>
-              <a:t>Indicador = Año + Zona + Año::Zona</a:t>
-            </a:r>
-            <a:endParaRPr lang="es-MX" dirty="0"/>
-          </a:p>
-        </p:txBody>
-      </p:sp>
-    </p:spTree>
-  </p:cSld>
-  <p:clrMapOvr>
-    <a:masterClrMapping/>
-  </p:clrMapOvr>
-  <p:timing>
-    <p:tnLst>
-      <p:par>
-        <p:cTn id="1" dur="indefinite" restart="never" nodeType="tmRoot"/>
-      </p:par>
-    </p:tnLst>
-  </p:timing>
-</p:sld>
-</file>
-
-<file path=ppt/slides/slide2.xml><?xml version="1.0" encoding="utf-8"?>
-<p:sld xmlns:a="http://schemas.openxmlformats.org/drawingml/2006/main" xmlns:r="http://schemas.openxmlformats.org/officeDocument/2006/relationships" xmlns:p="http://schemas.openxmlformats.org/presentationml/2006/main">
-  <p:cSld>
-    <p:spTree>
-      <p:nvGrpSpPr>
-        <p:cNvPr id="1" name=""/>
-        <p:cNvGrpSpPr/>
-        <p:nvPr/>
-      </p:nvGrpSpPr>
-      <p:grpSpPr>
-        <a:xfrm>
-          <a:off x="0" y="0"/>
-          <a:ext cx="0" cy="0"/>
-          <a:chOff x="0" y="0"/>
-          <a:chExt cx="0" cy="0"/>
-        </a:xfrm>
-      </p:grpSpPr>
-      <p:sp>
-        <p:nvSpPr>
-          <p:cNvPr id="2" name="1 Título"/>
-          <p:cNvSpPr>
-            <a:spLocks noGrp="1"/>
-          </p:cNvSpPr>
-          <p:nvPr>
-            <p:ph type="title"/>
-          </p:nvPr>
-        </p:nvSpPr>
-        <p:spPr/>
-        <p:txBody>
-          <a:bodyPr/>
-          <a:lstStyle/>
-          <a:p>
-            <a:r>
-              <a:rPr lang="es-MX" b="1" dirty="0" smtClean="0">
-                <a:effectLst>
-                  <a:outerShdw blurRad="38100" dist="38100" dir="2700000" algn="tl">
-                    <a:srgbClr val="000000">
-                      <a:alpha val="43137"/>
-                    </a:srgbClr>
-                  </a:outerShdw>
-                </a:effectLst>
-              </a:rPr>
-              <a:t>Estructura</a:t>
-            </a:r>
-            <a:endParaRPr lang="es-MX" b="1" dirty="0">
-              <a:effectLst>
-                <a:outerShdw blurRad="38100" dist="38100" dir="2700000" algn="tl">
-                  <a:srgbClr val="000000">
-                    <a:alpha val="43137"/>
-                  </a:srgbClr>
-                </a:outerShdw>
-              </a:effectLst>
-            </a:endParaRPr>
-          </a:p>
-        </p:txBody>
-      </p:sp>
-      <p:sp>
-        <p:nvSpPr>
-          <p:cNvPr id="3" name="2 Marcador de contenido"/>
-          <p:cNvSpPr>
-            <a:spLocks noGrp="1"/>
-          </p:cNvSpPr>
-          <p:nvPr>
-            <p:ph idx="1"/>
-          </p:nvPr>
-        </p:nvSpPr>
-        <p:spPr/>
-        <p:txBody>
-          <a:bodyPr/>
-          <a:lstStyle/>
-          <a:p>
-            <a:r>
-              <a:rPr lang="es-MX" dirty="0" smtClean="0"/>
-              <a:t>Proyecto </a:t>
-            </a:r>
-            <a:r>
-              <a:rPr lang="es-MX" dirty="0" err="1" smtClean="0"/>
-              <a:t>TURFeffect</a:t>
-            </a:r>
-            <a:endParaRPr lang="es-MX" dirty="0" smtClean="0"/>
-          </a:p>
-          <a:p>
-            <a:r>
-              <a:rPr lang="es-MX" dirty="0" smtClean="0"/>
-              <a:t>Indicadores</a:t>
-            </a:r>
-          </a:p>
-          <a:p>
-            <a:r>
-              <a:rPr lang="es-MX" dirty="0" smtClean="0"/>
-              <a:t>Análisis</a:t>
-            </a:r>
-          </a:p>
-          <a:p>
-            <a:r>
-              <a:rPr lang="es-MX" dirty="0" smtClean="0"/>
-              <a:t>Casos de estudio: Quintana Roo</a:t>
-            </a:r>
-          </a:p>
-          <a:p>
-            <a:endParaRPr lang="es-MX" dirty="0"/>
-          </a:p>
-        </p:txBody>
-      </p:sp>
-    </p:spTree>
-  </p:cSld>
-  <p:clrMapOvr>
-    <a:masterClrMapping/>
-  </p:clrMapOvr>
-  <p:timing>
-    <p:tnLst>
-      <p:par>
-        <p:cTn id="1" dur="indefinite" restart="never" nodeType="tmRoot"/>
-      </p:par>
-    </p:tnLst>
-  </p:timing>
-</p:sld>
-</file>
-
-<file path=ppt/slides/slide20.xml><?xml version="1.0" encoding="utf-8"?>
-<p:sld xmlns:a="http://schemas.openxmlformats.org/drawingml/2006/main" xmlns:r="http://schemas.openxmlformats.org/officeDocument/2006/relationships" xmlns:p="http://schemas.openxmlformats.org/presentationml/2006/main">
-  <p:cSld>
-    <p:spTree>
-      <p:nvGrpSpPr>
-        <p:cNvPr id="1" name=""/>
-        <p:cNvGrpSpPr/>
-        <p:nvPr/>
-      </p:nvGrpSpPr>
-      <p:grpSpPr>
-        <a:xfrm>
-          <a:off x="0" y="0"/>
-          <a:ext cx="0" cy="0"/>
-          <a:chOff x="0" y="0"/>
-          <a:chExt cx="0" cy="0"/>
-        </a:xfrm>
-      </p:grpSpPr>
-      <p:pic>
-        <p:nvPicPr>
-          <p:cNvPr id="1027" name="Picture 3" descr="C:\Users\JC\Documents\GitHub\QRoo\legend.png"/>
-          <p:cNvPicPr>
-            <a:picLocks noChangeAspect="1" noChangeArrowheads="1"/>
-          </p:cNvPicPr>
-          <p:nvPr/>
-        </p:nvPicPr>
-        <p:blipFill>
-          <a:blip r:embed="rId2" cstate="print"/>
-          <a:stretch>
-            <a:fillRect/>
-          </a:stretch>
-        </p:blipFill>
-        <p:spPr bwMode="auto">
-          <a:xfrm>
-            <a:off x="5064493" y="260649"/>
-            <a:ext cx="3767017" cy="572977"/>
-          </a:xfrm>
-          <a:prstGeom prst="rect">
-            <a:avLst/>
-          </a:prstGeom>
-          <a:noFill/>
-          <a:ln>
-            <a:noFill/>
-          </a:ln>
-        </p:spPr>
-      </p:pic>
-      <p:sp>
-        <p:nvSpPr>
-          <p:cNvPr id="4" name="3 Título"/>
-          <p:cNvSpPr>
-            <a:spLocks noGrp="1"/>
-          </p:cNvSpPr>
-          <p:nvPr>
-            <p:ph type="title"/>
-          </p:nvPr>
-        </p:nvSpPr>
-        <p:spPr>
-          <a:xfrm>
-            <a:off x="0" y="0"/>
-            <a:ext cx="4837613" cy="1143000"/>
-          </a:xfrm>
-        </p:spPr>
-        <p:txBody>
-          <a:bodyPr>
-            <a:normAutofit fontScale="90000"/>
-          </a:bodyPr>
-          <a:lstStyle/>
-          <a:p>
-            <a:r>
-              <a:rPr lang="es-MX" dirty="0" smtClean="0"/>
-              <a:t>Maria Elena,</a:t>
-            </a:r>
-            <a:br>
-              <a:rPr lang="es-MX" dirty="0" smtClean="0"/>
-            </a:br>
-            <a:r>
-              <a:rPr lang="es-MX" dirty="0" smtClean="0"/>
-              <a:t>Gallinero</a:t>
-            </a:r>
-            <a:endParaRPr lang="es-MX" dirty="0"/>
-          </a:p>
-        </p:txBody>
-      </p:sp>
-      <p:pic>
-        <p:nvPicPr>
-          <p:cNvPr id="2050" name="Picture 2"/>
-          <p:cNvPicPr>
-            <a:picLocks noChangeAspect="1" noChangeArrowheads="1"/>
-          </p:cNvPicPr>
-          <p:nvPr/>
-        </p:nvPicPr>
-        <p:blipFill>
-          <a:blip r:embed="rId3" cstate="print"/>
-          <a:srcRect l="28030" t="8485" r="44852" b="6250"/>
-          <a:stretch>
-            <a:fillRect/>
-          </a:stretch>
-        </p:blipFill>
-        <p:spPr bwMode="auto">
-          <a:xfrm>
-            <a:off x="5231110" y="894952"/>
-            <a:ext cx="3348000" cy="5918424"/>
-          </a:xfrm>
-          <a:prstGeom prst="rect">
-            <a:avLst/>
-          </a:prstGeom>
-          <a:noFill/>
-          <a:ln w="9525">
-            <a:noFill/>
-            <a:miter lim="800000"/>
-            <a:headEnd/>
-            <a:tailEnd/>
-          </a:ln>
-        </p:spPr>
-      </p:pic>
-    </p:spTree>
-  </p:cSld>
-  <p:clrMapOvr>
-    <a:masterClrMapping/>
-  </p:clrMapOvr>
-  <p:timing>
-    <p:tnLst>
-      <p:par>
-        <p:cTn id="1" dur="indefinite" restart="never" nodeType="tmRoot"/>
-      </p:par>
-    </p:tnLst>
-  </p:timing>
-</p:sld>
-</file>
-
-<file path=ppt/slides/slide21.xml><?xml version="1.0" encoding="utf-8"?>
-<p:sld xmlns:a="http://schemas.openxmlformats.org/drawingml/2006/main" xmlns:r="http://schemas.openxmlformats.org/officeDocument/2006/relationships" xmlns:p="http://schemas.openxmlformats.org/presentationml/2006/main">
-  <p:cSld>
-    <p:spTree>
-      <p:nvGrpSpPr>
-        <p:cNvPr id="1" name=""/>
-        <p:cNvGrpSpPr/>
-        <p:nvPr/>
-      </p:nvGrpSpPr>
-      <p:grpSpPr>
-        <a:xfrm>
-          <a:off x="0" y="0"/>
-          <a:ext cx="0" cy="0"/>
-          <a:chOff x="0" y="0"/>
-          <a:chExt cx="0" cy="0"/>
-        </a:xfrm>
-      </p:grpSpPr>
-      <p:pic>
-        <p:nvPicPr>
-          <p:cNvPr id="3074" name="Picture 2"/>
-          <p:cNvPicPr>
-            <a:picLocks noChangeAspect="1" noChangeArrowheads="1"/>
-          </p:cNvPicPr>
-          <p:nvPr/>
-        </p:nvPicPr>
-        <p:blipFill>
-          <a:blip r:embed="rId2" cstate="print"/>
-          <a:srcRect l="29136" t="13407" r="21608" b="13750"/>
-          <a:stretch>
-            <a:fillRect/>
-          </a:stretch>
-        </p:blipFill>
-        <p:spPr bwMode="auto">
-          <a:xfrm>
-            <a:off x="2062758" y="83460"/>
-            <a:ext cx="7920880" cy="6585900"/>
-          </a:xfrm>
-          <a:prstGeom prst="rect">
-            <a:avLst/>
-          </a:prstGeom>
-          <a:noFill/>
-          <a:ln w="9525">
-            <a:noFill/>
-            <a:miter lim="800000"/>
-            <a:headEnd/>
-            <a:tailEnd/>
-          </a:ln>
-        </p:spPr>
-      </p:pic>
-    </p:spTree>
-  </p:cSld>
-  <p:clrMapOvr>
-    <a:masterClrMapping/>
-  </p:clrMapOvr>
-  <p:timing>
-    <p:tnLst>
-      <p:par>
-        <p:cTn id="1" dur="indefinite" restart="never" nodeType="tmRoot"/>
-      </p:par>
-    </p:tnLst>
-  </p:timing>
-</p:sld>
-</file>
-
-<file path=ppt/slides/slide22.xml><?xml version="1.0" encoding="utf-8"?>
 <p:sld xmlns:a="http://schemas.openxmlformats.org/drawingml/2006/main" xmlns:r="http://schemas.openxmlformats.org/officeDocument/2006/relationships" xmlns:p="http://schemas.openxmlformats.org/presentationml/2006/main">
   <p:cSld>
     <p:spTree>
@@ -10174,7 +8620,7 @@
 </p:sld>
 </file>
 
-<file path=ppt/slides/slide23.xml><?xml version="1.0" encoding="utf-8"?>
+<file path=ppt/slides/slide2.xml><?xml version="1.0" encoding="utf-8"?>
 <p:sld xmlns:a="http://schemas.openxmlformats.org/drawingml/2006/main" xmlns:r="http://schemas.openxmlformats.org/officeDocument/2006/relationships" xmlns:p="http://schemas.openxmlformats.org/presentationml/2006/main">
   <p:cSld>
     <p:spTree>
@@ -10216,7 +8662,7 @@
                   </a:outerShdw>
                 </a:effectLst>
               </a:rPr>
-              <a:t>Resultados disponibles</a:t>
+              <a:t>Estructura</a:t>
             </a:r>
             <a:endParaRPr lang="es-MX" b="1" dirty="0">
               <a:effectLst>
@@ -10246,527 +8692,32 @@
           <a:lstStyle/>
           <a:p>
             <a:r>
-              <a:rPr lang="es-MX" dirty="0" smtClean="0">
-                <a:hlinkClick r:id="rId2"/>
-              </a:rPr>
-              <a:t>www.jcvdav.github.io/QRoo</a:t>
-            </a:r>
-            <a:endParaRPr lang="es-MX" dirty="0"/>
-          </a:p>
-          <a:p>
-            <a:endParaRPr lang="es-MX" dirty="0"/>
-          </a:p>
-        </p:txBody>
-      </p:sp>
-    </p:spTree>
-  </p:cSld>
-  <p:clrMapOvr>
-    <a:masterClrMapping/>
-  </p:clrMapOvr>
-  <p:timing>
-    <p:tnLst>
-      <p:par>
-        <p:cTn id="1" dur="indefinite" restart="never" nodeType="tmRoot"/>
-      </p:par>
-    </p:tnLst>
-  </p:timing>
-</p:sld>
-</file>
-
-<file path=ppt/slides/slide24.xml><?xml version="1.0" encoding="utf-8"?>
-<p:sld xmlns:a="http://schemas.openxmlformats.org/drawingml/2006/main" xmlns:r="http://schemas.openxmlformats.org/officeDocument/2006/relationships" xmlns:p="http://schemas.openxmlformats.org/presentationml/2006/main">
-  <p:cSld>
-    <p:spTree>
-      <p:nvGrpSpPr>
-        <p:cNvPr id="1" name=""/>
-        <p:cNvGrpSpPr/>
-        <p:nvPr/>
-      </p:nvGrpSpPr>
-      <p:grpSpPr>
-        <a:xfrm>
-          <a:off x="0" y="0"/>
-          <a:ext cx="0" cy="0"/>
-          <a:chOff x="0" y="0"/>
-          <a:chExt cx="0" cy="0"/>
-        </a:xfrm>
-      </p:grpSpPr>
-      <p:sp>
-        <p:nvSpPr>
-          <p:cNvPr id="2" name="1 Título"/>
-          <p:cNvSpPr>
-            <a:spLocks noGrp="1"/>
-          </p:cNvSpPr>
-          <p:nvPr>
-            <p:ph type="title"/>
-          </p:nvPr>
-        </p:nvSpPr>
-        <p:spPr/>
-        <p:txBody>
-          <a:bodyPr/>
-          <a:lstStyle/>
-          <a:p>
-            <a:r>
-              <a:rPr lang="es-MX" b="1" dirty="0" smtClean="0">
-                <a:effectLst>
-                  <a:outerShdw blurRad="38100" dist="38100" dir="2700000" algn="tl">
-                    <a:srgbClr val="000000">
-                      <a:alpha val="43137"/>
-                    </a:srgbClr>
-                  </a:outerShdw>
-                </a:effectLst>
-              </a:rPr>
-              <a:t>Encontramos</a:t>
-            </a:r>
-            <a:endParaRPr lang="es-MX" b="1" dirty="0">
-              <a:effectLst>
-                <a:outerShdw blurRad="38100" dist="38100" dir="2700000" algn="tl">
-                  <a:srgbClr val="000000">
-                    <a:alpha val="43137"/>
-                  </a:srgbClr>
-                </a:outerShdw>
-              </a:effectLst>
-            </a:endParaRPr>
-          </a:p>
-        </p:txBody>
-      </p:sp>
-      <p:sp>
-        <p:nvSpPr>
-          <p:cNvPr id="3" name="2 Marcador de contenido"/>
-          <p:cNvSpPr>
-            <a:spLocks noGrp="1"/>
-          </p:cNvSpPr>
-          <p:nvPr>
-            <p:ph idx="1"/>
-          </p:nvPr>
-        </p:nvSpPr>
-        <p:spPr/>
-        <p:txBody>
-          <a:bodyPr/>
-          <a:lstStyle/>
-          <a:p>
-            <a:r>
               <a:rPr lang="es-MX" dirty="0" smtClean="0"/>
-              <a:t>Mayoría de sitios e indicadores en incremento significativo</a:t>
-            </a:r>
-          </a:p>
-          <a:p>
-            <a:pPr lvl="1"/>
+              <a:t>Proyecto </a:t>
+            </a:r>
+            <a:r>
+              <a:rPr lang="es-MX" dirty="0" err="1" smtClean="0"/>
+              <a:t>TURFeffect</a:t>
+            </a:r>
+            <a:endParaRPr lang="es-MX" dirty="0" smtClean="0"/>
+          </a:p>
+          <a:p>
             <a:r>
               <a:rPr lang="es-MX" dirty="0" smtClean="0"/>
-              <a:t>Riqueza (-)</a:t>
-            </a:r>
-          </a:p>
-          <a:p>
-            <a:pPr lvl="1"/>
+              <a:t>Indicadores</a:t>
+            </a:r>
+          </a:p>
+          <a:p>
             <a:r>
               <a:rPr lang="es-MX" dirty="0" smtClean="0"/>
-              <a:t>Densidad (+)</a:t>
-            </a:r>
-          </a:p>
-          <a:p>
-            <a:pPr lvl="1"/>
+              <a:t>Casos </a:t>
+            </a:r>
             <a:r>
               <a:rPr lang="es-MX" dirty="0" smtClean="0"/>
-              <a:t>Biomasa (+)</a:t>
-            </a:r>
-          </a:p>
-          <a:p>
-            <a:r>
-              <a:rPr lang="es-MX" dirty="0" smtClean="0"/>
-              <a:t>Tiempo de recuperación aproximado de langosta = 12 años (MSY)</a:t>
-            </a:r>
-          </a:p>
-          <a:p>
-            <a:endParaRPr lang="es-MX" dirty="0"/>
-          </a:p>
-        </p:txBody>
-      </p:sp>
-    </p:spTree>
-  </p:cSld>
-  <p:clrMapOvr>
-    <a:masterClrMapping/>
-  </p:clrMapOvr>
-  <p:timing>
-    <p:tnLst>
-      <p:par>
-        <p:cTn id="1" dur="indefinite" restart="never" nodeType="tmRoot"/>
-      </p:par>
-    </p:tnLst>
-  </p:timing>
-</p:sld>
-</file>
-
-<file path=ppt/slides/slide25.xml><?xml version="1.0" encoding="utf-8"?>
-<p:sld xmlns:a="http://schemas.openxmlformats.org/drawingml/2006/main" xmlns:r="http://schemas.openxmlformats.org/officeDocument/2006/relationships" xmlns:p="http://schemas.openxmlformats.org/presentationml/2006/main">
-  <p:cSld>
-    <p:spTree>
-      <p:nvGrpSpPr>
-        <p:cNvPr id="1" name=""/>
-        <p:cNvGrpSpPr/>
-        <p:nvPr/>
-      </p:nvGrpSpPr>
-      <p:grpSpPr>
-        <a:xfrm>
-          <a:off x="0" y="0"/>
-          <a:ext cx="0" cy="0"/>
-          <a:chOff x="0" y="0"/>
-          <a:chExt cx="0" cy="0"/>
-        </a:xfrm>
-      </p:grpSpPr>
-      <p:sp>
-        <p:nvSpPr>
-          <p:cNvPr id="2" name="1 Título"/>
-          <p:cNvSpPr>
-            <a:spLocks noGrp="1"/>
-          </p:cNvSpPr>
-          <p:nvPr>
-            <p:ph type="title"/>
-          </p:nvPr>
-        </p:nvSpPr>
-        <p:spPr/>
-        <p:txBody>
-          <a:bodyPr/>
-          <a:lstStyle/>
-          <a:p>
-            <a:r>
-              <a:rPr lang="es-MX" b="1" dirty="0" smtClean="0">
-                <a:effectLst>
-                  <a:outerShdw blurRad="38100" dist="38100" dir="2700000" algn="tl">
-                    <a:srgbClr val="000000">
-                      <a:alpha val="43137"/>
-                    </a:srgbClr>
-                  </a:outerShdw>
-                </a:effectLst>
-              </a:rPr>
-              <a:t>Desventajas</a:t>
-            </a:r>
-            <a:endParaRPr lang="es-MX" b="1" dirty="0">
-              <a:effectLst>
-                <a:outerShdw blurRad="38100" dist="38100" dir="2700000" algn="tl">
-                  <a:srgbClr val="000000">
-                    <a:alpha val="43137"/>
-                  </a:srgbClr>
-                </a:outerShdw>
-              </a:effectLst>
-            </a:endParaRPr>
-          </a:p>
-        </p:txBody>
-      </p:sp>
-      <p:sp>
-        <p:nvSpPr>
-          <p:cNvPr id="3" name="2 Marcador de contenido"/>
-          <p:cNvSpPr>
-            <a:spLocks noGrp="1"/>
-          </p:cNvSpPr>
-          <p:nvPr>
-            <p:ph idx="1"/>
-          </p:nvPr>
-        </p:nvSpPr>
-        <p:spPr/>
-        <p:txBody>
-          <a:bodyPr/>
-          <a:lstStyle/>
-          <a:p>
-            <a:r>
-              <a:rPr lang="es-MX" dirty="0" smtClean="0"/>
-              <a:t>La </a:t>
-            </a:r>
-            <a:r>
-              <a:rPr lang="es-MX" dirty="0" err="1" smtClean="0"/>
-              <a:t>App</a:t>
-            </a:r>
-            <a:r>
-              <a:rPr lang="es-MX" dirty="0" smtClean="0"/>
-              <a:t> aún no está terminada</a:t>
-            </a:r>
-          </a:p>
-          <a:p>
-            <a:r>
-              <a:rPr lang="es-MX" dirty="0" smtClean="0"/>
-              <a:t>La información se limita a indicadores y análisis predeterminados</a:t>
-            </a:r>
-            <a:endParaRPr lang="es-MX" dirty="0"/>
-          </a:p>
-        </p:txBody>
-      </p:sp>
-    </p:spTree>
-  </p:cSld>
-  <p:clrMapOvr>
-    <a:masterClrMapping/>
-  </p:clrMapOvr>
-  <p:timing>
-    <p:tnLst>
-      <p:par>
-        <p:cTn id="1" dur="indefinite" restart="never" nodeType="tmRoot"/>
-      </p:par>
-    </p:tnLst>
-  </p:timing>
-</p:sld>
-</file>
-
-<file path=ppt/slides/slide26.xml><?xml version="1.0" encoding="utf-8"?>
-<p:sld xmlns:a="http://schemas.openxmlformats.org/drawingml/2006/main" xmlns:r="http://schemas.openxmlformats.org/officeDocument/2006/relationships" xmlns:p="http://schemas.openxmlformats.org/presentationml/2006/main">
-  <p:cSld>
-    <p:spTree>
-      <p:nvGrpSpPr>
-        <p:cNvPr id="1" name=""/>
-        <p:cNvGrpSpPr/>
-        <p:nvPr/>
-      </p:nvGrpSpPr>
-      <p:grpSpPr>
-        <a:xfrm>
-          <a:off x="0" y="0"/>
-          <a:ext cx="0" cy="0"/>
-          <a:chOff x="0" y="0"/>
-          <a:chExt cx="0" cy="0"/>
-        </a:xfrm>
-      </p:grpSpPr>
-      <p:sp>
-        <p:nvSpPr>
-          <p:cNvPr id="2" name="1 Título"/>
-          <p:cNvSpPr>
-            <a:spLocks noGrp="1"/>
-          </p:cNvSpPr>
-          <p:nvPr>
-            <p:ph type="title"/>
-          </p:nvPr>
-        </p:nvSpPr>
-        <p:spPr/>
-        <p:txBody>
-          <a:bodyPr/>
-          <a:lstStyle/>
-          <a:p>
-            <a:r>
-              <a:rPr lang="es-MX" b="1" dirty="0" smtClean="0">
-                <a:effectLst>
-                  <a:outerShdw blurRad="38100" dist="38100" dir="2700000" algn="tl">
-                    <a:srgbClr val="000000">
-                      <a:alpha val="43137"/>
-                    </a:srgbClr>
-                  </a:outerShdw>
-                </a:effectLst>
-              </a:rPr>
-              <a:t>Ventajas</a:t>
-            </a:r>
-            <a:endParaRPr lang="es-MX" b="1" dirty="0">
-              <a:effectLst>
-                <a:outerShdw blurRad="38100" dist="38100" dir="2700000" algn="tl">
-                  <a:srgbClr val="000000">
-                    <a:alpha val="43137"/>
-                  </a:srgbClr>
-                </a:outerShdw>
-              </a:effectLst>
-            </a:endParaRPr>
-          </a:p>
-        </p:txBody>
-      </p:sp>
-      <p:sp>
-        <p:nvSpPr>
-          <p:cNvPr id="3" name="2 Marcador de contenido"/>
-          <p:cNvSpPr>
-            <a:spLocks noGrp="1"/>
-          </p:cNvSpPr>
-          <p:nvPr>
-            <p:ph idx="1"/>
-          </p:nvPr>
-        </p:nvSpPr>
-        <p:spPr/>
-        <p:txBody>
-          <a:bodyPr/>
-          <a:lstStyle/>
-          <a:p>
-            <a:r>
-              <a:rPr lang="es-MX" dirty="0" smtClean="0"/>
-              <a:t>Los análisis representan un “</a:t>
-            </a:r>
-            <a:r>
-              <a:rPr lang="es-MX" dirty="0" err="1" smtClean="0"/>
-              <a:t>minimo</a:t>
-            </a:r>
-            <a:r>
-              <a:rPr lang="es-MX" dirty="0" smtClean="0"/>
-              <a:t>” a reportar</a:t>
-            </a:r>
-          </a:p>
-          <a:p>
-            <a:r>
-              <a:rPr lang="es-MX" dirty="0" smtClean="0"/>
-              <a:t>Primera versión disponible en Enero</a:t>
-            </a:r>
-          </a:p>
-          <a:p>
-            <a:pPr lvl="1"/>
-            <a:r>
-              <a:rPr lang="es-MX" dirty="0" smtClean="0"/>
-              <a:t>Ahorra tiempo y permite ser más crítico</a:t>
-            </a:r>
-          </a:p>
-          <a:p>
-            <a:r>
-              <a:rPr lang="es-MX" dirty="0" smtClean="0"/>
-              <a:t>Resultados son robustos, pero se pueden presentar a diversas audiencias</a:t>
-            </a:r>
-          </a:p>
-          <a:p>
-            <a:r>
-              <a:rPr lang="es-MX" dirty="0" smtClean="0"/>
-              <a:t>Análisis replicables</a:t>
-            </a:r>
-          </a:p>
-          <a:p>
-            <a:r>
-              <a:rPr lang="es-MX" dirty="0" smtClean="0"/>
-              <a:t>Fácil adaptación (35 s)</a:t>
-            </a:r>
-          </a:p>
-        </p:txBody>
-      </p:sp>
-    </p:spTree>
-  </p:cSld>
-  <p:clrMapOvr>
-    <a:masterClrMapping/>
-  </p:clrMapOvr>
-  <p:timing>
-    <p:tnLst>
-      <p:par>
-        <p:cTn id="1" dur="indefinite" restart="never" nodeType="tmRoot"/>
-      </p:par>
-    </p:tnLst>
-  </p:timing>
-</p:sld>
-</file>
-
-<file path=ppt/slides/slide27.xml><?xml version="1.0" encoding="utf-8"?>
-<p:sld xmlns:a="http://schemas.openxmlformats.org/drawingml/2006/main" xmlns:r="http://schemas.openxmlformats.org/officeDocument/2006/relationships" xmlns:p="http://schemas.openxmlformats.org/presentationml/2006/main">
-  <p:cSld>
-    <p:spTree>
-      <p:nvGrpSpPr>
-        <p:cNvPr id="1" name=""/>
-        <p:cNvGrpSpPr/>
-        <p:nvPr/>
-      </p:nvGrpSpPr>
-      <p:grpSpPr>
-        <a:xfrm>
-          <a:off x="0" y="0"/>
-          <a:ext cx="0" cy="0"/>
-          <a:chOff x="0" y="0"/>
-          <a:chExt cx="0" cy="0"/>
-        </a:xfrm>
-      </p:grpSpPr>
-      <p:pic>
-        <p:nvPicPr>
-          <p:cNvPr id="1026" name="Picture 2"/>
-          <p:cNvPicPr>
-            <a:picLocks noChangeAspect="1" noChangeArrowheads="1"/>
-          </p:cNvPicPr>
-          <p:nvPr/>
-        </p:nvPicPr>
-        <p:blipFill>
-          <a:blip r:embed="rId2" cstate="print"/>
-          <a:srcRect l="26369" t="12422" r="28249" b="12766"/>
-          <a:stretch>
-            <a:fillRect/>
-          </a:stretch>
-        </p:blipFill>
-        <p:spPr bwMode="auto">
-          <a:xfrm>
-            <a:off x="0" y="620688"/>
-            <a:ext cx="5904656" cy="5472608"/>
-          </a:xfrm>
-          <a:prstGeom prst="rect">
-            <a:avLst/>
-          </a:prstGeom>
-          <a:noFill/>
-          <a:ln w="9525">
-            <a:noFill/>
-            <a:miter lim="800000"/>
-            <a:headEnd/>
-            <a:tailEnd/>
-          </a:ln>
-        </p:spPr>
-      </p:pic>
-      <p:sp>
-        <p:nvSpPr>
-          <p:cNvPr id="5" name="4 Rectángulo"/>
-          <p:cNvSpPr/>
-          <p:nvPr/>
-        </p:nvSpPr>
-        <p:spPr>
-          <a:xfrm>
-            <a:off x="5879182" y="1052736"/>
-            <a:ext cx="6092825" cy="1200329"/>
-          </a:xfrm>
-          <a:prstGeom prst="rect">
-            <a:avLst/>
-          </a:prstGeom>
-        </p:spPr>
-        <p:txBody>
-          <a:bodyPr>
-            <a:spAutoFit/>
-          </a:bodyPr>
-          <a:lstStyle/>
-          <a:p>
-            <a:r>
-              <a:rPr lang="es-MX" b="1" dirty="0" smtClean="0"/>
-              <a:t>La protección o recuperación </a:t>
-            </a:r>
-            <a:r>
-              <a:rPr lang="es-MX" dirty="0" smtClean="0"/>
-              <a:t>de especies de escama, elasmobranquios, crustáceos y moluscos, de importancia comercial, en etapas juveniles y de reproducción, para </a:t>
-            </a:r>
-            <a:r>
-              <a:rPr lang="es-MX" b="1" dirty="0" smtClean="0"/>
-              <a:t>mejorar en el largo plazo las capturas </a:t>
-            </a:r>
-            <a:r>
-              <a:rPr lang="es-MX" dirty="0" smtClean="0"/>
-              <a:t>alrededor de dichas zonas</a:t>
-            </a:r>
-            <a:endParaRPr lang="es-MX" dirty="0"/>
-          </a:p>
-        </p:txBody>
-      </p:sp>
-      <p:sp>
-        <p:nvSpPr>
-          <p:cNvPr id="6" name="5 Rectángulo"/>
-          <p:cNvSpPr/>
-          <p:nvPr/>
-        </p:nvSpPr>
-        <p:spPr>
-          <a:xfrm>
-            <a:off x="5879182" y="2348880"/>
-            <a:ext cx="6092825" cy="1754326"/>
-          </a:xfrm>
-          <a:prstGeom prst="rect">
-            <a:avLst/>
-          </a:prstGeom>
-        </p:spPr>
-        <p:txBody>
-          <a:bodyPr>
-            <a:spAutoFit/>
-          </a:bodyPr>
-          <a:lstStyle/>
-          <a:p>
-            <a:r>
-              <a:rPr lang="es-MX" dirty="0" smtClean="0"/>
-              <a:t>El objetivo final del proyecto es </a:t>
-            </a:r>
-            <a:r>
-              <a:rPr lang="es-MX" b="1" dirty="0" smtClean="0"/>
-              <a:t>generar un ordenamiento pesquero </a:t>
-            </a:r>
-            <a:r>
-              <a:rPr lang="es-MX" dirty="0" smtClean="0"/>
-              <a:t>que, utilizando diversas herramientas de manejo, logre que los recursos </a:t>
-            </a:r>
-            <a:r>
-              <a:rPr lang="es-MX" b="1" dirty="0" smtClean="0"/>
-              <a:t>pesqueros sean aprovechados de forma tal que generen un mayor beneficio económico sin poner en riesgo el ecosistema o las especies que son extraídas por la misma actividad pesquera</a:t>
-            </a:r>
-            <a:r>
-              <a:rPr lang="es-MX" dirty="0" smtClean="0"/>
-              <a:t>. </a:t>
-            </a:r>
+              <a:t>de estudio: Quintana Roo</a:t>
+            </a:r>
+          </a:p>
+          <a:p>
             <a:endParaRPr lang="es-MX" dirty="0"/>
           </a:p>
         </p:txBody>
@@ -11456,7 +9407,7 @@
             <p:nvPr/>
           </p:nvPicPr>
           <p:blipFill>
-            <a:blip r:embed="rId2" cstate="print">
+            <a:blip r:embed="rId3" cstate="print">
               <a:extLst>
                 <a:ext uri="{28A0092B-C50C-407E-A947-70E740481C1C}">
                   <a14:useLocalDpi xmlns:a14="http://schemas.microsoft.com/office/drawing/2010/main" val="0"/>
@@ -11497,7 +9448,7 @@
             <p:nvPr/>
           </p:nvPicPr>
           <p:blipFill>
-            <a:blip r:embed="rId3" cstate="print">
+            <a:blip r:embed="rId4" cstate="print">
               <a:extLst>
                 <a:ext uri="{28A0092B-C50C-407E-A947-70E740481C1C}">
                   <a14:useLocalDpi xmlns:a14="http://schemas.microsoft.com/office/drawing/2010/main" val="0"/>
@@ -11538,7 +9489,7 @@
             <p:nvPr/>
           </p:nvPicPr>
           <p:blipFill>
-            <a:blip r:embed="rId4" cstate="print">
+            <a:blip r:embed="rId5" cstate="print">
               <a:extLst>
                 <a:ext uri="{28A0092B-C50C-407E-A947-70E740481C1C}">
                   <a14:useLocalDpi xmlns:a14="http://schemas.microsoft.com/office/drawing/2010/main" val="0"/>
@@ -11579,7 +9530,7 @@
             <p:nvPr/>
           </p:nvPicPr>
           <p:blipFill>
-            <a:blip r:embed="rId5" cstate="print">
+            <a:blip r:embed="rId6" cstate="print">
               <a:extLst>
                 <a:ext uri="{28A0092B-C50C-407E-A947-70E740481C1C}">
                   <a14:useLocalDpi xmlns:a14="http://schemas.microsoft.com/office/drawing/2010/main" val="0"/>
@@ -11620,7 +9571,7 @@
             <p:nvPr/>
           </p:nvPicPr>
           <p:blipFill>
-            <a:blip r:embed="rId6" cstate="print">
+            <a:blip r:embed="rId7" cstate="print">
               <a:extLst>
                 <a:ext uri="{28A0092B-C50C-407E-A947-70E740481C1C}">
                   <a14:useLocalDpi xmlns:a14="http://schemas.microsoft.com/office/drawing/2010/main" val="0"/>
@@ -11826,38 +9777,10 @@
           </a:p>
           <a:p>
             <a:r>
-              <a:rPr lang="es-MX" dirty="0" smtClean="0"/>
-              <a:t>Zonas de no pesca:</a:t>
-            </a:r>
-          </a:p>
-          <a:p>
-            <a:pPr lvl="1"/>
-            <a:r>
-              <a:rPr lang="es-MX" dirty="0" smtClean="0"/>
-              <a:t>Zonas núcleo de AMP</a:t>
-            </a:r>
-          </a:p>
-          <a:p>
-            <a:pPr lvl="1"/>
-            <a:r>
-              <a:rPr lang="es-MX" dirty="0" smtClean="0"/>
-              <a:t>Reservas comunitarias</a:t>
-            </a:r>
-          </a:p>
-          <a:p>
-            <a:pPr lvl="1"/>
-            <a:r>
-              <a:rPr lang="es-MX" b="1" dirty="0" smtClean="0">
-                <a:effectLst>
-                  <a:outerShdw blurRad="38100" dist="38100" dir="2700000" algn="tl">
-                    <a:srgbClr val="000000">
-                      <a:alpha val="43137"/>
-                    </a:srgbClr>
-                  </a:outerShdw>
-                </a:effectLst>
-              </a:rPr>
-              <a:t>Zonas de Refugio Pesquero</a:t>
-            </a:r>
+              <a:rPr lang="es-MX" dirty="0" err="1" smtClean="0"/>
+              <a:t>Objectives</a:t>
+            </a:r>
+            <a:endParaRPr lang="es-MX" dirty="0" smtClean="0"/>
           </a:p>
         </p:txBody>
       </p:sp>
@@ -12423,6 +10346,10 @@
               <a:rPr lang="en-US" dirty="0" err="1" smtClean="0"/>
               <a:t>Riqueza</a:t>
             </a:r>
+            <a:r>
+              <a:rPr lang="en-US" dirty="0" smtClean="0"/>
+              <a:t> – number of</a:t>
+            </a:r>
             <a:endParaRPr lang="en-US" dirty="0" smtClean="0"/>
           </a:p>
           <a:p>
@@ -12533,7 +10460,7 @@
           <p:nvPr/>
         </p:nvPicPr>
         <p:blipFill>
-          <a:blip r:embed="rId2" cstate="print"/>
+          <a:blip r:embed="rId3" cstate="print"/>
           <a:srcRect/>
           <a:stretch>
             <a:fillRect/>

</xml_diff>

<commit_message>
Presentation with table options
</commit_message>
<xml_diff>
--- a/Presentations/Workshop in Mexico/Mexico Workshop.pptx
+++ b/Presentations/Workshop in Mexico/Mexico Workshop.pptx
@@ -5,7 +5,7 @@
     <p:sldMasterId id="2147483648" r:id="rId1"/>
   </p:sldMasterIdLst>
   <p:notesMasterIdLst>
-    <p:notesMasterId r:id="rId20"/>
+    <p:notesMasterId r:id="rId22"/>
   </p:notesMasterIdLst>
   <p:sldIdLst>
     <p:sldId id="260" r:id="rId2"/>
@@ -26,6 +26,8 @@
     <p:sldId id="272" r:id="rId17"/>
     <p:sldId id="262" r:id="rId18"/>
     <p:sldId id="287" r:id="rId19"/>
+    <p:sldId id="290" r:id="rId20"/>
+    <p:sldId id="291" r:id="rId21"/>
   </p:sldIdLst>
   <p:sldSz cx="12190413" cy="6858000"/>
   <p:notesSz cx="6858000" cy="9144000"/>
@@ -126,7 +128,7 @@
   </p:defaultTextStyle>
   <p:extLst>
     <p:ext uri="{EFAFB233-063F-42B5-8137-9DF3F51BA10A}">
-      <p15:sldGuideLst xmlns="" xmlns:p15="http://schemas.microsoft.com/office/powerpoint/2012/main">
+      <p15:sldGuideLst xmlns:p15="http://schemas.microsoft.com/office/powerpoint/2012/main">
         <p15:guide id="1" orient="horz" pos="2160">
           <p15:clr>
             <a:srgbClr val="A4A3A4"/>
@@ -388,7 +390,7 @@
             <a:fld id="{280912AB-7E2A-4726-8C73-C75F6266AA28}" type="slidenum">
               <a:rPr lang="es-MX" smtClean="0"/>
               <a:pPr/>
-              <a:t>‹Nº›</a:t>
+              <a:t>‹nº›</a:t>
             </a:fld>
             <a:endParaRPr lang="es-MX"/>
           </a:p>
@@ -397,7 +399,7 @@
     </p:spTree>
     <p:extLst>
       <p:ext uri="{BB962C8B-B14F-4D97-AF65-F5344CB8AC3E}">
-        <p14:creationId xmlns="" xmlns:p14="http://schemas.microsoft.com/office/powerpoint/2010/main" val="368796389"/>
+        <p14:creationId xmlns:p14="http://schemas.microsoft.com/office/powerpoint/2010/main" val="368796389"/>
       </p:ext>
     </p:extLst>
   </p:cSld>
@@ -592,7 +594,7 @@
     </p:spTree>
     <p:extLst>
       <p:ext uri="{BB962C8B-B14F-4D97-AF65-F5344CB8AC3E}">
-        <p14:creationId xmlns="" xmlns:p14="http://schemas.microsoft.com/office/powerpoint/2010/main" val="3478287038"/>
+        <p14:creationId xmlns:p14="http://schemas.microsoft.com/office/powerpoint/2010/main" val="3478287038"/>
       </p:ext>
     </p:extLst>
   </p:cSld>
@@ -677,7 +679,7 @@
     </p:spTree>
     <p:extLst>
       <p:ext uri="{BB962C8B-B14F-4D97-AF65-F5344CB8AC3E}">
-        <p14:creationId xmlns="" xmlns:p14="http://schemas.microsoft.com/office/powerpoint/2010/main" val="3247054436"/>
+        <p14:creationId xmlns:p14="http://schemas.microsoft.com/office/powerpoint/2010/main" val="3247054436"/>
       </p:ext>
     </p:extLst>
   </p:cSld>
@@ -766,7 +768,7 @@
     </p:spTree>
     <p:extLst>
       <p:ext uri="{BB962C8B-B14F-4D97-AF65-F5344CB8AC3E}">
-        <p14:creationId xmlns="" xmlns:p14="http://schemas.microsoft.com/office/powerpoint/2010/main" val="1333304386"/>
+        <p14:creationId xmlns:p14="http://schemas.microsoft.com/office/powerpoint/2010/main" val="1333304386"/>
       </p:ext>
     </p:extLst>
   </p:cSld>
@@ -855,6 +857,11 @@
         </p:txBody>
       </p:sp>
     </p:spTree>
+    <p:extLst>
+      <p:ext uri="{BB962C8B-B14F-4D97-AF65-F5344CB8AC3E}">
+        <p14:creationId xmlns:p14="http://schemas.microsoft.com/office/powerpoint/2010/main" val="677977679"/>
+      </p:ext>
+    </p:extLst>
   </p:cSld>
   <p:clrMapOvr>
     <a:masterClrMapping/>
@@ -2545,7 +2552,7 @@
     </p:spTree>
     <p:extLst>
       <p:ext uri="{BB962C8B-B14F-4D97-AF65-F5344CB8AC3E}">
-        <p14:creationId xmlns="" xmlns:p14="http://schemas.microsoft.com/office/powerpoint/2010/main" val="3981295864"/>
+        <p14:creationId xmlns:p14="http://schemas.microsoft.com/office/powerpoint/2010/main" val="3981295864"/>
       </p:ext>
     </p:extLst>
   </p:cSld>
@@ -2780,7 +2787,7 @@
             <a:fld id="{08B575B2-E4DC-4B86-ADFF-AC1540A85088}" type="slidenum">
               <a:rPr lang="es-MX" smtClean="0"/>
               <a:pPr/>
-              <a:t>‹Nº›</a:t>
+              <a:t>‹nº›</a:t>
             </a:fld>
             <a:endParaRPr lang="es-MX"/>
           </a:p>
@@ -2947,7 +2954,7 @@
             <a:fld id="{08B575B2-E4DC-4B86-ADFF-AC1540A85088}" type="slidenum">
               <a:rPr lang="es-MX" smtClean="0"/>
               <a:pPr/>
-              <a:t>‹Nº›</a:t>
+              <a:t>‹nº›</a:t>
             </a:fld>
             <a:endParaRPr lang="es-MX"/>
           </a:p>
@@ -3124,7 +3131,7 @@
             <a:fld id="{08B575B2-E4DC-4B86-ADFF-AC1540A85088}" type="slidenum">
               <a:rPr lang="es-MX" smtClean="0"/>
               <a:pPr/>
-              <a:t>‹Nº›</a:t>
+              <a:t>‹nº›</a:t>
             </a:fld>
             <a:endParaRPr lang="es-MX"/>
           </a:p>
@@ -3291,7 +3298,7 @@
             <a:fld id="{08B575B2-E4DC-4B86-ADFF-AC1540A85088}" type="slidenum">
               <a:rPr lang="es-MX" smtClean="0"/>
               <a:pPr/>
-              <a:t>‹Nº›</a:t>
+              <a:t>‹nº›</a:t>
             </a:fld>
             <a:endParaRPr lang="es-MX"/>
           </a:p>
@@ -3534,7 +3541,7 @@
             <a:fld id="{08B575B2-E4DC-4B86-ADFF-AC1540A85088}" type="slidenum">
               <a:rPr lang="es-MX" smtClean="0"/>
               <a:pPr/>
-              <a:t>‹Nº›</a:t>
+              <a:t>‹nº›</a:t>
             </a:fld>
             <a:endParaRPr lang="es-MX"/>
           </a:p>
@@ -3819,7 +3826,7 @@
             <a:fld id="{08B575B2-E4DC-4B86-ADFF-AC1540A85088}" type="slidenum">
               <a:rPr lang="es-MX" smtClean="0"/>
               <a:pPr/>
-              <a:t>‹Nº›</a:t>
+              <a:t>‹nº›</a:t>
             </a:fld>
             <a:endParaRPr lang="es-MX"/>
           </a:p>
@@ -4238,7 +4245,7 @@
             <a:fld id="{08B575B2-E4DC-4B86-ADFF-AC1540A85088}" type="slidenum">
               <a:rPr lang="es-MX" smtClean="0"/>
               <a:pPr/>
-              <a:t>‹Nº›</a:t>
+              <a:t>‹nº›</a:t>
             </a:fld>
             <a:endParaRPr lang="es-MX"/>
           </a:p>
@@ -4353,7 +4360,7 @@
             <a:fld id="{08B575B2-E4DC-4B86-ADFF-AC1540A85088}" type="slidenum">
               <a:rPr lang="es-MX" smtClean="0"/>
               <a:pPr/>
-              <a:t>‹Nº›</a:t>
+              <a:t>‹nº›</a:t>
             </a:fld>
             <a:endParaRPr lang="es-MX"/>
           </a:p>
@@ -4445,7 +4452,7 @@
             <a:fld id="{08B575B2-E4DC-4B86-ADFF-AC1540A85088}" type="slidenum">
               <a:rPr lang="es-MX" smtClean="0"/>
               <a:pPr/>
-              <a:t>‹Nº›</a:t>
+              <a:t>‹nº›</a:t>
             </a:fld>
             <a:endParaRPr lang="es-MX"/>
           </a:p>
@@ -4719,7 +4726,7 @@
             <a:fld id="{08B575B2-E4DC-4B86-ADFF-AC1540A85088}" type="slidenum">
               <a:rPr lang="es-MX" smtClean="0"/>
               <a:pPr/>
-              <a:t>‹Nº›</a:t>
+              <a:t>‹nº›</a:t>
             </a:fld>
             <a:endParaRPr lang="es-MX"/>
           </a:p>
@@ -4969,7 +4976,7 @@
             <a:fld id="{08B575B2-E4DC-4B86-ADFF-AC1540A85088}" type="slidenum">
               <a:rPr lang="es-MX" smtClean="0"/>
               <a:pPr/>
-              <a:t>‹Nº›</a:t>
+              <a:t>‹nº›</a:t>
             </a:fld>
             <a:endParaRPr lang="es-MX"/>
           </a:p>
@@ -5215,7 +5222,7 @@
             <a:fld id="{08B575B2-E4DC-4B86-ADFF-AC1540A85088}" type="slidenum">
               <a:rPr lang="es-MX" smtClean="0"/>
               <a:pPr/>
-              <a:t>‹Nº›</a:t>
+              <a:t>‹nº›</a:t>
             </a:fld>
             <a:endParaRPr lang="es-MX"/>
           </a:p>
@@ -5519,7 +5526,7 @@
           <a:blip r:embed="rId2" cstate="print">
             <a:extLst>
               <a:ext uri="{28A0092B-C50C-407E-A947-70E740481C1C}">
-                <a14:useLocalDpi xmlns="" xmlns:a14="http://schemas.microsoft.com/office/drawing/2010/main" val="0"/>
+                <a14:useLocalDpi xmlns:a14="http://schemas.microsoft.com/office/drawing/2010/main" val="0"/>
               </a:ext>
             </a:extLst>
           </a:blip>
@@ -5539,7 +5546,7 @@
           <a:noFill/>
           <a:extLst>
             <a:ext uri="{909E8E84-426E-40DD-AFC4-6F175D3DCCD1}">
-              <a14:hiddenFill xmlns="" xmlns:a14="http://schemas.microsoft.com/office/drawing/2010/main">
+              <a14:hiddenFill xmlns:a14="http://schemas.microsoft.com/office/drawing/2010/main">
                 <a:solidFill>
                   <a:srgbClr val="FFFFFF"/>
                 </a:solidFill>
@@ -5560,7 +5567,7 @@
           <a:blip r:embed="rId3" cstate="print">
             <a:extLst>
               <a:ext uri="{28A0092B-C50C-407E-A947-70E740481C1C}">
-                <a14:useLocalDpi xmlns="" xmlns:a14="http://schemas.microsoft.com/office/drawing/2010/main" val="0"/>
+                <a14:useLocalDpi xmlns:a14="http://schemas.microsoft.com/office/drawing/2010/main" val="0"/>
               </a:ext>
             </a:extLst>
           </a:blip>
@@ -5580,7 +5587,7 @@
           <a:noFill/>
           <a:extLst>
             <a:ext uri="{909E8E84-426E-40DD-AFC4-6F175D3DCCD1}">
-              <a14:hiddenFill xmlns="" xmlns:a14="http://schemas.microsoft.com/office/drawing/2010/main">
+              <a14:hiddenFill xmlns:a14="http://schemas.microsoft.com/office/drawing/2010/main">
                 <a:solidFill>
                   <a:srgbClr val="FFFFFF"/>
                 </a:solidFill>
@@ -5867,7 +5874,7 @@
             <a:blip r:embed="rId2" cstate="print">
               <a:extLst>
                 <a:ext uri="{28A0092B-C50C-407E-A947-70E740481C1C}">
-                  <a14:useLocalDpi xmlns="" xmlns:a14="http://schemas.microsoft.com/office/drawing/2010/main" val="0"/>
+                  <a14:useLocalDpi xmlns:a14="http://schemas.microsoft.com/office/drawing/2010/main" val="0"/>
                 </a:ext>
               </a:extLst>
             </a:blip>
@@ -5887,7 +5894,7 @@
             <a:noFill/>
             <a:extLst>
               <a:ext uri="{909E8E84-426E-40DD-AFC4-6F175D3DCCD1}">
-                <a14:hiddenFill xmlns="" xmlns:a14="http://schemas.microsoft.com/office/drawing/2010/main">
+                <a14:hiddenFill xmlns:a14="http://schemas.microsoft.com/office/drawing/2010/main">
                   <a:solidFill>
                     <a:srgbClr val="FFFFFF"/>
                   </a:solidFill>
@@ -5908,7 +5915,7 @@
             <a:blip r:embed="rId3" cstate="print">
               <a:extLst>
                 <a:ext uri="{28A0092B-C50C-407E-A947-70E740481C1C}">
-                  <a14:useLocalDpi xmlns="" xmlns:a14="http://schemas.microsoft.com/office/drawing/2010/main" val="0"/>
+                  <a14:useLocalDpi xmlns:a14="http://schemas.microsoft.com/office/drawing/2010/main" val="0"/>
                 </a:ext>
               </a:extLst>
             </a:blip>
@@ -5928,7 +5935,7 @@
             <a:noFill/>
             <a:extLst>
               <a:ext uri="{909E8E84-426E-40DD-AFC4-6F175D3DCCD1}">
-                <a14:hiddenFill xmlns="" xmlns:a14="http://schemas.microsoft.com/office/drawing/2010/main">
+                <a14:hiddenFill xmlns:a14="http://schemas.microsoft.com/office/drawing/2010/main">
                   <a:solidFill>
                     <a:srgbClr val="FFFFFF"/>
                   </a:solidFill>
@@ -5949,7 +5956,7 @@
             <a:blip r:embed="rId4" cstate="print">
               <a:extLst>
                 <a:ext uri="{28A0092B-C50C-407E-A947-70E740481C1C}">
-                  <a14:useLocalDpi xmlns="" xmlns:a14="http://schemas.microsoft.com/office/drawing/2010/main" val="0"/>
+                  <a14:useLocalDpi xmlns:a14="http://schemas.microsoft.com/office/drawing/2010/main" val="0"/>
                 </a:ext>
               </a:extLst>
             </a:blip>
@@ -5969,7 +5976,7 @@
             <a:noFill/>
             <a:extLst>
               <a:ext uri="{909E8E84-426E-40DD-AFC4-6F175D3DCCD1}">
-                <a14:hiddenFill xmlns="" xmlns:a14="http://schemas.microsoft.com/office/drawing/2010/main">
+                <a14:hiddenFill xmlns:a14="http://schemas.microsoft.com/office/drawing/2010/main">
                   <a:solidFill>
                     <a:srgbClr val="FFFFFF"/>
                   </a:solidFill>
@@ -6949,7 +6956,6 @@
               <a:rPr lang="es-MX" dirty="0" smtClean="0"/>
               <a:t>2 Lagunas costeras</a:t>
             </a:r>
-            <a:endParaRPr lang="es-MX" dirty="0" smtClean="0"/>
           </a:p>
           <a:p>
             <a:pPr lvl="1"/>
@@ -6986,7 +6992,7 @@
             <a:blip r:embed="rId2" cstate="print">
               <a:extLst>
                 <a:ext uri="{28A0092B-C50C-407E-A947-70E740481C1C}">
-                  <a14:useLocalDpi xmlns="" xmlns:a14="http://schemas.microsoft.com/office/drawing/2010/main" val="0"/>
+                  <a14:useLocalDpi xmlns:a14="http://schemas.microsoft.com/office/drawing/2010/main" val="0"/>
                 </a:ext>
               </a:extLst>
             </a:blip>
@@ -7006,7 +7012,7 @@
             <a:noFill/>
             <a:extLst>
               <a:ext uri="{909E8E84-426E-40DD-AFC4-6F175D3DCCD1}">
-                <a14:hiddenFill xmlns="" xmlns:a14="http://schemas.microsoft.com/office/drawing/2010/main">
+                <a14:hiddenFill xmlns:a14="http://schemas.microsoft.com/office/drawing/2010/main">
                   <a:solidFill>
                     <a:srgbClr val="FFFFFF"/>
                   </a:solidFill>
@@ -7027,7 +7033,7 @@
             <a:blip r:embed="rId3" cstate="print">
               <a:extLst>
                 <a:ext uri="{28A0092B-C50C-407E-A947-70E740481C1C}">
-                  <a14:useLocalDpi xmlns="" xmlns:a14="http://schemas.microsoft.com/office/drawing/2010/main" val="0"/>
+                  <a14:useLocalDpi xmlns:a14="http://schemas.microsoft.com/office/drawing/2010/main" val="0"/>
                 </a:ext>
               </a:extLst>
             </a:blip>
@@ -7047,7 +7053,7 @@
             <a:noFill/>
             <a:extLst>
               <a:ext uri="{909E8E84-426E-40DD-AFC4-6F175D3DCCD1}">
-                <a14:hiddenFill xmlns="" xmlns:a14="http://schemas.microsoft.com/office/drawing/2010/main">
+                <a14:hiddenFill xmlns:a14="http://schemas.microsoft.com/office/drawing/2010/main">
                   <a:solidFill>
                     <a:srgbClr val="FFFFFF"/>
                   </a:solidFill>
@@ -7068,7 +7074,7 @@
             <a:blip r:embed="rId4" cstate="print">
               <a:extLst>
                 <a:ext uri="{28A0092B-C50C-407E-A947-70E740481C1C}">
-                  <a14:useLocalDpi xmlns="" xmlns:a14="http://schemas.microsoft.com/office/drawing/2010/main" val="0"/>
+                  <a14:useLocalDpi xmlns:a14="http://schemas.microsoft.com/office/drawing/2010/main" val="0"/>
                 </a:ext>
               </a:extLst>
             </a:blip>
@@ -7088,7 +7094,7 @@
             <a:noFill/>
             <a:extLst>
               <a:ext uri="{909E8E84-426E-40DD-AFC4-6F175D3DCCD1}">
-                <a14:hiddenFill xmlns="" xmlns:a14="http://schemas.microsoft.com/office/drawing/2010/main">
+                <a14:hiddenFill xmlns:a14="http://schemas.microsoft.com/office/drawing/2010/main">
                   <a:solidFill>
                     <a:srgbClr val="FFFFFF"/>
                   </a:solidFill>
@@ -7269,11 +7275,7 @@
             </a:pPr>
             <a:r>
               <a:rPr lang="es-MX" sz="2000" dirty="0" smtClean="0"/>
-              <a:t>Contribuir </a:t>
-            </a:r>
-            <a:r>
-              <a:rPr lang="es-MX" sz="2000" dirty="0" smtClean="0"/>
-              <a:t>a recuperar las poblaciones de especies objetivo de las pesquerías, como </a:t>
+              <a:t>Contribuir a recuperar las poblaciones de especies objetivo de las pesquerías, como </a:t>
             </a:r>
             <a:r>
               <a:rPr lang="es-MX" sz="2000" b="1" dirty="0" smtClean="0"/>
@@ -7291,7 +7293,6 @@
               <a:rPr lang="es-MX" sz="2000" dirty="0" smtClean="0"/>
               <a:t>. </a:t>
             </a:r>
-            <a:endParaRPr lang="es-MX" sz="2000" dirty="0" smtClean="0"/>
           </a:p>
           <a:p>
             <a:pPr marL="342900" indent="-342900">
@@ -7318,7 +7319,6 @@
               <a:rPr lang="es-MX" sz="2000" dirty="0" smtClean="0"/>
               <a:t>. </a:t>
             </a:r>
-            <a:endParaRPr lang="es-MX" sz="2000" dirty="0" smtClean="0"/>
           </a:p>
           <a:p>
             <a:pPr marL="342900" indent="-342900">
@@ -7327,11 +7327,7 @@
             </a:pPr>
             <a:r>
               <a:rPr lang="es-MX" sz="2000" dirty="0" smtClean="0"/>
-              <a:t>Ayudar </a:t>
-            </a:r>
-            <a:r>
-              <a:rPr lang="es-MX" sz="2000" dirty="0" smtClean="0"/>
-              <a:t>a </a:t>
+              <a:t>Ayudar a </a:t>
             </a:r>
             <a:r>
               <a:rPr lang="es-MX" sz="2000" b="1" dirty="0" smtClean="0"/>
@@ -7341,7 +7337,6 @@
               <a:rPr lang="es-MX" sz="2000" dirty="0" smtClean="0"/>
               <a:t>de los ecosistemas y de la pesca ante perturbaciones climáticas o presiones antropogénicas. </a:t>
             </a:r>
-            <a:endParaRPr lang="es-MX" sz="2000" dirty="0" smtClean="0"/>
           </a:p>
           <a:p>
             <a:pPr marL="342900" indent="-342900">
@@ -7350,11 +7345,7 @@
             </a:pPr>
             <a:r>
               <a:rPr lang="es-MX" sz="2000" b="1" dirty="0" smtClean="0"/>
-              <a:t>Proteger </a:t>
-            </a:r>
-            <a:r>
-              <a:rPr lang="es-MX" sz="2000" b="1" dirty="0" smtClean="0"/>
-              <a:t>una porción del hábitat</a:t>
+              <a:t>Proteger una porción del hábitat</a:t>
             </a:r>
             <a:r>
               <a:rPr lang="es-MX" sz="2000" dirty="0" smtClean="0"/>
@@ -7405,7 +7396,7 @@
             <a:blip r:embed="rId2" cstate="print">
               <a:extLst>
                 <a:ext uri="{28A0092B-C50C-407E-A947-70E740481C1C}">
-                  <a14:useLocalDpi xmlns="" xmlns:a14="http://schemas.microsoft.com/office/drawing/2010/main" val="0"/>
+                  <a14:useLocalDpi xmlns:a14="http://schemas.microsoft.com/office/drawing/2010/main" val="0"/>
                 </a:ext>
               </a:extLst>
             </a:blip>
@@ -7425,7 +7416,7 @@
             <a:noFill/>
             <a:extLst>
               <a:ext uri="{909E8E84-426E-40DD-AFC4-6F175D3DCCD1}">
-                <a14:hiddenFill xmlns="" xmlns:a14="http://schemas.microsoft.com/office/drawing/2010/main">
+                <a14:hiddenFill xmlns:a14="http://schemas.microsoft.com/office/drawing/2010/main">
                   <a:solidFill>
                     <a:srgbClr val="FFFFFF"/>
                   </a:solidFill>
@@ -7446,7 +7437,7 @@
             <a:blip r:embed="rId3" cstate="print">
               <a:extLst>
                 <a:ext uri="{28A0092B-C50C-407E-A947-70E740481C1C}">
-                  <a14:useLocalDpi xmlns="" xmlns:a14="http://schemas.microsoft.com/office/drawing/2010/main" val="0"/>
+                  <a14:useLocalDpi xmlns:a14="http://schemas.microsoft.com/office/drawing/2010/main" val="0"/>
                 </a:ext>
               </a:extLst>
             </a:blip>
@@ -7466,7 +7457,7 @@
             <a:noFill/>
             <a:extLst>
               <a:ext uri="{909E8E84-426E-40DD-AFC4-6F175D3DCCD1}">
-                <a14:hiddenFill xmlns="" xmlns:a14="http://schemas.microsoft.com/office/drawing/2010/main">
+                <a14:hiddenFill xmlns:a14="http://schemas.microsoft.com/office/drawing/2010/main">
                   <a:solidFill>
                     <a:srgbClr val="FFFFFF"/>
                   </a:solidFill>
@@ -7487,7 +7478,7 @@
             <a:blip r:embed="rId4" cstate="print">
               <a:extLst>
                 <a:ext uri="{28A0092B-C50C-407E-A947-70E740481C1C}">
-                  <a14:useLocalDpi xmlns="" xmlns:a14="http://schemas.microsoft.com/office/drawing/2010/main" val="0"/>
+                  <a14:useLocalDpi xmlns:a14="http://schemas.microsoft.com/office/drawing/2010/main" val="0"/>
                 </a:ext>
               </a:extLst>
             </a:blip>
@@ -7507,7 +7498,7 @@
             <a:noFill/>
             <a:extLst>
               <a:ext uri="{909E8E84-426E-40DD-AFC4-6F175D3DCCD1}">
-                <a14:hiddenFill xmlns="" xmlns:a14="http://schemas.microsoft.com/office/drawing/2010/main">
+                <a14:hiddenFill xmlns:a14="http://schemas.microsoft.com/office/drawing/2010/main">
                   <a:solidFill>
                     <a:srgbClr val="FFFFFF"/>
                   </a:solidFill>
@@ -7643,7 +7634,7 @@
             <a:blip r:embed="rId3" cstate="print">
               <a:extLst>
                 <a:ext uri="{28A0092B-C50C-407E-A947-70E740481C1C}">
-                  <a14:useLocalDpi xmlns="" xmlns:a14="http://schemas.microsoft.com/office/drawing/2010/main" val="0"/>
+                  <a14:useLocalDpi xmlns:a14="http://schemas.microsoft.com/office/drawing/2010/main" val="0"/>
                 </a:ext>
               </a:extLst>
             </a:blip>
@@ -7663,7 +7654,7 @@
             <a:noFill/>
             <a:extLst>
               <a:ext uri="{909E8E84-426E-40DD-AFC4-6F175D3DCCD1}">
-                <a14:hiddenFill xmlns="" xmlns:a14="http://schemas.microsoft.com/office/drawing/2010/main">
+                <a14:hiddenFill xmlns:a14="http://schemas.microsoft.com/office/drawing/2010/main">
                   <a:solidFill>
                     <a:srgbClr val="FFFFFF"/>
                   </a:solidFill>
@@ -7684,7 +7675,7 @@
             <a:blip r:embed="rId4" cstate="print">
               <a:extLst>
                 <a:ext uri="{28A0092B-C50C-407E-A947-70E740481C1C}">
-                  <a14:useLocalDpi xmlns="" xmlns:a14="http://schemas.microsoft.com/office/drawing/2010/main" val="0"/>
+                  <a14:useLocalDpi xmlns:a14="http://schemas.microsoft.com/office/drawing/2010/main" val="0"/>
                 </a:ext>
               </a:extLst>
             </a:blip>
@@ -7704,7 +7695,7 @@
             <a:noFill/>
             <a:extLst>
               <a:ext uri="{909E8E84-426E-40DD-AFC4-6F175D3DCCD1}">
-                <a14:hiddenFill xmlns="" xmlns:a14="http://schemas.microsoft.com/office/drawing/2010/main">
+                <a14:hiddenFill xmlns:a14="http://schemas.microsoft.com/office/drawing/2010/main">
                   <a:solidFill>
                     <a:srgbClr val="FFFFFF"/>
                   </a:solidFill>
@@ -7725,7 +7716,7 @@
             <a:blip r:embed="rId5" cstate="print">
               <a:extLst>
                 <a:ext uri="{28A0092B-C50C-407E-A947-70E740481C1C}">
-                  <a14:useLocalDpi xmlns="" xmlns:a14="http://schemas.microsoft.com/office/drawing/2010/main" val="0"/>
+                  <a14:useLocalDpi xmlns:a14="http://schemas.microsoft.com/office/drawing/2010/main" val="0"/>
                 </a:ext>
               </a:extLst>
             </a:blip>
@@ -7745,7 +7736,7 @@
             <a:noFill/>
             <a:extLst>
               <a:ext uri="{909E8E84-426E-40DD-AFC4-6F175D3DCCD1}">
-                <a14:hiddenFill xmlns="" xmlns:a14="http://schemas.microsoft.com/office/drawing/2010/main">
+                <a14:hiddenFill xmlns:a14="http://schemas.microsoft.com/office/drawing/2010/main">
                   <a:solidFill>
                     <a:srgbClr val="FFFFFF"/>
                   </a:solidFill>
@@ -7940,7 +7931,6 @@
               <a:rPr lang="es-MX" sz="2400" dirty="0" smtClean="0"/>
               <a:t>Nivel de inclusión</a:t>
             </a:r>
-            <a:endParaRPr lang="es-MX" sz="2400" dirty="0" smtClean="0"/>
           </a:p>
         </p:txBody>
       </p:sp>
@@ -8109,17 +8099,8 @@
           <a:p>
             <a:r>
               <a:rPr lang="es-MX" dirty="0" smtClean="0"/>
-              <a:t>Mayoría </a:t>
-            </a:r>
-            <a:r>
-              <a:rPr lang="es-MX" dirty="0" smtClean="0"/>
-              <a:t>de sitios e indicadores en incremento </a:t>
-            </a:r>
-            <a:r>
-              <a:rPr lang="es-MX" dirty="0" smtClean="0"/>
-              <a:t>significativo</a:t>
-            </a:r>
-            <a:endParaRPr lang="es-MX" dirty="0" smtClean="0"/>
+              <a:t>Mayoría de sitios e indicadores en incremento significativo</a:t>
+            </a:r>
           </a:p>
         </p:txBody>
       </p:sp>
@@ -8149,7 +8130,7 @@
             <a:blip r:embed="rId3" cstate="print">
               <a:extLst>
                 <a:ext uri="{28A0092B-C50C-407E-A947-70E740481C1C}">
-                  <a14:useLocalDpi xmlns="" xmlns:a14="http://schemas.microsoft.com/office/drawing/2010/main" val="0"/>
+                  <a14:useLocalDpi xmlns:a14="http://schemas.microsoft.com/office/drawing/2010/main" val="0"/>
                 </a:ext>
               </a:extLst>
             </a:blip>
@@ -8169,7 +8150,7 @@
             <a:noFill/>
             <a:extLst>
               <a:ext uri="{909E8E84-426E-40DD-AFC4-6F175D3DCCD1}">
-                <a14:hiddenFill xmlns="" xmlns:a14="http://schemas.microsoft.com/office/drawing/2010/main">
+                <a14:hiddenFill xmlns:a14="http://schemas.microsoft.com/office/drawing/2010/main">
                   <a:solidFill>
                     <a:srgbClr val="FFFFFF"/>
                   </a:solidFill>
@@ -8190,7 +8171,7 @@
             <a:blip r:embed="rId4" cstate="print">
               <a:extLst>
                 <a:ext uri="{28A0092B-C50C-407E-A947-70E740481C1C}">
-                  <a14:useLocalDpi xmlns="" xmlns:a14="http://schemas.microsoft.com/office/drawing/2010/main" val="0"/>
+                  <a14:useLocalDpi xmlns:a14="http://schemas.microsoft.com/office/drawing/2010/main" val="0"/>
                 </a:ext>
               </a:extLst>
             </a:blip>
@@ -8210,7 +8191,7 @@
             <a:noFill/>
             <a:extLst>
               <a:ext uri="{909E8E84-426E-40DD-AFC4-6F175D3DCCD1}">
-                <a14:hiddenFill xmlns="" xmlns:a14="http://schemas.microsoft.com/office/drawing/2010/main">
+                <a14:hiddenFill xmlns:a14="http://schemas.microsoft.com/office/drawing/2010/main">
                   <a:solidFill>
                     <a:srgbClr val="FFFFFF"/>
                   </a:solidFill>
@@ -8231,7 +8212,7 @@
             <a:blip r:embed="rId5" cstate="print">
               <a:extLst>
                 <a:ext uri="{28A0092B-C50C-407E-A947-70E740481C1C}">
-                  <a14:useLocalDpi xmlns="" xmlns:a14="http://schemas.microsoft.com/office/drawing/2010/main" val="0"/>
+                  <a14:useLocalDpi xmlns:a14="http://schemas.microsoft.com/office/drawing/2010/main" val="0"/>
                 </a:ext>
               </a:extLst>
             </a:blip>
@@ -8251,7 +8232,7 @@
             <a:noFill/>
             <a:extLst>
               <a:ext uri="{909E8E84-426E-40DD-AFC4-6F175D3DCCD1}">
-                <a14:hiddenFill xmlns="" xmlns:a14="http://schemas.microsoft.com/office/drawing/2010/main">
+                <a14:hiddenFill xmlns:a14="http://schemas.microsoft.com/office/drawing/2010/main">
                   <a:solidFill>
                     <a:srgbClr val="FFFFFF"/>
                   </a:solidFill>
@@ -8439,7 +8420,7 @@
               <a:blip r:embed="rId2" cstate="print">
                 <a:extLst>
                   <a:ext uri="{28A0092B-C50C-407E-A947-70E740481C1C}">
-                    <a14:useLocalDpi xmlns="" xmlns:a14="http://schemas.microsoft.com/office/drawing/2010/main" val="0"/>
+                    <a14:useLocalDpi xmlns:a14="http://schemas.microsoft.com/office/drawing/2010/main" val="0"/>
                   </a:ext>
                 </a:extLst>
               </a:blip>
@@ -8459,7 +8440,7 @@
               <a:noFill/>
               <a:extLst>
                 <a:ext uri="{909E8E84-426E-40DD-AFC4-6F175D3DCCD1}">
-                  <a14:hiddenFill xmlns="" xmlns:a14="http://schemas.microsoft.com/office/drawing/2010/main">
+                  <a14:hiddenFill xmlns:a14="http://schemas.microsoft.com/office/drawing/2010/main">
                     <a:solidFill>
                       <a:srgbClr val="FFFFFF"/>
                     </a:solidFill>
@@ -8480,7 +8461,7 @@
               <a:blip r:embed="rId3" cstate="print">
                 <a:extLst>
                   <a:ext uri="{28A0092B-C50C-407E-A947-70E740481C1C}">
-                    <a14:useLocalDpi xmlns="" xmlns:a14="http://schemas.microsoft.com/office/drawing/2010/main" val="0"/>
+                    <a14:useLocalDpi xmlns:a14="http://schemas.microsoft.com/office/drawing/2010/main" val="0"/>
                   </a:ext>
                 </a:extLst>
               </a:blip>
@@ -8500,7 +8481,7 @@
               <a:noFill/>
               <a:extLst>
                 <a:ext uri="{909E8E84-426E-40DD-AFC4-6F175D3DCCD1}">
-                  <a14:hiddenFill xmlns="" xmlns:a14="http://schemas.microsoft.com/office/drawing/2010/main">
+                  <a14:hiddenFill xmlns:a14="http://schemas.microsoft.com/office/drawing/2010/main">
                     <a:solidFill>
                       <a:srgbClr val="FFFFFF"/>
                     </a:solidFill>
@@ -8521,7 +8502,7 @@
               <a:blip r:embed="rId4" cstate="print">
                 <a:extLst>
                   <a:ext uri="{28A0092B-C50C-407E-A947-70E740481C1C}">
-                    <a14:useLocalDpi xmlns="" xmlns:a14="http://schemas.microsoft.com/office/drawing/2010/main" val="0"/>
+                    <a14:useLocalDpi xmlns:a14="http://schemas.microsoft.com/office/drawing/2010/main" val="0"/>
                   </a:ext>
                 </a:extLst>
               </a:blip>
@@ -8541,7 +8522,7 @@
               <a:noFill/>
               <a:extLst>
                 <a:ext uri="{909E8E84-426E-40DD-AFC4-6F175D3DCCD1}">
-                  <a14:hiddenFill xmlns="" xmlns:a14="http://schemas.microsoft.com/office/drawing/2010/main">
+                  <a14:hiddenFill xmlns:a14="http://schemas.microsoft.com/office/drawing/2010/main">
                     <a:solidFill>
                       <a:srgbClr val="FFFFFF"/>
                     </a:solidFill>
@@ -10734,60 +10715,6 @@
           <a:chExt cx="0" cy="0"/>
         </a:xfrm>
       </p:grpSpPr>
-      <p:sp>
-        <p:nvSpPr>
-          <p:cNvPr id="2" name="1 Título"/>
-          <p:cNvSpPr>
-            <a:spLocks noGrp="1"/>
-          </p:cNvSpPr>
-          <p:nvPr>
-            <p:ph type="title"/>
-          </p:nvPr>
-        </p:nvSpPr>
-        <p:spPr>
-          <a:xfrm>
-            <a:off x="609521" y="548680"/>
-            <a:ext cx="10971372" cy="1143000"/>
-          </a:xfrm>
-        </p:spPr>
-        <p:txBody>
-          <a:bodyPr/>
-          <a:lstStyle/>
-          <a:p>
-            <a:endParaRPr lang="es-MX" b="1" dirty="0">
-              <a:effectLst>
-                <a:outerShdw blurRad="38100" dist="38100" dir="2700000" algn="tl">
-                  <a:srgbClr val="000000">
-                    <a:alpha val="43137"/>
-                  </a:srgbClr>
-                </a:outerShdw>
-              </a:effectLst>
-            </a:endParaRPr>
-          </a:p>
-        </p:txBody>
-      </p:sp>
-      <p:sp>
-        <p:nvSpPr>
-          <p:cNvPr id="3" name="2 Marcador de contenido"/>
-          <p:cNvSpPr>
-            <a:spLocks noGrp="1"/>
-          </p:cNvSpPr>
-          <p:nvPr>
-            <p:ph idx="1"/>
-          </p:nvPr>
-        </p:nvSpPr>
-        <p:spPr/>
-        <p:txBody>
-          <a:bodyPr/>
-          <a:lstStyle/>
-          <a:p>
-            <a:pPr>
-              <a:buNone/>
-            </a:pPr>
-            <a:endParaRPr lang="es-MX" dirty="0"/>
-          </a:p>
-        </p:txBody>
-      </p:sp>
       <p:grpSp>
         <p:nvGrpSpPr>
           <p:cNvPr id="4" name="9 Grupo"/>
@@ -10828,7 +10755,7 @@
               <a:blip r:embed="rId2" cstate="print">
                 <a:extLst>
                   <a:ext uri="{28A0092B-C50C-407E-A947-70E740481C1C}">
-                    <a14:useLocalDpi xmlns="" xmlns:a14="http://schemas.microsoft.com/office/drawing/2010/main" val="0"/>
+                    <a14:useLocalDpi xmlns:a14="http://schemas.microsoft.com/office/drawing/2010/main" val="0"/>
                   </a:ext>
                 </a:extLst>
               </a:blip>
@@ -10848,7 +10775,7 @@
               <a:noFill/>
               <a:extLst>
                 <a:ext uri="{909E8E84-426E-40DD-AFC4-6F175D3DCCD1}">
-                  <a14:hiddenFill xmlns="" xmlns:a14="http://schemas.microsoft.com/office/drawing/2010/main">
+                  <a14:hiddenFill xmlns:a14="http://schemas.microsoft.com/office/drawing/2010/main">
                     <a:solidFill>
                       <a:srgbClr val="FFFFFF"/>
                     </a:solidFill>
@@ -10869,7 +10796,7 @@
               <a:blip r:embed="rId3" cstate="print">
                 <a:extLst>
                   <a:ext uri="{28A0092B-C50C-407E-A947-70E740481C1C}">
-                    <a14:useLocalDpi xmlns="" xmlns:a14="http://schemas.microsoft.com/office/drawing/2010/main" val="0"/>
+                    <a14:useLocalDpi xmlns:a14="http://schemas.microsoft.com/office/drawing/2010/main" val="0"/>
                   </a:ext>
                 </a:extLst>
               </a:blip>
@@ -10889,7 +10816,7 @@
               <a:noFill/>
               <a:extLst>
                 <a:ext uri="{909E8E84-426E-40DD-AFC4-6F175D3DCCD1}">
-                  <a14:hiddenFill xmlns="" xmlns:a14="http://schemas.microsoft.com/office/drawing/2010/main">
+                  <a14:hiddenFill xmlns:a14="http://schemas.microsoft.com/office/drawing/2010/main">
                     <a:solidFill>
                       <a:srgbClr val="FFFFFF"/>
                     </a:solidFill>
@@ -10910,7 +10837,7 @@
               <a:blip r:embed="rId4" cstate="print">
                 <a:extLst>
                   <a:ext uri="{28A0092B-C50C-407E-A947-70E740481C1C}">
-                    <a14:useLocalDpi xmlns="" xmlns:a14="http://schemas.microsoft.com/office/drawing/2010/main" val="0"/>
+                    <a14:useLocalDpi xmlns:a14="http://schemas.microsoft.com/office/drawing/2010/main" val="0"/>
                   </a:ext>
                 </a:extLst>
               </a:blip>
@@ -10930,7 +10857,7 @@
               <a:noFill/>
               <a:extLst>
                 <a:ext uri="{909E8E84-426E-40DD-AFC4-6F175D3DCCD1}">
-                  <a14:hiddenFill xmlns="" xmlns:a14="http://schemas.microsoft.com/office/drawing/2010/main">
+                  <a14:hiddenFill xmlns:a14="http://schemas.microsoft.com/office/drawing/2010/main">
                     <a:solidFill>
                       <a:srgbClr val="FFFFFF"/>
                     </a:solidFill>
@@ -10981,7 +10908,2501 @@
           </p:txBody>
         </p:sp>
       </p:grpSp>
+      <p:graphicFrame>
+        <p:nvGraphicFramePr>
+          <p:cNvPr id="10" name="Espaço Reservado para Conteúdo 9"/>
+          <p:cNvGraphicFramePr>
+            <a:graphicFrameLocks noGrp="1"/>
+          </p:cNvGraphicFramePr>
+          <p:nvPr>
+            <p:ph idx="1"/>
+            <p:extLst>
+              <p:ext uri="{D42A27DB-BD31-4B8C-83A1-F6EECF244321}">
+                <p14:modId xmlns:p14="http://schemas.microsoft.com/office/powerpoint/2010/main" val="842756025"/>
+              </p:ext>
+            </p:extLst>
+          </p:nvPr>
+        </p:nvGraphicFramePr>
+        <p:xfrm>
+          <a:off x="524105" y="1096780"/>
+          <a:ext cx="11142201" cy="4871823"/>
+        </p:xfrm>
+        <a:graphic>
+          <a:graphicData uri="http://schemas.openxmlformats.org/drawingml/2006/table">
+            <a:tbl>
+              <a:tblPr firstRow="1" bandRow="1">
+                <a:tableStyleId>{5C22544A-7EE6-4342-B048-85BDC9FD1C3A}</a:tableStyleId>
+              </a:tblPr>
+              <a:tblGrid>
+                <a:gridCol w="5415177"/>
+                <a:gridCol w="513172"/>
+                <a:gridCol w="821076"/>
+                <a:gridCol w="513172"/>
+                <a:gridCol w="513172"/>
+                <a:gridCol w="513172"/>
+                <a:gridCol w="513172"/>
+                <a:gridCol w="513172"/>
+                <a:gridCol w="821076"/>
+                <a:gridCol w="1005840"/>
+              </a:tblGrid>
+              <a:tr h="1489639">
+                <a:tc>
+                  <a:txBody>
+                    <a:bodyPr/>
+                    <a:lstStyle/>
+                    <a:p>
+                      <a:pPr algn="l"/>
+                      <a:r>
+                        <a:rPr lang="en-US" dirty="0" err="1" smtClean="0"/>
+                        <a:t>Objetivos</a:t>
+                      </a:r>
+                      <a:endParaRPr lang="en-US" dirty="0"/>
+                    </a:p>
+                  </a:txBody>
+                  <a:tcPr anchor="ctr"/>
+                </a:tc>
+                <a:tc>
+                  <a:txBody>
+                    <a:bodyPr/>
+                    <a:lstStyle/>
+                    <a:p>
+                      <a:pPr algn="ctr"/>
+                      <a:r>
+                        <a:rPr lang="en-US" dirty="0" err="1" smtClean="0"/>
+                        <a:t>Diversidad</a:t>
+                      </a:r>
+                      <a:endParaRPr lang="en-US" dirty="0"/>
+                    </a:p>
+                  </a:txBody>
+                  <a:tcPr vert="vert270" anchor="ctr"/>
+                </a:tc>
+                <a:tc>
+                  <a:txBody>
+                    <a:bodyPr/>
+                    <a:lstStyle/>
+                    <a:p>
+                      <a:pPr algn="ctr"/>
+                      <a:r>
+                        <a:rPr lang="en-US" dirty="0" err="1" smtClean="0"/>
+                        <a:t>Densidad</a:t>
+                      </a:r>
+                      <a:r>
+                        <a:rPr lang="en-US" dirty="0" smtClean="0"/>
+                        <a:t> de </a:t>
+                      </a:r>
+                      <a:r>
+                        <a:rPr lang="en-US" dirty="0" err="1" smtClean="0"/>
+                        <a:t>maduros</a:t>
+                      </a:r>
+                      <a:endParaRPr lang="en-US" dirty="0"/>
+                    </a:p>
+                  </a:txBody>
+                  <a:tcPr vert="vert270" anchor="ctr"/>
+                </a:tc>
+                <a:tc>
+                  <a:txBody>
+                    <a:bodyPr/>
+                    <a:lstStyle/>
+                    <a:p>
+                      <a:pPr algn="ctr"/>
+                      <a:r>
+                        <a:rPr lang="en-US" dirty="0" err="1" smtClean="0"/>
+                        <a:t>Densidad</a:t>
+                      </a:r>
+                      <a:endParaRPr lang="en-US" dirty="0"/>
+                    </a:p>
+                  </a:txBody>
+                  <a:tcPr vert="vert270" anchor="ctr"/>
+                </a:tc>
+                <a:tc>
+                  <a:txBody>
+                    <a:bodyPr/>
+                    <a:lstStyle/>
+                    <a:p>
+                      <a:pPr algn="ctr"/>
+                      <a:r>
+                        <a:rPr lang="en-US" dirty="0" err="1" smtClean="0"/>
+                        <a:t>Biomasa</a:t>
+                      </a:r>
+                      <a:endParaRPr lang="en-US" dirty="0"/>
+                    </a:p>
+                  </a:txBody>
+                  <a:tcPr vert="vert270" anchor="ctr"/>
+                </a:tc>
+                <a:tc>
+                  <a:txBody>
+                    <a:bodyPr/>
+                    <a:lstStyle/>
+                    <a:p>
+                      <a:pPr algn="ctr"/>
+                      <a:r>
+                        <a:rPr lang="en-US" dirty="0" err="1" smtClean="0"/>
+                        <a:t>Nivel</a:t>
+                      </a:r>
+                      <a:r>
+                        <a:rPr lang="en-US" dirty="0" smtClean="0"/>
+                        <a:t> </a:t>
+                      </a:r>
+                      <a:r>
+                        <a:rPr lang="en-US" dirty="0" err="1" smtClean="0"/>
+                        <a:t>trófico</a:t>
+                      </a:r>
+                      <a:endParaRPr lang="en-US" dirty="0"/>
+                    </a:p>
+                  </a:txBody>
+                  <a:tcPr vert="vert270" anchor="ctr"/>
+                </a:tc>
+                <a:tc>
+                  <a:txBody>
+                    <a:bodyPr/>
+                    <a:lstStyle/>
+                    <a:p>
+                      <a:pPr algn="ctr"/>
+                      <a:r>
+                        <a:rPr lang="en-US" dirty="0" err="1" smtClean="0"/>
+                        <a:t>Capturas</a:t>
+                      </a:r>
+                      <a:endParaRPr lang="en-US" dirty="0"/>
+                    </a:p>
+                  </a:txBody>
+                  <a:tcPr vert="vert270" anchor="ctr"/>
+                </a:tc>
+                <a:tc>
+                  <a:txBody>
+                    <a:bodyPr/>
+                    <a:lstStyle/>
+                    <a:p>
+                      <a:pPr algn="ctr"/>
+                      <a:r>
+                        <a:rPr lang="en-US" dirty="0" err="1" smtClean="0"/>
+                        <a:t>Ingressos</a:t>
+                      </a:r>
+                      <a:endParaRPr lang="en-US" dirty="0"/>
+                    </a:p>
+                  </a:txBody>
+                  <a:tcPr vert="vert270" anchor="ctr"/>
+                </a:tc>
+                <a:tc>
+                  <a:txBody>
+                    <a:bodyPr/>
+                    <a:lstStyle/>
+                    <a:p>
+                      <a:pPr algn="ctr"/>
+                      <a:r>
+                        <a:rPr lang="en-US" dirty="0" err="1" smtClean="0"/>
+                        <a:t>Conocimiento</a:t>
+                      </a:r>
+                      <a:endParaRPr lang="en-US" dirty="0"/>
+                    </a:p>
+                  </a:txBody>
+                  <a:tcPr vert="vert270" anchor="ctr"/>
+                </a:tc>
+                <a:tc>
+                  <a:txBody>
+                    <a:bodyPr/>
+                    <a:lstStyle/>
+                    <a:p>
+                      <a:pPr marL="0" marR="0" lvl="0" indent="0" algn="ctr" defTabSz="914400" rtl="0" eaLnBrk="1" fontAlgn="auto" latinLnBrk="0" hangingPunct="1">
+                        <a:lnSpc>
+                          <a:spcPct val="100000"/>
+                        </a:lnSpc>
+                        <a:spcBef>
+                          <a:spcPts val="0"/>
+                        </a:spcBef>
+                        <a:spcAft>
+                          <a:spcPts val="0"/>
+                        </a:spcAft>
+                        <a:buClrTx/>
+                        <a:buSzTx/>
+                        <a:buFontTx/>
+                        <a:buNone/>
+                        <a:tabLst/>
+                        <a:defRPr/>
+                      </a:pPr>
+                      <a:r>
+                        <a:rPr lang="en-US" dirty="0" err="1" smtClean="0"/>
+                        <a:t>Medios</a:t>
+                      </a:r>
+                      <a:r>
+                        <a:rPr lang="en-US" dirty="0" smtClean="0"/>
+                        <a:t> de subsistencia</a:t>
+                      </a:r>
+                    </a:p>
+                  </a:txBody>
+                  <a:tcPr vert="vert270" anchor="ctr"/>
+                </a:tc>
+              </a:tr>
+              <a:tr h="397904">
+                <a:tc>
+                  <a:txBody>
+                    <a:bodyPr/>
+                    <a:lstStyle/>
+                    <a:p>
+                      <a:r>
+                        <a:rPr lang="en-US" dirty="0" err="1" smtClean="0"/>
+                        <a:t>Recuperar</a:t>
+                      </a:r>
+                      <a:r>
+                        <a:rPr lang="en-US" dirty="0" smtClean="0"/>
+                        <a:t> </a:t>
+                      </a:r>
+                      <a:r>
+                        <a:rPr lang="en-US" dirty="0" err="1" smtClean="0"/>
+                        <a:t>especies</a:t>
+                      </a:r>
+                      <a:r>
+                        <a:rPr lang="en-US" dirty="0" smtClean="0"/>
+                        <a:t> de </a:t>
+                      </a:r>
+                      <a:r>
+                        <a:rPr lang="en-US" dirty="0" err="1" smtClean="0"/>
+                        <a:t>interés</a:t>
+                      </a:r>
+                      <a:r>
+                        <a:rPr lang="en-US" dirty="0" smtClean="0"/>
+                        <a:t> </a:t>
+                      </a:r>
+                      <a:r>
+                        <a:rPr lang="en-US" dirty="0" err="1" smtClean="0"/>
+                        <a:t>comercial</a:t>
+                      </a:r>
+                      <a:endParaRPr lang="en-US" dirty="0"/>
+                    </a:p>
+                  </a:txBody>
+                  <a:tcPr/>
+                </a:tc>
+                <a:tc>
+                  <a:txBody>
+                    <a:bodyPr/>
+                    <a:lstStyle/>
+                    <a:p>
+                      <a:pPr algn="ctr"/>
+                      <a:endParaRPr lang="en-US" b="1" dirty="0"/>
+                    </a:p>
+                  </a:txBody>
+                  <a:tcPr anchor="ctr"/>
+                </a:tc>
+                <a:tc>
+                  <a:txBody>
+                    <a:bodyPr/>
+                    <a:lstStyle/>
+                    <a:p>
+                      <a:pPr algn="ctr"/>
+                      <a:r>
+                        <a:rPr lang="en-US" b="1" dirty="0" smtClean="0"/>
+                        <a:t>*</a:t>
+                      </a:r>
+                      <a:endParaRPr lang="en-US" b="1" dirty="0"/>
+                    </a:p>
+                  </a:txBody>
+                  <a:tcPr anchor="ctr"/>
+                </a:tc>
+                <a:tc>
+                  <a:txBody>
+                    <a:bodyPr/>
+                    <a:lstStyle/>
+                    <a:p>
+                      <a:pPr algn="ctr"/>
+                      <a:r>
+                        <a:rPr lang="en-US" b="1" dirty="0" smtClean="0"/>
+                        <a:t>*</a:t>
+                      </a:r>
+                      <a:endParaRPr lang="en-US" b="1" dirty="0"/>
+                    </a:p>
+                  </a:txBody>
+                  <a:tcPr anchor="ctr"/>
+                </a:tc>
+                <a:tc>
+                  <a:txBody>
+                    <a:bodyPr/>
+                    <a:lstStyle/>
+                    <a:p>
+                      <a:pPr algn="ctr"/>
+                      <a:r>
+                        <a:rPr lang="en-US" b="1" dirty="0" smtClean="0"/>
+                        <a:t>*</a:t>
+                      </a:r>
+                      <a:endParaRPr lang="en-US" b="1" dirty="0"/>
+                    </a:p>
+                  </a:txBody>
+                  <a:tcPr anchor="ctr"/>
+                </a:tc>
+                <a:tc>
+                  <a:txBody>
+                    <a:bodyPr/>
+                    <a:lstStyle/>
+                    <a:p>
+                      <a:pPr algn="ctr"/>
+                      <a:endParaRPr lang="en-US" b="1" dirty="0"/>
+                    </a:p>
+                  </a:txBody>
+                  <a:tcPr anchor="ctr"/>
+                </a:tc>
+                <a:tc>
+                  <a:txBody>
+                    <a:bodyPr/>
+                    <a:lstStyle/>
+                    <a:p>
+                      <a:pPr algn="ctr"/>
+                      <a:endParaRPr lang="en-US" b="1" dirty="0"/>
+                    </a:p>
+                  </a:txBody>
+                  <a:tcPr anchor="ctr"/>
+                </a:tc>
+                <a:tc>
+                  <a:txBody>
+                    <a:bodyPr/>
+                    <a:lstStyle/>
+                    <a:p>
+                      <a:pPr algn="ctr"/>
+                      <a:endParaRPr lang="en-US" b="1" dirty="0"/>
+                    </a:p>
+                  </a:txBody>
+                  <a:tcPr anchor="ctr"/>
+                </a:tc>
+                <a:tc>
+                  <a:txBody>
+                    <a:bodyPr/>
+                    <a:lstStyle/>
+                    <a:p>
+                      <a:pPr algn="ctr"/>
+                      <a:r>
+                        <a:rPr lang="en-US" b="1" dirty="0" smtClean="0"/>
+                        <a:t>*</a:t>
+                      </a:r>
+                      <a:endParaRPr lang="en-US" b="1" dirty="0"/>
+                    </a:p>
+                  </a:txBody>
+                  <a:tcPr anchor="ctr"/>
+                </a:tc>
+                <a:tc>
+                  <a:txBody>
+                    <a:bodyPr/>
+                    <a:lstStyle/>
+                    <a:p>
+                      <a:pPr algn="ctr"/>
+                      <a:endParaRPr lang="en-US" b="1" dirty="0"/>
+                    </a:p>
+                  </a:txBody>
+                  <a:tcPr anchor="ctr"/>
+                </a:tc>
+              </a:tr>
+              <a:tr h="397904">
+                <a:tc>
+                  <a:txBody>
+                    <a:bodyPr/>
+                    <a:lstStyle/>
+                    <a:p>
+                      <a:r>
+                        <a:rPr lang="en-US" dirty="0" err="1" smtClean="0"/>
+                        <a:t>Conservar</a:t>
+                      </a:r>
+                      <a:r>
+                        <a:rPr lang="en-US" dirty="0" smtClean="0"/>
+                        <a:t> </a:t>
+                      </a:r>
+                      <a:r>
+                        <a:rPr lang="en-US" dirty="0" err="1" smtClean="0"/>
+                        <a:t>especies</a:t>
+                      </a:r>
+                      <a:r>
+                        <a:rPr lang="en-US" dirty="0" smtClean="0"/>
+                        <a:t> </a:t>
+                      </a:r>
+                      <a:r>
+                        <a:rPr lang="en-US" dirty="0" err="1" smtClean="0"/>
+                        <a:t>en</a:t>
+                      </a:r>
+                      <a:r>
+                        <a:rPr lang="en-US" baseline="0" dirty="0" smtClean="0"/>
+                        <a:t> regimen de </a:t>
+                      </a:r>
+                      <a:r>
+                        <a:rPr lang="en-US" baseline="0" dirty="0" err="1" smtClean="0"/>
+                        <a:t>protección</a:t>
+                      </a:r>
+                      <a:r>
+                        <a:rPr lang="en-US" baseline="0" dirty="0" smtClean="0"/>
+                        <a:t> especial</a:t>
+                      </a:r>
+                      <a:endParaRPr lang="en-US" dirty="0"/>
+                    </a:p>
+                  </a:txBody>
+                  <a:tcPr/>
+                </a:tc>
+                <a:tc>
+                  <a:txBody>
+                    <a:bodyPr/>
+                    <a:lstStyle/>
+                    <a:p>
+                      <a:pPr algn="ctr"/>
+                      <a:endParaRPr lang="en-US" b="1" dirty="0"/>
+                    </a:p>
+                  </a:txBody>
+                  <a:tcPr anchor="ctr"/>
+                </a:tc>
+                <a:tc>
+                  <a:txBody>
+                    <a:bodyPr/>
+                    <a:lstStyle/>
+                    <a:p>
+                      <a:pPr algn="ctr"/>
+                      <a:endParaRPr lang="en-US" b="1" dirty="0"/>
+                    </a:p>
+                  </a:txBody>
+                  <a:tcPr anchor="ctr"/>
+                </a:tc>
+                <a:tc>
+                  <a:txBody>
+                    <a:bodyPr/>
+                    <a:lstStyle/>
+                    <a:p>
+                      <a:pPr algn="ctr"/>
+                      <a:endParaRPr lang="en-US" b="1"/>
+                    </a:p>
+                  </a:txBody>
+                  <a:tcPr anchor="ctr"/>
+                </a:tc>
+                <a:tc>
+                  <a:txBody>
+                    <a:bodyPr/>
+                    <a:lstStyle/>
+                    <a:p>
+                      <a:pPr algn="ctr"/>
+                      <a:endParaRPr lang="en-US" b="1" dirty="0"/>
+                    </a:p>
+                  </a:txBody>
+                  <a:tcPr anchor="ctr"/>
+                </a:tc>
+                <a:tc>
+                  <a:txBody>
+                    <a:bodyPr/>
+                    <a:lstStyle/>
+                    <a:p>
+                      <a:pPr algn="ctr"/>
+                      <a:endParaRPr lang="en-US" b="1"/>
+                    </a:p>
+                  </a:txBody>
+                  <a:tcPr anchor="ctr"/>
+                </a:tc>
+                <a:tc>
+                  <a:txBody>
+                    <a:bodyPr/>
+                    <a:lstStyle/>
+                    <a:p>
+                      <a:pPr algn="ctr"/>
+                      <a:endParaRPr lang="en-US" b="1"/>
+                    </a:p>
+                  </a:txBody>
+                  <a:tcPr anchor="ctr"/>
+                </a:tc>
+                <a:tc>
+                  <a:txBody>
+                    <a:bodyPr/>
+                    <a:lstStyle/>
+                    <a:p>
+                      <a:pPr algn="ctr"/>
+                      <a:endParaRPr lang="en-US" b="1"/>
+                    </a:p>
+                  </a:txBody>
+                  <a:tcPr anchor="ctr"/>
+                </a:tc>
+                <a:tc>
+                  <a:txBody>
+                    <a:bodyPr/>
+                    <a:lstStyle/>
+                    <a:p>
+                      <a:pPr algn="ctr"/>
+                      <a:r>
+                        <a:rPr lang="en-US" b="1" dirty="0" smtClean="0"/>
+                        <a:t>*</a:t>
+                      </a:r>
+                      <a:endParaRPr lang="en-US" b="1" dirty="0"/>
+                    </a:p>
+                  </a:txBody>
+                  <a:tcPr anchor="ctr"/>
+                </a:tc>
+                <a:tc>
+                  <a:txBody>
+                    <a:bodyPr/>
+                    <a:lstStyle/>
+                    <a:p>
+                      <a:pPr algn="ctr"/>
+                      <a:r>
+                        <a:rPr lang="en-US" b="1" dirty="0" smtClean="0"/>
+                        <a:t>*</a:t>
+                      </a:r>
+                      <a:endParaRPr lang="en-US" b="1" dirty="0"/>
+                    </a:p>
+                  </a:txBody>
+                  <a:tcPr anchor="ctr"/>
+                </a:tc>
+              </a:tr>
+              <a:tr h="397904">
+                <a:tc>
+                  <a:txBody>
+                    <a:bodyPr/>
+                    <a:lstStyle/>
+                    <a:p>
+                      <a:r>
+                        <a:rPr lang="en-US" dirty="0" err="1" smtClean="0"/>
+                        <a:t>Mejorar</a:t>
+                      </a:r>
+                      <a:r>
+                        <a:rPr lang="en-US" dirty="0" smtClean="0"/>
+                        <a:t> la</a:t>
+                      </a:r>
+                      <a:r>
+                        <a:rPr lang="en-US" baseline="0" dirty="0" smtClean="0"/>
+                        <a:t> </a:t>
+                      </a:r>
+                      <a:r>
+                        <a:rPr lang="en-US" baseline="0" dirty="0" err="1" smtClean="0"/>
+                        <a:t>productividad</a:t>
+                      </a:r>
+                      <a:r>
+                        <a:rPr lang="en-US" baseline="0" dirty="0" smtClean="0"/>
+                        <a:t> </a:t>
+                      </a:r>
+                      <a:r>
+                        <a:rPr lang="en-US" baseline="0" dirty="0" err="1" smtClean="0"/>
+                        <a:t>pesquera</a:t>
+                      </a:r>
+                      <a:r>
+                        <a:rPr lang="en-US" baseline="0" dirty="0" smtClean="0"/>
+                        <a:t> </a:t>
+                      </a:r>
+                      <a:r>
+                        <a:rPr lang="en-US" baseline="0" dirty="0" err="1" smtClean="0"/>
+                        <a:t>en</a:t>
+                      </a:r>
+                      <a:r>
+                        <a:rPr lang="en-US" baseline="0" dirty="0" smtClean="0"/>
+                        <a:t> </a:t>
+                      </a:r>
+                      <a:r>
+                        <a:rPr lang="en-US" baseline="0" dirty="0" err="1" smtClean="0"/>
+                        <a:t>aguas</a:t>
+                      </a:r>
+                      <a:r>
+                        <a:rPr lang="en-US" baseline="0" dirty="0" smtClean="0"/>
+                        <a:t> </a:t>
+                      </a:r>
+                      <a:r>
+                        <a:rPr lang="en-US" baseline="0" dirty="0" err="1" smtClean="0"/>
+                        <a:t>adjacentes</a:t>
+                      </a:r>
+                      <a:endParaRPr lang="en-US" dirty="0"/>
+                    </a:p>
+                  </a:txBody>
+                  <a:tcPr/>
+                </a:tc>
+                <a:tc>
+                  <a:txBody>
+                    <a:bodyPr/>
+                    <a:lstStyle/>
+                    <a:p>
+                      <a:pPr algn="ctr"/>
+                      <a:endParaRPr lang="en-US" b="1" dirty="0"/>
+                    </a:p>
+                  </a:txBody>
+                  <a:tcPr anchor="ctr"/>
+                </a:tc>
+                <a:tc>
+                  <a:txBody>
+                    <a:bodyPr/>
+                    <a:lstStyle/>
+                    <a:p>
+                      <a:pPr algn="ctr"/>
+                      <a:endParaRPr lang="en-US" b="1" dirty="0"/>
+                    </a:p>
+                  </a:txBody>
+                  <a:tcPr anchor="ctr"/>
+                </a:tc>
+                <a:tc>
+                  <a:txBody>
+                    <a:bodyPr/>
+                    <a:lstStyle/>
+                    <a:p>
+                      <a:pPr algn="ctr"/>
+                      <a:r>
+                        <a:rPr lang="en-US" b="1" dirty="0" smtClean="0"/>
+                        <a:t>*</a:t>
+                      </a:r>
+                      <a:endParaRPr lang="en-US" b="1" dirty="0"/>
+                    </a:p>
+                  </a:txBody>
+                  <a:tcPr anchor="ctr"/>
+                </a:tc>
+                <a:tc>
+                  <a:txBody>
+                    <a:bodyPr/>
+                    <a:lstStyle/>
+                    <a:p>
+                      <a:pPr algn="ctr"/>
+                      <a:r>
+                        <a:rPr lang="en-US" b="1" dirty="0" smtClean="0"/>
+                        <a:t>*</a:t>
+                      </a:r>
+                      <a:endParaRPr lang="en-US" b="1" dirty="0"/>
+                    </a:p>
+                  </a:txBody>
+                  <a:tcPr anchor="ctr"/>
+                </a:tc>
+                <a:tc>
+                  <a:txBody>
+                    <a:bodyPr/>
+                    <a:lstStyle/>
+                    <a:p>
+                      <a:pPr algn="ctr"/>
+                      <a:endParaRPr lang="en-US" b="1" dirty="0"/>
+                    </a:p>
+                  </a:txBody>
+                  <a:tcPr anchor="ctr"/>
+                </a:tc>
+                <a:tc>
+                  <a:txBody>
+                    <a:bodyPr/>
+                    <a:lstStyle/>
+                    <a:p>
+                      <a:pPr algn="ctr"/>
+                      <a:r>
+                        <a:rPr lang="en-US" b="1" dirty="0" smtClean="0"/>
+                        <a:t>*</a:t>
+                      </a:r>
+                      <a:endParaRPr lang="en-US" b="1" dirty="0"/>
+                    </a:p>
+                  </a:txBody>
+                  <a:tcPr anchor="ctr"/>
+                </a:tc>
+                <a:tc>
+                  <a:txBody>
+                    <a:bodyPr/>
+                    <a:lstStyle/>
+                    <a:p>
+                      <a:pPr algn="ctr"/>
+                      <a:r>
+                        <a:rPr lang="en-US" b="1" dirty="0" smtClean="0"/>
+                        <a:t>*</a:t>
+                      </a:r>
+                      <a:endParaRPr lang="en-US" b="1" dirty="0"/>
+                    </a:p>
+                  </a:txBody>
+                  <a:tcPr anchor="ctr"/>
+                </a:tc>
+                <a:tc>
+                  <a:txBody>
+                    <a:bodyPr/>
+                    <a:lstStyle/>
+                    <a:p>
+                      <a:pPr algn="ctr"/>
+                      <a:endParaRPr lang="en-US" b="1" dirty="0"/>
+                    </a:p>
+                  </a:txBody>
+                  <a:tcPr anchor="ctr"/>
+                </a:tc>
+                <a:tc>
+                  <a:txBody>
+                    <a:bodyPr/>
+                    <a:lstStyle/>
+                    <a:p>
+                      <a:pPr algn="ctr"/>
+                      <a:endParaRPr lang="en-US" b="1" dirty="0"/>
+                    </a:p>
+                  </a:txBody>
+                  <a:tcPr anchor="ctr"/>
+                </a:tc>
+              </a:tr>
+              <a:tr h="397904">
+                <a:tc>
+                  <a:txBody>
+                    <a:bodyPr/>
+                    <a:lstStyle/>
+                    <a:p>
+                      <a:r>
+                        <a:rPr lang="en-US" dirty="0" err="1" smtClean="0"/>
+                        <a:t>Evitar</a:t>
+                      </a:r>
+                      <a:r>
+                        <a:rPr lang="en-US" dirty="0" smtClean="0"/>
+                        <a:t> que</a:t>
+                      </a:r>
+                      <a:r>
+                        <a:rPr lang="en-US" baseline="0" dirty="0" smtClean="0"/>
+                        <a:t> se </a:t>
+                      </a:r>
+                      <a:r>
+                        <a:rPr lang="en-US" baseline="0" dirty="0" err="1" smtClean="0"/>
+                        <a:t>llegue</a:t>
+                      </a:r>
+                      <a:r>
+                        <a:rPr lang="en-US" baseline="0" dirty="0" smtClean="0"/>
+                        <a:t> a la </a:t>
+                      </a:r>
+                      <a:r>
+                        <a:rPr lang="en-US" baseline="0" dirty="0" err="1" smtClean="0"/>
+                        <a:t>sobreexplotación</a:t>
+                      </a:r>
+                      <a:endParaRPr lang="en-US" dirty="0"/>
+                    </a:p>
+                  </a:txBody>
+                  <a:tcPr/>
+                </a:tc>
+                <a:tc>
+                  <a:txBody>
+                    <a:bodyPr/>
+                    <a:lstStyle/>
+                    <a:p>
+                      <a:pPr algn="ctr"/>
+                      <a:endParaRPr lang="en-US" b="1" dirty="0"/>
+                    </a:p>
+                  </a:txBody>
+                  <a:tcPr anchor="ctr"/>
+                </a:tc>
+                <a:tc>
+                  <a:txBody>
+                    <a:bodyPr/>
+                    <a:lstStyle/>
+                    <a:p>
+                      <a:pPr algn="ctr"/>
+                      <a:r>
+                        <a:rPr lang="en-US" b="1" dirty="0" smtClean="0"/>
+                        <a:t>*</a:t>
+                      </a:r>
+                      <a:endParaRPr lang="en-US" b="1" dirty="0"/>
+                    </a:p>
+                  </a:txBody>
+                  <a:tcPr anchor="ctr"/>
+                </a:tc>
+                <a:tc>
+                  <a:txBody>
+                    <a:bodyPr/>
+                    <a:lstStyle/>
+                    <a:p>
+                      <a:pPr algn="ctr"/>
+                      <a:r>
+                        <a:rPr lang="en-US" b="1" dirty="0" smtClean="0"/>
+                        <a:t>*</a:t>
+                      </a:r>
+                      <a:endParaRPr lang="en-US" b="1" dirty="0"/>
+                    </a:p>
+                  </a:txBody>
+                  <a:tcPr anchor="ctr"/>
+                </a:tc>
+                <a:tc>
+                  <a:txBody>
+                    <a:bodyPr/>
+                    <a:lstStyle/>
+                    <a:p>
+                      <a:pPr algn="ctr"/>
+                      <a:r>
+                        <a:rPr lang="en-US" b="1" dirty="0" smtClean="0"/>
+                        <a:t>*</a:t>
+                      </a:r>
+                      <a:endParaRPr lang="en-US" b="1" dirty="0"/>
+                    </a:p>
+                  </a:txBody>
+                  <a:tcPr anchor="ctr"/>
+                </a:tc>
+                <a:tc>
+                  <a:txBody>
+                    <a:bodyPr/>
+                    <a:lstStyle/>
+                    <a:p>
+                      <a:pPr algn="ctr"/>
+                      <a:endParaRPr lang="en-US" b="1" dirty="0"/>
+                    </a:p>
+                  </a:txBody>
+                  <a:tcPr anchor="ctr"/>
+                </a:tc>
+                <a:tc>
+                  <a:txBody>
+                    <a:bodyPr/>
+                    <a:lstStyle/>
+                    <a:p>
+                      <a:pPr algn="ctr"/>
+                      <a:endParaRPr lang="en-US" b="1" dirty="0"/>
+                    </a:p>
+                  </a:txBody>
+                  <a:tcPr anchor="ctr"/>
+                </a:tc>
+                <a:tc>
+                  <a:txBody>
+                    <a:bodyPr/>
+                    <a:lstStyle/>
+                    <a:p>
+                      <a:pPr algn="ctr"/>
+                      <a:endParaRPr lang="en-US" b="1" dirty="0"/>
+                    </a:p>
+                  </a:txBody>
+                  <a:tcPr anchor="ctr"/>
+                </a:tc>
+                <a:tc>
+                  <a:txBody>
+                    <a:bodyPr/>
+                    <a:lstStyle/>
+                    <a:p>
+                      <a:pPr algn="ctr"/>
+                      <a:endParaRPr lang="en-US" b="1" dirty="0"/>
+                    </a:p>
+                  </a:txBody>
+                  <a:tcPr anchor="ctr"/>
+                </a:tc>
+                <a:tc>
+                  <a:txBody>
+                    <a:bodyPr/>
+                    <a:lstStyle/>
+                    <a:p>
+                      <a:pPr algn="ctr"/>
+                      <a:endParaRPr lang="en-US" b="1" dirty="0"/>
+                    </a:p>
+                  </a:txBody>
+                  <a:tcPr anchor="ctr"/>
+                </a:tc>
+              </a:tr>
+              <a:tr h="397904">
+                <a:tc>
+                  <a:txBody>
+                    <a:bodyPr/>
+                    <a:lstStyle/>
+                    <a:p>
+                      <a:r>
+                        <a:rPr lang="en-US" dirty="0" err="1" smtClean="0"/>
+                        <a:t>Recuperar</a:t>
+                      </a:r>
+                      <a:r>
+                        <a:rPr lang="en-US" dirty="0" smtClean="0"/>
+                        <a:t> </a:t>
+                      </a:r>
+                      <a:r>
+                        <a:rPr lang="en-US" dirty="0" err="1" smtClean="0"/>
+                        <a:t>espécies</a:t>
+                      </a:r>
+                      <a:r>
+                        <a:rPr lang="en-US" dirty="0" smtClean="0"/>
+                        <a:t> </a:t>
+                      </a:r>
+                      <a:r>
+                        <a:rPr lang="en-US" dirty="0" err="1" smtClean="0"/>
+                        <a:t>sobreexplotadas</a:t>
+                      </a:r>
+                      <a:endParaRPr lang="en-US" dirty="0"/>
+                    </a:p>
+                  </a:txBody>
+                  <a:tcPr/>
+                </a:tc>
+                <a:tc>
+                  <a:txBody>
+                    <a:bodyPr/>
+                    <a:lstStyle/>
+                    <a:p>
+                      <a:pPr algn="ctr"/>
+                      <a:r>
+                        <a:rPr lang="en-US" b="1" dirty="0" smtClean="0"/>
+                        <a:t>*</a:t>
+                      </a:r>
+                      <a:endParaRPr lang="en-US" b="1" dirty="0"/>
+                    </a:p>
+                  </a:txBody>
+                  <a:tcPr anchor="ctr"/>
+                </a:tc>
+                <a:tc>
+                  <a:txBody>
+                    <a:bodyPr/>
+                    <a:lstStyle/>
+                    <a:p>
+                      <a:pPr algn="ctr"/>
+                      <a:r>
+                        <a:rPr lang="en-US" b="1" dirty="0" smtClean="0"/>
+                        <a:t>*</a:t>
+                      </a:r>
+                      <a:endParaRPr lang="en-US" b="1" dirty="0"/>
+                    </a:p>
+                  </a:txBody>
+                  <a:tcPr anchor="ctr"/>
+                </a:tc>
+                <a:tc>
+                  <a:txBody>
+                    <a:bodyPr/>
+                    <a:lstStyle/>
+                    <a:p>
+                      <a:pPr algn="ctr"/>
+                      <a:r>
+                        <a:rPr lang="en-US" b="1" dirty="0" smtClean="0"/>
+                        <a:t>*</a:t>
+                      </a:r>
+                      <a:endParaRPr lang="en-US" b="1" dirty="0"/>
+                    </a:p>
+                  </a:txBody>
+                  <a:tcPr anchor="ctr"/>
+                </a:tc>
+                <a:tc>
+                  <a:txBody>
+                    <a:bodyPr/>
+                    <a:lstStyle/>
+                    <a:p>
+                      <a:pPr algn="ctr"/>
+                      <a:r>
+                        <a:rPr lang="en-US" b="1" dirty="0" smtClean="0"/>
+                        <a:t>*</a:t>
+                      </a:r>
+                      <a:endParaRPr lang="en-US" b="1" dirty="0"/>
+                    </a:p>
+                  </a:txBody>
+                  <a:tcPr anchor="ctr"/>
+                </a:tc>
+                <a:tc>
+                  <a:txBody>
+                    <a:bodyPr/>
+                    <a:lstStyle/>
+                    <a:p>
+                      <a:pPr algn="ctr"/>
+                      <a:endParaRPr lang="en-US" b="1" dirty="0"/>
+                    </a:p>
+                  </a:txBody>
+                  <a:tcPr anchor="ctr"/>
+                </a:tc>
+                <a:tc>
+                  <a:txBody>
+                    <a:bodyPr/>
+                    <a:lstStyle/>
+                    <a:p>
+                      <a:pPr algn="ctr"/>
+                      <a:endParaRPr lang="en-US" b="1" dirty="0"/>
+                    </a:p>
+                  </a:txBody>
+                  <a:tcPr anchor="ctr"/>
+                </a:tc>
+                <a:tc>
+                  <a:txBody>
+                    <a:bodyPr/>
+                    <a:lstStyle/>
+                    <a:p>
+                      <a:pPr algn="ctr"/>
+                      <a:endParaRPr lang="en-US" b="1"/>
+                    </a:p>
+                  </a:txBody>
+                  <a:tcPr anchor="ctr"/>
+                </a:tc>
+                <a:tc>
+                  <a:txBody>
+                    <a:bodyPr/>
+                    <a:lstStyle/>
+                    <a:p>
+                      <a:pPr algn="ctr"/>
+                      <a:endParaRPr lang="en-US" b="1" dirty="0"/>
+                    </a:p>
+                  </a:txBody>
+                  <a:tcPr anchor="ctr"/>
+                </a:tc>
+                <a:tc>
+                  <a:txBody>
+                    <a:bodyPr/>
+                    <a:lstStyle/>
+                    <a:p>
+                      <a:pPr algn="ctr"/>
+                      <a:endParaRPr lang="en-US" b="1" dirty="0"/>
+                    </a:p>
+                  </a:txBody>
+                  <a:tcPr anchor="ctr"/>
+                </a:tc>
+              </a:tr>
+              <a:tr h="397904">
+                <a:tc>
+                  <a:txBody>
+                    <a:bodyPr/>
+                    <a:lstStyle/>
+                    <a:p>
+                      <a:r>
+                        <a:rPr lang="en-US" dirty="0" err="1" smtClean="0"/>
+                        <a:t>Preservar</a:t>
+                      </a:r>
+                      <a:r>
+                        <a:rPr lang="en-US" dirty="0" smtClean="0"/>
+                        <a:t> el habitat de las </a:t>
+                      </a:r>
+                      <a:r>
+                        <a:rPr lang="en-US" dirty="0" err="1" smtClean="0"/>
+                        <a:t>especies</a:t>
+                      </a:r>
+                      <a:r>
+                        <a:rPr lang="en-US" baseline="0" dirty="0" smtClean="0"/>
+                        <a:t> </a:t>
+                      </a:r>
+                      <a:r>
+                        <a:rPr lang="en-US" baseline="0" dirty="0" err="1" smtClean="0"/>
+                        <a:t>pesqueras</a:t>
+                      </a:r>
+                      <a:endParaRPr lang="en-US" dirty="0"/>
+                    </a:p>
+                  </a:txBody>
+                  <a:tcPr/>
+                </a:tc>
+                <a:tc>
+                  <a:txBody>
+                    <a:bodyPr/>
+                    <a:lstStyle/>
+                    <a:p>
+                      <a:pPr algn="ctr"/>
+                      <a:endParaRPr lang="en-US" b="1" dirty="0"/>
+                    </a:p>
+                  </a:txBody>
+                  <a:tcPr anchor="ctr"/>
+                </a:tc>
+                <a:tc>
+                  <a:txBody>
+                    <a:bodyPr/>
+                    <a:lstStyle/>
+                    <a:p>
+                      <a:pPr algn="ctr"/>
+                      <a:endParaRPr lang="en-US" b="1" dirty="0"/>
+                    </a:p>
+                  </a:txBody>
+                  <a:tcPr anchor="ctr"/>
+                </a:tc>
+                <a:tc>
+                  <a:txBody>
+                    <a:bodyPr/>
+                    <a:lstStyle/>
+                    <a:p>
+                      <a:pPr algn="ctr"/>
+                      <a:endParaRPr lang="en-US" b="1" dirty="0"/>
+                    </a:p>
+                  </a:txBody>
+                  <a:tcPr anchor="ctr"/>
+                </a:tc>
+                <a:tc>
+                  <a:txBody>
+                    <a:bodyPr/>
+                    <a:lstStyle/>
+                    <a:p>
+                      <a:pPr algn="ctr"/>
+                      <a:endParaRPr lang="en-US" b="1" dirty="0"/>
+                    </a:p>
+                  </a:txBody>
+                  <a:tcPr anchor="ctr"/>
+                </a:tc>
+                <a:tc>
+                  <a:txBody>
+                    <a:bodyPr/>
+                    <a:lstStyle/>
+                    <a:p>
+                      <a:pPr algn="ctr"/>
+                      <a:endParaRPr lang="en-US" b="1" dirty="0"/>
+                    </a:p>
+                  </a:txBody>
+                  <a:tcPr anchor="ctr"/>
+                </a:tc>
+                <a:tc>
+                  <a:txBody>
+                    <a:bodyPr/>
+                    <a:lstStyle/>
+                    <a:p>
+                      <a:pPr algn="ctr"/>
+                      <a:endParaRPr lang="en-US" b="1" dirty="0"/>
+                    </a:p>
+                  </a:txBody>
+                  <a:tcPr anchor="ctr"/>
+                </a:tc>
+                <a:tc>
+                  <a:txBody>
+                    <a:bodyPr/>
+                    <a:lstStyle/>
+                    <a:p>
+                      <a:pPr algn="ctr"/>
+                      <a:endParaRPr lang="en-US" b="1" dirty="0"/>
+                    </a:p>
+                  </a:txBody>
+                  <a:tcPr anchor="ctr"/>
+                </a:tc>
+                <a:tc>
+                  <a:txBody>
+                    <a:bodyPr/>
+                    <a:lstStyle/>
+                    <a:p>
+                      <a:pPr algn="ctr"/>
+                      <a:endParaRPr lang="en-US" b="1" dirty="0"/>
+                    </a:p>
+                  </a:txBody>
+                  <a:tcPr anchor="ctr"/>
+                </a:tc>
+                <a:tc>
+                  <a:txBody>
+                    <a:bodyPr/>
+                    <a:lstStyle/>
+                    <a:p>
+                      <a:pPr marL="0" marR="0" lvl="0" indent="0" algn="ctr" defTabSz="914400" rtl="0" eaLnBrk="1" fontAlgn="auto" latinLnBrk="0" hangingPunct="1">
+                        <a:lnSpc>
+                          <a:spcPct val="100000"/>
+                        </a:lnSpc>
+                        <a:spcBef>
+                          <a:spcPts val="0"/>
+                        </a:spcBef>
+                        <a:spcAft>
+                          <a:spcPts val="0"/>
+                        </a:spcAft>
+                        <a:buClrTx/>
+                        <a:buSzTx/>
+                        <a:buFontTx/>
+                        <a:buNone/>
+                        <a:tabLst/>
+                        <a:defRPr/>
+                      </a:pPr>
+                      <a:r>
+                        <a:rPr lang="en-US" b="1" dirty="0" smtClean="0"/>
+                        <a:t>*</a:t>
+                      </a:r>
+                    </a:p>
+                  </a:txBody>
+                  <a:tcPr anchor="ctr"/>
+                </a:tc>
+              </a:tr>
+              <a:tr h="994760">
+                <a:tc>
+                  <a:txBody>
+                    <a:bodyPr/>
+                    <a:lstStyle/>
+                    <a:p>
+                      <a:r>
+                        <a:rPr lang="en-US" dirty="0" err="1" smtClean="0"/>
+                        <a:t>Contribuir</a:t>
+                      </a:r>
+                      <a:r>
+                        <a:rPr lang="en-US" dirty="0" smtClean="0"/>
+                        <a:t> al </a:t>
+                      </a:r>
+                      <a:r>
+                        <a:rPr lang="en-US" dirty="0" err="1" smtClean="0"/>
+                        <a:t>mantenimiento</a:t>
+                      </a:r>
+                      <a:r>
+                        <a:rPr lang="en-US" dirty="0" smtClean="0"/>
+                        <a:t> de </a:t>
+                      </a:r>
+                      <a:r>
+                        <a:rPr lang="en-US" dirty="0" err="1" smtClean="0"/>
+                        <a:t>los</a:t>
+                      </a:r>
+                      <a:r>
+                        <a:rPr lang="en-US" dirty="0" smtClean="0"/>
+                        <a:t> </a:t>
+                      </a:r>
+                      <a:r>
+                        <a:rPr lang="en-US" dirty="0" err="1" smtClean="0"/>
+                        <a:t>procesos</a:t>
+                      </a:r>
+                      <a:r>
+                        <a:rPr lang="en-US" baseline="0" dirty="0" smtClean="0"/>
+                        <a:t> </a:t>
+                      </a:r>
+                      <a:r>
+                        <a:rPr lang="en-US" baseline="0" dirty="0" err="1" smtClean="0"/>
+                        <a:t>biológicos</a:t>
+                      </a:r>
+                      <a:r>
+                        <a:rPr lang="en-US" baseline="0" dirty="0" smtClean="0"/>
+                        <a:t> (</a:t>
+                      </a:r>
+                      <a:r>
+                        <a:rPr lang="en-US" baseline="0" dirty="0" err="1" smtClean="0"/>
+                        <a:t>crianza</a:t>
+                      </a:r>
+                      <a:r>
+                        <a:rPr lang="en-US" baseline="0" dirty="0" smtClean="0"/>
+                        <a:t>, </a:t>
+                      </a:r>
+                      <a:r>
+                        <a:rPr lang="en-US" baseline="0" dirty="0" err="1" smtClean="0"/>
+                        <a:t>reclutamiento</a:t>
+                      </a:r>
+                      <a:r>
+                        <a:rPr lang="en-US" baseline="0" dirty="0" smtClean="0"/>
+                        <a:t>, </a:t>
+                      </a:r>
+                      <a:r>
+                        <a:rPr lang="en-US" baseline="0" dirty="0" err="1" smtClean="0"/>
+                        <a:t>crecimiento</a:t>
+                      </a:r>
+                      <a:r>
+                        <a:rPr lang="en-US" baseline="0" dirty="0" smtClean="0"/>
+                        <a:t>, </a:t>
+                      </a:r>
+                      <a:r>
+                        <a:rPr lang="en-US" baseline="0" dirty="0" err="1" smtClean="0"/>
+                        <a:t>reproducción</a:t>
+                      </a:r>
+                      <a:r>
+                        <a:rPr lang="en-US" baseline="0" dirty="0" smtClean="0"/>
+                        <a:t>, </a:t>
+                      </a:r>
+                      <a:r>
+                        <a:rPr lang="en-US" baseline="0" dirty="0" err="1" smtClean="0"/>
+                        <a:t>alimentación</a:t>
+                      </a:r>
+                      <a:r>
+                        <a:rPr lang="en-US" baseline="0" dirty="0" smtClean="0"/>
+                        <a:t>)</a:t>
+                      </a:r>
+                      <a:endParaRPr lang="en-US" dirty="0"/>
+                    </a:p>
+                  </a:txBody>
+                  <a:tcPr/>
+                </a:tc>
+                <a:tc>
+                  <a:txBody>
+                    <a:bodyPr/>
+                    <a:lstStyle/>
+                    <a:p>
+                      <a:pPr algn="ctr"/>
+                      <a:r>
+                        <a:rPr lang="en-US" b="1" dirty="0" smtClean="0"/>
+                        <a:t>*</a:t>
+                      </a:r>
+                      <a:endParaRPr lang="en-US" b="1" dirty="0"/>
+                    </a:p>
+                  </a:txBody>
+                  <a:tcPr anchor="ctr"/>
+                </a:tc>
+                <a:tc>
+                  <a:txBody>
+                    <a:bodyPr/>
+                    <a:lstStyle/>
+                    <a:p>
+                      <a:pPr algn="ctr"/>
+                      <a:r>
+                        <a:rPr lang="en-US" b="1" dirty="0" smtClean="0"/>
+                        <a:t>*</a:t>
+                      </a:r>
+                      <a:endParaRPr lang="en-US" b="1" dirty="0"/>
+                    </a:p>
+                  </a:txBody>
+                  <a:tcPr anchor="ctr"/>
+                </a:tc>
+                <a:tc>
+                  <a:txBody>
+                    <a:bodyPr/>
+                    <a:lstStyle/>
+                    <a:p>
+                      <a:pPr algn="ctr"/>
+                      <a:r>
+                        <a:rPr lang="en-US" b="1" dirty="0" smtClean="0"/>
+                        <a:t>*</a:t>
+                      </a:r>
+                      <a:endParaRPr lang="en-US" b="1" dirty="0"/>
+                    </a:p>
+                  </a:txBody>
+                  <a:tcPr anchor="ctr"/>
+                </a:tc>
+                <a:tc>
+                  <a:txBody>
+                    <a:bodyPr/>
+                    <a:lstStyle/>
+                    <a:p>
+                      <a:pPr algn="ctr"/>
+                      <a:r>
+                        <a:rPr lang="en-US" b="1" dirty="0" smtClean="0"/>
+                        <a:t>*</a:t>
+                      </a:r>
+                      <a:endParaRPr lang="en-US" b="1" dirty="0"/>
+                    </a:p>
+                  </a:txBody>
+                  <a:tcPr anchor="ctr"/>
+                </a:tc>
+                <a:tc>
+                  <a:txBody>
+                    <a:bodyPr/>
+                    <a:lstStyle/>
+                    <a:p>
+                      <a:pPr algn="ctr"/>
+                      <a:r>
+                        <a:rPr lang="en-US" b="1" dirty="0" smtClean="0"/>
+                        <a:t>*</a:t>
+                      </a:r>
+                      <a:endParaRPr lang="en-US" b="1" dirty="0"/>
+                    </a:p>
+                  </a:txBody>
+                  <a:tcPr anchor="ctr"/>
+                </a:tc>
+                <a:tc>
+                  <a:txBody>
+                    <a:bodyPr/>
+                    <a:lstStyle/>
+                    <a:p>
+                      <a:pPr algn="ctr"/>
+                      <a:endParaRPr lang="en-US" b="1" dirty="0"/>
+                    </a:p>
+                  </a:txBody>
+                  <a:tcPr anchor="ctr"/>
+                </a:tc>
+                <a:tc>
+                  <a:txBody>
+                    <a:bodyPr/>
+                    <a:lstStyle/>
+                    <a:p>
+                      <a:pPr algn="ctr"/>
+                      <a:endParaRPr lang="en-US" b="1" dirty="0"/>
+                    </a:p>
+                  </a:txBody>
+                  <a:tcPr anchor="ctr"/>
+                </a:tc>
+                <a:tc>
+                  <a:txBody>
+                    <a:bodyPr/>
+                    <a:lstStyle/>
+                    <a:p>
+                      <a:pPr algn="ctr"/>
+                      <a:endParaRPr lang="en-US" b="1" dirty="0" smtClean="0"/>
+                    </a:p>
+                  </a:txBody>
+                  <a:tcPr anchor="ctr"/>
+                </a:tc>
+                <a:tc>
+                  <a:txBody>
+                    <a:bodyPr/>
+                    <a:lstStyle/>
+                    <a:p>
+                      <a:pPr algn="ctr"/>
+                      <a:endParaRPr lang="en-US" b="1" dirty="0" smtClean="0"/>
+                    </a:p>
+                  </a:txBody>
+                  <a:tcPr anchor="ctr"/>
+                </a:tc>
+              </a:tr>
+            </a:tbl>
+          </a:graphicData>
+        </a:graphic>
+      </p:graphicFrame>
     </p:spTree>
+  </p:cSld>
+  <p:clrMapOvr>
+    <a:masterClrMapping/>
+  </p:clrMapOvr>
+  <p:timing>
+    <p:tnLst>
+      <p:par>
+        <p:cTn id="1" dur="indefinite" restart="never" nodeType="tmRoot"/>
+      </p:par>
+    </p:tnLst>
+  </p:timing>
+</p:sld>
+</file>
+
+<file path=ppt/slides/slide19.xml><?xml version="1.0" encoding="utf-8"?>
+<p:sld xmlns:a="http://schemas.openxmlformats.org/drawingml/2006/main" xmlns:r="http://schemas.openxmlformats.org/officeDocument/2006/relationships" xmlns:p="http://schemas.openxmlformats.org/presentationml/2006/main">
+  <p:cSld>
+    <p:spTree>
+      <p:nvGrpSpPr>
+        <p:cNvPr id="1" name=""/>
+        <p:cNvGrpSpPr/>
+        <p:nvPr/>
+      </p:nvGrpSpPr>
+      <p:grpSpPr>
+        <a:xfrm>
+          <a:off x="0" y="0"/>
+          <a:ext cx="0" cy="0"/>
+          <a:chOff x="0" y="0"/>
+          <a:chExt cx="0" cy="0"/>
+        </a:xfrm>
+      </p:grpSpPr>
+      <p:grpSp>
+        <p:nvGrpSpPr>
+          <p:cNvPr id="4" name="9 Grupo"/>
+          <p:cNvGrpSpPr/>
+          <p:nvPr/>
+        </p:nvGrpSpPr>
+        <p:grpSpPr>
+          <a:xfrm>
+            <a:off x="0" y="0"/>
+            <a:ext cx="12190413" cy="6885384"/>
+            <a:chOff x="0" y="0"/>
+            <a:chExt cx="12190413" cy="6885384"/>
+          </a:xfrm>
+        </p:grpSpPr>
+        <p:grpSp>
+          <p:nvGrpSpPr>
+            <p:cNvPr id="5" name="4 Grupo"/>
+            <p:cNvGrpSpPr/>
+            <p:nvPr/>
+          </p:nvGrpSpPr>
+          <p:grpSpPr>
+            <a:xfrm>
+              <a:off x="0" y="0"/>
+              <a:ext cx="12190413" cy="900000"/>
+              <a:chOff x="0" y="0"/>
+              <a:chExt cx="12190413" cy="900000"/>
+            </a:xfrm>
+          </p:grpSpPr>
+          <p:pic>
+            <p:nvPicPr>
+              <p:cNvPr id="6" name="Picture 2" descr="D:\Descargas\logo2.jpg"/>
+              <p:cNvPicPr>
+                <a:picLocks noChangeAspect="1" noChangeArrowheads="1"/>
+              </p:cNvPicPr>
+              <p:nvPr/>
+            </p:nvPicPr>
+            <p:blipFill>
+              <a:blip r:embed="rId2" cstate="print">
+                <a:extLst>
+                  <a:ext uri="{28A0092B-C50C-407E-A947-70E740481C1C}">
+                    <a14:useLocalDpi xmlns:a14="http://schemas.microsoft.com/office/drawing/2010/main" val="0"/>
+                  </a:ext>
+                </a:extLst>
+              </a:blip>
+              <a:srcRect/>
+              <a:stretch>
+                <a:fillRect/>
+              </a:stretch>
+            </p:blipFill>
+            <p:spPr bwMode="auto">
+              <a:xfrm>
+                <a:off x="5663158" y="0"/>
+                <a:ext cx="743840" cy="900000"/>
+              </a:xfrm>
+              <a:prstGeom prst="rect">
+                <a:avLst/>
+              </a:prstGeom>
+              <a:noFill/>
+              <a:extLst>
+                <a:ext uri="{909E8E84-426E-40DD-AFC4-6F175D3DCCD1}">
+                  <a14:hiddenFill xmlns:a14="http://schemas.microsoft.com/office/drawing/2010/main">
+                    <a:solidFill>
+                      <a:srgbClr val="FFFFFF"/>
+                    </a:solidFill>
+                  </a14:hiddenFill>
+                </a:ext>
+              </a:extLst>
+            </p:spPr>
+          </p:pic>
+          <p:pic>
+            <p:nvPicPr>
+              <p:cNvPr id="7" name="Picture 2" descr="Image result"/>
+              <p:cNvPicPr>
+                <a:picLocks noChangeAspect="1" noChangeArrowheads="1"/>
+              </p:cNvPicPr>
+              <p:nvPr/>
+            </p:nvPicPr>
+            <p:blipFill>
+              <a:blip r:embed="rId3" cstate="print">
+                <a:extLst>
+                  <a:ext uri="{28A0092B-C50C-407E-A947-70E740481C1C}">
+                    <a14:useLocalDpi xmlns:a14="http://schemas.microsoft.com/office/drawing/2010/main" val="0"/>
+                  </a:ext>
+                </a:extLst>
+              </a:blip>
+              <a:srcRect/>
+              <a:stretch>
+                <a:fillRect/>
+              </a:stretch>
+            </p:blipFill>
+            <p:spPr bwMode="auto">
+              <a:xfrm>
+                <a:off x="11528344" y="0"/>
+                <a:ext cx="662069" cy="900000"/>
+              </a:xfrm>
+              <a:prstGeom prst="rect">
+                <a:avLst/>
+              </a:prstGeom>
+              <a:noFill/>
+              <a:extLst>
+                <a:ext uri="{909E8E84-426E-40DD-AFC4-6F175D3DCCD1}">
+                  <a14:hiddenFill xmlns:a14="http://schemas.microsoft.com/office/drawing/2010/main">
+                    <a:solidFill>
+                      <a:srgbClr val="FFFFFF"/>
+                    </a:solidFill>
+                  </a14:hiddenFill>
+                </a:ext>
+              </a:extLst>
+            </p:spPr>
+          </p:pic>
+          <p:pic>
+            <p:nvPicPr>
+              <p:cNvPr id="8" name="Picture 6" descr="Image result for comunidad y biodiversidad logo"/>
+              <p:cNvPicPr>
+                <a:picLocks noChangeAspect="1" noChangeArrowheads="1"/>
+              </p:cNvPicPr>
+              <p:nvPr/>
+            </p:nvPicPr>
+            <p:blipFill>
+              <a:blip r:embed="rId4" cstate="print">
+                <a:extLst>
+                  <a:ext uri="{28A0092B-C50C-407E-A947-70E740481C1C}">
+                    <a14:useLocalDpi xmlns:a14="http://schemas.microsoft.com/office/drawing/2010/main" val="0"/>
+                  </a:ext>
+                </a:extLst>
+              </a:blip>
+              <a:srcRect/>
+              <a:stretch>
+                <a:fillRect/>
+              </a:stretch>
+            </p:blipFill>
+            <p:spPr bwMode="auto">
+              <a:xfrm>
+                <a:off x="0" y="0"/>
+                <a:ext cx="1066519" cy="900000"/>
+              </a:xfrm>
+              <a:prstGeom prst="rect">
+                <a:avLst/>
+              </a:prstGeom>
+              <a:noFill/>
+              <a:extLst>
+                <a:ext uri="{909E8E84-426E-40DD-AFC4-6F175D3DCCD1}">
+                  <a14:hiddenFill xmlns:a14="http://schemas.microsoft.com/office/drawing/2010/main">
+                    <a:solidFill>
+                      <a:srgbClr val="FFFFFF"/>
+                    </a:solidFill>
+                  </a14:hiddenFill>
+                </a:ext>
+              </a:extLst>
+            </p:spPr>
+          </p:pic>
+        </p:grpSp>
+        <p:sp>
+          <p:nvSpPr>
+            <p:cNvPr id="9" name="8 Rectángulo"/>
+            <p:cNvSpPr/>
+            <p:nvPr/>
+          </p:nvSpPr>
+          <p:spPr>
+            <a:xfrm>
+              <a:off x="0" y="6165384"/>
+              <a:ext cx="12190413" cy="720000"/>
+            </a:xfrm>
+            <a:prstGeom prst="rect">
+              <a:avLst/>
+            </a:prstGeom>
+          </p:spPr>
+          <p:style>
+            <a:lnRef idx="2">
+              <a:schemeClr val="accent1">
+                <a:shade val="50000"/>
+              </a:schemeClr>
+            </a:lnRef>
+            <a:fillRef idx="1">
+              <a:schemeClr val="accent1"/>
+            </a:fillRef>
+            <a:effectRef idx="0">
+              <a:schemeClr val="accent1"/>
+            </a:effectRef>
+            <a:fontRef idx="minor">
+              <a:schemeClr val="lt1"/>
+            </a:fontRef>
+          </p:style>
+          <p:txBody>
+            <a:bodyPr rtlCol="0" anchor="ctr"/>
+            <a:lstStyle/>
+            <a:p>
+              <a:pPr algn="ctr"/>
+              <a:endParaRPr lang="es-MX"/>
+            </a:p>
+          </p:txBody>
+        </p:sp>
+      </p:grpSp>
+      <p:graphicFrame>
+        <p:nvGraphicFramePr>
+          <p:cNvPr id="10" name="Espaço Reservado para Conteúdo 9"/>
+          <p:cNvGraphicFramePr>
+            <a:graphicFrameLocks noGrp="1"/>
+          </p:cNvGraphicFramePr>
+          <p:nvPr>
+            <p:ph idx="1"/>
+            <p:extLst>
+              <p:ext uri="{D42A27DB-BD31-4B8C-83A1-F6EECF244321}">
+                <p14:modId xmlns:p14="http://schemas.microsoft.com/office/powerpoint/2010/main" val="3126632509"/>
+              </p:ext>
+            </p:extLst>
+          </p:nvPr>
+        </p:nvGraphicFramePr>
+        <p:xfrm>
+          <a:off x="601137" y="1279659"/>
+          <a:ext cx="10867881" cy="3704539"/>
+        </p:xfrm>
+        <a:graphic>
+          <a:graphicData uri="http://schemas.openxmlformats.org/drawingml/2006/table">
+            <a:tbl>
+              <a:tblPr firstRow="1" bandRow="1">
+                <a:tableStyleId>{5C22544A-7EE6-4342-B048-85BDC9FD1C3A}</a:tableStyleId>
+              </a:tblPr>
+              <a:tblGrid>
+                <a:gridCol w="5415177"/>
+                <a:gridCol w="513172"/>
+                <a:gridCol w="821076"/>
+                <a:gridCol w="513172"/>
+                <a:gridCol w="513172"/>
+                <a:gridCol w="513172"/>
+                <a:gridCol w="513172"/>
+                <a:gridCol w="513172"/>
+                <a:gridCol w="821076"/>
+                <a:gridCol w="731520"/>
+              </a:tblGrid>
+              <a:tr h="1500342">
+                <a:tc>
+                  <a:txBody>
+                    <a:bodyPr/>
+                    <a:lstStyle/>
+                    <a:p>
+                      <a:pPr algn="l"/>
+                      <a:r>
+                        <a:rPr lang="en-US" dirty="0" err="1" smtClean="0"/>
+                        <a:t>Objetivos</a:t>
+                      </a:r>
+                      <a:endParaRPr lang="en-US" dirty="0"/>
+                    </a:p>
+                  </a:txBody>
+                  <a:tcPr anchor="ctr"/>
+                </a:tc>
+                <a:tc>
+                  <a:txBody>
+                    <a:bodyPr/>
+                    <a:lstStyle/>
+                    <a:p>
+                      <a:pPr algn="ctr"/>
+                      <a:r>
+                        <a:rPr lang="en-US" dirty="0" err="1" smtClean="0"/>
+                        <a:t>Diversidad</a:t>
+                      </a:r>
+                      <a:endParaRPr lang="en-US" dirty="0"/>
+                    </a:p>
+                  </a:txBody>
+                  <a:tcPr vert="vert270" anchor="ctr"/>
+                </a:tc>
+                <a:tc>
+                  <a:txBody>
+                    <a:bodyPr/>
+                    <a:lstStyle/>
+                    <a:p>
+                      <a:pPr algn="ctr"/>
+                      <a:r>
+                        <a:rPr lang="en-US" dirty="0" err="1" smtClean="0"/>
+                        <a:t>Densidad</a:t>
+                      </a:r>
+                      <a:r>
+                        <a:rPr lang="en-US" dirty="0" smtClean="0"/>
+                        <a:t> de </a:t>
+                      </a:r>
+                      <a:r>
+                        <a:rPr lang="en-US" dirty="0" err="1" smtClean="0"/>
+                        <a:t>maduros</a:t>
+                      </a:r>
+                      <a:endParaRPr lang="en-US" dirty="0"/>
+                    </a:p>
+                  </a:txBody>
+                  <a:tcPr vert="vert270" anchor="ctr"/>
+                </a:tc>
+                <a:tc>
+                  <a:txBody>
+                    <a:bodyPr/>
+                    <a:lstStyle/>
+                    <a:p>
+                      <a:pPr algn="ctr"/>
+                      <a:r>
+                        <a:rPr lang="en-US" dirty="0" err="1" smtClean="0"/>
+                        <a:t>Densidad</a:t>
+                      </a:r>
+                      <a:endParaRPr lang="en-US" dirty="0"/>
+                    </a:p>
+                  </a:txBody>
+                  <a:tcPr vert="vert270" anchor="ctr"/>
+                </a:tc>
+                <a:tc>
+                  <a:txBody>
+                    <a:bodyPr/>
+                    <a:lstStyle/>
+                    <a:p>
+                      <a:pPr algn="ctr"/>
+                      <a:r>
+                        <a:rPr lang="en-US" dirty="0" err="1" smtClean="0"/>
+                        <a:t>Biomasa</a:t>
+                      </a:r>
+                      <a:endParaRPr lang="en-US" dirty="0"/>
+                    </a:p>
+                  </a:txBody>
+                  <a:tcPr vert="vert270" anchor="ctr"/>
+                </a:tc>
+                <a:tc>
+                  <a:txBody>
+                    <a:bodyPr/>
+                    <a:lstStyle/>
+                    <a:p>
+                      <a:pPr algn="ctr"/>
+                      <a:r>
+                        <a:rPr lang="en-US" dirty="0" err="1" smtClean="0"/>
+                        <a:t>Nivel</a:t>
+                      </a:r>
+                      <a:r>
+                        <a:rPr lang="en-US" dirty="0" smtClean="0"/>
+                        <a:t> </a:t>
+                      </a:r>
+                      <a:r>
+                        <a:rPr lang="en-US" dirty="0" err="1" smtClean="0"/>
+                        <a:t>trófico</a:t>
+                      </a:r>
+                      <a:endParaRPr lang="en-US" dirty="0"/>
+                    </a:p>
+                  </a:txBody>
+                  <a:tcPr vert="vert270" anchor="ctr"/>
+                </a:tc>
+                <a:tc>
+                  <a:txBody>
+                    <a:bodyPr/>
+                    <a:lstStyle/>
+                    <a:p>
+                      <a:pPr algn="ctr"/>
+                      <a:r>
+                        <a:rPr lang="en-US" dirty="0" err="1" smtClean="0"/>
+                        <a:t>Capturas</a:t>
+                      </a:r>
+                      <a:endParaRPr lang="en-US" dirty="0"/>
+                    </a:p>
+                  </a:txBody>
+                  <a:tcPr vert="vert270" anchor="ctr"/>
+                </a:tc>
+                <a:tc>
+                  <a:txBody>
+                    <a:bodyPr/>
+                    <a:lstStyle/>
+                    <a:p>
+                      <a:pPr algn="ctr"/>
+                      <a:r>
+                        <a:rPr lang="en-US" dirty="0" err="1" smtClean="0"/>
+                        <a:t>Ingressos</a:t>
+                      </a:r>
+                      <a:endParaRPr lang="en-US" dirty="0"/>
+                    </a:p>
+                  </a:txBody>
+                  <a:tcPr vert="vert270" anchor="ctr"/>
+                </a:tc>
+                <a:tc>
+                  <a:txBody>
+                    <a:bodyPr/>
+                    <a:lstStyle/>
+                    <a:p>
+                      <a:pPr algn="ctr"/>
+                      <a:r>
+                        <a:rPr lang="en-US" dirty="0" err="1" smtClean="0"/>
+                        <a:t>Conocimiento</a:t>
+                      </a:r>
+                      <a:endParaRPr lang="en-US" dirty="0"/>
+                    </a:p>
+                  </a:txBody>
+                  <a:tcPr vert="vert270" anchor="ctr"/>
+                </a:tc>
+                <a:tc>
+                  <a:txBody>
+                    <a:bodyPr/>
+                    <a:lstStyle/>
+                    <a:p>
+                      <a:pPr algn="ctr"/>
+                      <a:r>
+                        <a:rPr lang="en-US" dirty="0" err="1" smtClean="0"/>
+                        <a:t>Medios</a:t>
+                      </a:r>
+                      <a:r>
+                        <a:rPr lang="en-US" dirty="0" smtClean="0"/>
+                        <a:t> de subsistencia</a:t>
+                      </a:r>
+                      <a:endParaRPr lang="en-US" dirty="0"/>
+                    </a:p>
+                  </a:txBody>
+                  <a:tcPr vert="vert270" anchor="ctr"/>
+                </a:tc>
+              </a:tr>
+              <a:tr h="400763">
+                <a:tc>
+                  <a:txBody>
+                    <a:bodyPr/>
+                    <a:lstStyle/>
+                    <a:p>
+                      <a:r>
+                        <a:rPr lang="en-US" dirty="0" err="1" smtClean="0"/>
+                        <a:t>Recuperar</a:t>
+                      </a:r>
+                      <a:r>
+                        <a:rPr lang="en-US" dirty="0" smtClean="0"/>
+                        <a:t> </a:t>
+                      </a:r>
+                      <a:r>
+                        <a:rPr lang="en-US" dirty="0" err="1" smtClean="0"/>
+                        <a:t>especies</a:t>
+                      </a:r>
+                      <a:r>
+                        <a:rPr lang="en-US" dirty="0" smtClean="0"/>
+                        <a:t> de </a:t>
+                      </a:r>
+                      <a:r>
+                        <a:rPr lang="en-US" dirty="0" err="1" smtClean="0"/>
+                        <a:t>interés</a:t>
+                      </a:r>
+                      <a:r>
+                        <a:rPr lang="en-US" dirty="0" smtClean="0"/>
+                        <a:t> </a:t>
+                      </a:r>
+                      <a:r>
+                        <a:rPr lang="en-US" dirty="0" err="1" smtClean="0"/>
+                        <a:t>comercial</a:t>
+                      </a:r>
+                      <a:endParaRPr lang="en-US" dirty="0"/>
+                    </a:p>
+                  </a:txBody>
+                  <a:tcPr/>
+                </a:tc>
+                <a:tc>
+                  <a:txBody>
+                    <a:bodyPr/>
+                    <a:lstStyle/>
+                    <a:p>
+                      <a:pPr algn="ctr"/>
+                      <a:endParaRPr lang="en-US" b="1" dirty="0"/>
+                    </a:p>
+                  </a:txBody>
+                  <a:tcPr anchor="ctr"/>
+                </a:tc>
+                <a:tc>
+                  <a:txBody>
+                    <a:bodyPr/>
+                    <a:lstStyle/>
+                    <a:p>
+                      <a:pPr algn="ctr"/>
+                      <a:r>
+                        <a:rPr lang="en-US" b="1" dirty="0" smtClean="0"/>
+                        <a:t>*</a:t>
+                      </a:r>
+                      <a:endParaRPr lang="en-US" b="1" dirty="0"/>
+                    </a:p>
+                  </a:txBody>
+                  <a:tcPr anchor="ctr"/>
+                </a:tc>
+                <a:tc>
+                  <a:txBody>
+                    <a:bodyPr/>
+                    <a:lstStyle/>
+                    <a:p>
+                      <a:pPr algn="ctr"/>
+                      <a:r>
+                        <a:rPr lang="en-US" b="1" dirty="0" smtClean="0"/>
+                        <a:t>*</a:t>
+                      </a:r>
+                      <a:endParaRPr lang="en-US" b="1" dirty="0"/>
+                    </a:p>
+                  </a:txBody>
+                  <a:tcPr anchor="ctr"/>
+                </a:tc>
+                <a:tc>
+                  <a:txBody>
+                    <a:bodyPr/>
+                    <a:lstStyle/>
+                    <a:p>
+                      <a:pPr algn="ctr"/>
+                      <a:r>
+                        <a:rPr lang="en-US" b="1" dirty="0" smtClean="0"/>
+                        <a:t>*</a:t>
+                      </a:r>
+                      <a:endParaRPr lang="en-US" b="1" dirty="0"/>
+                    </a:p>
+                  </a:txBody>
+                  <a:tcPr anchor="ctr"/>
+                </a:tc>
+                <a:tc>
+                  <a:txBody>
+                    <a:bodyPr/>
+                    <a:lstStyle/>
+                    <a:p>
+                      <a:pPr algn="ctr"/>
+                      <a:endParaRPr lang="en-US" b="1" dirty="0"/>
+                    </a:p>
+                  </a:txBody>
+                  <a:tcPr anchor="ctr"/>
+                </a:tc>
+                <a:tc>
+                  <a:txBody>
+                    <a:bodyPr/>
+                    <a:lstStyle/>
+                    <a:p>
+                      <a:pPr algn="ctr"/>
+                      <a:endParaRPr lang="en-US" b="1" dirty="0"/>
+                    </a:p>
+                  </a:txBody>
+                  <a:tcPr anchor="ctr"/>
+                </a:tc>
+                <a:tc>
+                  <a:txBody>
+                    <a:bodyPr/>
+                    <a:lstStyle/>
+                    <a:p>
+                      <a:pPr algn="ctr"/>
+                      <a:endParaRPr lang="en-US" b="1" dirty="0"/>
+                    </a:p>
+                  </a:txBody>
+                  <a:tcPr anchor="ctr"/>
+                </a:tc>
+                <a:tc>
+                  <a:txBody>
+                    <a:bodyPr/>
+                    <a:lstStyle/>
+                    <a:p>
+                      <a:pPr algn="ctr"/>
+                      <a:r>
+                        <a:rPr lang="en-US" b="1" dirty="0" smtClean="0"/>
+                        <a:t>*</a:t>
+                      </a:r>
+                      <a:endParaRPr lang="en-US" b="1" dirty="0"/>
+                    </a:p>
+                  </a:txBody>
+                  <a:tcPr anchor="ctr"/>
+                </a:tc>
+                <a:tc>
+                  <a:txBody>
+                    <a:bodyPr/>
+                    <a:lstStyle/>
+                    <a:p>
+                      <a:pPr algn="ctr"/>
+                      <a:endParaRPr lang="en-US" b="1" dirty="0"/>
+                    </a:p>
+                  </a:txBody>
+                  <a:tcPr anchor="ctr"/>
+                </a:tc>
+              </a:tr>
+              <a:tr h="400763">
+                <a:tc>
+                  <a:txBody>
+                    <a:bodyPr/>
+                    <a:lstStyle/>
+                    <a:p>
+                      <a:r>
+                        <a:rPr lang="en-US" dirty="0" err="1" smtClean="0"/>
+                        <a:t>Mejorar</a:t>
+                      </a:r>
+                      <a:r>
+                        <a:rPr lang="en-US" dirty="0" smtClean="0"/>
+                        <a:t> la</a:t>
+                      </a:r>
+                      <a:r>
+                        <a:rPr lang="en-US" baseline="0" dirty="0" smtClean="0"/>
+                        <a:t> </a:t>
+                      </a:r>
+                      <a:r>
+                        <a:rPr lang="en-US" baseline="0" dirty="0" err="1" smtClean="0"/>
+                        <a:t>productividad</a:t>
+                      </a:r>
+                      <a:r>
+                        <a:rPr lang="en-US" baseline="0" dirty="0" smtClean="0"/>
+                        <a:t> </a:t>
+                      </a:r>
+                      <a:r>
+                        <a:rPr lang="en-US" baseline="0" dirty="0" err="1" smtClean="0"/>
+                        <a:t>pesquera</a:t>
+                      </a:r>
+                      <a:r>
+                        <a:rPr lang="en-US" baseline="0" dirty="0" smtClean="0"/>
+                        <a:t> </a:t>
+                      </a:r>
+                      <a:r>
+                        <a:rPr lang="en-US" baseline="0" dirty="0" err="1" smtClean="0"/>
+                        <a:t>en</a:t>
+                      </a:r>
+                      <a:r>
+                        <a:rPr lang="en-US" baseline="0" dirty="0" smtClean="0"/>
+                        <a:t> </a:t>
+                      </a:r>
+                      <a:r>
+                        <a:rPr lang="en-US" baseline="0" dirty="0" err="1" smtClean="0"/>
+                        <a:t>aguas</a:t>
+                      </a:r>
+                      <a:r>
+                        <a:rPr lang="en-US" baseline="0" dirty="0" smtClean="0"/>
+                        <a:t> </a:t>
+                      </a:r>
+                      <a:r>
+                        <a:rPr lang="en-US" baseline="0" dirty="0" err="1" smtClean="0"/>
+                        <a:t>adjacentes</a:t>
+                      </a:r>
+                      <a:endParaRPr lang="en-US" dirty="0"/>
+                    </a:p>
+                  </a:txBody>
+                  <a:tcPr/>
+                </a:tc>
+                <a:tc>
+                  <a:txBody>
+                    <a:bodyPr/>
+                    <a:lstStyle/>
+                    <a:p>
+                      <a:pPr algn="ctr"/>
+                      <a:endParaRPr lang="en-US" b="1" dirty="0"/>
+                    </a:p>
+                  </a:txBody>
+                  <a:tcPr anchor="ctr"/>
+                </a:tc>
+                <a:tc>
+                  <a:txBody>
+                    <a:bodyPr/>
+                    <a:lstStyle/>
+                    <a:p>
+                      <a:pPr algn="ctr"/>
+                      <a:endParaRPr lang="en-US" b="1" dirty="0"/>
+                    </a:p>
+                  </a:txBody>
+                  <a:tcPr anchor="ctr"/>
+                </a:tc>
+                <a:tc>
+                  <a:txBody>
+                    <a:bodyPr/>
+                    <a:lstStyle/>
+                    <a:p>
+                      <a:pPr algn="ctr"/>
+                      <a:r>
+                        <a:rPr lang="en-US" b="1" dirty="0" smtClean="0"/>
+                        <a:t>*</a:t>
+                      </a:r>
+                      <a:endParaRPr lang="en-US" b="1" dirty="0"/>
+                    </a:p>
+                  </a:txBody>
+                  <a:tcPr anchor="ctr"/>
+                </a:tc>
+                <a:tc>
+                  <a:txBody>
+                    <a:bodyPr/>
+                    <a:lstStyle/>
+                    <a:p>
+                      <a:pPr algn="ctr"/>
+                      <a:r>
+                        <a:rPr lang="en-US" b="1" dirty="0" smtClean="0"/>
+                        <a:t>*</a:t>
+                      </a:r>
+                      <a:endParaRPr lang="en-US" b="1" dirty="0"/>
+                    </a:p>
+                  </a:txBody>
+                  <a:tcPr anchor="ctr"/>
+                </a:tc>
+                <a:tc>
+                  <a:txBody>
+                    <a:bodyPr/>
+                    <a:lstStyle/>
+                    <a:p>
+                      <a:pPr algn="ctr"/>
+                      <a:endParaRPr lang="en-US" b="1" dirty="0"/>
+                    </a:p>
+                  </a:txBody>
+                  <a:tcPr anchor="ctr"/>
+                </a:tc>
+                <a:tc>
+                  <a:txBody>
+                    <a:bodyPr/>
+                    <a:lstStyle/>
+                    <a:p>
+                      <a:pPr algn="ctr"/>
+                      <a:r>
+                        <a:rPr lang="en-US" b="1" dirty="0" smtClean="0"/>
+                        <a:t>*</a:t>
+                      </a:r>
+                      <a:endParaRPr lang="en-US" b="1" dirty="0"/>
+                    </a:p>
+                  </a:txBody>
+                  <a:tcPr anchor="ctr"/>
+                </a:tc>
+                <a:tc>
+                  <a:txBody>
+                    <a:bodyPr/>
+                    <a:lstStyle/>
+                    <a:p>
+                      <a:pPr algn="ctr"/>
+                      <a:r>
+                        <a:rPr lang="en-US" b="1" dirty="0" smtClean="0"/>
+                        <a:t>*</a:t>
+                      </a:r>
+                      <a:endParaRPr lang="en-US" b="1" dirty="0"/>
+                    </a:p>
+                  </a:txBody>
+                  <a:tcPr anchor="ctr"/>
+                </a:tc>
+                <a:tc>
+                  <a:txBody>
+                    <a:bodyPr/>
+                    <a:lstStyle/>
+                    <a:p>
+                      <a:pPr algn="ctr"/>
+                      <a:endParaRPr lang="en-US" b="1" dirty="0"/>
+                    </a:p>
+                  </a:txBody>
+                  <a:tcPr anchor="ctr"/>
+                </a:tc>
+                <a:tc>
+                  <a:txBody>
+                    <a:bodyPr/>
+                    <a:lstStyle/>
+                    <a:p>
+                      <a:pPr algn="ctr"/>
+                      <a:endParaRPr lang="en-US" b="1" dirty="0"/>
+                    </a:p>
+                  </a:txBody>
+                  <a:tcPr anchor="ctr"/>
+                </a:tc>
+              </a:tr>
+              <a:tr h="400763">
+                <a:tc>
+                  <a:txBody>
+                    <a:bodyPr/>
+                    <a:lstStyle/>
+                    <a:p>
+                      <a:r>
+                        <a:rPr lang="en-US" dirty="0" err="1" smtClean="0"/>
+                        <a:t>Preservar</a:t>
+                      </a:r>
+                      <a:r>
+                        <a:rPr lang="en-US" dirty="0" smtClean="0"/>
+                        <a:t> el habitat de las </a:t>
+                      </a:r>
+                      <a:r>
+                        <a:rPr lang="en-US" dirty="0" err="1" smtClean="0"/>
+                        <a:t>especies</a:t>
+                      </a:r>
+                      <a:r>
+                        <a:rPr lang="en-US" baseline="0" dirty="0" smtClean="0"/>
+                        <a:t> </a:t>
+                      </a:r>
+                      <a:r>
+                        <a:rPr lang="en-US" baseline="0" dirty="0" err="1" smtClean="0"/>
+                        <a:t>pesqueras</a:t>
+                      </a:r>
+                      <a:endParaRPr lang="en-US" dirty="0"/>
+                    </a:p>
+                  </a:txBody>
+                  <a:tcPr/>
+                </a:tc>
+                <a:tc>
+                  <a:txBody>
+                    <a:bodyPr/>
+                    <a:lstStyle/>
+                    <a:p>
+                      <a:pPr algn="ctr"/>
+                      <a:endParaRPr lang="en-US" b="1" dirty="0"/>
+                    </a:p>
+                  </a:txBody>
+                  <a:tcPr anchor="ctr"/>
+                </a:tc>
+                <a:tc>
+                  <a:txBody>
+                    <a:bodyPr/>
+                    <a:lstStyle/>
+                    <a:p>
+                      <a:pPr algn="ctr"/>
+                      <a:endParaRPr lang="en-US" b="1" dirty="0"/>
+                    </a:p>
+                  </a:txBody>
+                  <a:tcPr anchor="ctr"/>
+                </a:tc>
+                <a:tc>
+                  <a:txBody>
+                    <a:bodyPr/>
+                    <a:lstStyle/>
+                    <a:p>
+                      <a:pPr algn="ctr"/>
+                      <a:endParaRPr lang="en-US" b="1" dirty="0"/>
+                    </a:p>
+                  </a:txBody>
+                  <a:tcPr anchor="ctr"/>
+                </a:tc>
+                <a:tc>
+                  <a:txBody>
+                    <a:bodyPr/>
+                    <a:lstStyle/>
+                    <a:p>
+                      <a:pPr algn="ctr"/>
+                      <a:endParaRPr lang="en-US" b="1" dirty="0"/>
+                    </a:p>
+                  </a:txBody>
+                  <a:tcPr anchor="ctr"/>
+                </a:tc>
+                <a:tc>
+                  <a:txBody>
+                    <a:bodyPr/>
+                    <a:lstStyle/>
+                    <a:p>
+                      <a:pPr algn="ctr"/>
+                      <a:endParaRPr lang="en-US" b="1" dirty="0"/>
+                    </a:p>
+                  </a:txBody>
+                  <a:tcPr anchor="ctr"/>
+                </a:tc>
+                <a:tc>
+                  <a:txBody>
+                    <a:bodyPr/>
+                    <a:lstStyle/>
+                    <a:p>
+                      <a:pPr algn="ctr"/>
+                      <a:endParaRPr lang="en-US" b="1" dirty="0"/>
+                    </a:p>
+                  </a:txBody>
+                  <a:tcPr anchor="ctr"/>
+                </a:tc>
+                <a:tc>
+                  <a:txBody>
+                    <a:bodyPr/>
+                    <a:lstStyle/>
+                    <a:p>
+                      <a:pPr algn="ctr"/>
+                      <a:endParaRPr lang="en-US" b="1" dirty="0"/>
+                    </a:p>
+                  </a:txBody>
+                  <a:tcPr anchor="ctr"/>
+                </a:tc>
+                <a:tc>
+                  <a:txBody>
+                    <a:bodyPr/>
+                    <a:lstStyle/>
+                    <a:p>
+                      <a:pPr algn="ctr"/>
+                      <a:r>
+                        <a:rPr lang="en-US" b="1" dirty="0" smtClean="0"/>
+                        <a:t>*</a:t>
+                      </a:r>
+                      <a:endParaRPr lang="en-US" b="1" dirty="0"/>
+                    </a:p>
+                  </a:txBody>
+                  <a:tcPr anchor="ctr"/>
+                </a:tc>
+                <a:tc>
+                  <a:txBody>
+                    <a:bodyPr/>
+                    <a:lstStyle/>
+                    <a:p>
+                      <a:pPr algn="ctr"/>
+                      <a:r>
+                        <a:rPr lang="en-US" b="1" dirty="0" smtClean="0"/>
+                        <a:t>*</a:t>
+                      </a:r>
+                      <a:endParaRPr lang="en-US" b="1" dirty="0"/>
+                    </a:p>
+                  </a:txBody>
+                  <a:tcPr anchor="ctr"/>
+                </a:tc>
+              </a:tr>
+              <a:tr h="1001908">
+                <a:tc>
+                  <a:txBody>
+                    <a:bodyPr/>
+                    <a:lstStyle/>
+                    <a:p>
+                      <a:r>
+                        <a:rPr lang="en-US" dirty="0" err="1" smtClean="0"/>
+                        <a:t>Contribuir</a:t>
+                      </a:r>
+                      <a:r>
+                        <a:rPr lang="en-US" dirty="0" smtClean="0"/>
+                        <a:t> al </a:t>
+                      </a:r>
+                      <a:r>
+                        <a:rPr lang="en-US" dirty="0" err="1" smtClean="0"/>
+                        <a:t>mantenimiento</a:t>
+                      </a:r>
+                      <a:r>
+                        <a:rPr lang="en-US" dirty="0" smtClean="0"/>
+                        <a:t> de </a:t>
+                      </a:r>
+                      <a:r>
+                        <a:rPr lang="en-US" dirty="0" err="1" smtClean="0"/>
+                        <a:t>los</a:t>
+                      </a:r>
+                      <a:r>
+                        <a:rPr lang="en-US" dirty="0" smtClean="0"/>
+                        <a:t> </a:t>
+                      </a:r>
+                      <a:r>
+                        <a:rPr lang="en-US" dirty="0" err="1" smtClean="0"/>
+                        <a:t>procesos</a:t>
+                      </a:r>
+                      <a:r>
+                        <a:rPr lang="en-US" baseline="0" dirty="0" smtClean="0"/>
+                        <a:t> </a:t>
+                      </a:r>
+                      <a:r>
+                        <a:rPr lang="en-US" baseline="0" dirty="0" err="1" smtClean="0"/>
+                        <a:t>biológicos</a:t>
+                      </a:r>
+                      <a:r>
+                        <a:rPr lang="en-US" baseline="0" dirty="0" smtClean="0"/>
+                        <a:t> (</a:t>
+                      </a:r>
+                      <a:r>
+                        <a:rPr lang="en-US" baseline="0" dirty="0" err="1" smtClean="0"/>
+                        <a:t>crianza</a:t>
+                      </a:r>
+                      <a:r>
+                        <a:rPr lang="en-US" baseline="0" dirty="0" smtClean="0"/>
+                        <a:t>, </a:t>
+                      </a:r>
+                      <a:r>
+                        <a:rPr lang="en-US" baseline="0" dirty="0" err="1" smtClean="0"/>
+                        <a:t>reclutamiento</a:t>
+                      </a:r>
+                      <a:r>
+                        <a:rPr lang="en-US" baseline="0" dirty="0" smtClean="0"/>
+                        <a:t>, </a:t>
+                      </a:r>
+                      <a:r>
+                        <a:rPr lang="en-US" baseline="0" dirty="0" err="1" smtClean="0"/>
+                        <a:t>crecimiento</a:t>
+                      </a:r>
+                      <a:r>
+                        <a:rPr lang="en-US" baseline="0" dirty="0" smtClean="0"/>
+                        <a:t>, </a:t>
+                      </a:r>
+                      <a:r>
+                        <a:rPr lang="en-US" baseline="0" dirty="0" err="1" smtClean="0"/>
+                        <a:t>reproducción</a:t>
+                      </a:r>
+                      <a:r>
+                        <a:rPr lang="en-US" baseline="0" dirty="0" smtClean="0"/>
+                        <a:t>, </a:t>
+                      </a:r>
+                      <a:r>
+                        <a:rPr lang="en-US" baseline="0" dirty="0" err="1" smtClean="0"/>
+                        <a:t>alimentación</a:t>
+                      </a:r>
+                      <a:r>
+                        <a:rPr lang="en-US" baseline="0" dirty="0" smtClean="0"/>
+                        <a:t>)</a:t>
+                      </a:r>
+                      <a:endParaRPr lang="en-US" dirty="0"/>
+                    </a:p>
+                  </a:txBody>
+                  <a:tcPr/>
+                </a:tc>
+                <a:tc>
+                  <a:txBody>
+                    <a:bodyPr/>
+                    <a:lstStyle/>
+                    <a:p>
+                      <a:pPr algn="ctr"/>
+                      <a:r>
+                        <a:rPr lang="en-US" b="1" dirty="0" smtClean="0"/>
+                        <a:t>*</a:t>
+                      </a:r>
+                      <a:endParaRPr lang="en-US" b="1" dirty="0"/>
+                    </a:p>
+                  </a:txBody>
+                  <a:tcPr anchor="ctr"/>
+                </a:tc>
+                <a:tc>
+                  <a:txBody>
+                    <a:bodyPr/>
+                    <a:lstStyle/>
+                    <a:p>
+                      <a:pPr algn="ctr"/>
+                      <a:r>
+                        <a:rPr lang="en-US" b="1" dirty="0" smtClean="0"/>
+                        <a:t>*</a:t>
+                      </a:r>
+                      <a:endParaRPr lang="en-US" b="1" dirty="0"/>
+                    </a:p>
+                  </a:txBody>
+                  <a:tcPr anchor="ctr"/>
+                </a:tc>
+                <a:tc>
+                  <a:txBody>
+                    <a:bodyPr/>
+                    <a:lstStyle/>
+                    <a:p>
+                      <a:pPr algn="ctr"/>
+                      <a:r>
+                        <a:rPr lang="en-US" b="1" dirty="0" smtClean="0"/>
+                        <a:t>*</a:t>
+                      </a:r>
+                      <a:endParaRPr lang="en-US" b="1" dirty="0"/>
+                    </a:p>
+                  </a:txBody>
+                  <a:tcPr anchor="ctr"/>
+                </a:tc>
+                <a:tc>
+                  <a:txBody>
+                    <a:bodyPr/>
+                    <a:lstStyle/>
+                    <a:p>
+                      <a:pPr algn="ctr"/>
+                      <a:r>
+                        <a:rPr lang="en-US" b="1" dirty="0" smtClean="0"/>
+                        <a:t>*</a:t>
+                      </a:r>
+                      <a:endParaRPr lang="en-US" b="1" dirty="0"/>
+                    </a:p>
+                  </a:txBody>
+                  <a:tcPr anchor="ctr"/>
+                </a:tc>
+                <a:tc>
+                  <a:txBody>
+                    <a:bodyPr/>
+                    <a:lstStyle/>
+                    <a:p>
+                      <a:pPr algn="ctr"/>
+                      <a:r>
+                        <a:rPr lang="en-US" b="1" dirty="0" smtClean="0"/>
+                        <a:t>*</a:t>
+                      </a:r>
+                      <a:endParaRPr lang="en-US" b="1" dirty="0"/>
+                    </a:p>
+                  </a:txBody>
+                  <a:tcPr anchor="ctr"/>
+                </a:tc>
+                <a:tc>
+                  <a:txBody>
+                    <a:bodyPr/>
+                    <a:lstStyle/>
+                    <a:p>
+                      <a:pPr algn="ctr"/>
+                      <a:endParaRPr lang="en-US" b="1" dirty="0"/>
+                    </a:p>
+                  </a:txBody>
+                  <a:tcPr anchor="ctr"/>
+                </a:tc>
+                <a:tc>
+                  <a:txBody>
+                    <a:bodyPr/>
+                    <a:lstStyle/>
+                    <a:p>
+                      <a:pPr algn="ctr"/>
+                      <a:endParaRPr lang="en-US" b="1" dirty="0"/>
+                    </a:p>
+                  </a:txBody>
+                  <a:tcPr anchor="ctr"/>
+                </a:tc>
+                <a:tc>
+                  <a:txBody>
+                    <a:bodyPr/>
+                    <a:lstStyle/>
+                    <a:p>
+                      <a:pPr algn="ctr"/>
+                      <a:r>
+                        <a:rPr lang="en-US" b="1" dirty="0" smtClean="0"/>
+                        <a:t>*</a:t>
+                      </a:r>
+                    </a:p>
+                  </a:txBody>
+                  <a:tcPr anchor="ctr"/>
+                </a:tc>
+                <a:tc>
+                  <a:txBody>
+                    <a:bodyPr/>
+                    <a:lstStyle/>
+                    <a:p>
+                      <a:pPr algn="ctr"/>
+                      <a:r>
+                        <a:rPr lang="en-US" b="1" dirty="0" smtClean="0"/>
+                        <a:t>*</a:t>
+                      </a:r>
+                      <a:endParaRPr lang="en-US" b="1" dirty="0" smtClean="0"/>
+                    </a:p>
+                  </a:txBody>
+                  <a:tcPr anchor="ctr"/>
+                </a:tc>
+              </a:tr>
+            </a:tbl>
+          </a:graphicData>
+        </a:graphic>
+      </p:graphicFrame>
+    </p:spTree>
+    <p:extLst>
+      <p:ext uri="{BB962C8B-B14F-4D97-AF65-F5344CB8AC3E}">
+        <p14:creationId xmlns:p14="http://schemas.microsoft.com/office/powerpoint/2010/main" val="3918357120"/>
+      </p:ext>
+    </p:extLst>
   </p:cSld>
   <p:clrMapOvr>
     <a:masterClrMapping/>
@@ -11140,7 +13561,7 @@
             <a:blip r:embed="rId2" cstate="print">
               <a:extLst>
                 <a:ext uri="{28A0092B-C50C-407E-A947-70E740481C1C}">
-                  <a14:useLocalDpi xmlns="" xmlns:a14="http://schemas.microsoft.com/office/drawing/2010/main" val="0"/>
+                  <a14:useLocalDpi xmlns:a14="http://schemas.microsoft.com/office/drawing/2010/main" val="0"/>
                 </a:ext>
               </a:extLst>
             </a:blip>
@@ -11160,7 +13581,7 @@
             <a:noFill/>
             <a:extLst>
               <a:ext uri="{909E8E84-426E-40DD-AFC4-6F175D3DCCD1}">
-                <a14:hiddenFill xmlns="" xmlns:a14="http://schemas.microsoft.com/office/drawing/2010/main">
+                <a14:hiddenFill xmlns:a14="http://schemas.microsoft.com/office/drawing/2010/main">
                   <a:solidFill>
                     <a:srgbClr val="FFFFFF"/>
                   </a:solidFill>
@@ -11181,7 +13602,7 @@
             <a:blip r:embed="rId3" cstate="print">
               <a:extLst>
                 <a:ext uri="{28A0092B-C50C-407E-A947-70E740481C1C}">
-                  <a14:useLocalDpi xmlns="" xmlns:a14="http://schemas.microsoft.com/office/drawing/2010/main" val="0"/>
+                  <a14:useLocalDpi xmlns:a14="http://schemas.microsoft.com/office/drawing/2010/main" val="0"/>
                 </a:ext>
               </a:extLst>
             </a:blip>
@@ -11201,7 +13622,7 @@
             <a:noFill/>
             <a:extLst>
               <a:ext uri="{909E8E84-426E-40DD-AFC4-6F175D3DCCD1}">
-                <a14:hiddenFill xmlns="" xmlns:a14="http://schemas.microsoft.com/office/drawing/2010/main">
+                <a14:hiddenFill xmlns:a14="http://schemas.microsoft.com/office/drawing/2010/main">
                   <a:solidFill>
                     <a:srgbClr val="FFFFFF"/>
                   </a:solidFill>
@@ -11222,7 +13643,7 @@
             <a:blip r:embed="rId4" cstate="print">
               <a:extLst>
                 <a:ext uri="{28A0092B-C50C-407E-A947-70E740481C1C}">
-                  <a14:useLocalDpi xmlns="" xmlns:a14="http://schemas.microsoft.com/office/drawing/2010/main" val="0"/>
+                  <a14:useLocalDpi xmlns:a14="http://schemas.microsoft.com/office/drawing/2010/main" val="0"/>
                 </a:ext>
               </a:extLst>
             </a:blip>
@@ -11242,7 +13663,7 @@
             <a:noFill/>
             <a:extLst>
               <a:ext uri="{909E8E84-426E-40DD-AFC4-6F175D3DCCD1}">
-                <a14:hiddenFill xmlns="" xmlns:a14="http://schemas.microsoft.com/office/drawing/2010/main">
+                <a14:hiddenFill xmlns:a14="http://schemas.microsoft.com/office/drawing/2010/main">
                   <a:solidFill>
                     <a:srgbClr val="FFFFFF"/>
                   </a:solidFill>
@@ -11293,6 +13714,1037 @@
         </p:txBody>
       </p:sp>
     </p:spTree>
+  </p:cSld>
+  <p:clrMapOvr>
+    <a:masterClrMapping/>
+  </p:clrMapOvr>
+  <p:timing>
+    <p:tnLst>
+      <p:par>
+        <p:cTn id="1" dur="indefinite" restart="never" nodeType="tmRoot"/>
+      </p:par>
+    </p:tnLst>
+  </p:timing>
+</p:sld>
+</file>
+
+<file path=ppt/slides/slide20.xml><?xml version="1.0" encoding="utf-8"?>
+<p:sld xmlns:a="http://schemas.openxmlformats.org/drawingml/2006/main" xmlns:r="http://schemas.openxmlformats.org/officeDocument/2006/relationships" xmlns:p="http://schemas.openxmlformats.org/presentationml/2006/main">
+  <p:cSld>
+    <p:spTree>
+      <p:nvGrpSpPr>
+        <p:cNvPr id="1" name=""/>
+        <p:cNvGrpSpPr/>
+        <p:nvPr/>
+      </p:nvGrpSpPr>
+      <p:grpSpPr>
+        <a:xfrm>
+          <a:off x="0" y="0"/>
+          <a:ext cx="0" cy="0"/>
+          <a:chOff x="0" y="0"/>
+          <a:chExt cx="0" cy="0"/>
+        </a:xfrm>
+      </p:grpSpPr>
+      <p:grpSp>
+        <p:nvGrpSpPr>
+          <p:cNvPr id="4" name="9 Grupo"/>
+          <p:cNvGrpSpPr/>
+          <p:nvPr/>
+        </p:nvGrpSpPr>
+        <p:grpSpPr>
+          <a:xfrm>
+            <a:off x="0" y="0"/>
+            <a:ext cx="12190413" cy="6885384"/>
+            <a:chOff x="0" y="0"/>
+            <a:chExt cx="12190413" cy="6885384"/>
+          </a:xfrm>
+        </p:grpSpPr>
+        <p:grpSp>
+          <p:nvGrpSpPr>
+            <p:cNvPr id="5" name="4 Grupo"/>
+            <p:cNvGrpSpPr/>
+            <p:nvPr/>
+          </p:nvGrpSpPr>
+          <p:grpSpPr>
+            <a:xfrm>
+              <a:off x="0" y="0"/>
+              <a:ext cx="12190413" cy="900000"/>
+              <a:chOff x="0" y="0"/>
+              <a:chExt cx="12190413" cy="900000"/>
+            </a:xfrm>
+          </p:grpSpPr>
+          <p:pic>
+            <p:nvPicPr>
+              <p:cNvPr id="6" name="Picture 2" descr="D:\Descargas\logo2.jpg"/>
+              <p:cNvPicPr>
+                <a:picLocks noChangeAspect="1" noChangeArrowheads="1"/>
+              </p:cNvPicPr>
+              <p:nvPr/>
+            </p:nvPicPr>
+            <p:blipFill>
+              <a:blip r:embed="rId2" cstate="print">
+                <a:extLst>
+                  <a:ext uri="{28A0092B-C50C-407E-A947-70E740481C1C}">
+                    <a14:useLocalDpi xmlns:a14="http://schemas.microsoft.com/office/drawing/2010/main" val="0"/>
+                  </a:ext>
+                </a:extLst>
+              </a:blip>
+              <a:srcRect/>
+              <a:stretch>
+                <a:fillRect/>
+              </a:stretch>
+            </p:blipFill>
+            <p:spPr bwMode="auto">
+              <a:xfrm>
+                <a:off x="5663158" y="0"/>
+                <a:ext cx="743840" cy="900000"/>
+              </a:xfrm>
+              <a:prstGeom prst="rect">
+                <a:avLst/>
+              </a:prstGeom>
+              <a:noFill/>
+              <a:extLst>
+                <a:ext uri="{909E8E84-426E-40DD-AFC4-6F175D3DCCD1}">
+                  <a14:hiddenFill xmlns:a14="http://schemas.microsoft.com/office/drawing/2010/main">
+                    <a:solidFill>
+                      <a:srgbClr val="FFFFFF"/>
+                    </a:solidFill>
+                  </a14:hiddenFill>
+                </a:ext>
+              </a:extLst>
+            </p:spPr>
+          </p:pic>
+          <p:pic>
+            <p:nvPicPr>
+              <p:cNvPr id="7" name="Picture 2" descr="Image result"/>
+              <p:cNvPicPr>
+                <a:picLocks noChangeAspect="1" noChangeArrowheads="1"/>
+              </p:cNvPicPr>
+              <p:nvPr/>
+            </p:nvPicPr>
+            <p:blipFill>
+              <a:blip r:embed="rId3" cstate="print">
+                <a:extLst>
+                  <a:ext uri="{28A0092B-C50C-407E-A947-70E740481C1C}">
+                    <a14:useLocalDpi xmlns:a14="http://schemas.microsoft.com/office/drawing/2010/main" val="0"/>
+                  </a:ext>
+                </a:extLst>
+              </a:blip>
+              <a:srcRect/>
+              <a:stretch>
+                <a:fillRect/>
+              </a:stretch>
+            </p:blipFill>
+            <p:spPr bwMode="auto">
+              <a:xfrm>
+                <a:off x="11528344" y="0"/>
+                <a:ext cx="662069" cy="900000"/>
+              </a:xfrm>
+              <a:prstGeom prst="rect">
+                <a:avLst/>
+              </a:prstGeom>
+              <a:noFill/>
+              <a:extLst>
+                <a:ext uri="{909E8E84-426E-40DD-AFC4-6F175D3DCCD1}">
+                  <a14:hiddenFill xmlns:a14="http://schemas.microsoft.com/office/drawing/2010/main">
+                    <a:solidFill>
+                      <a:srgbClr val="FFFFFF"/>
+                    </a:solidFill>
+                  </a14:hiddenFill>
+                </a:ext>
+              </a:extLst>
+            </p:spPr>
+          </p:pic>
+          <p:pic>
+            <p:nvPicPr>
+              <p:cNvPr id="8" name="Picture 6" descr="Image result for comunidad y biodiversidad logo"/>
+              <p:cNvPicPr>
+                <a:picLocks noChangeAspect="1" noChangeArrowheads="1"/>
+              </p:cNvPicPr>
+              <p:nvPr/>
+            </p:nvPicPr>
+            <p:blipFill>
+              <a:blip r:embed="rId4" cstate="print">
+                <a:extLst>
+                  <a:ext uri="{28A0092B-C50C-407E-A947-70E740481C1C}">
+                    <a14:useLocalDpi xmlns:a14="http://schemas.microsoft.com/office/drawing/2010/main" val="0"/>
+                  </a:ext>
+                </a:extLst>
+              </a:blip>
+              <a:srcRect/>
+              <a:stretch>
+                <a:fillRect/>
+              </a:stretch>
+            </p:blipFill>
+            <p:spPr bwMode="auto">
+              <a:xfrm>
+                <a:off x="0" y="0"/>
+                <a:ext cx="1066519" cy="900000"/>
+              </a:xfrm>
+              <a:prstGeom prst="rect">
+                <a:avLst/>
+              </a:prstGeom>
+              <a:noFill/>
+              <a:extLst>
+                <a:ext uri="{909E8E84-426E-40DD-AFC4-6F175D3DCCD1}">
+                  <a14:hiddenFill xmlns:a14="http://schemas.microsoft.com/office/drawing/2010/main">
+                    <a:solidFill>
+                      <a:srgbClr val="FFFFFF"/>
+                    </a:solidFill>
+                  </a14:hiddenFill>
+                </a:ext>
+              </a:extLst>
+            </p:spPr>
+          </p:pic>
+        </p:grpSp>
+        <p:sp>
+          <p:nvSpPr>
+            <p:cNvPr id="9" name="8 Rectángulo"/>
+            <p:cNvSpPr/>
+            <p:nvPr/>
+          </p:nvSpPr>
+          <p:spPr>
+            <a:xfrm>
+              <a:off x="0" y="6165384"/>
+              <a:ext cx="12190413" cy="720000"/>
+            </a:xfrm>
+            <a:prstGeom prst="rect">
+              <a:avLst/>
+            </a:prstGeom>
+          </p:spPr>
+          <p:style>
+            <a:lnRef idx="2">
+              <a:schemeClr val="accent1">
+                <a:shade val="50000"/>
+              </a:schemeClr>
+            </a:lnRef>
+            <a:fillRef idx="1">
+              <a:schemeClr val="accent1"/>
+            </a:fillRef>
+            <a:effectRef idx="0">
+              <a:schemeClr val="accent1"/>
+            </a:effectRef>
+            <a:fontRef idx="minor">
+              <a:schemeClr val="lt1"/>
+            </a:fontRef>
+          </p:style>
+          <p:txBody>
+            <a:bodyPr rtlCol="0" anchor="ctr"/>
+            <a:lstStyle/>
+            <a:p>
+              <a:pPr algn="ctr"/>
+              <a:endParaRPr lang="es-MX"/>
+            </a:p>
+          </p:txBody>
+        </p:sp>
+      </p:grpSp>
+      <p:graphicFrame>
+        <p:nvGraphicFramePr>
+          <p:cNvPr id="10" name="Espaço Reservado para Conteúdo 9"/>
+          <p:cNvGraphicFramePr>
+            <a:graphicFrameLocks noGrp="1"/>
+          </p:cNvGraphicFramePr>
+          <p:nvPr>
+            <p:ph idx="1"/>
+            <p:extLst>
+              <p:ext uri="{D42A27DB-BD31-4B8C-83A1-F6EECF244321}">
+                <p14:modId xmlns:p14="http://schemas.microsoft.com/office/powerpoint/2010/main" val="1701132709"/>
+              </p:ext>
+            </p:extLst>
+          </p:nvPr>
+        </p:nvGraphicFramePr>
+        <p:xfrm>
+          <a:off x="661265" y="904482"/>
+          <a:ext cx="10867881" cy="5980902"/>
+        </p:xfrm>
+        <a:graphic>
+          <a:graphicData uri="http://schemas.openxmlformats.org/drawingml/2006/table">
+            <a:tbl>
+              <a:tblPr firstRow="1" bandRow="1">
+                <a:tableStyleId>{5C22544A-7EE6-4342-B048-85BDC9FD1C3A}</a:tableStyleId>
+              </a:tblPr>
+              <a:tblGrid>
+                <a:gridCol w="5415177"/>
+                <a:gridCol w="513172"/>
+                <a:gridCol w="821076"/>
+                <a:gridCol w="513172"/>
+                <a:gridCol w="513172"/>
+                <a:gridCol w="513172"/>
+                <a:gridCol w="513172"/>
+                <a:gridCol w="513172"/>
+                <a:gridCol w="821076"/>
+                <a:gridCol w="731520"/>
+              </a:tblGrid>
+              <a:tr h="1500342">
+                <a:tc>
+                  <a:txBody>
+                    <a:bodyPr/>
+                    <a:lstStyle/>
+                    <a:p>
+                      <a:pPr algn="l"/>
+                      <a:r>
+                        <a:rPr lang="en-US" dirty="0" err="1" smtClean="0"/>
+                        <a:t>Objetivos</a:t>
+                      </a:r>
+                      <a:endParaRPr lang="en-US" dirty="0"/>
+                    </a:p>
+                  </a:txBody>
+                  <a:tcPr anchor="ctr"/>
+                </a:tc>
+                <a:tc>
+                  <a:txBody>
+                    <a:bodyPr/>
+                    <a:lstStyle/>
+                    <a:p>
+                      <a:pPr algn="ctr"/>
+                      <a:r>
+                        <a:rPr lang="en-US" dirty="0" err="1" smtClean="0"/>
+                        <a:t>Diversidad</a:t>
+                      </a:r>
+                      <a:endParaRPr lang="en-US" dirty="0"/>
+                    </a:p>
+                  </a:txBody>
+                  <a:tcPr vert="vert270" anchor="ctr"/>
+                </a:tc>
+                <a:tc>
+                  <a:txBody>
+                    <a:bodyPr/>
+                    <a:lstStyle/>
+                    <a:p>
+                      <a:pPr algn="ctr"/>
+                      <a:r>
+                        <a:rPr lang="en-US" dirty="0" err="1" smtClean="0"/>
+                        <a:t>Densidad</a:t>
+                      </a:r>
+                      <a:r>
+                        <a:rPr lang="en-US" dirty="0" smtClean="0"/>
+                        <a:t> de </a:t>
+                      </a:r>
+                      <a:r>
+                        <a:rPr lang="en-US" dirty="0" err="1" smtClean="0"/>
+                        <a:t>maduros</a:t>
+                      </a:r>
+                      <a:endParaRPr lang="en-US" dirty="0"/>
+                    </a:p>
+                  </a:txBody>
+                  <a:tcPr vert="vert270" anchor="ctr"/>
+                </a:tc>
+                <a:tc>
+                  <a:txBody>
+                    <a:bodyPr/>
+                    <a:lstStyle/>
+                    <a:p>
+                      <a:pPr algn="ctr"/>
+                      <a:r>
+                        <a:rPr lang="en-US" dirty="0" err="1" smtClean="0"/>
+                        <a:t>Densidad</a:t>
+                      </a:r>
+                      <a:endParaRPr lang="en-US" dirty="0"/>
+                    </a:p>
+                  </a:txBody>
+                  <a:tcPr vert="vert270" anchor="ctr"/>
+                </a:tc>
+                <a:tc>
+                  <a:txBody>
+                    <a:bodyPr/>
+                    <a:lstStyle/>
+                    <a:p>
+                      <a:pPr algn="ctr"/>
+                      <a:r>
+                        <a:rPr lang="en-US" dirty="0" err="1" smtClean="0"/>
+                        <a:t>Biomasa</a:t>
+                      </a:r>
+                      <a:endParaRPr lang="en-US" dirty="0"/>
+                    </a:p>
+                  </a:txBody>
+                  <a:tcPr vert="vert270" anchor="ctr"/>
+                </a:tc>
+                <a:tc>
+                  <a:txBody>
+                    <a:bodyPr/>
+                    <a:lstStyle/>
+                    <a:p>
+                      <a:pPr algn="ctr"/>
+                      <a:r>
+                        <a:rPr lang="en-US" dirty="0" err="1" smtClean="0"/>
+                        <a:t>Nivel</a:t>
+                      </a:r>
+                      <a:r>
+                        <a:rPr lang="en-US" dirty="0" smtClean="0"/>
+                        <a:t> </a:t>
+                      </a:r>
+                      <a:r>
+                        <a:rPr lang="en-US" dirty="0" err="1" smtClean="0"/>
+                        <a:t>trófico</a:t>
+                      </a:r>
+                      <a:endParaRPr lang="en-US" dirty="0"/>
+                    </a:p>
+                  </a:txBody>
+                  <a:tcPr vert="vert270" anchor="ctr"/>
+                </a:tc>
+                <a:tc>
+                  <a:txBody>
+                    <a:bodyPr/>
+                    <a:lstStyle/>
+                    <a:p>
+                      <a:pPr algn="ctr"/>
+                      <a:r>
+                        <a:rPr lang="en-US" dirty="0" err="1" smtClean="0"/>
+                        <a:t>Capturas</a:t>
+                      </a:r>
+                      <a:endParaRPr lang="en-US" dirty="0"/>
+                    </a:p>
+                  </a:txBody>
+                  <a:tcPr vert="vert270" anchor="ctr"/>
+                </a:tc>
+                <a:tc>
+                  <a:txBody>
+                    <a:bodyPr/>
+                    <a:lstStyle/>
+                    <a:p>
+                      <a:pPr algn="ctr"/>
+                      <a:r>
+                        <a:rPr lang="en-US" dirty="0" err="1" smtClean="0"/>
+                        <a:t>Ingressos</a:t>
+                      </a:r>
+                      <a:endParaRPr lang="en-US" dirty="0"/>
+                    </a:p>
+                  </a:txBody>
+                  <a:tcPr vert="vert270" anchor="ctr"/>
+                </a:tc>
+                <a:tc>
+                  <a:txBody>
+                    <a:bodyPr/>
+                    <a:lstStyle/>
+                    <a:p>
+                      <a:pPr algn="ctr"/>
+                      <a:r>
+                        <a:rPr lang="en-US" dirty="0" err="1" smtClean="0"/>
+                        <a:t>Conocimiento</a:t>
+                      </a:r>
+                      <a:endParaRPr lang="en-US" dirty="0"/>
+                    </a:p>
+                  </a:txBody>
+                  <a:tcPr vert="vert270" anchor="ctr"/>
+                </a:tc>
+                <a:tc>
+                  <a:txBody>
+                    <a:bodyPr/>
+                    <a:lstStyle/>
+                    <a:p>
+                      <a:pPr algn="ctr"/>
+                      <a:r>
+                        <a:rPr lang="en-US" dirty="0" err="1" smtClean="0"/>
+                        <a:t>Medios</a:t>
+                      </a:r>
+                      <a:r>
+                        <a:rPr lang="en-US" dirty="0" smtClean="0"/>
+                        <a:t> de subsistencia</a:t>
+                      </a:r>
+                      <a:endParaRPr lang="en-US" dirty="0"/>
+                    </a:p>
+                  </a:txBody>
+                  <a:tcPr vert="vert270" anchor="ctr"/>
+                </a:tc>
+              </a:tr>
+              <a:tr h="400763">
+                <a:tc>
+                  <a:txBody>
+                    <a:bodyPr/>
+                    <a:lstStyle/>
+                    <a:p>
+                      <a:r>
+                        <a:rPr lang="es-MX" sz="1800" dirty="0" smtClean="0"/>
+                        <a:t>Contribuir a recuperar las poblaciones de especies objetivo de las pesquerías, como </a:t>
+                      </a:r>
+                      <a:r>
+                        <a:rPr lang="es-MX" sz="1800" b="1" dirty="0" smtClean="0"/>
+                        <a:t>langosta, caracol rosado y varias especies de peces</a:t>
+                      </a:r>
+                      <a:r>
+                        <a:rPr lang="es-MX" sz="1800" dirty="0" smtClean="0"/>
+                        <a:t>, ayudando al reclutamiento, el crecimiento y la </a:t>
+                      </a:r>
+                      <a:r>
+                        <a:rPr lang="es-MX" sz="1800" b="1" dirty="0" smtClean="0"/>
+                        <a:t>densidad para mejorar el éxito reproductivo</a:t>
+                      </a:r>
+                      <a:r>
+                        <a:rPr lang="es-MX" sz="1800" dirty="0" smtClean="0"/>
+                        <a:t>.</a:t>
+                      </a:r>
+                      <a:endParaRPr lang="en-US" dirty="0"/>
+                    </a:p>
+                  </a:txBody>
+                  <a:tcPr/>
+                </a:tc>
+                <a:tc>
+                  <a:txBody>
+                    <a:bodyPr/>
+                    <a:lstStyle/>
+                    <a:p>
+                      <a:pPr algn="ctr"/>
+                      <a:endParaRPr lang="en-US" b="1" dirty="0"/>
+                    </a:p>
+                  </a:txBody>
+                  <a:tcPr anchor="ctr"/>
+                </a:tc>
+                <a:tc>
+                  <a:txBody>
+                    <a:bodyPr/>
+                    <a:lstStyle/>
+                    <a:p>
+                      <a:pPr algn="ctr"/>
+                      <a:r>
+                        <a:rPr lang="en-US" b="1" dirty="0" smtClean="0"/>
+                        <a:t>*</a:t>
+                      </a:r>
+                      <a:endParaRPr lang="en-US" b="1" dirty="0"/>
+                    </a:p>
+                  </a:txBody>
+                  <a:tcPr anchor="ctr"/>
+                </a:tc>
+                <a:tc>
+                  <a:txBody>
+                    <a:bodyPr/>
+                    <a:lstStyle/>
+                    <a:p>
+                      <a:pPr algn="ctr"/>
+                      <a:r>
+                        <a:rPr lang="en-US" b="1" dirty="0" smtClean="0"/>
+                        <a:t>*</a:t>
+                      </a:r>
+                      <a:endParaRPr lang="en-US" b="1" dirty="0"/>
+                    </a:p>
+                  </a:txBody>
+                  <a:tcPr anchor="ctr"/>
+                </a:tc>
+                <a:tc>
+                  <a:txBody>
+                    <a:bodyPr/>
+                    <a:lstStyle/>
+                    <a:p>
+                      <a:pPr algn="ctr"/>
+                      <a:r>
+                        <a:rPr lang="en-US" b="1" dirty="0" smtClean="0"/>
+                        <a:t>*</a:t>
+                      </a:r>
+                      <a:endParaRPr lang="en-US" b="1" dirty="0"/>
+                    </a:p>
+                  </a:txBody>
+                  <a:tcPr anchor="ctr"/>
+                </a:tc>
+                <a:tc>
+                  <a:txBody>
+                    <a:bodyPr/>
+                    <a:lstStyle/>
+                    <a:p>
+                      <a:pPr algn="ctr"/>
+                      <a:endParaRPr lang="en-US" b="1" dirty="0"/>
+                    </a:p>
+                  </a:txBody>
+                  <a:tcPr anchor="ctr"/>
+                </a:tc>
+                <a:tc>
+                  <a:txBody>
+                    <a:bodyPr/>
+                    <a:lstStyle/>
+                    <a:p>
+                      <a:pPr algn="ctr"/>
+                      <a:endParaRPr lang="en-US" b="1" dirty="0"/>
+                    </a:p>
+                  </a:txBody>
+                  <a:tcPr anchor="ctr"/>
+                </a:tc>
+                <a:tc>
+                  <a:txBody>
+                    <a:bodyPr/>
+                    <a:lstStyle/>
+                    <a:p>
+                      <a:pPr algn="ctr"/>
+                      <a:endParaRPr lang="en-US" b="1" dirty="0"/>
+                    </a:p>
+                  </a:txBody>
+                  <a:tcPr anchor="ctr"/>
+                </a:tc>
+                <a:tc>
+                  <a:txBody>
+                    <a:bodyPr/>
+                    <a:lstStyle/>
+                    <a:p>
+                      <a:pPr algn="ctr"/>
+                      <a:r>
+                        <a:rPr lang="en-US" b="1" dirty="0" smtClean="0"/>
+                        <a:t>*</a:t>
+                      </a:r>
+                      <a:endParaRPr lang="en-US" b="1" dirty="0"/>
+                    </a:p>
+                  </a:txBody>
+                  <a:tcPr anchor="ctr"/>
+                </a:tc>
+                <a:tc>
+                  <a:txBody>
+                    <a:bodyPr/>
+                    <a:lstStyle/>
+                    <a:p>
+                      <a:pPr algn="ctr"/>
+                      <a:endParaRPr lang="en-US" b="1" dirty="0"/>
+                    </a:p>
+                  </a:txBody>
+                  <a:tcPr anchor="ctr"/>
+                </a:tc>
+              </a:tr>
+              <a:tr h="400763">
+                <a:tc>
+                  <a:txBody>
+                    <a:bodyPr/>
+                    <a:lstStyle/>
+                    <a:p>
+                      <a:r>
+                        <a:rPr lang="es-MX" sz="1800" dirty="0" smtClean="0"/>
+                        <a:t>Contribuir </a:t>
+                      </a:r>
+                      <a:r>
+                        <a:rPr lang="es-MX" sz="1800" b="1" dirty="0" smtClean="0"/>
+                        <a:t>a mejorar la productividad </a:t>
+                      </a:r>
+                      <a:r>
+                        <a:rPr lang="es-MX" sz="1800" dirty="0" smtClean="0"/>
+                        <a:t>pesquera a mediano plazo </a:t>
+                      </a:r>
+                      <a:r>
+                        <a:rPr lang="es-MX" sz="1800" b="1" dirty="0" smtClean="0"/>
+                        <a:t>recuperando la biomasa</a:t>
+                      </a:r>
+                      <a:r>
+                        <a:rPr lang="es-MX" sz="1800" dirty="0" smtClean="0"/>
+                        <a:t>.</a:t>
+                      </a:r>
+                      <a:endParaRPr lang="en-US" dirty="0"/>
+                    </a:p>
+                  </a:txBody>
+                  <a:tcPr/>
+                </a:tc>
+                <a:tc>
+                  <a:txBody>
+                    <a:bodyPr/>
+                    <a:lstStyle/>
+                    <a:p>
+                      <a:pPr algn="ctr"/>
+                      <a:endParaRPr lang="en-US" b="1" dirty="0"/>
+                    </a:p>
+                  </a:txBody>
+                  <a:tcPr anchor="ctr"/>
+                </a:tc>
+                <a:tc>
+                  <a:txBody>
+                    <a:bodyPr/>
+                    <a:lstStyle/>
+                    <a:p>
+                      <a:pPr algn="ctr"/>
+                      <a:endParaRPr lang="en-US" b="1" dirty="0"/>
+                    </a:p>
+                  </a:txBody>
+                  <a:tcPr anchor="ctr"/>
+                </a:tc>
+                <a:tc>
+                  <a:txBody>
+                    <a:bodyPr/>
+                    <a:lstStyle/>
+                    <a:p>
+                      <a:pPr algn="ctr"/>
+                      <a:r>
+                        <a:rPr lang="en-US" b="1" dirty="0" smtClean="0"/>
+                        <a:t>*</a:t>
+                      </a:r>
+                      <a:endParaRPr lang="en-US" b="1" dirty="0"/>
+                    </a:p>
+                  </a:txBody>
+                  <a:tcPr anchor="ctr"/>
+                </a:tc>
+                <a:tc>
+                  <a:txBody>
+                    <a:bodyPr/>
+                    <a:lstStyle/>
+                    <a:p>
+                      <a:pPr algn="ctr"/>
+                      <a:r>
+                        <a:rPr lang="en-US" b="1" dirty="0" smtClean="0"/>
+                        <a:t>*</a:t>
+                      </a:r>
+                      <a:endParaRPr lang="en-US" b="1" dirty="0"/>
+                    </a:p>
+                  </a:txBody>
+                  <a:tcPr anchor="ctr"/>
+                </a:tc>
+                <a:tc>
+                  <a:txBody>
+                    <a:bodyPr/>
+                    <a:lstStyle/>
+                    <a:p>
+                      <a:pPr algn="ctr"/>
+                      <a:endParaRPr lang="en-US" b="1" dirty="0"/>
+                    </a:p>
+                  </a:txBody>
+                  <a:tcPr anchor="ctr"/>
+                </a:tc>
+                <a:tc>
+                  <a:txBody>
+                    <a:bodyPr/>
+                    <a:lstStyle/>
+                    <a:p>
+                      <a:pPr algn="ctr"/>
+                      <a:r>
+                        <a:rPr lang="en-US" b="1" dirty="0" smtClean="0"/>
+                        <a:t>*</a:t>
+                      </a:r>
+                      <a:endParaRPr lang="en-US" b="1" dirty="0"/>
+                    </a:p>
+                  </a:txBody>
+                  <a:tcPr anchor="ctr"/>
+                </a:tc>
+                <a:tc>
+                  <a:txBody>
+                    <a:bodyPr/>
+                    <a:lstStyle/>
+                    <a:p>
+                      <a:pPr algn="ctr"/>
+                      <a:r>
+                        <a:rPr lang="en-US" b="1" dirty="0" smtClean="0"/>
+                        <a:t>*</a:t>
+                      </a:r>
+                      <a:endParaRPr lang="en-US" b="1" dirty="0"/>
+                    </a:p>
+                  </a:txBody>
+                  <a:tcPr anchor="ctr"/>
+                </a:tc>
+                <a:tc>
+                  <a:txBody>
+                    <a:bodyPr/>
+                    <a:lstStyle/>
+                    <a:p>
+                      <a:pPr algn="ctr"/>
+                      <a:endParaRPr lang="en-US" b="1" dirty="0"/>
+                    </a:p>
+                  </a:txBody>
+                  <a:tcPr anchor="ctr"/>
+                </a:tc>
+                <a:tc>
+                  <a:txBody>
+                    <a:bodyPr/>
+                    <a:lstStyle/>
+                    <a:p>
+                      <a:pPr algn="ctr"/>
+                      <a:endParaRPr lang="en-US" b="1" dirty="0"/>
+                    </a:p>
+                  </a:txBody>
+                  <a:tcPr anchor="ctr"/>
+                </a:tc>
+              </a:tr>
+              <a:tr h="400763">
+                <a:tc>
+                  <a:txBody>
+                    <a:bodyPr/>
+                    <a:lstStyle/>
+                    <a:p>
+                      <a:r>
+                        <a:rPr lang="es-MX" sz="1800" dirty="0" smtClean="0"/>
+                        <a:t>Ayudar a </a:t>
+                      </a:r>
+                      <a:r>
+                        <a:rPr lang="es-MX" sz="1800" b="1" dirty="0" smtClean="0"/>
+                        <a:t>aumentar la resiliencia </a:t>
+                      </a:r>
+                      <a:r>
+                        <a:rPr lang="es-MX" sz="1800" dirty="0" smtClean="0"/>
+                        <a:t>de los ecosistemas y de la pesca ante perturbaciones climáticas o presiones antropogénicas.</a:t>
+                      </a:r>
+                      <a:endParaRPr lang="en-US" dirty="0"/>
+                    </a:p>
+                  </a:txBody>
+                  <a:tcPr/>
+                </a:tc>
+                <a:tc>
+                  <a:txBody>
+                    <a:bodyPr/>
+                    <a:lstStyle/>
+                    <a:p>
+                      <a:pPr algn="ctr"/>
+                      <a:r>
+                        <a:rPr lang="en-US" b="1" dirty="0" smtClean="0"/>
+                        <a:t>*</a:t>
+                      </a:r>
+                      <a:endParaRPr lang="en-US" b="1" dirty="0"/>
+                    </a:p>
+                  </a:txBody>
+                  <a:tcPr anchor="ctr"/>
+                </a:tc>
+                <a:tc>
+                  <a:txBody>
+                    <a:bodyPr/>
+                    <a:lstStyle/>
+                    <a:p>
+                      <a:pPr algn="ctr"/>
+                      <a:r>
+                        <a:rPr lang="en-US" b="1" dirty="0" smtClean="0"/>
+                        <a:t>*</a:t>
+                      </a:r>
+                      <a:endParaRPr lang="en-US" b="1" dirty="0"/>
+                    </a:p>
+                  </a:txBody>
+                  <a:tcPr anchor="ctr"/>
+                </a:tc>
+                <a:tc>
+                  <a:txBody>
+                    <a:bodyPr/>
+                    <a:lstStyle/>
+                    <a:p>
+                      <a:pPr algn="ctr"/>
+                      <a:r>
+                        <a:rPr lang="en-US" b="1" dirty="0" smtClean="0"/>
+                        <a:t>*</a:t>
+                      </a:r>
+                      <a:endParaRPr lang="en-US" b="1" dirty="0"/>
+                    </a:p>
+                  </a:txBody>
+                  <a:tcPr anchor="ctr"/>
+                </a:tc>
+                <a:tc>
+                  <a:txBody>
+                    <a:bodyPr/>
+                    <a:lstStyle/>
+                    <a:p>
+                      <a:pPr algn="ctr"/>
+                      <a:r>
+                        <a:rPr lang="en-US" b="1" dirty="0" smtClean="0"/>
+                        <a:t>*</a:t>
+                      </a:r>
+                      <a:endParaRPr lang="en-US" b="1" dirty="0"/>
+                    </a:p>
+                  </a:txBody>
+                  <a:tcPr anchor="ctr"/>
+                </a:tc>
+                <a:tc>
+                  <a:txBody>
+                    <a:bodyPr/>
+                    <a:lstStyle/>
+                    <a:p>
+                      <a:pPr algn="ctr"/>
+                      <a:r>
+                        <a:rPr lang="en-US" b="1" dirty="0" smtClean="0"/>
+                        <a:t>*</a:t>
+                      </a:r>
+                      <a:endParaRPr lang="en-US" b="1" dirty="0"/>
+                    </a:p>
+                  </a:txBody>
+                  <a:tcPr anchor="ctr"/>
+                </a:tc>
+                <a:tc>
+                  <a:txBody>
+                    <a:bodyPr/>
+                    <a:lstStyle/>
+                    <a:p>
+                      <a:pPr algn="ctr"/>
+                      <a:endParaRPr lang="en-US" b="1" dirty="0"/>
+                    </a:p>
+                  </a:txBody>
+                  <a:tcPr anchor="ctr"/>
+                </a:tc>
+                <a:tc>
+                  <a:txBody>
+                    <a:bodyPr/>
+                    <a:lstStyle/>
+                    <a:p>
+                      <a:pPr algn="ctr"/>
+                      <a:endParaRPr lang="en-US" b="1" dirty="0"/>
+                    </a:p>
+                  </a:txBody>
+                  <a:tcPr anchor="ctr"/>
+                </a:tc>
+                <a:tc>
+                  <a:txBody>
+                    <a:bodyPr/>
+                    <a:lstStyle/>
+                    <a:p>
+                      <a:pPr algn="ctr"/>
+                      <a:r>
+                        <a:rPr lang="en-US" b="1" dirty="0" smtClean="0"/>
+                        <a:t>*</a:t>
+                      </a:r>
+                      <a:endParaRPr lang="en-US" b="1" dirty="0"/>
+                    </a:p>
+                  </a:txBody>
+                  <a:tcPr anchor="ctr"/>
+                </a:tc>
+                <a:tc>
+                  <a:txBody>
+                    <a:bodyPr/>
+                    <a:lstStyle/>
+                    <a:p>
+                      <a:pPr algn="ctr"/>
+                      <a:r>
+                        <a:rPr lang="en-US" b="1" dirty="0" smtClean="0"/>
+                        <a:t>*</a:t>
+                      </a:r>
+                      <a:endParaRPr lang="en-US" b="1" dirty="0"/>
+                    </a:p>
+                  </a:txBody>
+                  <a:tcPr anchor="ctr"/>
+                </a:tc>
+              </a:tr>
+              <a:tr h="400763">
+                <a:tc>
+                  <a:txBody>
+                    <a:bodyPr/>
+                    <a:lstStyle/>
+                    <a:p>
+                      <a:r>
+                        <a:rPr lang="es-MX" sz="1800" b="1" dirty="0" smtClean="0"/>
+                        <a:t>Proteger una porción del hábitat</a:t>
+                      </a:r>
+                      <a:r>
+                        <a:rPr lang="es-MX" sz="1800" dirty="0" smtClean="0"/>
+                        <a:t>, la biodiversidad y los procesos ecológicos de los ecosistemas coralinos, de la laguna </a:t>
+                      </a:r>
+                      <a:r>
+                        <a:rPr lang="es-MX" sz="1800" dirty="0" err="1" smtClean="0"/>
+                        <a:t>arrecifal</a:t>
+                      </a:r>
+                      <a:r>
+                        <a:rPr lang="es-MX" sz="1800" dirty="0" smtClean="0"/>
+                        <a:t> y de los humedales, </a:t>
+                      </a:r>
+                      <a:r>
+                        <a:rPr lang="es-MX" sz="1800" b="1" dirty="0" smtClean="0"/>
+                        <a:t>con la restauración de sus funciones tróficas</a:t>
+                      </a:r>
+                      <a:r>
+                        <a:rPr lang="es-MX" sz="1800" dirty="0" smtClean="0"/>
+                        <a:t> de importancia para las especies comerciales pesqueras. </a:t>
+                      </a:r>
+                      <a:endParaRPr lang="en-US" dirty="0"/>
+                    </a:p>
+                  </a:txBody>
+                  <a:tcPr/>
+                </a:tc>
+                <a:tc>
+                  <a:txBody>
+                    <a:bodyPr/>
+                    <a:lstStyle/>
+                    <a:p>
+                      <a:pPr algn="ctr"/>
+                      <a:endParaRPr lang="en-US" b="1" dirty="0"/>
+                    </a:p>
+                  </a:txBody>
+                  <a:tcPr anchor="ctr"/>
+                </a:tc>
+                <a:tc>
+                  <a:txBody>
+                    <a:bodyPr/>
+                    <a:lstStyle/>
+                    <a:p>
+                      <a:pPr algn="ctr"/>
+                      <a:endParaRPr lang="en-US" b="1" dirty="0"/>
+                    </a:p>
+                  </a:txBody>
+                  <a:tcPr anchor="ctr"/>
+                </a:tc>
+                <a:tc>
+                  <a:txBody>
+                    <a:bodyPr/>
+                    <a:lstStyle/>
+                    <a:p>
+                      <a:pPr algn="ctr"/>
+                      <a:endParaRPr lang="en-US" b="1" dirty="0"/>
+                    </a:p>
+                  </a:txBody>
+                  <a:tcPr anchor="ctr"/>
+                </a:tc>
+                <a:tc>
+                  <a:txBody>
+                    <a:bodyPr/>
+                    <a:lstStyle/>
+                    <a:p>
+                      <a:pPr algn="ctr"/>
+                      <a:endParaRPr lang="en-US" b="1" dirty="0"/>
+                    </a:p>
+                  </a:txBody>
+                  <a:tcPr anchor="ctr"/>
+                </a:tc>
+                <a:tc>
+                  <a:txBody>
+                    <a:bodyPr/>
+                    <a:lstStyle/>
+                    <a:p>
+                      <a:pPr algn="ctr"/>
+                      <a:endParaRPr lang="en-US" b="1" dirty="0"/>
+                    </a:p>
+                  </a:txBody>
+                  <a:tcPr anchor="ctr"/>
+                </a:tc>
+                <a:tc>
+                  <a:txBody>
+                    <a:bodyPr/>
+                    <a:lstStyle/>
+                    <a:p>
+                      <a:pPr algn="ctr"/>
+                      <a:endParaRPr lang="en-US" b="1" dirty="0"/>
+                    </a:p>
+                  </a:txBody>
+                  <a:tcPr anchor="ctr"/>
+                </a:tc>
+                <a:tc>
+                  <a:txBody>
+                    <a:bodyPr/>
+                    <a:lstStyle/>
+                    <a:p>
+                      <a:pPr algn="ctr"/>
+                      <a:endParaRPr lang="en-US" b="1" dirty="0"/>
+                    </a:p>
+                  </a:txBody>
+                  <a:tcPr anchor="ctr"/>
+                </a:tc>
+                <a:tc>
+                  <a:txBody>
+                    <a:bodyPr/>
+                    <a:lstStyle/>
+                    <a:p>
+                      <a:pPr algn="ctr"/>
+                      <a:r>
+                        <a:rPr lang="en-US" b="1" dirty="0" smtClean="0"/>
+                        <a:t>*</a:t>
+                      </a:r>
+                      <a:endParaRPr lang="en-US" b="1" dirty="0"/>
+                    </a:p>
+                  </a:txBody>
+                  <a:tcPr anchor="ctr"/>
+                </a:tc>
+                <a:tc>
+                  <a:txBody>
+                    <a:bodyPr/>
+                    <a:lstStyle/>
+                    <a:p>
+                      <a:pPr algn="ctr"/>
+                      <a:r>
+                        <a:rPr lang="en-US" b="1" dirty="0" smtClean="0"/>
+                        <a:t>*</a:t>
+                      </a:r>
+                      <a:endParaRPr lang="en-US" b="1" dirty="0"/>
+                    </a:p>
+                  </a:txBody>
+                  <a:tcPr anchor="ctr"/>
+                </a:tc>
+              </a:tr>
+            </a:tbl>
+          </a:graphicData>
+        </a:graphic>
+      </p:graphicFrame>
+    </p:spTree>
+    <p:extLst>
+      <p:ext uri="{BB962C8B-B14F-4D97-AF65-F5344CB8AC3E}">
+        <p14:creationId xmlns:p14="http://schemas.microsoft.com/office/powerpoint/2010/main" val="1643352218"/>
+      </p:ext>
+    </p:extLst>
   </p:cSld>
   <p:clrMapOvr>
     <a:masterClrMapping/>
@@ -11420,7 +14872,7 @@
           <a:blip r:embed="rId3" cstate="print">
             <a:extLst>
               <a:ext uri="{28A0092B-C50C-407E-A947-70E740481C1C}">
-                <a14:useLocalDpi xmlns="" xmlns:a14="http://schemas.microsoft.com/office/drawing/2010/main" val="0"/>
+                <a14:useLocalDpi xmlns:a14="http://schemas.microsoft.com/office/drawing/2010/main" val="0"/>
               </a:ext>
             </a:extLst>
           </a:blip>
@@ -11440,7 +14892,7 @@
           <a:noFill/>
           <a:extLst>
             <a:ext uri="{909E8E84-426E-40DD-AFC4-6F175D3DCCD1}">
-              <a14:hiddenFill xmlns="" xmlns:a14="http://schemas.microsoft.com/office/drawing/2010/main">
+              <a14:hiddenFill xmlns:a14="http://schemas.microsoft.com/office/drawing/2010/main">
                 <a:solidFill>
                   <a:srgbClr val="FFFFFF"/>
                 </a:solidFill>
@@ -11461,7 +14913,7 @@
           <a:blip r:embed="rId4" cstate="print">
             <a:extLst>
               <a:ext uri="{28A0092B-C50C-407E-A947-70E740481C1C}">
-                <a14:useLocalDpi xmlns="" xmlns:a14="http://schemas.microsoft.com/office/drawing/2010/main" val="0"/>
+                <a14:useLocalDpi xmlns:a14="http://schemas.microsoft.com/office/drawing/2010/main" val="0"/>
               </a:ext>
             </a:extLst>
           </a:blip>
@@ -11481,7 +14933,7 @@
           <a:noFill/>
           <a:extLst>
             <a:ext uri="{909E8E84-426E-40DD-AFC4-6F175D3DCCD1}">
-              <a14:hiddenFill xmlns="" xmlns:a14="http://schemas.microsoft.com/office/drawing/2010/main">
+              <a14:hiddenFill xmlns:a14="http://schemas.microsoft.com/office/drawing/2010/main">
                 <a:solidFill>
                   <a:srgbClr val="FFFFFF"/>
                 </a:solidFill>
@@ -11502,7 +14954,7 @@
           <a:blip r:embed="rId5" cstate="print">
             <a:extLst>
               <a:ext uri="{28A0092B-C50C-407E-A947-70E740481C1C}">
-                <a14:useLocalDpi xmlns="" xmlns:a14="http://schemas.microsoft.com/office/drawing/2010/main" val="0"/>
+                <a14:useLocalDpi xmlns:a14="http://schemas.microsoft.com/office/drawing/2010/main" val="0"/>
               </a:ext>
             </a:extLst>
           </a:blip>
@@ -11522,7 +14974,7 @@
           <a:noFill/>
           <a:extLst>
             <a:ext uri="{909E8E84-426E-40DD-AFC4-6F175D3DCCD1}">
-              <a14:hiddenFill xmlns="" xmlns:a14="http://schemas.microsoft.com/office/drawing/2010/main">
+              <a14:hiddenFill xmlns:a14="http://schemas.microsoft.com/office/drawing/2010/main">
                 <a:solidFill>
                   <a:srgbClr val="FFFFFF"/>
                 </a:solidFill>
@@ -11543,7 +14995,7 @@
           <a:blip r:embed="rId6" cstate="print">
             <a:extLst>
               <a:ext uri="{28A0092B-C50C-407E-A947-70E740481C1C}">
-                <a14:useLocalDpi xmlns="" xmlns:a14="http://schemas.microsoft.com/office/drawing/2010/main" val="0"/>
+                <a14:useLocalDpi xmlns:a14="http://schemas.microsoft.com/office/drawing/2010/main" val="0"/>
               </a:ext>
             </a:extLst>
           </a:blip>
@@ -11563,7 +15015,7 @@
           <a:noFill/>
           <a:extLst>
             <a:ext uri="{909E8E84-426E-40DD-AFC4-6F175D3DCCD1}">
-              <a14:hiddenFill xmlns="" xmlns:a14="http://schemas.microsoft.com/office/drawing/2010/main">
+              <a14:hiddenFill xmlns:a14="http://schemas.microsoft.com/office/drawing/2010/main">
                 <a:solidFill>
                   <a:srgbClr val="FFFFFF"/>
                 </a:solidFill>
@@ -11678,7 +15130,7 @@
             <a:blip r:embed="rId7" cstate="print">
               <a:extLst>
                 <a:ext uri="{28A0092B-C50C-407E-A947-70E740481C1C}">
-                  <a14:useLocalDpi xmlns="" xmlns:a14="http://schemas.microsoft.com/office/drawing/2010/main" val="0"/>
+                  <a14:useLocalDpi xmlns:a14="http://schemas.microsoft.com/office/drawing/2010/main" val="0"/>
                 </a:ext>
               </a:extLst>
             </a:blip>
@@ -11698,7 +15150,7 @@
             <a:noFill/>
             <a:extLst>
               <a:ext uri="{909E8E84-426E-40DD-AFC4-6F175D3DCCD1}">
-                <a14:hiddenFill xmlns="" xmlns:a14="http://schemas.microsoft.com/office/drawing/2010/main">
+                <a14:hiddenFill xmlns:a14="http://schemas.microsoft.com/office/drawing/2010/main">
                   <a:solidFill>
                     <a:srgbClr val="FFFFFF"/>
                   </a:solidFill>
@@ -11719,7 +15171,7 @@
             <a:blip r:embed="rId8" cstate="print">
               <a:extLst>
                 <a:ext uri="{28A0092B-C50C-407E-A947-70E740481C1C}">
-                  <a14:useLocalDpi xmlns="" xmlns:a14="http://schemas.microsoft.com/office/drawing/2010/main" val="0"/>
+                  <a14:useLocalDpi xmlns:a14="http://schemas.microsoft.com/office/drawing/2010/main" val="0"/>
                 </a:ext>
               </a:extLst>
             </a:blip>
@@ -11739,7 +15191,7 @@
             <a:noFill/>
             <a:extLst>
               <a:ext uri="{909E8E84-426E-40DD-AFC4-6F175D3DCCD1}">
-                <a14:hiddenFill xmlns="" xmlns:a14="http://schemas.microsoft.com/office/drawing/2010/main">
+                <a14:hiddenFill xmlns:a14="http://schemas.microsoft.com/office/drawing/2010/main">
                   <a:solidFill>
                     <a:srgbClr val="FFFFFF"/>
                   </a:solidFill>
@@ -11760,7 +15212,7 @@
             <a:blip r:embed="rId9" cstate="print">
               <a:extLst>
                 <a:ext uri="{28A0092B-C50C-407E-A947-70E740481C1C}">
-                  <a14:useLocalDpi xmlns="" xmlns:a14="http://schemas.microsoft.com/office/drawing/2010/main" val="0"/>
+                  <a14:useLocalDpi xmlns:a14="http://schemas.microsoft.com/office/drawing/2010/main" val="0"/>
                 </a:ext>
               </a:extLst>
             </a:blip>
@@ -11780,7 +15232,7 @@
             <a:noFill/>
             <a:extLst>
               <a:ext uri="{909E8E84-426E-40DD-AFC4-6F175D3DCCD1}">
-                <a14:hiddenFill xmlns="" xmlns:a14="http://schemas.microsoft.com/office/drawing/2010/main">
+                <a14:hiddenFill xmlns:a14="http://schemas.microsoft.com/office/drawing/2010/main">
                   <a:solidFill>
                     <a:srgbClr val="FFFFFF"/>
                   </a:solidFill>
@@ -11933,7 +15385,7 @@
             <a:blip r:embed="rId2" cstate="print">
               <a:extLst>
                 <a:ext uri="{28A0092B-C50C-407E-A947-70E740481C1C}">
-                  <a14:useLocalDpi xmlns="" xmlns:a14="http://schemas.microsoft.com/office/drawing/2010/main" val="0"/>
+                  <a14:useLocalDpi xmlns:a14="http://schemas.microsoft.com/office/drawing/2010/main" val="0"/>
                 </a:ext>
               </a:extLst>
             </a:blip>
@@ -11953,7 +15405,7 @@
             <a:noFill/>
             <a:extLst>
               <a:ext uri="{909E8E84-426E-40DD-AFC4-6F175D3DCCD1}">
-                <a14:hiddenFill xmlns="" xmlns:a14="http://schemas.microsoft.com/office/drawing/2010/main">
+                <a14:hiddenFill xmlns:a14="http://schemas.microsoft.com/office/drawing/2010/main">
                   <a:solidFill>
                     <a:srgbClr val="FFFFFF"/>
                   </a:solidFill>
@@ -11974,7 +15426,7 @@
             <a:blip r:embed="rId3" cstate="print">
               <a:extLst>
                 <a:ext uri="{28A0092B-C50C-407E-A947-70E740481C1C}">
-                  <a14:useLocalDpi xmlns="" xmlns:a14="http://schemas.microsoft.com/office/drawing/2010/main" val="0"/>
+                  <a14:useLocalDpi xmlns:a14="http://schemas.microsoft.com/office/drawing/2010/main" val="0"/>
                 </a:ext>
               </a:extLst>
             </a:blip>
@@ -11994,7 +15446,7 @@
             <a:noFill/>
             <a:extLst>
               <a:ext uri="{909E8E84-426E-40DD-AFC4-6F175D3DCCD1}">
-                <a14:hiddenFill xmlns="" xmlns:a14="http://schemas.microsoft.com/office/drawing/2010/main">
+                <a14:hiddenFill xmlns:a14="http://schemas.microsoft.com/office/drawing/2010/main">
                   <a:solidFill>
                     <a:srgbClr val="FFFFFF"/>
                   </a:solidFill>
@@ -12015,7 +15467,7 @@
             <a:blip r:embed="rId4" cstate="print">
               <a:extLst>
                 <a:ext uri="{28A0092B-C50C-407E-A947-70E740481C1C}">
-                  <a14:useLocalDpi xmlns="" xmlns:a14="http://schemas.microsoft.com/office/drawing/2010/main" val="0"/>
+                  <a14:useLocalDpi xmlns:a14="http://schemas.microsoft.com/office/drawing/2010/main" val="0"/>
                 </a:ext>
               </a:extLst>
             </a:blip>
@@ -12035,7 +15487,7 @@
             <a:noFill/>
             <a:extLst>
               <a:ext uri="{909E8E84-426E-40DD-AFC4-6F175D3DCCD1}">
-                <a14:hiddenFill xmlns="" xmlns:a14="http://schemas.microsoft.com/office/drawing/2010/main">
+                <a14:hiddenFill xmlns:a14="http://schemas.microsoft.com/office/drawing/2010/main">
                   <a:solidFill>
                     <a:srgbClr val="FFFFFF"/>
                   </a:solidFill>
@@ -12289,7 +15741,7 @@
             <a:blip r:embed="rId2" cstate="print">
               <a:extLst>
                 <a:ext uri="{28A0092B-C50C-407E-A947-70E740481C1C}">
-                  <a14:useLocalDpi xmlns="" xmlns:a14="http://schemas.microsoft.com/office/drawing/2010/main" val="0"/>
+                  <a14:useLocalDpi xmlns:a14="http://schemas.microsoft.com/office/drawing/2010/main" val="0"/>
                 </a:ext>
               </a:extLst>
             </a:blip>
@@ -12309,7 +15761,7 @@
             <a:noFill/>
             <a:extLst>
               <a:ext uri="{909E8E84-426E-40DD-AFC4-6F175D3DCCD1}">
-                <a14:hiddenFill xmlns="" xmlns:a14="http://schemas.microsoft.com/office/drawing/2010/main">
+                <a14:hiddenFill xmlns:a14="http://schemas.microsoft.com/office/drawing/2010/main">
                   <a:solidFill>
                     <a:srgbClr val="FFFFFF"/>
                   </a:solidFill>
@@ -12330,7 +15782,7 @@
             <a:blip r:embed="rId3" cstate="print">
               <a:extLst>
                 <a:ext uri="{28A0092B-C50C-407E-A947-70E740481C1C}">
-                  <a14:useLocalDpi xmlns="" xmlns:a14="http://schemas.microsoft.com/office/drawing/2010/main" val="0"/>
+                  <a14:useLocalDpi xmlns:a14="http://schemas.microsoft.com/office/drawing/2010/main" val="0"/>
                 </a:ext>
               </a:extLst>
             </a:blip>
@@ -12350,7 +15802,7 @@
             <a:noFill/>
             <a:extLst>
               <a:ext uri="{909E8E84-426E-40DD-AFC4-6F175D3DCCD1}">
-                <a14:hiddenFill xmlns="" xmlns:a14="http://schemas.microsoft.com/office/drawing/2010/main">
+                <a14:hiddenFill xmlns:a14="http://schemas.microsoft.com/office/drawing/2010/main">
                   <a:solidFill>
                     <a:srgbClr val="FFFFFF"/>
                   </a:solidFill>
@@ -12371,7 +15823,7 @@
             <a:blip r:embed="rId4" cstate="print">
               <a:extLst>
                 <a:ext uri="{28A0092B-C50C-407E-A947-70E740481C1C}">
-                  <a14:useLocalDpi xmlns="" xmlns:a14="http://schemas.microsoft.com/office/drawing/2010/main" val="0"/>
+                  <a14:useLocalDpi xmlns:a14="http://schemas.microsoft.com/office/drawing/2010/main" val="0"/>
                 </a:ext>
               </a:extLst>
             </a:blip>
@@ -12391,7 +15843,7 @@
             <a:noFill/>
             <a:extLst>
               <a:ext uri="{909E8E84-426E-40DD-AFC4-6F175D3DCCD1}">
-                <a14:hiddenFill xmlns="" xmlns:a14="http://schemas.microsoft.com/office/drawing/2010/main">
+                <a14:hiddenFill xmlns:a14="http://schemas.microsoft.com/office/drawing/2010/main">
                   <a:solidFill>
                     <a:srgbClr val="FFFFFF"/>
                   </a:solidFill>
@@ -12705,7 +16157,7 @@
             <a:blip r:embed="rId3" cstate="print">
               <a:extLst>
                 <a:ext uri="{28A0092B-C50C-407E-A947-70E740481C1C}">
-                  <a14:useLocalDpi xmlns="" xmlns:a14="http://schemas.microsoft.com/office/drawing/2010/main" val="0"/>
+                  <a14:useLocalDpi xmlns:a14="http://schemas.microsoft.com/office/drawing/2010/main" val="0"/>
                 </a:ext>
               </a:extLst>
             </a:blip>
@@ -12725,7 +16177,7 @@
             <a:noFill/>
             <a:extLst>
               <a:ext uri="{909E8E84-426E-40DD-AFC4-6F175D3DCCD1}">
-                <a14:hiddenFill xmlns="" xmlns:a14="http://schemas.microsoft.com/office/drawing/2010/main">
+                <a14:hiddenFill xmlns:a14="http://schemas.microsoft.com/office/drawing/2010/main">
                   <a:solidFill>
                     <a:srgbClr val="FFFFFF"/>
                   </a:solidFill>
@@ -12746,7 +16198,7 @@
             <a:blip r:embed="rId4" cstate="print">
               <a:extLst>
                 <a:ext uri="{28A0092B-C50C-407E-A947-70E740481C1C}">
-                  <a14:useLocalDpi xmlns="" xmlns:a14="http://schemas.microsoft.com/office/drawing/2010/main" val="0"/>
+                  <a14:useLocalDpi xmlns:a14="http://schemas.microsoft.com/office/drawing/2010/main" val="0"/>
                 </a:ext>
               </a:extLst>
             </a:blip>
@@ -12766,7 +16218,7 @@
             <a:noFill/>
             <a:extLst>
               <a:ext uri="{909E8E84-426E-40DD-AFC4-6F175D3DCCD1}">
-                <a14:hiddenFill xmlns="" xmlns:a14="http://schemas.microsoft.com/office/drawing/2010/main">
+                <a14:hiddenFill xmlns:a14="http://schemas.microsoft.com/office/drawing/2010/main">
                   <a:solidFill>
                     <a:srgbClr val="FFFFFF"/>
                   </a:solidFill>
@@ -12787,7 +16239,7 @@
             <a:blip r:embed="rId5" cstate="print">
               <a:extLst>
                 <a:ext uri="{28A0092B-C50C-407E-A947-70E740481C1C}">
-                  <a14:useLocalDpi xmlns="" xmlns:a14="http://schemas.microsoft.com/office/drawing/2010/main" val="0"/>
+                  <a14:useLocalDpi xmlns:a14="http://schemas.microsoft.com/office/drawing/2010/main" val="0"/>
                 </a:ext>
               </a:extLst>
             </a:blip>
@@ -12807,7 +16259,7 @@
             <a:noFill/>
             <a:extLst>
               <a:ext uri="{909E8E84-426E-40DD-AFC4-6F175D3DCCD1}">
-                <a14:hiddenFill xmlns="" xmlns:a14="http://schemas.microsoft.com/office/drawing/2010/main">
+                <a14:hiddenFill xmlns:a14="http://schemas.microsoft.com/office/drawing/2010/main">
                   <a:solidFill>
                     <a:srgbClr val="FFFFFF"/>
                   </a:solidFill>
@@ -12860,7 +16312,7 @@
     </p:spTree>
     <p:extLst>
       <p:ext uri="{BB962C8B-B14F-4D97-AF65-F5344CB8AC3E}">
-        <p14:creationId xmlns="" xmlns:p14="http://schemas.microsoft.com/office/powerpoint/2010/main" val="329827206"/>
+        <p14:creationId xmlns:p14="http://schemas.microsoft.com/office/powerpoint/2010/main" val="329827206"/>
       </p:ext>
     </p:extLst>
   </p:cSld>
@@ -14044,7 +17496,7 @@
             <a:blip r:embed="rId4" cstate="print">
               <a:extLst>
                 <a:ext uri="{28A0092B-C50C-407E-A947-70E740481C1C}">
-                  <a14:useLocalDpi xmlns="" xmlns:a14="http://schemas.microsoft.com/office/drawing/2010/main" val="0"/>
+                  <a14:useLocalDpi xmlns:a14="http://schemas.microsoft.com/office/drawing/2010/main" val="0"/>
                 </a:ext>
               </a:extLst>
             </a:blip>
@@ -14064,7 +17516,7 @@
             <a:noFill/>
             <a:extLst>
               <a:ext uri="{909E8E84-426E-40DD-AFC4-6F175D3DCCD1}">
-                <a14:hiddenFill xmlns="" xmlns:a14="http://schemas.microsoft.com/office/drawing/2010/main">
+                <a14:hiddenFill xmlns:a14="http://schemas.microsoft.com/office/drawing/2010/main">
                   <a:solidFill>
                     <a:srgbClr val="FFFFFF"/>
                   </a:solidFill>
@@ -14085,7 +17537,7 @@
             <a:blip r:embed="rId5" cstate="print">
               <a:extLst>
                 <a:ext uri="{28A0092B-C50C-407E-A947-70E740481C1C}">
-                  <a14:useLocalDpi xmlns="" xmlns:a14="http://schemas.microsoft.com/office/drawing/2010/main" val="0"/>
+                  <a14:useLocalDpi xmlns:a14="http://schemas.microsoft.com/office/drawing/2010/main" val="0"/>
                 </a:ext>
               </a:extLst>
             </a:blip>
@@ -14105,7 +17557,7 @@
             <a:noFill/>
             <a:extLst>
               <a:ext uri="{909E8E84-426E-40DD-AFC4-6F175D3DCCD1}">
-                <a14:hiddenFill xmlns="" xmlns:a14="http://schemas.microsoft.com/office/drawing/2010/main">
+                <a14:hiddenFill xmlns:a14="http://schemas.microsoft.com/office/drawing/2010/main">
                   <a:solidFill>
                     <a:srgbClr val="FFFFFF"/>
                   </a:solidFill>
@@ -14126,7 +17578,7 @@
             <a:blip r:embed="rId6" cstate="print">
               <a:extLst>
                 <a:ext uri="{28A0092B-C50C-407E-A947-70E740481C1C}">
-                  <a14:useLocalDpi xmlns="" xmlns:a14="http://schemas.microsoft.com/office/drawing/2010/main" val="0"/>
+                  <a14:useLocalDpi xmlns:a14="http://schemas.microsoft.com/office/drawing/2010/main" val="0"/>
                 </a:ext>
               </a:extLst>
             </a:blip>
@@ -14146,7 +17598,7 @@
             <a:noFill/>
             <a:extLst>
               <a:ext uri="{909E8E84-426E-40DD-AFC4-6F175D3DCCD1}">
-                <a14:hiddenFill xmlns="" xmlns:a14="http://schemas.microsoft.com/office/drawing/2010/main">
+                <a14:hiddenFill xmlns:a14="http://schemas.microsoft.com/office/drawing/2010/main">
                   <a:solidFill>
                     <a:srgbClr val="FFFFFF"/>
                   </a:solidFill>
@@ -14170,9 +17622,82 @@
         </p:xfrm>
         <a:graphic>
           <a:graphicData uri="http://schemas.openxmlformats.org/presentationml/2006/ole">
-            <p:oleObj spid="_x0000_s14340" name="Ecuación" r:id="rId7" imgW="533160" imgH="431640" progId="Equation.3">
-              <p:embed/>
-            </p:oleObj>
+            <mc:AlternateContent xmlns:mc="http://schemas.openxmlformats.org/markup-compatibility/2006">
+              <mc:Choice xmlns:v="urn:schemas-microsoft-com:vml" Requires="v">
+                <p:oleObj spid="_x0000_s14353" name="Ecuación" r:id="rId7" imgW="533160" imgH="431640" progId="Equation.3">
+                  <p:embed/>
+                </p:oleObj>
+              </mc:Choice>
+              <mc:Fallback>
+                <p:oleObj name="Ecuación" r:id="rId7" imgW="533160" imgH="431640" progId="Equation.3">
+                  <p:embed/>
+                  <p:pic>
+                    <p:nvPicPr>
+                      <p:cNvPr id="0" name="Picture 4"/>
+                      <p:cNvPicPr>
+                        <a:picLocks noChangeAspect="1" noChangeArrowheads="1"/>
+                      </p:cNvPicPr>
+                      <p:nvPr/>
+                    </p:nvPicPr>
+                    <p:blipFill>
+                      <a:blip r:embed="rId8">
+                        <a:extLst>
+                          <a:ext uri="{28A0092B-C50C-407E-A947-70E740481C1C}">
+                            <a14:useLocalDpi xmlns:a14="http://schemas.microsoft.com/office/drawing/2010/main" val="0"/>
+                          </a:ext>
+                        </a:extLst>
+                      </a:blip>
+                      <a:srcRect/>
+                      <a:stretch>
+                        <a:fillRect/>
+                      </a:stretch>
+                    </p:blipFill>
+                    <p:spPr bwMode="auto">
+                      <a:xfrm>
+                        <a:off x="6959302" y="4005064"/>
+                        <a:ext cx="1008112" cy="816091"/>
+                      </a:xfrm>
+                      <a:prstGeom prst="rect">
+                        <a:avLst/>
+                      </a:prstGeom>
+                      <a:noFill/>
+                      <a:ln>
+                        <a:noFill/>
+                      </a:ln>
+                      <a:effectLst/>
+                      <a:extLst>
+                        <a:ext uri="{909E8E84-426E-40DD-AFC4-6F175D3DCCD1}">
+                          <a14:hiddenFill xmlns:a14="http://schemas.microsoft.com/office/drawing/2010/main">
+                            <a:solidFill>
+                              <a:schemeClr val="accent1"/>
+                            </a:solidFill>
+                          </a14:hiddenFill>
+                        </a:ext>
+                        <a:ext uri="{91240B29-F687-4F45-9708-019B960494DF}">
+                          <a14:hiddenLine xmlns:a14="http://schemas.microsoft.com/office/drawing/2010/main" w="9525">
+                            <a:solidFill>
+                              <a:schemeClr val="tx1"/>
+                            </a:solidFill>
+                            <a:miter lim="800000"/>
+                            <a:headEnd/>
+                            <a:tailEnd/>
+                          </a14:hiddenLine>
+                        </a:ext>
+                        <a:ext uri="{AF507438-7753-43E0-B8FC-AC1667EBCBE1}">
+                          <a14:hiddenEffects xmlns:a14="http://schemas.microsoft.com/office/drawing/2010/main">
+                            <a:effectLst>
+                              <a:outerShdw dist="35921" dir="2700000" algn="ctr" rotWithShape="0">
+                                <a:schemeClr val="bg2"/>
+                              </a:outerShdw>
+                            </a:effectLst>
+                          </a14:hiddenEffects>
+                        </a:ext>
+                      </a:extLst>
+                    </p:spPr>
+                  </p:pic>
+                </p:oleObj>
+              </mc:Fallback>
+            </mc:AlternateContent>
           </a:graphicData>
         </a:graphic>
       </p:graphicFrame>
@@ -14292,7 +17817,7 @@
             <a:blip r:embed="rId2" cstate="print">
               <a:extLst>
                 <a:ext uri="{28A0092B-C50C-407E-A947-70E740481C1C}">
-                  <a14:useLocalDpi xmlns="" xmlns:a14="http://schemas.microsoft.com/office/drawing/2010/main" val="0"/>
+                  <a14:useLocalDpi xmlns:a14="http://schemas.microsoft.com/office/drawing/2010/main" val="0"/>
                 </a:ext>
               </a:extLst>
             </a:blip>
@@ -14312,7 +17837,7 @@
             <a:noFill/>
             <a:extLst>
               <a:ext uri="{909E8E84-426E-40DD-AFC4-6F175D3DCCD1}">
-                <a14:hiddenFill xmlns="" xmlns:a14="http://schemas.microsoft.com/office/drawing/2010/main">
+                <a14:hiddenFill xmlns:a14="http://schemas.microsoft.com/office/drawing/2010/main">
                   <a:solidFill>
                     <a:srgbClr val="FFFFFF"/>
                   </a:solidFill>
@@ -14333,7 +17858,7 @@
             <a:blip r:embed="rId3" cstate="print">
               <a:extLst>
                 <a:ext uri="{28A0092B-C50C-407E-A947-70E740481C1C}">
-                  <a14:useLocalDpi xmlns="" xmlns:a14="http://schemas.microsoft.com/office/drawing/2010/main" val="0"/>
+                  <a14:useLocalDpi xmlns:a14="http://schemas.microsoft.com/office/drawing/2010/main" val="0"/>
                 </a:ext>
               </a:extLst>
             </a:blip>
@@ -14353,7 +17878,7 @@
             <a:noFill/>
             <a:extLst>
               <a:ext uri="{909E8E84-426E-40DD-AFC4-6F175D3DCCD1}">
-                <a14:hiddenFill xmlns="" xmlns:a14="http://schemas.microsoft.com/office/drawing/2010/main">
+                <a14:hiddenFill xmlns:a14="http://schemas.microsoft.com/office/drawing/2010/main">
                   <a:solidFill>
                     <a:srgbClr val="FFFFFF"/>
                   </a:solidFill>
@@ -14374,7 +17899,7 @@
             <a:blip r:embed="rId4" cstate="print">
               <a:extLst>
                 <a:ext uri="{28A0092B-C50C-407E-A947-70E740481C1C}">
-                  <a14:useLocalDpi xmlns="" xmlns:a14="http://schemas.microsoft.com/office/drawing/2010/main" val="0"/>
+                  <a14:useLocalDpi xmlns:a14="http://schemas.microsoft.com/office/drawing/2010/main" val="0"/>
                 </a:ext>
               </a:extLst>
             </a:blip>
@@ -14394,7 +17919,7 @@
             <a:noFill/>
             <a:extLst>
               <a:ext uri="{909E8E84-426E-40DD-AFC4-6F175D3DCCD1}">
-                <a14:hiddenFill xmlns="" xmlns:a14="http://schemas.microsoft.com/office/drawing/2010/main">
+                <a14:hiddenFill xmlns:a14="http://schemas.microsoft.com/office/drawing/2010/main">
                   <a:solidFill>
                     <a:srgbClr val="FFFFFF"/>
                   </a:solidFill>
@@ -14860,11 +18385,7 @@
                       </a:r>
                       <a:r>
                         <a:rPr lang="es-MX" sz="1600" u="none" strike="noStrike" noProof="0" dirty="0" smtClean="0"/>
-                        <a:t>apturas </a:t>
-                      </a:r>
-                      <a:r>
-                        <a:rPr lang="es-MX" sz="1600" u="none" strike="noStrike" noProof="0" dirty="0" smtClean="0"/>
-                        <a:t>anuales de todas las especies aprovechadas.</a:t>
+                        <a:t>apturas anuales de todas las especies aprovechadas.</a:t>
                       </a:r>
                       <a:endParaRPr lang="es-MX" sz="1600" b="0" i="0" u="none" strike="noStrike" noProof="0" dirty="0">
                         <a:solidFill>
@@ -14982,16 +18503,7 @@
                           </a:solidFill>
                           <a:latin typeface="+mj-lt"/>
                         </a:rPr>
-                        <a:t>apturas </a:t>
-                      </a:r>
-                      <a:r>
-                        <a:rPr lang="es-MX" sz="1600" b="0" i="0" u="none" strike="noStrike" noProof="0" dirty="0" smtClean="0">
-                          <a:solidFill>
-                            <a:srgbClr val="000000"/>
-                          </a:solidFill>
-                          <a:latin typeface="+mj-lt"/>
-                        </a:rPr>
-                        <a:t>anuales de las especies para</a:t>
+                        <a:t>apturas anuales de las especies para</a:t>
                       </a:r>
                       <a:r>
                         <a:rPr lang="es-MX" sz="1600" b="0" i="0" u="none" strike="noStrike" baseline="0" noProof="0" dirty="0" smtClean="0">
@@ -15360,7 +18872,7 @@
             <a:blip r:embed="rId2" cstate="print">
               <a:extLst>
                 <a:ext uri="{28A0092B-C50C-407E-A947-70E740481C1C}">
-                  <a14:useLocalDpi xmlns="" xmlns:a14="http://schemas.microsoft.com/office/drawing/2010/main" val="0"/>
+                  <a14:useLocalDpi xmlns:a14="http://schemas.microsoft.com/office/drawing/2010/main" val="0"/>
                 </a:ext>
               </a:extLst>
             </a:blip>
@@ -15380,7 +18892,7 @@
             <a:noFill/>
             <a:extLst>
               <a:ext uri="{909E8E84-426E-40DD-AFC4-6F175D3DCCD1}">
-                <a14:hiddenFill xmlns="" xmlns:a14="http://schemas.microsoft.com/office/drawing/2010/main">
+                <a14:hiddenFill xmlns:a14="http://schemas.microsoft.com/office/drawing/2010/main">
                   <a:solidFill>
                     <a:srgbClr val="FFFFFF"/>
                   </a:solidFill>
@@ -15401,7 +18913,7 @@
             <a:blip r:embed="rId3" cstate="print">
               <a:extLst>
                 <a:ext uri="{28A0092B-C50C-407E-A947-70E740481C1C}">
-                  <a14:useLocalDpi xmlns="" xmlns:a14="http://schemas.microsoft.com/office/drawing/2010/main" val="0"/>
+                  <a14:useLocalDpi xmlns:a14="http://schemas.microsoft.com/office/drawing/2010/main" val="0"/>
                 </a:ext>
               </a:extLst>
             </a:blip>
@@ -15421,7 +18933,7 @@
             <a:noFill/>
             <a:extLst>
               <a:ext uri="{909E8E84-426E-40DD-AFC4-6F175D3DCCD1}">
-                <a14:hiddenFill xmlns="" xmlns:a14="http://schemas.microsoft.com/office/drawing/2010/main">
+                <a14:hiddenFill xmlns:a14="http://schemas.microsoft.com/office/drawing/2010/main">
                   <a:solidFill>
                     <a:srgbClr val="FFFFFF"/>
                   </a:solidFill>
@@ -15442,7 +18954,7 @@
             <a:blip r:embed="rId4" cstate="print">
               <a:extLst>
                 <a:ext uri="{28A0092B-C50C-407E-A947-70E740481C1C}">
-                  <a14:useLocalDpi xmlns="" xmlns:a14="http://schemas.microsoft.com/office/drawing/2010/main" val="0"/>
+                  <a14:useLocalDpi xmlns:a14="http://schemas.microsoft.com/office/drawing/2010/main" val="0"/>
                 </a:ext>
               </a:extLst>
             </a:blip>
@@ -15462,7 +18974,7 @@
             <a:noFill/>
             <a:extLst>
               <a:ext uri="{909E8E84-426E-40DD-AFC4-6F175D3DCCD1}">
-                <a14:hiddenFill xmlns="" xmlns:a14="http://schemas.microsoft.com/office/drawing/2010/main">
+                <a14:hiddenFill xmlns:a14="http://schemas.microsoft.com/office/drawing/2010/main">
                   <a:solidFill>
                     <a:srgbClr val="FFFFFF"/>
                   </a:solidFill>

</xml_diff>

<commit_message>
Updated the notes from the workshop
</commit_message>
<xml_diff>
--- a/Presentations/Workshop in Mexico/Mexico Workshop.pptx
+++ b/Presentations/Workshop in Mexico/Mexico Workshop.pptx
@@ -127,7 +127,7 @@
   </p:defaultTextStyle>
   <p:extLst>
     <p:ext uri="{EFAFB233-063F-42B5-8137-9DF3F51BA10A}">
-      <p15:sldGuideLst xmlns:p15="http://schemas.microsoft.com/office/powerpoint/2012/main" xmlns="">
+      <p15:sldGuideLst xmlns="" xmlns:p15="http://schemas.microsoft.com/office/powerpoint/2012/main">
         <p15:guide id="1" orient="horz" pos="2160">
           <p15:clr>
             <a:srgbClr val="A4A3A4"/>
@@ -227,7 +227,7 @@
             <a:fld id="{DA3D7982-6D12-44B7-B09C-9027420CE024}" type="datetimeFigureOut">
               <a:rPr lang="es-MX" smtClean="0"/>
               <a:pPr/>
-              <a:t>10/10/2016</a:t>
+              <a:t>11/10/2016</a:t>
             </a:fld>
             <a:endParaRPr lang="es-MX" dirty="0"/>
           </a:p>
@@ -398,7 +398,7 @@
     </p:spTree>
     <p:extLst>
       <p:ext uri="{BB962C8B-B14F-4D97-AF65-F5344CB8AC3E}">
-        <p14:creationId xmlns:p14="http://schemas.microsoft.com/office/powerpoint/2010/main" xmlns="" val="368796389"/>
+        <p14:creationId xmlns="" xmlns:p14="http://schemas.microsoft.com/office/powerpoint/2010/main" val="368796389"/>
       </p:ext>
     </p:extLst>
   </p:cSld>
@@ -577,7 +577,7 @@
     </p:spTree>
     <p:extLst>
       <p:ext uri="{BB962C8B-B14F-4D97-AF65-F5344CB8AC3E}">
-        <p14:creationId xmlns:p14="http://schemas.microsoft.com/office/powerpoint/2010/main" xmlns="" val="3478287038"/>
+        <p14:creationId xmlns="" xmlns:p14="http://schemas.microsoft.com/office/powerpoint/2010/main" val="3478287038"/>
       </p:ext>
     </p:extLst>
   </p:cSld>
@@ -664,7 +664,7 @@
     </p:spTree>
     <p:extLst>
       <p:ext uri="{BB962C8B-B14F-4D97-AF65-F5344CB8AC3E}">
-        <p14:creationId xmlns:p14="http://schemas.microsoft.com/office/powerpoint/2010/main" xmlns="" val="3981295864"/>
+        <p14:creationId xmlns="" xmlns:p14="http://schemas.microsoft.com/office/powerpoint/2010/main" val="3981295864"/>
       </p:ext>
     </p:extLst>
   </p:cSld>
@@ -805,7 +805,7 @@
     </p:spTree>
     <p:extLst>
       <p:ext uri="{BB962C8B-B14F-4D97-AF65-F5344CB8AC3E}">
-        <p14:creationId xmlns:p14="http://schemas.microsoft.com/office/powerpoint/2010/main" xmlns="" val="3247054436"/>
+        <p14:creationId xmlns="" xmlns:p14="http://schemas.microsoft.com/office/powerpoint/2010/main" val="3247054436"/>
       </p:ext>
     </p:extLst>
   </p:cSld>
@@ -894,7 +894,7 @@
     </p:spTree>
     <p:extLst>
       <p:ext uri="{BB962C8B-B14F-4D97-AF65-F5344CB8AC3E}">
-        <p14:creationId xmlns:p14="http://schemas.microsoft.com/office/powerpoint/2010/main" xmlns="" val="1333304386"/>
+        <p14:creationId xmlns="" xmlns:p14="http://schemas.microsoft.com/office/powerpoint/2010/main" val="1333304386"/>
       </p:ext>
     </p:extLst>
   </p:cSld>
@@ -1067,7 +1067,7 @@
     </p:spTree>
     <p:extLst>
       <p:ext uri="{BB962C8B-B14F-4D97-AF65-F5344CB8AC3E}">
-        <p14:creationId xmlns:p14="http://schemas.microsoft.com/office/powerpoint/2010/main" xmlns="" val="677977679"/>
+        <p14:creationId xmlns="" xmlns:p14="http://schemas.microsoft.com/office/powerpoint/2010/main" val="677977679"/>
       </p:ext>
     </p:extLst>
   </p:cSld>
@@ -1259,7 +1259,7 @@
             <a:fld id="{67970304-9F4D-4A06-BCEA-E573EFCCD4CE}" type="datetimeFigureOut">
               <a:rPr lang="es-MX" smtClean="0"/>
               <a:pPr/>
-              <a:t>10/10/2016</a:t>
+              <a:t>11/10/2016</a:t>
             </a:fld>
             <a:endParaRPr lang="es-MX" dirty="0"/>
           </a:p>
@@ -1426,7 +1426,7 @@
             <a:fld id="{67970304-9F4D-4A06-BCEA-E573EFCCD4CE}" type="datetimeFigureOut">
               <a:rPr lang="es-MX" smtClean="0"/>
               <a:pPr/>
-              <a:t>10/10/2016</a:t>
+              <a:t>11/10/2016</a:t>
             </a:fld>
             <a:endParaRPr lang="es-MX" dirty="0"/>
           </a:p>
@@ -1603,7 +1603,7 @@
             <a:fld id="{67970304-9F4D-4A06-BCEA-E573EFCCD4CE}" type="datetimeFigureOut">
               <a:rPr lang="es-MX" smtClean="0"/>
               <a:pPr/>
-              <a:t>10/10/2016</a:t>
+              <a:t>11/10/2016</a:t>
             </a:fld>
             <a:endParaRPr lang="es-MX" dirty="0"/>
           </a:p>
@@ -1770,7 +1770,7 @@
             <a:fld id="{67970304-9F4D-4A06-BCEA-E573EFCCD4CE}" type="datetimeFigureOut">
               <a:rPr lang="es-MX" smtClean="0"/>
               <a:pPr/>
-              <a:t>10/10/2016</a:t>
+              <a:t>11/10/2016</a:t>
             </a:fld>
             <a:endParaRPr lang="es-MX" dirty="0"/>
           </a:p>
@@ -2013,7 +2013,7 @@
             <a:fld id="{67970304-9F4D-4A06-BCEA-E573EFCCD4CE}" type="datetimeFigureOut">
               <a:rPr lang="es-MX" smtClean="0"/>
               <a:pPr/>
-              <a:t>10/10/2016</a:t>
+              <a:t>11/10/2016</a:t>
             </a:fld>
             <a:endParaRPr lang="es-MX" dirty="0"/>
           </a:p>
@@ -2298,7 +2298,7 @@
             <a:fld id="{67970304-9F4D-4A06-BCEA-E573EFCCD4CE}" type="datetimeFigureOut">
               <a:rPr lang="es-MX" smtClean="0"/>
               <a:pPr/>
-              <a:t>10/10/2016</a:t>
+              <a:t>11/10/2016</a:t>
             </a:fld>
             <a:endParaRPr lang="es-MX" dirty="0"/>
           </a:p>
@@ -2717,7 +2717,7 @@
             <a:fld id="{67970304-9F4D-4A06-BCEA-E573EFCCD4CE}" type="datetimeFigureOut">
               <a:rPr lang="es-MX" smtClean="0"/>
               <a:pPr/>
-              <a:t>10/10/2016</a:t>
+              <a:t>11/10/2016</a:t>
             </a:fld>
             <a:endParaRPr lang="es-MX" dirty="0"/>
           </a:p>
@@ -2832,7 +2832,7 @@
             <a:fld id="{67970304-9F4D-4A06-BCEA-E573EFCCD4CE}" type="datetimeFigureOut">
               <a:rPr lang="es-MX" smtClean="0"/>
               <a:pPr/>
-              <a:t>10/10/2016</a:t>
+              <a:t>11/10/2016</a:t>
             </a:fld>
             <a:endParaRPr lang="es-MX" dirty="0"/>
           </a:p>
@@ -2924,7 +2924,7 @@
             <a:fld id="{67970304-9F4D-4A06-BCEA-E573EFCCD4CE}" type="datetimeFigureOut">
               <a:rPr lang="es-MX" smtClean="0"/>
               <a:pPr/>
-              <a:t>10/10/2016</a:t>
+              <a:t>11/10/2016</a:t>
             </a:fld>
             <a:endParaRPr lang="es-MX" dirty="0"/>
           </a:p>
@@ -3198,7 +3198,7 @@
             <a:fld id="{67970304-9F4D-4A06-BCEA-E573EFCCD4CE}" type="datetimeFigureOut">
               <a:rPr lang="es-MX" smtClean="0"/>
               <a:pPr/>
-              <a:t>10/10/2016</a:t>
+              <a:t>11/10/2016</a:t>
             </a:fld>
             <a:endParaRPr lang="es-MX" dirty="0"/>
           </a:p>
@@ -3448,7 +3448,7 @@
             <a:fld id="{67970304-9F4D-4A06-BCEA-E573EFCCD4CE}" type="datetimeFigureOut">
               <a:rPr lang="es-MX" smtClean="0"/>
               <a:pPr/>
-              <a:t>10/10/2016</a:t>
+              <a:t>11/10/2016</a:t>
             </a:fld>
             <a:endParaRPr lang="es-MX" dirty="0"/>
           </a:p>
@@ -3658,7 +3658,7 @@
             <a:fld id="{67970304-9F4D-4A06-BCEA-E573EFCCD4CE}" type="datetimeFigureOut">
               <a:rPr lang="es-MX" smtClean="0"/>
               <a:pPr/>
-              <a:t>10/10/2016</a:t>
+              <a:t>11/10/2016</a:t>
             </a:fld>
             <a:endParaRPr lang="es-MX" dirty="0"/>
           </a:p>
@@ -4041,7 +4041,7 @@
           <a:blip r:embed="rId2" cstate="print">
             <a:extLst>
               <a:ext uri="{28A0092B-C50C-407E-A947-70E740481C1C}">
-                <a14:useLocalDpi xmlns:a14="http://schemas.microsoft.com/office/drawing/2010/main" xmlns="" val="0"/>
+                <a14:useLocalDpi xmlns="" xmlns:a14="http://schemas.microsoft.com/office/drawing/2010/main" val="0"/>
               </a:ext>
             </a:extLst>
           </a:blip>
@@ -4061,7 +4061,7 @@
           <a:noFill/>
           <a:extLst>
             <a:ext uri="{909E8E84-426E-40DD-AFC4-6F175D3DCCD1}">
-              <a14:hiddenFill xmlns:a14="http://schemas.microsoft.com/office/drawing/2010/main" xmlns="">
+              <a14:hiddenFill xmlns="" xmlns:a14="http://schemas.microsoft.com/office/drawing/2010/main">
                 <a:solidFill>
                   <a:srgbClr val="FFFFFF"/>
                 </a:solidFill>
@@ -4082,7 +4082,7 @@
           <a:blip r:embed="rId3" cstate="print">
             <a:extLst>
               <a:ext uri="{28A0092B-C50C-407E-A947-70E740481C1C}">
-                <a14:useLocalDpi xmlns:a14="http://schemas.microsoft.com/office/drawing/2010/main" xmlns="" val="0"/>
+                <a14:useLocalDpi xmlns="" xmlns:a14="http://schemas.microsoft.com/office/drawing/2010/main" val="0"/>
               </a:ext>
             </a:extLst>
           </a:blip>
@@ -4102,7 +4102,7 @@
           <a:noFill/>
           <a:extLst>
             <a:ext uri="{909E8E84-426E-40DD-AFC4-6F175D3DCCD1}">
-              <a14:hiddenFill xmlns:a14="http://schemas.microsoft.com/office/drawing/2010/main" xmlns="">
+              <a14:hiddenFill xmlns="" xmlns:a14="http://schemas.microsoft.com/office/drawing/2010/main">
                 <a:solidFill>
                   <a:srgbClr val="FFFFFF"/>
                 </a:solidFill>
@@ -4259,7 +4259,7 @@
           <a:blip r:embed="rId4" cstate="print">
             <a:extLst>
               <a:ext uri="{28A0092B-C50C-407E-A947-70E740481C1C}">
-                <a14:useLocalDpi xmlns:a14="http://schemas.microsoft.com/office/drawing/2010/main" xmlns="" val="0"/>
+                <a14:useLocalDpi xmlns="" xmlns:a14="http://schemas.microsoft.com/office/drawing/2010/main" val="0"/>
               </a:ext>
             </a:extLst>
           </a:blip>
@@ -4279,7 +4279,7 @@
           <a:noFill/>
           <a:extLst>
             <a:ext uri="{909E8E84-426E-40DD-AFC4-6F175D3DCCD1}">
-              <a14:hiddenFill xmlns:a14="http://schemas.microsoft.com/office/drawing/2010/main" xmlns="">
+              <a14:hiddenFill xmlns="" xmlns:a14="http://schemas.microsoft.com/office/drawing/2010/main">
                 <a:solidFill>
                   <a:srgbClr val="FFFFFF"/>
                 </a:solidFill>
@@ -4404,7 +4404,7 @@
             <a:blip r:embed="rId3" cstate="print">
               <a:extLst>
                 <a:ext uri="{28A0092B-C50C-407E-A947-70E740481C1C}">
-                  <a14:useLocalDpi xmlns:a14="http://schemas.microsoft.com/office/drawing/2010/main" xmlns="" val="0"/>
+                  <a14:useLocalDpi xmlns="" xmlns:a14="http://schemas.microsoft.com/office/drawing/2010/main" val="0"/>
                 </a:ext>
               </a:extLst>
             </a:blip>
@@ -4424,7 +4424,7 @@
             <a:noFill/>
             <a:extLst>
               <a:ext uri="{909E8E84-426E-40DD-AFC4-6F175D3DCCD1}">
-                <a14:hiddenFill xmlns:a14="http://schemas.microsoft.com/office/drawing/2010/main" xmlns="">
+                <a14:hiddenFill xmlns="" xmlns:a14="http://schemas.microsoft.com/office/drawing/2010/main">
                   <a:solidFill>
                     <a:srgbClr val="FFFFFF"/>
                   </a:solidFill>
@@ -4445,7 +4445,7 @@
             <a:blip r:embed="rId4" cstate="print">
               <a:extLst>
                 <a:ext uri="{28A0092B-C50C-407E-A947-70E740481C1C}">
-                  <a14:useLocalDpi xmlns:a14="http://schemas.microsoft.com/office/drawing/2010/main" xmlns="" val="0"/>
+                  <a14:useLocalDpi xmlns="" xmlns:a14="http://schemas.microsoft.com/office/drawing/2010/main" val="0"/>
                 </a:ext>
               </a:extLst>
             </a:blip>
@@ -4465,7 +4465,7 @@
             <a:noFill/>
             <a:extLst>
               <a:ext uri="{909E8E84-426E-40DD-AFC4-6F175D3DCCD1}">
-                <a14:hiddenFill xmlns:a14="http://schemas.microsoft.com/office/drawing/2010/main" xmlns="">
+                <a14:hiddenFill xmlns="" xmlns:a14="http://schemas.microsoft.com/office/drawing/2010/main">
                   <a:solidFill>
                     <a:srgbClr val="FFFFFF"/>
                   </a:solidFill>
@@ -4486,7 +4486,7 @@
             <a:blip r:embed="rId5" cstate="print">
               <a:extLst>
                 <a:ext uri="{28A0092B-C50C-407E-A947-70E740481C1C}">
-                  <a14:useLocalDpi xmlns:a14="http://schemas.microsoft.com/office/drawing/2010/main" xmlns="" val="0"/>
+                  <a14:useLocalDpi xmlns="" xmlns:a14="http://schemas.microsoft.com/office/drawing/2010/main" val="0"/>
                 </a:ext>
               </a:extLst>
             </a:blip>
@@ -4506,7 +4506,7 @@
             <a:noFill/>
             <a:extLst>
               <a:ext uri="{909E8E84-426E-40DD-AFC4-6F175D3DCCD1}">
-                <a14:hiddenFill xmlns:a14="http://schemas.microsoft.com/office/drawing/2010/main" xmlns="">
+                <a14:hiddenFill xmlns="" xmlns:a14="http://schemas.microsoft.com/office/drawing/2010/main">
                   <a:solidFill>
                     <a:srgbClr val="FFFFFF"/>
                   </a:solidFill>
@@ -5210,7 +5210,7 @@
             <a:blip r:embed="rId2" cstate="print">
               <a:extLst>
                 <a:ext uri="{28A0092B-C50C-407E-A947-70E740481C1C}">
-                  <a14:useLocalDpi xmlns:a14="http://schemas.microsoft.com/office/drawing/2010/main" xmlns="" val="0"/>
+                  <a14:useLocalDpi xmlns="" xmlns:a14="http://schemas.microsoft.com/office/drawing/2010/main" val="0"/>
                 </a:ext>
               </a:extLst>
             </a:blip>
@@ -5230,7 +5230,7 @@
             <a:noFill/>
             <a:extLst>
               <a:ext uri="{909E8E84-426E-40DD-AFC4-6F175D3DCCD1}">
-                <a14:hiddenFill xmlns:a14="http://schemas.microsoft.com/office/drawing/2010/main" xmlns="">
+                <a14:hiddenFill xmlns="" xmlns:a14="http://schemas.microsoft.com/office/drawing/2010/main">
                   <a:solidFill>
                     <a:srgbClr val="FFFFFF"/>
                   </a:solidFill>
@@ -5251,7 +5251,7 @@
             <a:blip r:embed="rId3" cstate="print">
               <a:extLst>
                 <a:ext uri="{28A0092B-C50C-407E-A947-70E740481C1C}">
-                  <a14:useLocalDpi xmlns:a14="http://schemas.microsoft.com/office/drawing/2010/main" xmlns="" val="0"/>
+                  <a14:useLocalDpi xmlns="" xmlns:a14="http://schemas.microsoft.com/office/drawing/2010/main" val="0"/>
                 </a:ext>
               </a:extLst>
             </a:blip>
@@ -5271,7 +5271,7 @@
             <a:noFill/>
             <a:extLst>
               <a:ext uri="{909E8E84-426E-40DD-AFC4-6F175D3DCCD1}">
-                <a14:hiddenFill xmlns:a14="http://schemas.microsoft.com/office/drawing/2010/main" xmlns="">
+                <a14:hiddenFill xmlns="" xmlns:a14="http://schemas.microsoft.com/office/drawing/2010/main">
                   <a:solidFill>
                     <a:srgbClr val="FFFFFF"/>
                   </a:solidFill>
@@ -5292,7 +5292,7 @@
             <a:blip r:embed="rId4" cstate="print">
               <a:extLst>
                 <a:ext uri="{28A0092B-C50C-407E-A947-70E740481C1C}">
-                  <a14:useLocalDpi xmlns:a14="http://schemas.microsoft.com/office/drawing/2010/main" xmlns="" val="0"/>
+                  <a14:useLocalDpi xmlns="" xmlns:a14="http://schemas.microsoft.com/office/drawing/2010/main" val="0"/>
                 </a:ext>
               </a:extLst>
             </a:blip>
@@ -5312,7 +5312,7 @@
             <a:noFill/>
             <a:extLst>
               <a:ext uri="{909E8E84-426E-40DD-AFC4-6F175D3DCCD1}">
-                <a14:hiddenFill xmlns:a14="http://schemas.microsoft.com/office/drawing/2010/main" xmlns="">
+                <a14:hiddenFill xmlns="" xmlns:a14="http://schemas.microsoft.com/office/drawing/2010/main">
                   <a:solidFill>
                     <a:srgbClr val="FFFFFF"/>
                   </a:solidFill>
@@ -6226,7 +6226,7 @@
               <a:blip r:embed="rId2" cstate="print">
                 <a:extLst>
                   <a:ext uri="{28A0092B-C50C-407E-A947-70E740481C1C}">
-                    <a14:useLocalDpi xmlns:a14="http://schemas.microsoft.com/office/drawing/2010/main" xmlns="" val="0"/>
+                    <a14:useLocalDpi xmlns="" xmlns:a14="http://schemas.microsoft.com/office/drawing/2010/main" val="0"/>
                   </a:ext>
                 </a:extLst>
               </a:blip>
@@ -6246,7 +6246,7 @@
               <a:noFill/>
               <a:extLst>
                 <a:ext uri="{909E8E84-426E-40DD-AFC4-6F175D3DCCD1}">
-                  <a14:hiddenFill xmlns:a14="http://schemas.microsoft.com/office/drawing/2010/main" xmlns="">
+                  <a14:hiddenFill xmlns="" xmlns:a14="http://schemas.microsoft.com/office/drawing/2010/main">
                     <a:solidFill>
                       <a:srgbClr val="FFFFFF"/>
                     </a:solidFill>
@@ -6267,7 +6267,7 @@
               <a:blip r:embed="rId3" cstate="print">
                 <a:extLst>
                   <a:ext uri="{28A0092B-C50C-407E-A947-70E740481C1C}">
-                    <a14:useLocalDpi xmlns:a14="http://schemas.microsoft.com/office/drawing/2010/main" xmlns="" val="0"/>
+                    <a14:useLocalDpi xmlns="" xmlns:a14="http://schemas.microsoft.com/office/drawing/2010/main" val="0"/>
                   </a:ext>
                 </a:extLst>
               </a:blip>
@@ -6287,7 +6287,7 @@
               <a:noFill/>
               <a:extLst>
                 <a:ext uri="{909E8E84-426E-40DD-AFC4-6F175D3DCCD1}">
-                  <a14:hiddenFill xmlns:a14="http://schemas.microsoft.com/office/drawing/2010/main" xmlns="">
+                  <a14:hiddenFill xmlns="" xmlns:a14="http://schemas.microsoft.com/office/drawing/2010/main">
                     <a:solidFill>
                       <a:srgbClr val="FFFFFF"/>
                     </a:solidFill>
@@ -6308,7 +6308,7 @@
               <a:blip r:embed="rId4" cstate="print">
                 <a:extLst>
                   <a:ext uri="{28A0092B-C50C-407E-A947-70E740481C1C}">
-                    <a14:useLocalDpi xmlns:a14="http://schemas.microsoft.com/office/drawing/2010/main" xmlns="" val="0"/>
+                    <a14:useLocalDpi xmlns="" xmlns:a14="http://schemas.microsoft.com/office/drawing/2010/main" val="0"/>
                   </a:ext>
                 </a:extLst>
               </a:blip>
@@ -6328,7 +6328,7 @@
               <a:noFill/>
               <a:extLst>
                 <a:ext uri="{909E8E84-426E-40DD-AFC4-6F175D3DCCD1}">
-                  <a14:hiddenFill xmlns:a14="http://schemas.microsoft.com/office/drawing/2010/main" xmlns="">
+                  <a14:hiddenFill xmlns="" xmlns:a14="http://schemas.microsoft.com/office/drawing/2010/main">
                     <a:solidFill>
                       <a:srgbClr val="FFFFFF"/>
                     </a:solidFill>
@@ -6389,7 +6389,7 @@
             <p:ph idx="1"/>
             <p:extLst>
               <p:ext uri="{D42A27DB-BD31-4B8C-83A1-F6EECF244321}">
-                <p14:modId xmlns:p14="http://schemas.microsoft.com/office/powerpoint/2010/main" xmlns="" val="842756025"/>
+                <p14:modId xmlns="" xmlns:p14="http://schemas.microsoft.com/office/powerpoint/2010/main" val="842756025"/>
               </p:ext>
             </p:extLst>
           </p:nvPr>
@@ -6543,10 +6543,10 @@
                     <a:lstStyle/>
                     <a:p>
                       <a:r>
-                        <a:rPr lang="es-MX" noProof="0" dirty="0" smtClean="0"/>
+                        <a:rPr lang="es-MX" b="1" noProof="0" dirty="0" smtClean="0"/>
                         <a:t>Recuperar especies de interés comercial</a:t>
                       </a:r>
-                      <a:endParaRPr lang="es-MX" noProof="0" dirty="0"/>
+                      <a:endParaRPr lang="es-MX" b="1" noProof="0" dirty="0"/>
                     </a:p>
                   </a:txBody>
                   <a:tcPr/>
@@ -6870,14 +6870,14 @@
                     <a:lstStyle/>
                     <a:p>
                       <a:r>
-                        <a:rPr lang="es-MX" noProof="0" dirty="0" smtClean="0"/>
+                        <a:rPr lang="es-MX" b="1" noProof="0" dirty="0" smtClean="0"/>
                         <a:t>Evitar que</a:t>
                       </a:r>
                       <a:r>
-                        <a:rPr lang="es-MX" baseline="0" noProof="0" dirty="0" smtClean="0"/>
+                        <a:rPr lang="es-MX" b="1" baseline="0" noProof="0" dirty="0" smtClean="0"/>
                         <a:t> se llegue a la sobreexplotación</a:t>
                       </a:r>
-                      <a:endParaRPr lang="es-MX" noProof="0" dirty="0"/>
+                      <a:endParaRPr lang="es-MX" b="1" noProof="0" dirty="0"/>
                     </a:p>
                   </a:txBody>
                   <a:tcPr/>
@@ -6979,10 +6979,10 @@
                     <a:lstStyle/>
                     <a:p>
                       <a:r>
-                        <a:rPr lang="es-MX" noProof="0" dirty="0" smtClean="0"/>
+                        <a:rPr lang="es-MX" b="1" noProof="0" dirty="0" smtClean="0"/>
                         <a:t>Recuperar especies sobreexplotadas</a:t>
                       </a:r>
-                      <a:endParaRPr lang="es-MX" noProof="0" dirty="0"/>
+                      <a:endParaRPr lang="es-MX" b="1" noProof="0" dirty="0"/>
                     </a:p>
                   </a:txBody>
                   <a:tcPr/>
@@ -7457,7 +7457,7 @@
             <a:blip r:embed="rId2" cstate="print">
               <a:extLst>
                 <a:ext uri="{28A0092B-C50C-407E-A947-70E740481C1C}">
-                  <a14:useLocalDpi xmlns:a14="http://schemas.microsoft.com/office/drawing/2010/main" xmlns="" val="0"/>
+                  <a14:useLocalDpi xmlns="" xmlns:a14="http://schemas.microsoft.com/office/drawing/2010/main" val="0"/>
                 </a:ext>
               </a:extLst>
             </a:blip>
@@ -7477,7 +7477,7 @@
             <a:noFill/>
             <a:extLst>
               <a:ext uri="{909E8E84-426E-40DD-AFC4-6F175D3DCCD1}">
-                <a14:hiddenFill xmlns:a14="http://schemas.microsoft.com/office/drawing/2010/main" xmlns="">
+                <a14:hiddenFill xmlns="" xmlns:a14="http://schemas.microsoft.com/office/drawing/2010/main">
                   <a:solidFill>
                     <a:srgbClr val="FFFFFF"/>
                   </a:solidFill>
@@ -7498,7 +7498,7 @@
             <a:blip r:embed="rId3" cstate="print">
               <a:extLst>
                 <a:ext uri="{28A0092B-C50C-407E-A947-70E740481C1C}">
-                  <a14:useLocalDpi xmlns:a14="http://schemas.microsoft.com/office/drawing/2010/main" xmlns="" val="0"/>
+                  <a14:useLocalDpi xmlns="" xmlns:a14="http://schemas.microsoft.com/office/drawing/2010/main" val="0"/>
                 </a:ext>
               </a:extLst>
             </a:blip>
@@ -7518,7 +7518,7 @@
             <a:noFill/>
             <a:extLst>
               <a:ext uri="{909E8E84-426E-40DD-AFC4-6F175D3DCCD1}">
-                <a14:hiddenFill xmlns:a14="http://schemas.microsoft.com/office/drawing/2010/main" xmlns="">
+                <a14:hiddenFill xmlns="" xmlns:a14="http://schemas.microsoft.com/office/drawing/2010/main">
                   <a:solidFill>
                     <a:srgbClr val="FFFFFF"/>
                   </a:solidFill>
@@ -7539,7 +7539,7 @@
             <a:blip r:embed="rId4" cstate="print">
               <a:extLst>
                 <a:ext uri="{28A0092B-C50C-407E-A947-70E740481C1C}">
-                  <a14:useLocalDpi xmlns:a14="http://schemas.microsoft.com/office/drawing/2010/main" xmlns="" val="0"/>
+                  <a14:useLocalDpi xmlns="" xmlns:a14="http://schemas.microsoft.com/office/drawing/2010/main" val="0"/>
                 </a:ext>
               </a:extLst>
             </a:blip>
@@ -7559,7 +7559,7 @@
             <a:noFill/>
             <a:extLst>
               <a:ext uri="{909E8E84-426E-40DD-AFC4-6F175D3DCCD1}">
-                <a14:hiddenFill xmlns:a14="http://schemas.microsoft.com/office/drawing/2010/main" xmlns="">
+                <a14:hiddenFill xmlns="" xmlns:a14="http://schemas.microsoft.com/office/drawing/2010/main">
                   <a:solidFill>
                     <a:srgbClr val="FFFFFF"/>
                   </a:solidFill>
@@ -7743,7 +7743,7 @@
               <a:blip r:embed="rId2" cstate="print">
                 <a:extLst>
                   <a:ext uri="{28A0092B-C50C-407E-A947-70E740481C1C}">
-                    <a14:useLocalDpi xmlns:a14="http://schemas.microsoft.com/office/drawing/2010/main" xmlns="" val="0"/>
+                    <a14:useLocalDpi xmlns="" xmlns:a14="http://schemas.microsoft.com/office/drawing/2010/main" val="0"/>
                   </a:ext>
                 </a:extLst>
               </a:blip>
@@ -7763,7 +7763,7 @@
               <a:noFill/>
               <a:extLst>
                 <a:ext uri="{909E8E84-426E-40DD-AFC4-6F175D3DCCD1}">
-                  <a14:hiddenFill xmlns:a14="http://schemas.microsoft.com/office/drawing/2010/main" xmlns="">
+                  <a14:hiddenFill xmlns="" xmlns:a14="http://schemas.microsoft.com/office/drawing/2010/main">
                     <a:solidFill>
                       <a:srgbClr val="FFFFFF"/>
                     </a:solidFill>
@@ -7784,7 +7784,7 @@
               <a:blip r:embed="rId3" cstate="print">
                 <a:extLst>
                   <a:ext uri="{28A0092B-C50C-407E-A947-70E740481C1C}">
-                    <a14:useLocalDpi xmlns:a14="http://schemas.microsoft.com/office/drawing/2010/main" xmlns="" val="0"/>
+                    <a14:useLocalDpi xmlns="" xmlns:a14="http://schemas.microsoft.com/office/drawing/2010/main" val="0"/>
                   </a:ext>
                 </a:extLst>
               </a:blip>
@@ -7804,7 +7804,7 @@
               <a:noFill/>
               <a:extLst>
                 <a:ext uri="{909E8E84-426E-40DD-AFC4-6F175D3DCCD1}">
-                  <a14:hiddenFill xmlns:a14="http://schemas.microsoft.com/office/drawing/2010/main" xmlns="">
+                  <a14:hiddenFill xmlns="" xmlns:a14="http://schemas.microsoft.com/office/drawing/2010/main">
                     <a:solidFill>
                       <a:srgbClr val="FFFFFF"/>
                     </a:solidFill>
@@ -7825,7 +7825,7 @@
               <a:blip r:embed="rId4" cstate="print">
                 <a:extLst>
                   <a:ext uri="{28A0092B-C50C-407E-A947-70E740481C1C}">
-                    <a14:useLocalDpi xmlns:a14="http://schemas.microsoft.com/office/drawing/2010/main" xmlns="" val="0"/>
+                    <a14:useLocalDpi xmlns="" xmlns:a14="http://schemas.microsoft.com/office/drawing/2010/main" val="0"/>
                   </a:ext>
                 </a:extLst>
               </a:blip>
@@ -7845,7 +7845,7 @@
               <a:noFill/>
               <a:extLst>
                 <a:ext uri="{909E8E84-426E-40DD-AFC4-6F175D3DCCD1}">
-                  <a14:hiddenFill xmlns:a14="http://schemas.microsoft.com/office/drawing/2010/main" xmlns="">
+                  <a14:hiddenFill xmlns="" xmlns:a14="http://schemas.microsoft.com/office/drawing/2010/main">
                     <a:solidFill>
                       <a:srgbClr val="FFFFFF"/>
                     </a:solidFill>
@@ -7906,7 +7906,7 @@
             <p:ph idx="1"/>
             <p:extLst>
               <p:ext uri="{D42A27DB-BD31-4B8C-83A1-F6EECF244321}">
-                <p14:modId xmlns:p14="http://schemas.microsoft.com/office/powerpoint/2010/main" xmlns="" val="1701132709"/>
+                <p14:modId xmlns="" xmlns:p14="http://schemas.microsoft.com/office/powerpoint/2010/main" val="1701132709"/>
               </p:ext>
             </p:extLst>
           </p:nvPr>
@@ -8532,7 +8532,7 @@
     </p:spTree>
     <p:extLst>
       <p:ext uri="{BB962C8B-B14F-4D97-AF65-F5344CB8AC3E}">
-        <p14:creationId xmlns:p14="http://schemas.microsoft.com/office/powerpoint/2010/main" xmlns="" val="1643352218"/>
+        <p14:creationId xmlns="" xmlns:p14="http://schemas.microsoft.com/office/powerpoint/2010/main" val="1643352218"/>
       </p:ext>
     </p:extLst>
   </p:cSld>
@@ -8620,7 +8620,7 @@
             <a:blip r:embed="rId3" cstate="print">
               <a:extLst>
                 <a:ext uri="{28A0092B-C50C-407E-A947-70E740481C1C}">
-                  <a14:useLocalDpi xmlns:a14="http://schemas.microsoft.com/office/drawing/2010/main" xmlns="" val="0"/>
+                  <a14:useLocalDpi xmlns="" xmlns:a14="http://schemas.microsoft.com/office/drawing/2010/main" val="0"/>
                 </a:ext>
               </a:extLst>
             </a:blip>
@@ -8640,7 +8640,7 @@
             <a:noFill/>
             <a:extLst>
               <a:ext uri="{909E8E84-426E-40DD-AFC4-6F175D3DCCD1}">
-                <a14:hiddenFill xmlns:a14="http://schemas.microsoft.com/office/drawing/2010/main" xmlns="">
+                <a14:hiddenFill xmlns="" xmlns:a14="http://schemas.microsoft.com/office/drawing/2010/main">
                   <a:solidFill>
                     <a:srgbClr val="FFFFFF"/>
                   </a:solidFill>
@@ -8661,7 +8661,7 @@
             <a:blip r:embed="rId4" cstate="print">
               <a:extLst>
                 <a:ext uri="{28A0092B-C50C-407E-A947-70E740481C1C}">
-                  <a14:useLocalDpi xmlns:a14="http://schemas.microsoft.com/office/drawing/2010/main" xmlns="" val="0"/>
+                  <a14:useLocalDpi xmlns="" xmlns:a14="http://schemas.microsoft.com/office/drawing/2010/main" val="0"/>
                 </a:ext>
               </a:extLst>
             </a:blip>
@@ -8681,7 +8681,7 @@
             <a:noFill/>
             <a:extLst>
               <a:ext uri="{909E8E84-426E-40DD-AFC4-6F175D3DCCD1}">
-                <a14:hiddenFill xmlns:a14="http://schemas.microsoft.com/office/drawing/2010/main" xmlns="">
+                <a14:hiddenFill xmlns="" xmlns:a14="http://schemas.microsoft.com/office/drawing/2010/main">
                   <a:solidFill>
                     <a:srgbClr val="FFFFFF"/>
                   </a:solidFill>
@@ -8702,7 +8702,7 @@
             <a:blip r:embed="rId5" cstate="print">
               <a:extLst>
                 <a:ext uri="{28A0092B-C50C-407E-A947-70E740481C1C}">
-                  <a14:useLocalDpi xmlns:a14="http://schemas.microsoft.com/office/drawing/2010/main" xmlns="" val="0"/>
+                  <a14:useLocalDpi xmlns="" xmlns:a14="http://schemas.microsoft.com/office/drawing/2010/main" val="0"/>
                 </a:ext>
               </a:extLst>
             </a:blip>
@@ -8722,7 +8722,7 @@
             <a:noFill/>
             <a:extLst>
               <a:ext uri="{909E8E84-426E-40DD-AFC4-6F175D3DCCD1}">
-                <a14:hiddenFill xmlns:a14="http://schemas.microsoft.com/office/drawing/2010/main" xmlns="">
+                <a14:hiddenFill xmlns="" xmlns:a14="http://schemas.microsoft.com/office/drawing/2010/main">
                   <a:solidFill>
                     <a:srgbClr val="FFFFFF"/>
                   </a:solidFill>
@@ -8869,11 +8869,7 @@
             </a:pPr>
             <a:r>
               <a:rPr lang="es-MX" sz="2400" dirty="0" smtClean="0"/>
-              <a:t>Nivel de </a:t>
-            </a:r>
-            <a:r>
-              <a:rPr lang="es-MX" sz="2400" dirty="0" smtClean="0"/>
-              <a:t>inclusión</a:t>
+              <a:t>Nivel de inclusión</a:t>
             </a:r>
           </a:p>
           <a:p>
@@ -8890,7 +8886,6 @@
               <a:rPr lang="es-MX" sz="3200" b="1" dirty="0" smtClean="0"/>
               <a:t>ANÁLISIS</a:t>
             </a:r>
-            <a:endParaRPr lang="es-MX" sz="3200" b="1" dirty="0" smtClean="0"/>
           </a:p>
         </p:txBody>
       </p:sp>
@@ -9070,7 +9065,7 @@
             <a:blip r:embed="rId3" cstate="print">
               <a:extLst>
                 <a:ext uri="{28A0092B-C50C-407E-A947-70E740481C1C}">
-                  <a14:useLocalDpi xmlns:a14="http://schemas.microsoft.com/office/drawing/2010/main" xmlns="" val="0"/>
+                  <a14:useLocalDpi xmlns="" xmlns:a14="http://schemas.microsoft.com/office/drawing/2010/main" val="0"/>
                 </a:ext>
               </a:extLst>
             </a:blip>
@@ -9090,7 +9085,7 @@
             <a:noFill/>
             <a:extLst>
               <a:ext uri="{909E8E84-426E-40DD-AFC4-6F175D3DCCD1}">
-                <a14:hiddenFill xmlns:a14="http://schemas.microsoft.com/office/drawing/2010/main" xmlns="">
+                <a14:hiddenFill xmlns="" xmlns:a14="http://schemas.microsoft.com/office/drawing/2010/main">
                   <a:solidFill>
                     <a:srgbClr val="FFFFFF"/>
                   </a:solidFill>
@@ -9111,7 +9106,7 @@
             <a:blip r:embed="rId4" cstate="print">
               <a:extLst>
                 <a:ext uri="{28A0092B-C50C-407E-A947-70E740481C1C}">
-                  <a14:useLocalDpi xmlns:a14="http://schemas.microsoft.com/office/drawing/2010/main" xmlns="" val="0"/>
+                  <a14:useLocalDpi xmlns="" xmlns:a14="http://schemas.microsoft.com/office/drawing/2010/main" val="0"/>
                 </a:ext>
               </a:extLst>
             </a:blip>
@@ -9131,7 +9126,7 @@
             <a:noFill/>
             <a:extLst>
               <a:ext uri="{909E8E84-426E-40DD-AFC4-6F175D3DCCD1}">
-                <a14:hiddenFill xmlns:a14="http://schemas.microsoft.com/office/drawing/2010/main" xmlns="">
+                <a14:hiddenFill xmlns="" xmlns:a14="http://schemas.microsoft.com/office/drawing/2010/main">
                   <a:solidFill>
                     <a:srgbClr val="FFFFFF"/>
                   </a:solidFill>
@@ -9152,7 +9147,7 @@
             <a:blip r:embed="rId5" cstate="print">
               <a:extLst>
                 <a:ext uri="{28A0092B-C50C-407E-A947-70E740481C1C}">
-                  <a14:useLocalDpi xmlns:a14="http://schemas.microsoft.com/office/drawing/2010/main" xmlns="" val="0"/>
+                  <a14:useLocalDpi xmlns="" xmlns:a14="http://schemas.microsoft.com/office/drawing/2010/main" val="0"/>
                 </a:ext>
               </a:extLst>
             </a:blip>
@@ -9172,7 +9167,7 @@
             <a:noFill/>
             <a:extLst>
               <a:ext uri="{909E8E84-426E-40DD-AFC4-6F175D3DCCD1}">
-                <a14:hiddenFill xmlns:a14="http://schemas.microsoft.com/office/drawing/2010/main" xmlns="">
+                <a14:hiddenFill xmlns="" xmlns:a14="http://schemas.microsoft.com/office/drawing/2010/main">
                   <a:solidFill>
                     <a:srgbClr val="FFFFFF"/>
                   </a:solidFill>
@@ -9363,7 +9358,7 @@
               <a:blip r:embed="rId2" cstate="print">
                 <a:extLst>
                   <a:ext uri="{28A0092B-C50C-407E-A947-70E740481C1C}">
-                    <a14:useLocalDpi xmlns:a14="http://schemas.microsoft.com/office/drawing/2010/main" xmlns="" val="0"/>
+                    <a14:useLocalDpi xmlns="" xmlns:a14="http://schemas.microsoft.com/office/drawing/2010/main" val="0"/>
                   </a:ext>
                 </a:extLst>
               </a:blip>
@@ -9383,7 +9378,7 @@
               <a:noFill/>
               <a:extLst>
                 <a:ext uri="{909E8E84-426E-40DD-AFC4-6F175D3DCCD1}">
-                  <a14:hiddenFill xmlns:a14="http://schemas.microsoft.com/office/drawing/2010/main" xmlns="">
+                  <a14:hiddenFill xmlns="" xmlns:a14="http://schemas.microsoft.com/office/drawing/2010/main">
                     <a:solidFill>
                       <a:srgbClr val="FFFFFF"/>
                     </a:solidFill>
@@ -9404,7 +9399,7 @@
               <a:blip r:embed="rId3" cstate="print">
                 <a:extLst>
                   <a:ext uri="{28A0092B-C50C-407E-A947-70E740481C1C}">
-                    <a14:useLocalDpi xmlns:a14="http://schemas.microsoft.com/office/drawing/2010/main" xmlns="" val="0"/>
+                    <a14:useLocalDpi xmlns="" xmlns:a14="http://schemas.microsoft.com/office/drawing/2010/main" val="0"/>
                   </a:ext>
                 </a:extLst>
               </a:blip>
@@ -9424,7 +9419,7 @@
               <a:noFill/>
               <a:extLst>
                 <a:ext uri="{909E8E84-426E-40DD-AFC4-6F175D3DCCD1}">
-                  <a14:hiddenFill xmlns:a14="http://schemas.microsoft.com/office/drawing/2010/main" xmlns="">
+                  <a14:hiddenFill xmlns="" xmlns:a14="http://schemas.microsoft.com/office/drawing/2010/main">
                     <a:solidFill>
                       <a:srgbClr val="FFFFFF"/>
                     </a:solidFill>
@@ -9445,7 +9440,7 @@
               <a:blip r:embed="rId4" cstate="print">
                 <a:extLst>
                   <a:ext uri="{28A0092B-C50C-407E-A947-70E740481C1C}">
-                    <a14:useLocalDpi xmlns:a14="http://schemas.microsoft.com/office/drawing/2010/main" xmlns="" val="0"/>
+                    <a14:useLocalDpi xmlns="" xmlns:a14="http://schemas.microsoft.com/office/drawing/2010/main" val="0"/>
                   </a:ext>
                 </a:extLst>
               </a:blip>
@@ -9465,7 +9460,7 @@
               <a:noFill/>
               <a:extLst>
                 <a:ext uri="{909E8E84-426E-40DD-AFC4-6F175D3DCCD1}">
-                  <a14:hiddenFill xmlns:a14="http://schemas.microsoft.com/office/drawing/2010/main" xmlns="">
+                  <a14:hiddenFill xmlns="" xmlns:a14="http://schemas.microsoft.com/office/drawing/2010/main">
                     <a:solidFill>
                       <a:srgbClr val="FFFFFF"/>
                     </a:solidFill>
@@ -9588,7 +9583,7 @@
               <a:blip r:embed="rId2" cstate="print">
                 <a:extLst>
                   <a:ext uri="{28A0092B-C50C-407E-A947-70E740481C1C}">
-                    <a14:useLocalDpi xmlns:a14="http://schemas.microsoft.com/office/drawing/2010/main" xmlns="" val="0"/>
+                    <a14:useLocalDpi xmlns="" xmlns:a14="http://schemas.microsoft.com/office/drawing/2010/main" val="0"/>
                   </a:ext>
                 </a:extLst>
               </a:blip>
@@ -9608,7 +9603,7 @@
               <a:noFill/>
               <a:extLst>
                 <a:ext uri="{909E8E84-426E-40DD-AFC4-6F175D3DCCD1}">
-                  <a14:hiddenFill xmlns:a14="http://schemas.microsoft.com/office/drawing/2010/main" xmlns="">
+                  <a14:hiddenFill xmlns="" xmlns:a14="http://schemas.microsoft.com/office/drawing/2010/main">
                     <a:solidFill>
                       <a:srgbClr val="FFFFFF"/>
                     </a:solidFill>
@@ -9629,7 +9624,7 @@
               <a:blip r:embed="rId3" cstate="print">
                 <a:extLst>
                   <a:ext uri="{28A0092B-C50C-407E-A947-70E740481C1C}">
-                    <a14:useLocalDpi xmlns:a14="http://schemas.microsoft.com/office/drawing/2010/main" xmlns="" val="0"/>
+                    <a14:useLocalDpi xmlns="" xmlns:a14="http://schemas.microsoft.com/office/drawing/2010/main" val="0"/>
                   </a:ext>
                 </a:extLst>
               </a:blip>
@@ -9649,7 +9644,7 @@
               <a:noFill/>
               <a:extLst>
                 <a:ext uri="{909E8E84-426E-40DD-AFC4-6F175D3DCCD1}">
-                  <a14:hiddenFill xmlns:a14="http://schemas.microsoft.com/office/drawing/2010/main" xmlns="">
+                  <a14:hiddenFill xmlns="" xmlns:a14="http://schemas.microsoft.com/office/drawing/2010/main">
                     <a:solidFill>
                       <a:srgbClr val="FFFFFF"/>
                     </a:solidFill>
@@ -9670,7 +9665,7 @@
               <a:blip r:embed="rId4" cstate="print">
                 <a:extLst>
                   <a:ext uri="{28A0092B-C50C-407E-A947-70E740481C1C}">
-                    <a14:useLocalDpi xmlns:a14="http://schemas.microsoft.com/office/drawing/2010/main" xmlns="" val="0"/>
+                    <a14:useLocalDpi xmlns="" xmlns:a14="http://schemas.microsoft.com/office/drawing/2010/main" val="0"/>
                   </a:ext>
                 </a:extLst>
               </a:blip>
@@ -9690,7 +9685,7 @@
               <a:noFill/>
               <a:extLst>
                 <a:ext uri="{909E8E84-426E-40DD-AFC4-6F175D3DCCD1}">
-                  <a14:hiddenFill xmlns:a14="http://schemas.microsoft.com/office/drawing/2010/main" xmlns="">
+                  <a14:hiddenFill xmlns="" xmlns:a14="http://schemas.microsoft.com/office/drawing/2010/main">
                     <a:solidFill>
                       <a:srgbClr val="FFFFFF"/>
                     </a:solidFill>
@@ -9751,7 +9746,7 @@
             <p:ph idx="1"/>
             <p:extLst>
               <p:ext uri="{D42A27DB-BD31-4B8C-83A1-F6EECF244321}">
-                <p14:modId xmlns:p14="http://schemas.microsoft.com/office/powerpoint/2010/main" xmlns="" val="3126632509"/>
+                <p14:modId xmlns="" xmlns:p14="http://schemas.microsoft.com/office/powerpoint/2010/main" val="3126632509"/>
               </p:ext>
             </p:extLst>
           </p:nvPr>
@@ -10337,7 +10332,7 @@
     </p:spTree>
     <p:extLst>
       <p:ext uri="{BB962C8B-B14F-4D97-AF65-F5344CB8AC3E}">
-        <p14:creationId xmlns:p14="http://schemas.microsoft.com/office/powerpoint/2010/main" xmlns="" val="3918357120"/>
+        <p14:creationId xmlns="" xmlns:p14="http://schemas.microsoft.com/office/powerpoint/2010/main" val="3918357120"/>
       </p:ext>
     </p:extLst>
   </p:cSld>
@@ -10691,7 +10686,7 @@
             <a:blip r:embed="rId2" cstate="print">
               <a:extLst>
                 <a:ext uri="{28A0092B-C50C-407E-A947-70E740481C1C}">
-                  <a14:useLocalDpi xmlns:a14="http://schemas.microsoft.com/office/drawing/2010/main" xmlns="" val="0"/>
+                  <a14:useLocalDpi xmlns="" xmlns:a14="http://schemas.microsoft.com/office/drawing/2010/main" val="0"/>
                 </a:ext>
               </a:extLst>
             </a:blip>
@@ -10711,7 +10706,7 @@
             <a:noFill/>
             <a:extLst>
               <a:ext uri="{909E8E84-426E-40DD-AFC4-6F175D3DCCD1}">
-                <a14:hiddenFill xmlns:a14="http://schemas.microsoft.com/office/drawing/2010/main" xmlns="">
+                <a14:hiddenFill xmlns="" xmlns:a14="http://schemas.microsoft.com/office/drawing/2010/main">
                   <a:solidFill>
                     <a:srgbClr val="FFFFFF"/>
                   </a:solidFill>
@@ -10732,7 +10727,7 @@
             <a:blip r:embed="rId3" cstate="print">
               <a:extLst>
                 <a:ext uri="{28A0092B-C50C-407E-A947-70E740481C1C}">
-                  <a14:useLocalDpi xmlns:a14="http://schemas.microsoft.com/office/drawing/2010/main" xmlns="" val="0"/>
+                  <a14:useLocalDpi xmlns="" xmlns:a14="http://schemas.microsoft.com/office/drawing/2010/main" val="0"/>
                 </a:ext>
               </a:extLst>
             </a:blip>
@@ -10752,7 +10747,7 @@
             <a:noFill/>
             <a:extLst>
               <a:ext uri="{909E8E84-426E-40DD-AFC4-6F175D3DCCD1}">
-                <a14:hiddenFill xmlns:a14="http://schemas.microsoft.com/office/drawing/2010/main" xmlns="">
+                <a14:hiddenFill xmlns="" xmlns:a14="http://schemas.microsoft.com/office/drawing/2010/main">
                   <a:solidFill>
                     <a:srgbClr val="FFFFFF"/>
                   </a:solidFill>
@@ -10773,7 +10768,7 @@
             <a:blip r:embed="rId4" cstate="print">
               <a:extLst>
                 <a:ext uri="{28A0092B-C50C-407E-A947-70E740481C1C}">
-                  <a14:useLocalDpi xmlns:a14="http://schemas.microsoft.com/office/drawing/2010/main" xmlns="" val="0"/>
+                  <a14:useLocalDpi xmlns="" xmlns:a14="http://schemas.microsoft.com/office/drawing/2010/main" val="0"/>
                 </a:ext>
               </a:extLst>
             </a:blip>
@@ -10793,7 +10788,7 @@
             <a:noFill/>
             <a:extLst>
               <a:ext uri="{909E8E84-426E-40DD-AFC4-6F175D3DCCD1}">
-                <a14:hiddenFill xmlns:a14="http://schemas.microsoft.com/office/drawing/2010/main" xmlns="">
+                <a14:hiddenFill xmlns="" xmlns:a14="http://schemas.microsoft.com/office/drawing/2010/main">
                   <a:solidFill>
                     <a:srgbClr val="FFFFFF"/>
                   </a:solidFill>
@@ -10971,7 +10966,7 @@
           <a:blip r:embed="rId3" cstate="print">
             <a:extLst>
               <a:ext uri="{28A0092B-C50C-407E-A947-70E740481C1C}">
-                <a14:useLocalDpi xmlns:a14="http://schemas.microsoft.com/office/drawing/2010/main" xmlns="" val="0"/>
+                <a14:useLocalDpi xmlns="" xmlns:a14="http://schemas.microsoft.com/office/drawing/2010/main" val="0"/>
               </a:ext>
             </a:extLst>
           </a:blip>
@@ -10991,7 +10986,7 @@
           <a:noFill/>
           <a:extLst>
             <a:ext uri="{909E8E84-426E-40DD-AFC4-6F175D3DCCD1}">
-              <a14:hiddenFill xmlns:a14="http://schemas.microsoft.com/office/drawing/2010/main" xmlns="">
+              <a14:hiddenFill xmlns="" xmlns:a14="http://schemas.microsoft.com/office/drawing/2010/main">
                 <a:solidFill>
                   <a:srgbClr val="FFFFFF"/>
                 </a:solidFill>
@@ -11012,7 +11007,7 @@
           <a:blip r:embed="rId4" cstate="print">
             <a:extLst>
               <a:ext uri="{28A0092B-C50C-407E-A947-70E740481C1C}">
-                <a14:useLocalDpi xmlns:a14="http://schemas.microsoft.com/office/drawing/2010/main" xmlns="" val="0"/>
+                <a14:useLocalDpi xmlns="" xmlns:a14="http://schemas.microsoft.com/office/drawing/2010/main" val="0"/>
               </a:ext>
             </a:extLst>
           </a:blip>
@@ -11032,7 +11027,7 @@
           <a:noFill/>
           <a:extLst>
             <a:ext uri="{909E8E84-426E-40DD-AFC4-6F175D3DCCD1}">
-              <a14:hiddenFill xmlns:a14="http://schemas.microsoft.com/office/drawing/2010/main" xmlns="">
+              <a14:hiddenFill xmlns="" xmlns:a14="http://schemas.microsoft.com/office/drawing/2010/main">
                 <a:solidFill>
                   <a:srgbClr val="FFFFFF"/>
                 </a:solidFill>
@@ -11053,7 +11048,7 @@
           <a:blip r:embed="rId5" cstate="print">
             <a:extLst>
               <a:ext uri="{28A0092B-C50C-407E-A947-70E740481C1C}">
-                <a14:useLocalDpi xmlns:a14="http://schemas.microsoft.com/office/drawing/2010/main" xmlns="" val="0"/>
+                <a14:useLocalDpi xmlns="" xmlns:a14="http://schemas.microsoft.com/office/drawing/2010/main" val="0"/>
               </a:ext>
             </a:extLst>
           </a:blip>
@@ -11073,7 +11068,7 @@
           <a:noFill/>
           <a:extLst>
             <a:ext uri="{909E8E84-426E-40DD-AFC4-6F175D3DCCD1}">
-              <a14:hiddenFill xmlns:a14="http://schemas.microsoft.com/office/drawing/2010/main" xmlns="">
+              <a14:hiddenFill xmlns="" xmlns:a14="http://schemas.microsoft.com/office/drawing/2010/main">
                 <a:solidFill>
                   <a:srgbClr val="FFFFFF"/>
                 </a:solidFill>
@@ -11188,7 +11183,7 @@
             <a:blip r:embed="rId6" cstate="print">
               <a:extLst>
                 <a:ext uri="{28A0092B-C50C-407E-A947-70E740481C1C}">
-                  <a14:useLocalDpi xmlns:a14="http://schemas.microsoft.com/office/drawing/2010/main" xmlns="" val="0"/>
+                  <a14:useLocalDpi xmlns="" xmlns:a14="http://schemas.microsoft.com/office/drawing/2010/main" val="0"/>
                 </a:ext>
               </a:extLst>
             </a:blip>
@@ -11208,7 +11203,7 @@
             <a:noFill/>
             <a:extLst>
               <a:ext uri="{909E8E84-426E-40DD-AFC4-6F175D3DCCD1}">
-                <a14:hiddenFill xmlns:a14="http://schemas.microsoft.com/office/drawing/2010/main" xmlns="">
+                <a14:hiddenFill xmlns="" xmlns:a14="http://schemas.microsoft.com/office/drawing/2010/main">
                   <a:solidFill>
                     <a:srgbClr val="FFFFFF"/>
                   </a:solidFill>
@@ -11229,7 +11224,7 @@
             <a:blip r:embed="rId7" cstate="print">
               <a:extLst>
                 <a:ext uri="{28A0092B-C50C-407E-A947-70E740481C1C}">
-                  <a14:useLocalDpi xmlns:a14="http://schemas.microsoft.com/office/drawing/2010/main" xmlns="" val="0"/>
+                  <a14:useLocalDpi xmlns="" xmlns:a14="http://schemas.microsoft.com/office/drawing/2010/main" val="0"/>
                 </a:ext>
               </a:extLst>
             </a:blip>
@@ -11249,7 +11244,7 @@
             <a:noFill/>
             <a:extLst>
               <a:ext uri="{909E8E84-426E-40DD-AFC4-6F175D3DCCD1}">
-                <a14:hiddenFill xmlns:a14="http://schemas.microsoft.com/office/drawing/2010/main" xmlns="">
+                <a14:hiddenFill xmlns="" xmlns:a14="http://schemas.microsoft.com/office/drawing/2010/main">
                   <a:solidFill>
                     <a:srgbClr val="FFFFFF"/>
                   </a:solidFill>
@@ -11270,7 +11265,7 @@
             <a:blip r:embed="rId8" cstate="print">
               <a:extLst>
                 <a:ext uri="{28A0092B-C50C-407E-A947-70E740481C1C}">
-                  <a14:useLocalDpi xmlns:a14="http://schemas.microsoft.com/office/drawing/2010/main" xmlns="" val="0"/>
+                  <a14:useLocalDpi xmlns="" xmlns:a14="http://schemas.microsoft.com/office/drawing/2010/main" val="0"/>
                 </a:ext>
               </a:extLst>
             </a:blip>
@@ -11290,7 +11285,7 @@
             <a:noFill/>
             <a:extLst>
               <a:ext uri="{909E8E84-426E-40DD-AFC4-6F175D3DCCD1}">
-                <a14:hiddenFill xmlns:a14="http://schemas.microsoft.com/office/drawing/2010/main" xmlns="">
+                <a14:hiddenFill xmlns="" xmlns:a14="http://schemas.microsoft.com/office/drawing/2010/main">
                   <a:solidFill>
                     <a:srgbClr val="FFFFFF"/>
                   </a:solidFill>
@@ -11527,7 +11522,7 @@
             <a:blip r:embed="rId2" cstate="print">
               <a:extLst>
                 <a:ext uri="{28A0092B-C50C-407E-A947-70E740481C1C}">
-                  <a14:useLocalDpi xmlns:a14="http://schemas.microsoft.com/office/drawing/2010/main" xmlns="" val="0"/>
+                  <a14:useLocalDpi xmlns="" xmlns:a14="http://schemas.microsoft.com/office/drawing/2010/main" val="0"/>
                 </a:ext>
               </a:extLst>
             </a:blip>
@@ -11547,7 +11542,7 @@
             <a:noFill/>
             <a:extLst>
               <a:ext uri="{909E8E84-426E-40DD-AFC4-6F175D3DCCD1}">
-                <a14:hiddenFill xmlns:a14="http://schemas.microsoft.com/office/drawing/2010/main" xmlns="">
+                <a14:hiddenFill xmlns="" xmlns:a14="http://schemas.microsoft.com/office/drawing/2010/main">
                   <a:solidFill>
                     <a:srgbClr val="FFFFFF"/>
                   </a:solidFill>
@@ -11568,7 +11563,7 @@
             <a:blip r:embed="rId3" cstate="print">
               <a:extLst>
                 <a:ext uri="{28A0092B-C50C-407E-A947-70E740481C1C}">
-                  <a14:useLocalDpi xmlns:a14="http://schemas.microsoft.com/office/drawing/2010/main" xmlns="" val="0"/>
+                  <a14:useLocalDpi xmlns="" xmlns:a14="http://schemas.microsoft.com/office/drawing/2010/main" val="0"/>
                 </a:ext>
               </a:extLst>
             </a:blip>
@@ -11588,7 +11583,7 @@
             <a:noFill/>
             <a:extLst>
               <a:ext uri="{909E8E84-426E-40DD-AFC4-6F175D3DCCD1}">
-                <a14:hiddenFill xmlns:a14="http://schemas.microsoft.com/office/drawing/2010/main" xmlns="">
+                <a14:hiddenFill xmlns="" xmlns:a14="http://schemas.microsoft.com/office/drawing/2010/main">
                   <a:solidFill>
                     <a:srgbClr val="FFFFFF"/>
                   </a:solidFill>
@@ -11609,7 +11604,7 @@
             <a:blip r:embed="rId4" cstate="print">
               <a:extLst>
                 <a:ext uri="{28A0092B-C50C-407E-A947-70E740481C1C}">
-                  <a14:useLocalDpi xmlns:a14="http://schemas.microsoft.com/office/drawing/2010/main" xmlns="" val="0"/>
+                  <a14:useLocalDpi xmlns="" xmlns:a14="http://schemas.microsoft.com/office/drawing/2010/main" val="0"/>
                 </a:ext>
               </a:extLst>
             </a:blip>
@@ -11629,7 +11624,7 @@
             <a:noFill/>
             <a:extLst>
               <a:ext uri="{909E8E84-426E-40DD-AFC4-6F175D3DCCD1}">
-                <a14:hiddenFill xmlns:a14="http://schemas.microsoft.com/office/drawing/2010/main" xmlns="">
+                <a14:hiddenFill xmlns="" xmlns:a14="http://schemas.microsoft.com/office/drawing/2010/main">
                   <a:solidFill>
                     <a:srgbClr val="FFFFFF"/>
                   </a:solidFill>
@@ -11883,7 +11878,7 @@
             <a:blip r:embed="rId2" cstate="print">
               <a:extLst>
                 <a:ext uri="{28A0092B-C50C-407E-A947-70E740481C1C}">
-                  <a14:useLocalDpi xmlns:a14="http://schemas.microsoft.com/office/drawing/2010/main" xmlns="" val="0"/>
+                  <a14:useLocalDpi xmlns="" xmlns:a14="http://schemas.microsoft.com/office/drawing/2010/main" val="0"/>
                 </a:ext>
               </a:extLst>
             </a:blip>
@@ -11903,7 +11898,7 @@
             <a:noFill/>
             <a:extLst>
               <a:ext uri="{909E8E84-426E-40DD-AFC4-6F175D3DCCD1}">
-                <a14:hiddenFill xmlns:a14="http://schemas.microsoft.com/office/drawing/2010/main" xmlns="">
+                <a14:hiddenFill xmlns="" xmlns:a14="http://schemas.microsoft.com/office/drawing/2010/main">
                   <a:solidFill>
                     <a:srgbClr val="FFFFFF"/>
                   </a:solidFill>
@@ -11924,7 +11919,7 @@
             <a:blip r:embed="rId3" cstate="print">
               <a:extLst>
                 <a:ext uri="{28A0092B-C50C-407E-A947-70E740481C1C}">
-                  <a14:useLocalDpi xmlns:a14="http://schemas.microsoft.com/office/drawing/2010/main" xmlns="" val="0"/>
+                  <a14:useLocalDpi xmlns="" xmlns:a14="http://schemas.microsoft.com/office/drawing/2010/main" val="0"/>
                 </a:ext>
               </a:extLst>
             </a:blip>
@@ -11944,7 +11939,7 @@
             <a:noFill/>
             <a:extLst>
               <a:ext uri="{909E8E84-426E-40DD-AFC4-6F175D3DCCD1}">
-                <a14:hiddenFill xmlns:a14="http://schemas.microsoft.com/office/drawing/2010/main" xmlns="">
+                <a14:hiddenFill xmlns="" xmlns:a14="http://schemas.microsoft.com/office/drawing/2010/main">
                   <a:solidFill>
                     <a:srgbClr val="FFFFFF"/>
                   </a:solidFill>
@@ -11965,7 +11960,7 @@
             <a:blip r:embed="rId4" cstate="print">
               <a:extLst>
                 <a:ext uri="{28A0092B-C50C-407E-A947-70E740481C1C}">
-                  <a14:useLocalDpi xmlns:a14="http://schemas.microsoft.com/office/drawing/2010/main" xmlns="" val="0"/>
+                  <a14:useLocalDpi xmlns="" xmlns:a14="http://schemas.microsoft.com/office/drawing/2010/main" val="0"/>
                 </a:ext>
               </a:extLst>
             </a:blip>
@@ -11985,7 +11980,7 @@
             <a:noFill/>
             <a:extLst>
               <a:ext uri="{909E8E84-426E-40DD-AFC4-6F175D3DCCD1}">
-                <a14:hiddenFill xmlns:a14="http://schemas.microsoft.com/office/drawing/2010/main" xmlns="">
+                <a14:hiddenFill xmlns="" xmlns:a14="http://schemas.microsoft.com/office/drawing/2010/main">
                   <a:solidFill>
                     <a:srgbClr val="FFFFFF"/>
                   </a:solidFill>
@@ -14210,7 +14205,7 @@
             <a:blip r:embed="rId3" cstate="print">
               <a:extLst>
                 <a:ext uri="{28A0092B-C50C-407E-A947-70E740481C1C}">
-                  <a14:useLocalDpi xmlns:a14="http://schemas.microsoft.com/office/drawing/2010/main" xmlns="" val="0"/>
+                  <a14:useLocalDpi xmlns="" xmlns:a14="http://schemas.microsoft.com/office/drawing/2010/main" val="0"/>
                 </a:ext>
               </a:extLst>
             </a:blip>
@@ -14230,7 +14225,7 @@
             <a:noFill/>
             <a:extLst>
               <a:ext uri="{909E8E84-426E-40DD-AFC4-6F175D3DCCD1}">
-                <a14:hiddenFill xmlns:a14="http://schemas.microsoft.com/office/drawing/2010/main" xmlns="">
+                <a14:hiddenFill xmlns="" xmlns:a14="http://schemas.microsoft.com/office/drawing/2010/main">
                   <a:solidFill>
                     <a:srgbClr val="FFFFFF"/>
                   </a:solidFill>
@@ -14251,7 +14246,7 @@
             <a:blip r:embed="rId4" cstate="print">
               <a:extLst>
                 <a:ext uri="{28A0092B-C50C-407E-A947-70E740481C1C}">
-                  <a14:useLocalDpi xmlns:a14="http://schemas.microsoft.com/office/drawing/2010/main" xmlns="" val="0"/>
+                  <a14:useLocalDpi xmlns="" xmlns:a14="http://schemas.microsoft.com/office/drawing/2010/main" val="0"/>
                 </a:ext>
               </a:extLst>
             </a:blip>
@@ -14271,7 +14266,7 @@
             <a:noFill/>
             <a:extLst>
               <a:ext uri="{909E8E84-426E-40DD-AFC4-6F175D3DCCD1}">
-                <a14:hiddenFill xmlns:a14="http://schemas.microsoft.com/office/drawing/2010/main" xmlns="">
+                <a14:hiddenFill xmlns="" xmlns:a14="http://schemas.microsoft.com/office/drawing/2010/main">
                   <a:solidFill>
                     <a:srgbClr val="FFFFFF"/>
                   </a:solidFill>
@@ -14292,7 +14287,7 @@
             <a:blip r:embed="rId5" cstate="print">
               <a:extLst>
                 <a:ext uri="{28A0092B-C50C-407E-A947-70E740481C1C}">
-                  <a14:useLocalDpi xmlns:a14="http://schemas.microsoft.com/office/drawing/2010/main" xmlns="" val="0"/>
+                  <a14:useLocalDpi xmlns="" xmlns:a14="http://schemas.microsoft.com/office/drawing/2010/main" val="0"/>
                 </a:ext>
               </a:extLst>
             </a:blip>
@@ -14312,7 +14307,7 @@
             <a:noFill/>
             <a:extLst>
               <a:ext uri="{909E8E84-426E-40DD-AFC4-6F175D3DCCD1}">
-                <a14:hiddenFill xmlns:a14="http://schemas.microsoft.com/office/drawing/2010/main" xmlns="">
+                <a14:hiddenFill xmlns="" xmlns:a14="http://schemas.microsoft.com/office/drawing/2010/main">
                   <a:solidFill>
                     <a:srgbClr val="FFFFFF"/>
                   </a:solidFill>
@@ -14412,7 +14407,7 @@
     </p:spTree>
     <p:extLst>
       <p:ext uri="{BB962C8B-B14F-4D97-AF65-F5344CB8AC3E}">
-        <p14:creationId xmlns:p14="http://schemas.microsoft.com/office/powerpoint/2010/main" xmlns="" val="329827206"/>
+        <p14:creationId xmlns="" xmlns:p14="http://schemas.microsoft.com/office/powerpoint/2010/main" val="329827206"/>
       </p:ext>
     </p:extLst>
   </p:cSld>
@@ -15609,7 +15604,7 @@
             <a:blip r:embed="rId4" cstate="print">
               <a:extLst>
                 <a:ext uri="{28A0092B-C50C-407E-A947-70E740481C1C}">
-                  <a14:useLocalDpi xmlns:a14="http://schemas.microsoft.com/office/drawing/2010/main" xmlns="" val="0"/>
+                  <a14:useLocalDpi xmlns="" xmlns:a14="http://schemas.microsoft.com/office/drawing/2010/main" val="0"/>
                 </a:ext>
               </a:extLst>
             </a:blip>
@@ -15629,7 +15624,7 @@
             <a:noFill/>
             <a:extLst>
               <a:ext uri="{909E8E84-426E-40DD-AFC4-6F175D3DCCD1}">
-                <a14:hiddenFill xmlns:a14="http://schemas.microsoft.com/office/drawing/2010/main" xmlns="">
+                <a14:hiddenFill xmlns="" xmlns:a14="http://schemas.microsoft.com/office/drawing/2010/main">
                   <a:solidFill>
                     <a:srgbClr val="FFFFFF"/>
                   </a:solidFill>
@@ -15650,7 +15645,7 @@
             <a:blip r:embed="rId5" cstate="print">
               <a:extLst>
                 <a:ext uri="{28A0092B-C50C-407E-A947-70E740481C1C}">
-                  <a14:useLocalDpi xmlns:a14="http://schemas.microsoft.com/office/drawing/2010/main" xmlns="" val="0"/>
+                  <a14:useLocalDpi xmlns="" xmlns:a14="http://schemas.microsoft.com/office/drawing/2010/main" val="0"/>
                 </a:ext>
               </a:extLst>
             </a:blip>
@@ -15670,7 +15665,7 @@
             <a:noFill/>
             <a:extLst>
               <a:ext uri="{909E8E84-426E-40DD-AFC4-6F175D3DCCD1}">
-                <a14:hiddenFill xmlns:a14="http://schemas.microsoft.com/office/drawing/2010/main" xmlns="">
+                <a14:hiddenFill xmlns="" xmlns:a14="http://schemas.microsoft.com/office/drawing/2010/main">
                   <a:solidFill>
                     <a:srgbClr val="FFFFFF"/>
                   </a:solidFill>
@@ -15691,7 +15686,7 @@
             <a:blip r:embed="rId6" cstate="print">
               <a:extLst>
                 <a:ext uri="{28A0092B-C50C-407E-A947-70E740481C1C}">
-                  <a14:useLocalDpi xmlns:a14="http://schemas.microsoft.com/office/drawing/2010/main" xmlns="" val="0"/>
+                  <a14:useLocalDpi xmlns="" xmlns:a14="http://schemas.microsoft.com/office/drawing/2010/main" val="0"/>
                 </a:ext>
               </a:extLst>
             </a:blip>
@@ -15711,7 +15706,7 @@
             <a:noFill/>
             <a:extLst>
               <a:ext uri="{909E8E84-426E-40DD-AFC4-6F175D3DCCD1}">
-                <a14:hiddenFill xmlns:a14="http://schemas.microsoft.com/office/drawing/2010/main" xmlns="">
+                <a14:hiddenFill xmlns="" xmlns:a14="http://schemas.microsoft.com/office/drawing/2010/main">
                   <a:solidFill>
                     <a:srgbClr val="FFFFFF"/>
                   </a:solidFill>
@@ -15857,7 +15852,7 @@
             <a:blip r:embed="rId2" cstate="print">
               <a:extLst>
                 <a:ext uri="{28A0092B-C50C-407E-A947-70E740481C1C}">
-                  <a14:useLocalDpi xmlns:a14="http://schemas.microsoft.com/office/drawing/2010/main" xmlns="" val="0"/>
+                  <a14:useLocalDpi xmlns="" xmlns:a14="http://schemas.microsoft.com/office/drawing/2010/main" val="0"/>
                 </a:ext>
               </a:extLst>
             </a:blip>
@@ -15877,7 +15872,7 @@
             <a:noFill/>
             <a:extLst>
               <a:ext uri="{909E8E84-426E-40DD-AFC4-6F175D3DCCD1}">
-                <a14:hiddenFill xmlns:a14="http://schemas.microsoft.com/office/drawing/2010/main" xmlns="">
+                <a14:hiddenFill xmlns="" xmlns:a14="http://schemas.microsoft.com/office/drawing/2010/main">
                   <a:solidFill>
                     <a:srgbClr val="FFFFFF"/>
                   </a:solidFill>
@@ -15898,7 +15893,7 @@
             <a:blip r:embed="rId3" cstate="print">
               <a:extLst>
                 <a:ext uri="{28A0092B-C50C-407E-A947-70E740481C1C}">
-                  <a14:useLocalDpi xmlns:a14="http://schemas.microsoft.com/office/drawing/2010/main" xmlns="" val="0"/>
+                  <a14:useLocalDpi xmlns="" xmlns:a14="http://schemas.microsoft.com/office/drawing/2010/main" val="0"/>
                 </a:ext>
               </a:extLst>
             </a:blip>
@@ -15918,7 +15913,7 @@
             <a:noFill/>
             <a:extLst>
               <a:ext uri="{909E8E84-426E-40DD-AFC4-6F175D3DCCD1}">
-                <a14:hiddenFill xmlns:a14="http://schemas.microsoft.com/office/drawing/2010/main" xmlns="">
+                <a14:hiddenFill xmlns="" xmlns:a14="http://schemas.microsoft.com/office/drawing/2010/main">
                   <a:solidFill>
                     <a:srgbClr val="FFFFFF"/>
                   </a:solidFill>
@@ -15939,7 +15934,7 @@
             <a:blip r:embed="rId4" cstate="print">
               <a:extLst>
                 <a:ext uri="{28A0092B-C50C-407E-A947-70E740481C1C}">
-                  <a14:useLocalDpi xmlns:a14="http://schemas.microsoft.com/office/drawing/2010/main" xmlns="" val="0"/>
+                  <a14:useLocalDpi xmlns="" xmlns:a14="http://schemas.microsoft.com/office/drawing/2010/main" val="0"/>
                 </a:ext>
               </a:extLst>
             </a:blip>
@@ -15959,7 +15954,7 @@
             <a:noFill/>
             <a:extLst>
               <a:ext uri="{909E8E84-426E-40DD-AFC4-6F175D3DCCD1}">
-                <a14:hiddenFill xmlns:a14="http://schemas.microsoft.com/office/drawing/2010/main" xmlns="">
+                <a14:hiddenFill xmlns="" xmlns:a14="http://schemas.microsoft.com/office/drawing/2010/main">
                   <a:solidFill>
                     <a:srgbClr val="FFFFFF"/>
                   </a:solidFill>

</xml_diff>

<commit_message>
First draft of the presentation for El Rosario
</commit_message>
<xml_diff>
--- a/Presentations/Workshop in Mexico/Mexico Workshop.pptx
+++ b/Presentations/Workshop in Mexico/Mexico Workshop.pptx
@@ -127,7 +127,7 @@
   </p:defaultTextStyle>
   <p:extLst>
     <p:ext uri="{EFAFB233-063F-42B5-8137-9DF3F51BA10A}">
-      <p15:sldGuideLst xmlns="" xmlns:p15="http://schemas.microsoft.com/office/powerpoint/2012/main">
+      <p15:sldGuideLst xmlns:p15="http://schemas.microsoft.com/office/powerpoint/2012/main">
         <p15:guide id="1" orient="horz" pos="2160">
           <p15:clr>
             <a:srgbClr val="A4A3A4"/>
@@ -227,7 +227,7 @@
             <a:fld id="{DA3D7982-6D12-44B7-B09C-9027420CE024}" type="datetimeFigureOut">
               <a:rPr lang="es-MX" smtClean="0"/>
               <a:pPr/>
-              <a:t>11/10/2016</a:t>
+              <a:t>10/11/2016</a:t>
             </a:fld>
             <a:endParaRPr lang="es-MX" dirty="0"/>
           </a:p>
@@ -389,7 +389,7 @@
             <a:fld id="{280912AB-7E2A-4726-8C73-C75F6266AA28}" type="slidenum">
               <a:rPr lang="es-MX" smtClean="0"/>
               <a:pPr/>
-              <a:t>‹Nº›</a:t>
+              <a:t>‹nº›</a:t>
             </a:fld>
             <a:endParaRPr lang="es-MX" dirty="0"/>
           </a:p>
@@ -398,7 +398,7 @@
     </p:spTree>
     <p:extLst>
       <p:ext uri="{BB962C8B-B14F-4D97-AF65-F5344CB8AC3E}">
-        <p14:creationId xmlns="" xmlns:p14="http://schemas.microsoft.com/office/powerpoint/2010/main" val="368796389"/>
+        <p14:creationId xmlns:p14="http://schemas.microsoft.com/office/powerpoint/2010/main" val="368796389"/>
       </p:ext>
     </p:extLst>
   </p:cSld>
@@ -577,7 +577,7 @@
     </p:spTree>
     <p:extLst>
       <p:ext uri="{BB962C8B-B14F-4D97-AF65-F5344CB8AC3E}">
-        <p14:creationId xmlns="" xmlns:p14="http://schemas.microsoft.com/office/powerpoint/2010/main" val="3478287038"/>
+        <p14:creationId xmlns:p14="http://schemas.microsoft.com/office/powerpoint/2010/main" val="3478287038"/>
       </p:ext>
     </p:extLst>
   </p:cSld>
@@ -629,7 +629,7 @@
         <p:spPr/>
         <p:txBody>
           <a:bodyPr>
-            <a:normAutofit lnSpcReduction="10000"/>
+            <a:normAutofit/>
           </a:bodyPr>
           <a:lstStyle/>
           <a:p>
@@ -664,7 +664,7 @@
     </p:spTree>
     <p:extLst>
       <p:ext uri="{BB962C8B-B14F-4D97-AF65-F5344CB8AC3E}">
-        <p14:creationId xmlns="" xmlns:p14="http://schemas.microsoft.com/office/powerpoint/2010/main" val="3981295864"/>
+        <p14:creationId xmlns:p14="http://schemas.microsoft.com/office/powerpoint/2010/main" val="3981295864"/>
       </p:ext>
     </p:extLst>
   </p:cSld>
@@ -805,7 +805,7 @@
     </p:spTree>
     <p:extLst>
       <p:ext uri="{BB962C8B-B14F-4D97-AF65-F5344CB8AC3E}">
-        <p14:creationId xmlns="" xmlns:p14="http://schemas.microsoft.com/office/powerpoint/2010/main" val="3247054436"/>
+        <p14:creationId xmlns:p14="http://schemas.microsoft.com/office/powerpoint/2010/main" val="3247054436"/>
       </p:ext>
     </p:extLst>
   </p:cSld>
@@ -894,7 +894,7 @@
     </p:spTree>
     <p:extLst>
       <p:ext uri="{BB962C8B-B14F-4D97-AF65-F5344CB8AC3E}">
-        <p14:creationId xmlns="" xmlns:p14="http://schemas.microsoft.com/office/powerpoint/2010/main" val="1333304386"/>
+        <p14:creationId xmlns:p14="http://schemas.microsoft.com/office/powerpoint/2010/main" val="1333304386"/>
       </p:ext>
     </p:extLst>
   </p:cSld>
@@ -979,6 +979,11 @@
         </p:txBody>
       </p:sp>
     </p:spTree>
+    <p:extLst>
+      <p:ext uri="{BB962C8B-B14F-4D97-AF65-F5344CB8AC3E}">
+        <p14:creationId xmlns:p14="http://schemas.microsoft.com/office/powerpoint/2010/main" val="2474999161"/>
+      </p:ext>
+    </p:extLst>
   </p:cSld>
   <p:clrMapOvr>
     <a:masterClrMapping/>
@@ -1067,7 +1072,7 @@
     </p:spTree>
     <p:extLst>
       <p:ext uri="{BB962C8B-B14F-4D97-AF65-F5344CB8AC3E}">
-        <p14:creationId xmlns="" xmlns:p14="http://schemas.microsoft.com/office/powerpoint/2010/main" val="677977679"/>
+        <p14:creationId xmlns:p14="http://schemas.microsoft.com/office/powerpoint/2010/main" val="677977679"/>
       </p:ext>
     </p:extLst>
   </p:cSld>
@@ -1259,7 +1264,7 @@
             <a:fld id="{67970304-9F4D-4A06-BCEA-E573EFCCD4CE}" type="datetimeFigureOut">
               <a:rPr lang="es-MX" smtClean="0"/>
               <a:pPr/>
-              <a:t>11/10/2016</a:t>
+              <a:t>10/11/2016</a:t>
             </a:fld>
             <a:endParaRPr lang="es-MX" dirty="0"/>
           </a:p>
@@ -1302,7 +1307,7 @@
             <a:fld id="{08B575B2-E4DC-4B86-ADFF-AC1540A85088}" type="slidenum">
               <a:rPr lang="es-MX" smtClean="0"/>
               <a:pPr/>
-              <a:t>‹Nº›</a:t>
+              <a:t>‹nº›</a:t>
             </a:fld>
             <a:endParaRPr lang="es-MX" dirty="0"/>
           </a:p>
@@ -1426,7 +1431,7 @@
             <a:fld id="{67970304-9F4D-4A06-BCEA-E573EFCCD4CE}" type="datetimeFigureOut">
               <a:rPr lang="es-MX" smtClean="0"/>
               <a:pPr/>
-              <a:t>11/10/2016</a:t>
+              <a:t>10/11/2016</a:t>
             </a:fld>
             <a:endParaRPr lang="es-MX" dirty="0"/>
           </a:p>
@@ -1469,7 +1474,7 @@
             <a:fld id="{08B575B2-E4DC-4B86-ADFF-AC1540A85088}" type="slidenum">
               <a:rPr lang="es-MX" smtClean="0"/>
               <a:pPr/>
-              <a:t>‹Nº›</a:t>
+              <a:t>‹nº›</a:t>
             </a:fld>
             <a:endParaRPr lang="es-MX" dirty="0"/>
           </a:p>
@@ -1603,7 +1608,7 @@
             <a:fld id="{67970304-9F4D-4A06-BCEA-E573EFCCD4CE}" type="datetimeFigureOut">
               <a:rPr lang="es-MX" smtClean="0"/>
               <a:pPr/>
-              <a:t>11/10/2016</a:t>
+              <a:t>10/11/2016</a:t>
             </a:fld>
             <a:endParaRPr lang="es-MX" dirty="0"/>
           </a:p>
@@ -1646,7 +1651,7 @@
             <a:fld id="{08B575B2-E4DC-4B86-ADFF-AC1540A85088}" type="slidenum">
               <a:rPr lang="es-MX" smtClean="0"/>
               <a:pPr/>
-              <a:t>‹Nº›</a:t>
+              <a:t>‹nº›</a:t>
             </a:fld>
             <a:endParaRPr lang="es-MX" dirty="0"/>
           </a:p>
@@ -1770,7 +1775,7 @@
             <a:fld id="{67970304-9F4D-4A06-BCEA-E573EFCCD4CE}" type="datetimeFigureOut">
               <a:rPr lang="es-MX" smtClean="0"/>
               <a:pPr/>
-              <a:t>11/10/2016</a:t>
+              <a:t>10/11/2016</a:t>
             </a:fld>
             <a:endParaRPr lang="es-MX" dirty="0"/>
           </a:p>
@@ -1813,7 +1818,7 @@
             <a:fld id="{08B575B2-E4DC-4B86-ADFF-AC1540A85088}" type="slidenum">
               <a:rPr lang="es-MX" smtClean="0"/>
               <a:pPr/>
-              <a:t>‹Nº›</a:t>
+              <a:t>‹nº›</a:t>
             </a:fld>
             <a:endParaRPr lang="es-MX" dirty="0"/>
           </a:p>
@@ -2013,7 +2018,7 @@
             <a:fld id="{67970304-9F4D-4A06-BCEA-E573EFCCD4CE}" type="datetimeFigureOut">
               <a:rPr lang="es-MX" smtClean="0"/>
               <a:pPr/>
-              <a:t>11/10/2016</a:t>
+              <a:t>10/11/2016</a:t>
             </a:fld>
             <a:endParaRPr lang="es-MX" dirty="0"/>
           </a:p>
@@ -2056,7 +2061,7 @@
             <a:fld id="{08B575B2-E4DC-4B86-ADFF-AC1540A85088}" type="slidenum">
               <a:rPr lang="es-MX" smtClean="0"/>
               <a:pPr/>
-              <a:t>‹Nº›</a:t>
+              <a:t>‹nº›</a:t>
             </a:fld>
             <a:endParaRPr lang="es-MX" dirty="0"/>
           </a:p>
@@ -2298,7 +2303,7 @@
             <a:fld id="{67970304-9F4D-4A06-BCEA-E573EFCCD4CE}" type="datetimeFigureOut">
               <a:rPr lang="es-MX" smtClean="0"/>
               <a:pPr/>
-              <a:t>11/10/2016</a:t>
+              <a:t>10/11/2016</a:t>
             </a:fld>
             <a:endParaRPr lang="es-MX" dirty="0"/>
           </a:p>
@@ -2341,7 +2346,7 @@
             <a:fld id="{08B575B2-E4DC-4B86-ADFF-AC1540A85088}" type="slidenum">
               <a:rPr lang="es-MX" smtClean="0"/>
               <a:pPr/>
-              <a:t>‹Nº›</a:t>
+              <a:t>‹nº›</a:t>
             </a:fld>
             <a:endParaRPr lang="es-MX" dirty="0"/>
           </a:p>
@@ -2717,7 +2722,7 @@
             <a:fld id="{67970304-9F4D-4A06-BCEA-E573EFCCD4CE}" type="datetimeFigureOut">
               <a:rPr lang="es-MX" smtClean="0"/>
               <a:pPr/>
-              <a:t>11/10/2016</a:t>
+              <a:t>10/11/2016</a:t>
             </a:fld>
             <a:endParaRPr lang="es-MX" dirty="0"/>
           </a:p>
@@ -2760,7 +2765,7 @@
             <a:fld id="{08B575B2-E4DC-4B86-ADFF-AC1540A85088}" type="slidenum">
               <a:rPr lang="es-MX" smtClean="0"/>
               <a:pPr/>
-              <a:t>‹Nº›</a:t>
+              <a:t>‹nº›</a:t>
             </a:fld>
             <a:endParaRPr lang="es-MX" dirty="0"/>
           </a:p>
@@ -2832,7 +2837,7 @@
             <a:fld id="{67970304-9F4D-4A06-BCEA-E573EFCCD4CE}" type="datetimeFigureOut">
               <a:rPr lang="es-MX" smtClean="0"/>
               <a:pPr/>
-              <a:t>11/10/2016</a:t>
+              <a:t>10/11/2016</a:t>
             </a:fld>
             <a:endParaRPr lang="es-MX" dirty="0"/>
           </a:p>
@@ -2875,7 +2880,7 @@
             <a:fld id="{08B575B2-E4DC-4B86-ADFF-AC1540A85088}" type="slidenum">
               <a:rPr lang="es-MX" smtClean="0"/>
               <a:pPr/>
-              <a:t>‹Nº›</a:t>
+              <a:t>‹nº›</a:t>
             </a:fld>
             <a:endParaRPr lang="es-MX" dirty="0"/>
           </a:p>
@@ -2924,7 +2929,7 @@
             <a:fld id="{67970304-9F4D-4A06-BCEA-E573EFCCD4CE}" type="datetimeFigureOut">
               <a:rPr lang="es-MX" smtClean="0"/>
               <a:pPr/>
-              <a:t>11/10/2016</a:t>
+              <a:t>10/11/2016</a:t>
             </a:fld>
             <a:endParaRPr lang="es-MX" dirty="0"/>
           </a:p>
@@ -2967,7 +2972,7 @@
             <a:fld id="{08B575B2-E4DC-4B86-ADFF-AC1540A85088}" type="slidenum">
               <a:rPr lang="es-MX" smtClean="0"/>
               <a:pPr/>
-              <a:t>‹Nº›</a:t>
+              <a:t>‹nº›</a:t>
             </a:fld>
             <a:endParaRPr lang="es-MX" dirty="0"/>
           </a:p>
@@ -3198,7 +3203,7 @@
             <a:fld id="{67970304-9F4D-4A06-BCEA-E573EFCCD4CE}" type="datetimeFigureOut">
               <a:rPr lang="es-MX" smtClean="0"/>
               <a:pPr/>
-              <a:t>11/10/2016</a:t>
+              <a:t>10/11/2016</a:t>
             </a:fld>
             <a:endParaRPr lang="es-MX" dirty="0"/>
           </a:p>
@@ -3241,7 +3246,7 @@
             <a:fld id="{08B575B2-E4DC-4B86-ADFF-AC1540A85088}" type="slidenum">
               <a:rPr lang="es-MX" smtClean="0"/>
               <a:pPr/>
-              <a:t>‹Nº›</a:t>
+              <a:t>‹nº›</a:t>
             </a:fld>
             <a:endParaRPr lang="es-MX" dirty="0"/>
           </a:p>
@@ -3448,7 +3453,7 @@
             <a:fld id="{67970304-9F4D-4A06-BCEA-E573EFCCD4CE}" type="datetimeFigureOut">
               <a:rPr lang="es-MX" smtClean="0"/>
               <a:pPr/>
-              <a:t>11/10/2016</a:t>
+              <a:t>10/11/2016</a:t>
             </a:fld>
             <a:endParaRPr lang="es-MX" dirty="0"/>
           </a:p>
@@ -3491,7 +3496,7 @@
             <a:fld id="{08B575B2-E4DC-4B86-ADFF-AC1540A85088}" type="slidenum">
               <a:rPr lang="es-MX" smtClean="0"/>
               <a:pPr/>
-              <a:t>‹Nº›</a:t>
+              <a:t>‹nº›</a:t>
             </a:fld>
             <a:endParaRPr lang="es-MX" dirty="0"/>
           </a:p>
@@ -3658,7 +3663,7 @@
             <a:fld id="{67970304-9F4D-4A06-BCEA-E573EFCCD4CE}" type="datetimeFigureOut">
               <a:rPr lang="es-MX" smtClean="0"/>
               <a:pPr/>
-              <a:t>11/10/2016</a:t>
+              <a:t>10/11/2016</a:t>
             </a:fld>
             <a:endParaRPr lang="es-MX" dirty="0"/>
           </a:p>
@@ -3737,7 +3742,7 @@
             <a:fld id="{08B575B2-E4DC-4B86-ADFF-AC1540A85088}" type="slidenum">
               <a:rPr lang="es-MX" smtClean="0"/>
               <a:pPr/>
-              <a:t>‹Nº›</a:t>
+              <a:t>‹nº›</a:t>
             </a:fld>
             <a:endParaRPr lang="es-MX" dirty="0"/>
           </a:p>
@@ -4041,7 +4046,7 @@
           <a:blip r:embed="rId2" cstate="print">
             <a:extLst>
               <a:ext uri="{28A0092B-C50C-407E-A947-70E740481C1C}">
-                <a14:useLocalDpi xmlns="" xmlns:a14="http://schemas.microsoft.com/office/drawing/2010/main" val="0"/>
+                <a14:useLocalDpi xmlns:a14="http://schemas.microsoft.com/office/drawing/2010/main" val="0"/>
               </a:ext>
             </a:extLst>
           </a:blip>
@@ -4061,7 +4066,7 @@
           <a:noFill/>
           <a:extLst>
             <a:ext uri="{909E8E84-426E-40DD-AFC4-6F175D3DCCD1}">
-              <a14:hiddenFill xmlns="" xmlns:a14="http://schemas.microsoft.com/office/drawing/2010/main">
+              <a14:hiddenFill xmlns:a14="http://schemas.microsoft.com/office/drawing/2010/main">
                 <a:solidFill>
                   <a:srgbClr val="FFFFFF"/>
                 </a:solidFill>
@@ -4082,7 +4087,7 @@
           <a:blip r:embed="rId3" cstate="print">
             <a:extLst>
               <a:ext uri="{28A0092B-C50C-407E-A947-70E740481C1C}">
-                <a14:useLocalDpi xmlns="" xmlns:a14="http://schemas.microsoft.com/office/drawing/2010/main" val="0"/>
+                <a14:useLocalDpi xmlns:a14="http://schemas.microsoft.com/office/drawing/2010/main" val="0"/>
               </a:ext>
             </a:extLst>
           </a:blip>
@@ -4102,7 +4107,7 @@
           <a:noFill/>
           <a:extLst>
             <a:ext uri="{909E8E84-426E-40DD-AFC4-6F175D3DCCD1}">
-              <a14:hiddenFill xmlns="" xmlns:a14="http://schemas.microsoft.com/office/drawing/2010/main">
+              <a14:hiddenFill xmlns:a14="http://schemas.microsoft.com/office/drawing/2010/main">
                 <a:solidFill>
                   <a:srgbClr val="FFFFFF"/>
                 </a:solidFill>
@@ -4224,6 +4229,18 @@
           <a:lstStyle/>
           <a:p>
             <a:r>
+              <a:rPr lang="es-MX" sz="5400" b="1" dirty="0">
+                <a:effectLst>
+                  <a:outerShdw blurRad="38100" dist="38100" dir="2700000" algn="tl">
+                    <a:srgbClr val="000000">
+                      <a:alpha val="43137"/>
+                    </a:srgbClr>
+                  </a:outerShdw>
+                </a:effectLst>
+              </a:rPr>
+              <a:t>E</a:t>
+            </a:r>
+            <a:r>
               <a:rPr lang="es-MX" sz="5400" b="1" dirty="0" smtClean="0">
                 <a:effectLst>
                   <a:outerShdw blurRad="38100" dist="38100" dir="2700000" algn="tl">
@@ -4233,7 +4250,31 @@
                   </a:outerShdw>
                 </a:effectLst>
               </a:rPr>
-              <a:t>Propuesta de indicadores para la evaluación de zonas de refugio pesquero</a:t>
+              <a:t>valuación </a:t>
+            </a:r>
+            <a:r>
+              <a:rPr lang="es-MX" sz="5400" b="1" dirty="0" smtClean="0">
+                <a:effectLst>
+                  <a:outerShdw blurRad="38100" dist="38100" dir="2700000" algn="tl">
+                    <a:srgbClr val="000000">
+                      <a:alpha val="43137"/>
+                    </a:srgbClr>
+                  </a:outerShdw>
+                </a:effectLst>
+              </a:rPr>
+              <a:t>de zonas de </a:t>
+            </a:r>
+            <a:r>
+              <a:rPr lang="es-MX" sz="5400" b="1" dirty="0" smtClean="0">
+                <a:effectLst>
+                  <a:outerShdw blurRad="38100" dist="38100" dir="2700000" algn="tl">
+                    <a:srgbClr val="000000">
+                      <a:alpha val="43137"/>
+                    </a:srgbClr>
+                  </a:outerShdw>
+                </a:effectLst>
+              </a:rPr>
+              <a:t>no pesca en México</a:t>
             </a:r>
             <a:endParaRPr lang="es-MX" sz="5400" b="1" dirty="0">
               <a:effectLst>
@@ -4259,7 +4300,7 @@
           <a:blip r:embed="rId4" cstate="print">
             <a:extLst>
               <a:ext uri="{28A0092B-C50C-407E-A947-70E740481C1C}">
-                <a14:useLocalDpi xmlns="" xmlns:a14="http://schemas.microsoft.com/office/drawing/2010/main" val="0"/>
+                <a14:useLocalDpi xmlns:a14="http://schemas.microsoft.com/office/drawing/2010/main" val="0"/>
               </a:ext>
             </a:extLst>
           </a:blip>
@@ -4279,7 +4320,7 @@
           <a:noFill/>
           <a:extLst>
             <a:ext uri="{909E8E84-426E-40DD-AFC4-6F175D3DCCD1}">
-              <a14:hiddenFill xmlns="" xmlns:a14="http://schemas.microsoft.com/office/drawing/2010/main">
+              <a14:hiddenFill xmlns:a14="http://schemas.microsoft.com/office/drawing/2010/main">
                 <a:solidFill>
                   <a:srgbClr val="FFFFFF"/>
                 </a:solidFill>
@@ -4404,7 +4445,7 @@
             <a:blip r:embed="rId3" cstate="print">
               <a:extLst>
                 <a:ext uri="{28A0092B-C50C-407E-A947-70E740481C1C}">
-                  <a14:useLocalDpi xmlns="" xmlns:a14="http://schemas.microsoft.com/office/drawing/2010/main" val="0"/>
+                  <a14:useLocalDpi xmlns:a14="http://schemas.microsoft.com/office/drawing/2010/main" val="0"/>
                 </a:ext>
               </a:extLst>
             </a:blip>
@@ -4424,7 +4465,7 @@
             <a:noFill/>
             <a:extLst>
               <a:ext uri="{909E8E84-426E-40DD-AFC4-6F175D3DCCD1}">
-                <a14:hiddenFill xmlns="" xmlns:a14="http://schemas.microsoft.com/office/drawing/2010/main">
+                <a14:hiddenFill xmlns:a14="http://schemas.microsoft.com/office/drawing/2010/main">
                   <a:solidFill>
                     <a:srgbClr val="FFFFFF"/>
                   </a:solidFill>
@@ -4445,7 +4486,7 @@
             <a:blip r:embed="rId4" cstate="print">
               <a:extLst>
                 <a:ext uri="{28A0092B-C50C-407E-A947-70E740481C1C}">
-                  <a14:useLocalDpi xmlns="" xmlns:a14="http://schemas.microsoft.com/office/drawing/2010/main" val="0"/>
+                  <a14:useLocalDpi xmlns:a14="http://schemas.microsoft.com/office/drawing/2010/main" val="0"/>
                 </a:ext>
               </a:extLst>
             </a:blip>
@@ -4465,7 +4506,7 @@
             <a:noFill/>
             <a:extLst>
               <a:ext uri="{909E8E84-426E-40DD-AFC4-6F175D3DCCD1}">
-                <a14:hiddenFill xmlns="" xmlns:a14="http://schemas.microsoft.com/office/drawing/2010/main">
+                <a14:hiddenFill xmlns:a14="http://schemas.microsoft.com/office/drawing/2010/main">
                   <a:solidFill>
                     <a:srgbClr val="FFFFFF"/>
                   </a:solidFill>
@@ -4486,7 +4527,7 @@
             <a:blip r:embed="rId5" cstate="print">
               <a:extLst>
                 <a:ext uri="{28A0092B-C50C-407E-A947-70E740481C1C}">
-                  <a14:useLocalDpi xmlns="" xmlns:a14="http://schemas.microsoft.com/office/drawing/2010/main" val="0"/>
+                  <a14:useLocalDpi xmlns:a14="http://schemas.microsoft.com/office/drawing/2010/main" val="0"/>
                 </a:ext>
               </a:extLst>
             </a:blip>
@@ -4506,7 +4547,7 @@
             <a:noFill/>
             <a:extLst>
               <a:ext uri="{909E8E84-426E-40DD-AFC4-6F175D3DCCD1}">
-                <a14:hiddenFill xmlns="" xmlns:a14="http://schemas.microsoft.com/office/drawing/2010/main">
+                <a14:hiddenFill xmlns:a14="http://schemas.microsoft.com/office/drawing/2010/main">
                   <a:solidFill>
                     <a:srgbClr val="FFFFFF"/>
                   </a:solidFill>
@@ -5210,7 +5251,7 @@
             <a:blip r:embed="rId2" cstate="print">
               <a:extLst>
                 <a:ext uri="{28A0092B-C50C-407E-A947-70E740481C1C}">
-                  <a14:useLocalDpi xmlns="" xmlns:a14="http://schemas.microsoft.com/office/drawing/2010/main" val="0"/>
+                  <a14:useLocalDpi xmlns:a14="http://schemas.microsoft.com/office/drawing/2010/main" val="0"/>
                 </a:ext>
               </a:extLst>
             </a:blip>
@@ -5230,7 +5271,7 @@
             <a:noFill/>
             <a:extLst>
               <a:ext uri="{909E8E84-426E-40DD-AFC4-6F175D3DCCD1}">
-                <a14:hiddenFill xmlns="" xmlns:a14="http://schemas.microsoft.com/office/drawing/2010/main">
+                <a14:hiddenFill xmlns:a14="http://schemas.microsoft.com/office/drawing/2010/main">
                   <a:solidFill>
                     <a:srgbClr val="FFFFFF"/>
                   </a:solidFill>
@@ -5251,7 +5292,7 @@
             <a:blip r:embed="rId3" cstate="print">
               <a:extLst>
                 <a:ext uri="{28A0092B-C50C-407E-A947-70E740481C1C}">
-                  <a14:useLocalDpi xmlns="" xmlns:a14="http://schemas.microsoft.com/office/drawing/2010/main" val="0"/>
+                  <a14:useLocalDpi xmlns:a14="http://schemas.microsoft.com/office/drawing/2010/main" val="0"/>
                 </a:ext>
               </a:extLst>
             </a:blip>
@@ -5271,7 +5312,7 @@
             <a:noFill/>
             <a:extLst>
               <a:ext uri="{909E8E84-426E-40DD-AFC4-6F175D3DCCD1}">
-                <a14:hiddenFill xmlns="" xmlns:a14="http://schemas.microsoft.com/office/drawing/2010/main">
+                <a14:hiddenFill xmlns:a14="http://schemas.microsoft.com/office/drawing/2010/main">
                   <a:solidFill>
                     <a:srgbClr val="FFFFFF"/>
                   </a:solidFill>
@@ -5292,7 +5333,7 @@
             <a:blip r:embed="rId4" cstate="print">
               <a:extLst>
                 <a:ext uri="{28A0092B-C50C-407E-A947-70E740481C1C}">
-                  <a14:useLocalDpi xmlns="" xmlns:a14="http://schemas.microsoft.com/office/drawing/2010/main" val="0"/>
+                  <a14:useLocalDpi xmlns:a14="http://schemas.microsoft.com/office/drawing/2010/main" val="0"/>
                 </a:ext>
               </a:extLst>
             </a:blip>
@@ -5312,7 +5353,7 @@
             <a:noFill/>
             <a:extLst>
               <a:ext uri="{909E8E84-426E-40DD-AFC4-6F175D3DCCD1}">
-                <a14:hiddenFill xmlns="" xmlns:a14="http://schemas.microsoft.com/office/drawing/2010/main">
+                <a14:hiddenFill xmlns:a14="http://schemas.microsoft.com/office/drawing/2010/main">
                   <a:solidFill>
                     <a:srgbClr val="FFFFFF"/>
                   </a:solidFill>
@@ -6226,7 +6267,7 @@
               <a:blip r:embed="rId2" cstate="print">
                 <a:extLst>
                   <a:ext uri="{28A0092B-C50C-407E-A947-70E740481C1C}">
-                    <a14:useLocalDpi xmlns="" xmlns:a14="http://schemas.microsoft.com/office/drawing/2010/main" val="0"/>
+                    <a14:useLocalDpi xmlns:a14="http://schemas.microsoft.com/office/drawing/2010/main" val="0"/>
                   </a:ext>
                 </a:extLst>
               </a:blip>
@@ -6246,7 +6287,7 @@
               <a:noFill/>
               <a:extLst>
                 <a:ext uri="{909E8E84-426E-40DD-AFC4-6F175D3DCCD1}">
-                  <a14:hiddenFill xmlns="" xmlns:a14="http://schemas.microsoft.com/office/drawing/2010/main">
+                  <a14:hiddenFill xmlns:a14="http://schemas.microsoft.com/office/drawing/2010/main">
                     <a:solidFill>
                       <a:srgbClr val="FFFFFF"/>
                     </a:solidFill>
@@ -6267,7 +6308,7 @@
               <a:blip r:embed="rId3" cstate="print">
                 <a:extLst>
                   <a:ext uri="{28A0092B-C50C-407E-A947-70E740481C1C}">
-                    <a14:useLocalDpi xmlns="" xmlns:a14="http://schemas.microsoft.com/office/drawing/2010/main" val="0"/>
+                    <a14:useLocalDpi xmlns:a14="http://schemas.microsoft.com/office/drawing/2010/main" val="0"/>
                   </a:ext>
                 </a:extLst>
               </a:blip>
@@ -6287,7 +6328,7 @@
               <a:noFill/>
               <a:extLst>
                 <a:ext uri="{909E8E84-426E-40DD-AFC4-6F175D3DCCD1}">
-                  <a14:hiddenFill xmlns="" xmlns:a14="http://schemas.microsoft.com/office/drawing/2010/main">
+                  <a14:hiddenFill xmlns:a14="http://schemas.microsoft.com/office/drawing/2010/main">
                     <a:solidFill>
                       <a:srgbClr val="FFFFFF"/>
                     </a:solidFill>
@@ -6308,7 +6349,7 @@
               <a:blip r:embed="rId4" cstate="print">
                 <a:extLst>
                   <a:ext uri="{28A0092B-C50C-407E-A947-70E740481C1C}">
-                    <a14:useLocalDpi xmlns="" xmlns:a14="http://schemas.microsoft.com/office/drawing/2010/main" val="0"/>
+                    <a14:useLocalDpi xmlns:a14="http://schemas.microsoft.com/office/drawing/2010/main" val="0"/>
                   </a:ext>
                 </a:extLst>
               </a:blip>
@@ -6328,7 +6369,7 @@
               <a:noFill/>
               <a:extLst>
                 <a:ext uri="{909E8E84-426E-40DD-AFC4-6F175D3DCCD1}">
-                  <a14:hiddenFill xmlns="" xmlns:a14="http://schemas.microsoft.com/office/drawing/2010/main">
+                  <a14:hiddenFill xmlns:a14="http://schemas.microsoft.com/office/drawing/2010/main">
                     <a:solidFill>
                       <a:srgbClr val="FFFFFF"/>
                     </a:solidFill>
@@ -6389,7 +6430,7 @@
             <p:ph idx="1"/>
             <p:extLst>
               <p:ext uri="{D42A27DB-BD31-4B8C-83A1-F6EECF244321}">
-                <p14:modId xmlns="" xmlns:p14="http://schemas.microsoft.com/office/powerpoint/2010/main" val="842756025"/>
+                <p14:modId xmlns:p14="http://schemas.microsoft.com/office/powerpoint/2010/main" val="842756025"/>
               </p:ext>
             </p:extLst>
           </p:nvPr>
@@ -7457,7 +7498,7 @@
             <a:blip r:embed="rId2" cstate="print">
               <a:extLst>
                 <a:ext uri="{28A0092B-C50C-407E-A947-70E740481C1C}">
-                  <a14:useLocalDpi xmlns="" xmlns:a14="http://schemas.microsoft.com/office/drawing/2010/main" val="0"/>
+                  <a14:useLocalDpi xmlns:a14="http://schemas.microsoft.com/office/drawing/2010/main" val="0"/>
                 </a:ext>
               </a:extLst>
             </a:blip>
@@ -7477,7 +7518,7 @@
             <a:noFill/>
             <a:extLst>
               <a:ext uri="{909E8E84-426E-40DD-AFC4-6F175D3DCCD1}">
-                <a14:hiddenFill xmlns="" xmlns:a14="http://schemas.microsoft.com/office/drawing/2010/main">
+                <a14:hiddenFill xmlns:a14="http://schemas.microsoft.com/office/drawing/2010/main">
                   <a:solidFill>
                     <a:srgbClr val="FFFFFF"/>
                   </a:solidFill>
@@ -7498,7 +7539,7 @@
             <a:blip r:embed="rId3" cstate="print">
               <a:extLst>
                 <a:ext uri="{28A0092B-C50C-407E-A947-70E740481C1C}">
-                  <a14:useLocalDpi xmlns="" xmlns:a14="http://schemas.microsoft.com/office/drawing/2010/main" val="0"/>
+                  <a14:useLocalDpi xmlns:a14="http://schemas.microsoft.com/office/drawing/2010/main" val="0"/>
                 </a:ext>
               </a:extLst>
             </a:blip>
@@ -7518,7 +7559,7 @@
             <a:noFill/>
             <a:extLst>
               <a:ext uri="{909E8E84-426E-40DD-AFC4-6F175D3DCCD1}">
-                <a14:hiddenFill xmlns="" xmlns:a14="http://schemas.microsoft.com/office/drawing/2010/main">
+                <a14:hiddenFill xmlns:a14="http://schemas.microsoft.com/office/drawing/2010/main">
                   <a:solidFill>
                     <a:srgbClr val="FFFFFF"/>
                   </a:solidFill>
@@ -7539,7 +7580,7 @@
             <a:blip r:embed="rId4" cstate="print">
               <a:extLst>
                 <a:ext uri="{28A0092B-C50C-407E-A947-70E740481C1C}">
-                  <a14:useLocalDpi xmlns="" xmlns:a14="http://schemas.microsoft.com/office/drawing/2010/main" val="0"/>
+                  <a14:useLocalDpi xmlns:a14="http://schemas.microsoft.com/office/drawing/2010/main" val="0"/>
                 </a:ext>
               </a:extLst>
             </a:blip>
@@ -7559,7 +7600,7 @@
             <a:noFill/>
             <a:extLst>
               <a:ext uri="{909E8E84-426E-40DD-AFC4-6F175D3DCCD1}">
-                <a14:hiddenFill xmlns="" xmlns:a14="http://schemas.microsoft.com/office/drawing/2010/main">
+                <a14:hiddenFill xmlns:a14="http://schemas.microsoft.com/office/drawing/2010/main">
                   <a:solidFill>
                     <a:srgbClr val="FFFFFF"/>
                   </a:solidFill>
@@ -7743,7 +7784,7 @@
               <a:blip r:embed="rId2" cstate="print">
                 <a:extLst>
                   <a:ext uri="{28A0092B-C50C-407E-A947-70E740481C1C}">
-                    <a14:useLocalDpi xmlns="" xmlns:a14="http://schemas.microsoft.com/office/drawing/2010/main" val="0"/>
+                    <a14:useLocalDpi xmlns:a14="http://schemas.microsoft.com/office/drawing/2010/main" val="0"/>
                   </a:ext>
                 </a:extLst>
               </a:blip>
@@ -7763,7 +7804,7 @@
               <a:noFill/>
               <a:extLst>
                 <a:ext uri="{909E8E84-426E-40DD-AFC4-6F175D3DCCD1}">
-                  <a14:hiddenFill xmlns="" xmlns:a14="http://schemas.microsoft.com/office/drawing/2010/main">
+                  <a14:hiddenFill xmlns:a14="http://schemas.microsoft.com/office/drawing/2010/main">
                     <a:solidFill>
                       <a:srgbClr val="FFFFFF"/>
                     </a:solidFill>
@@ -7784,7 +7825,7 @@
               <a:blip r:embed="rId3" cstate="print">
                 <a:extLst>
                   <a:ext uri="{28A0092B-C50C-407E-A947-70E740481C1C}">
-                    <a14:useLocalDpi xmlns="" xmlns:a14="http://schemas.microsoft.com/office/drawing/2010/main" val="0"/>
+                    <a14:useLocalDpi xmlns:a14="http://schemas.microsoft.com/office/drawing/2010/main" val="0"/>
                   </a:ext>
                 </a:extLst>
               </a:blip>
@@ -7804,7 +7845,7 @@
               <a:noFill/>
               <a:extLst>
                 <a:ext uri="{909E8E84-426E-40DD-AFC4-6F175D3DCCD1}">
-                  <a14:hiddenFill xmlns="" xmlns:a14="http://schemas.microsoft.com/office/drawing/2010/main">
+                  <a14:hiddenFill xmlns:a14="http://schemas.microsoft.com/office/drawing/2010/main">
                     <a:solidFill>
                       <a:srgbClr val="FFFFFF"/>
                     </a:solidFill>
@@ -7825,7 +7866,7 @@
               <a:blip r:embed="rId4" cstate="print">
                 <a:extLst>
                   <a:ext uri="{28A0092B-C50C-407E-A947-70E740481C1C}">
-                    <a14:useLocalDpi xmlns="" xmlns:a14="http://schemas.microsoft.com/office/drawing/2010/main" val="0"/>
+                    <a14:useLocalDpi xmlns:a14="http://schemas.microsoft.com/office/drawing/2010/main" val="0"/>
                   </a:ext>
                 </a:extLst>
               </a:blip>
@@ -7845,7 +7886,7 @@
               <a:noFill/>
               <a:extLst>
                 <a:ext uri="{909E8E84-426E-40DD-AFC4-6F175D3DCCD1}">
-                  <a14:hiddenFill xmlns="" xmlns:a14="http://schemas.microsoft.com/office/drawing/2010/main">
+                  <a14:hiddenFill xmlns:a14="http://schemas.microsoft.com/office/drawing/2010/main">
                     <a:solidFill>
                       <a:srgbClr val="FFFFFF"/>
                     </a:solidFill>
@@ -7906,7 +7947,7 @@
             <p:ph idx="1"/>
             <p:extLst>
               <p:ext uri="{D42A27DB-BD31-4B8C-83A1-F6EECF244321}">
-                <p14:modId xmlns="" xmlns:p14="http://schemas.microsoft.com/office/powerpoint/2010/main" val="1701132709"/>
+                <p14:modId xmlns:p14="http://schemas.microsoft.com/office/powerpoint/2010/main" val="1701132709"/>
               </p:ext>
             </p:extLst>
           </p:nvPr>
@@ -8532,7 +8573,7 @@
     </p:spTree>
     <p:extLst>
       <p:ext uri="{BB962C8B-B14F-4D97-AF65-F5344CB8AC3E}">
-        <p14:creationId xmlns="" xmlns:p14="http://schemas.microsoft.com/office/powerpoint/2010/main" val="1643352218"/>
+        <p14:creationId xmlns:p14="http://schemas.microsoft.com/office/powerpoint/2010/main" val="1643352218"/>
       </p:ext>
     </p:extLst>
   </p:cSld>
@@ -8620,7 +8661,7 @@
             <a:blip r:embed="rId3" cstate="print">
               <a:extLst>
                 <a:ext uri="{28A0092B-C50C-407E-A947-70E740481C1C}">
-                  <a14:useLocalDpi xmlns="" xmlns:a14="http://schemas.microsoft.com/office/drawing/2010/main" val="0"/>
+                  <a14:useLocalDpi xmlns:a14="http://schemas.microsoft.com/office/drawing/2010/main" val="0"/>
                 </a:ext>
               </a:extLst>
             </a:blip>
@@ -8640,7 +8681,7 @@
             <a:noFill/>
             <a:extLst>
               <a:ext uri="{909E8E84-426E-40DD-AFC4-6F175D3DCCD1}">
-                <a14:hiddenFill xmlns="" xmlns:a14="http://schemas.microsoft.com/office/drawing/2010/main">
+                <a14:hiddenFill xmlns:a14="http://schemas.microsoft.com/office/drawing/2010/main">
                   <a:solidFill>
                     <a:srgbClr val="FFFFFF"/>
                   </a:solidFill>
@@ -8661,7 +8702,7 @@
             <a:blip r:embed="rId4" cstate="print">
               <a:extLst>
                 <a:ext uri="{28A0092B-C50C-407E-A947-70E740481C1C}">
-                  <a14:useLocalDpi xmlns="" xmlns:a14="http://schemas.microsoft.com/office/drawing/2010/main" val="0"/>
+                  <a14:useLocalDpi xmlns:a14="http://schemas.microsoft.com/office/drawing/2010/main" val="0"/>
                 </a:ext>
               </a:extLst>
             </a:blip>
@@ -8681,7 +8722,7 @@
             <a:noFill/>
             <a:extLst>
               <a:ext uri="{909E8E84-426E-40DD-AFC4-6F175D3DCCD1}">
-                <a14:hiddenFill xmlns="" xmlns:a14="http://schemas.microsoft.com/office/drawing/2010/main">
+                <a14:hiddenFill xmlns:a14="http://schemas.microsoft.com/office/drawing/2010/main">
                   <a:solidFill>
                     <a:srgbClr val="FFFFFF"/>
                   </a:solidFill>
@@ -8702,7 +8743,7 @@
             <a:blip r:embed="rId5" cstate="print">
               <a:extLst>
                 <a:ext uri="{28A0092B-C50C-407E-A947-70E740481C1C}">
-                  <a14:useLocalDpi xmlns="" xmlns:a14="http://schemas.microsoft.com/office/drawing/2010/main" val="0"/>
+                  <a14:useLocalDpi xmlns:a14="http://schemas.microsoft.com/office/drawing/2010/main" val="0"/>
                 </a:ext>
               </a:extLst>
             </a:blip>
@@ -8722,7 +8763,7 @@
             <a:noFill/>
             <a:extLst>
               <a:ext uri="{909E8E84-426E-40DD-AFC4-6F175D3DCCD1}">
-                <a14:hiddenFill xmlns="" xmlns:a14="http://schemas.microsoft.com/office/drawing/2010/main">
+                <a14:hiddenFill xmlns:a14="http://schemas.microsoft.com/office/drawing/2010/main">
                   <a:solidFill>
                     <a:srgbClr val="FFFFFF"/>
                   </a:solidFill>
@@ -9065,7 +9106,7 @@
             <a:blip r:embed="rId3" cstate="print">
               <a:extLst>
                 <a:ext uri="{28A0092B-C50C-407E-A947-70E740481C1C}">
-                  <a14:useLocalDpi xmlns="" xmlns:a14="http://schemas.microsoft.com/office/drawing/2010/main" val="0"/>
+                  <a14:useLocalDpi xmlns:a14="http://schemas.microsoft.com/office/drawing/2010/main" val="0"/>
                 </a:ext>
               </a:extLst>
             </a:blip>
@@ -9085,7 +9126,7 @@
             <a:noFill/>
             <a:extLst>
               <a:ext uri="{909E8E84-426E-40DD-AFC4-6F175D3DCCD1}">
-                <a14:hiddenFill xmlns="" xmlns:a14="http://schemas.microsoft.com/office/drawing/2010/main">
+                <a14:hiddenFill xmlns:a14="http://schemas.microsoft.com/office/drawing/2010/main">
                   <a:solidFill>
                     <a:srgbClr val="FFFFFF"/>
                   </a:solidFill>
@@ -9106,7 +9147,7 @@
             <a:blip r:embed="rId4" cstate="print">
               <a:extLst>
                 <a:ext uri="{28A0092B-C50C-407E-A947-70E740481C1C}">
-                  <a14:useLocalDpi xmlns="" xmlns:a14="http://schemas.microsoft.com/office/drawing/2010/main" val="0"/>
+                  <a14:useLocalDpi xmlns:a14="http://schemas.microsoft.com/office/drawing/2010/main" val="0"/>
                 </a:ext>
               </a:extLst>
             </a:blip>
@@ -9126,7 +9167,7 @@
             <a:noFill/>
             <a:extLst>
               <a:ext uri="{909E8E84-426E-40DD-AFC4-6F175D3DCCD1}">
-                <a14:hiddenFill xmlns="" xmlns:a14="http://schemas.microsoft.com/office/drawing/2010/main">
+                <a14:hiddenFill xmlns:a14="http://schemas.microsoft.com/office/drawing/2010/main">
                   <a:solidFill>
                     <a:srgbClr val="FFFFFF"/>
                   </a:solidFill>
@@ -9147,7 +9188,7 @@
             <a:blip r:embed="rId5" cstate="print">
               <a:extLst>
                 <a:ext uri="{28A0092B-C50C-407E-A947-70E740481C1C}">
-                  <a14:useLocalDpi xmlns="" xmlns:a14="http://schemas.microsoft.com/office/drawing/2010/main" val="0"/>
+                  <a14:useLocalDpi xmlns:a14="http://schemas.microsoft.com/office/drawing/2010/main" val="0"/>
                 </a:ext>
               </a:extLst>
             </a:blip>
@@ -9167,7 +9208,7 @@
             <a:noFill/>
             <a:extLst>
               <a:ext uri="{909E8E84-426E-40DD-AFC4-6F175D3DCCD1}">
-                <a14:hiddenFill xmlns="" xmlns:a14="http://schemas.microsoft.com/office/drawing/2010/main">
+                <a14:hiddenFill xmlns:a14="http://schemas.microsoft.com/office/drawing/2010/main">
                   <a:solidFill>
                     <a:srgbClr val="FFFFFF"/>
                   </a:solidFill>
@@ -9358,7 +9399,7 @@
               <a:blip r:embed="rId2" cstate="print">
                 <a:extLst>
                   <a:ext uri="{28A0092B-C50C-407E-A947-70E740481C1C}">
-                    <a14:useLocalDpi xmlns="" xmlns:a14="http://schemas.microsoft.com/office/drawing/2010/main" val="0"/>
+                    <a14:useLocalDpi xmlns:a14="http://schemas.microsoft.com/office/drawing/2010/main" val="0"/>
                   </a:ext>
                 </a:extLst>
               </a:blip>
@@ -9378,7 +9419,7 @@
               <a:noFill/>
               <a:extLst>
                 <a:ext uri="{909E8E84-426E-40DD-AFC4-6F175D3DCCD1}">
-                  <a14:hiddenFill xmlns="" xmlns:a14="http://schemas.microsoft.com/office/drawing/2010/main">
+                  <a14:hiddenFill xmlns:a14="http://schemas.microsoft.com/office/drawing/2010/main">
                     <a:solidFill>
                       <a:srgbClr val="FFFFFF"/>
                     </a:solidFill>
@@ -9399,7 +9440,7 @@
               <a:blip r:embed="rId3" cstate="print">
                 <a:extLst>
                   <a:ext uri="{28A0092B-C50C-407E-A947-70E740481C1C}">
-                    <a14:useLocalDpi xmlns="" xmlns:a14="http://schemas.microsoft.com/office/drawing/2010/main" val="0"/>
+                    <a14:useLocalDpi xmlns:a14="http://schemas.microsoft.com/office/drawing/2010/main" val="0"/>
                   </a:ext>
                 </a:extLst>
               </a:blip>
@@ -9419,7 +9460,7 @@
               <a:noFill/>
               <a:extLst>
                 <a:ext uri="{909E8E84-426E-40DD-AFC4-6F175D3DCCD1}">
-                  <a14:hiddenFill xmlns="" xmlns:a14="http://schemas.microsoft.com/office/drawing/2010/main">
+                  <a14:hiddenFill xmlns:a14="http://schemas.microsoft.com/office/drawing/2010/main">
                     <a:solidFill>
                       <a:srgbClr val="FFFFFF"/>
                     </a:solidFill>
@@ -9440,7 +9481,7 @@
               <a:blip r:embed="rId4" cstate="print">
                 <a:extLst>
                   <a:ext uri="{28A0092B-C50C-407E-A947-70E740481C1C}">
-                    <a14:useLocalDpi xmlns="" xmlns:a14="http://schemas.microsoft.com/office/drawing/2010/main" val="0"/>
+                    <a14:useLocalDpi xmlns:a14="http://schemas.microsoft.com/office/drawing/2010/main" val="0"/>
                   </a:ext>
                 </a:extLst>
               </a:blip>
@@ -9460,7 +9501,7 @@
               <a:noFill/>
               <a:extLst>
                 <a:ext uri="{909E8E84-426E-40DD-AFC4-6F175D3DCCD1}">
-                  <a14:hiddenFill xmlns="" xmlns:a14="http://schemas.microsoft.com/office/drawing/2010/main">
+                  <a14:hiddenFill xmlns:a14="http://schemas.microsoft.com/office/drawing/2010/main">
                     <a:solidFill>
                       <a:srgbClr val="FFFFFF"/>
                     </a:solidFill>
@@ -9583,7 +9624,7 @@
               <a:blip r:embed="rId2" cstate="print">
                 <a:extLst>
                   <a:ext uri="{28A0092B-C50C-407E-A947-70E740481C1C}">
-                    <a14:useLocalDpi xmlns="" xmlns:a14="http://schemas.microsoft.com/office/drawing/2010/main" val="0"/>
+                    <a14:useLocalDpi xmlns:a14="http://schemas.microsoft.com/office/drawing/2010/main" val="0"/>
                   </a:ext>
                 </a:extLst>
               </a:blip>
@@ -9603,7 +9644,7 @@
               <a:noFill/>
               <a:extLst>
                 <a:ext uri="{909E8E84-426E-40DD-AFC4-6F175D3DCCD1}">
-                  <a14:hiddenFill xmlns="" xmlns:a14="http://schemas.microsoft.com/office/drawing/2010/main">
+                  <a14:hiddenFill xmlns:a14="http://schemas.microsoft.com/office/drawing/2010/main">
                     <a:solidFill>
                       <a:srgbClr val="FFFFFF"/>
                     </a:solidFill>
@@ -9624,7 +9665,7 @@
               <a:blip r:embed="rId3" cstate="print">
                 <a:extLst>
                   <a:ext uri="{28A0092B-C50C-407E-A947-70E740481C1C}">
-                    <a14:useLocalDpi xmlns="" xmlns:a14="http://schemas.microsoft.com/office/drawing/2010/main" val="0"/>
+                    <a14:useLocalDpi xmlns:a14="http://schemas.microsoft.com/office/drawing/2010/main" val="0"/>
                   </a:ext>
                 </a:extLst>
               </a:blip>
@@ -9644,7 +9685,7 @@
               <a:noFill/>
               <a:extLst>
                 <a:ext uri="{909E8E84-426E-40DD-AFC4-6F175D3DCCD1}">
-                  <a14:hiddenFill xmlns="" xmlns:a14="http://schemas.microsoft.com/office/drawing/2010/main">
+                  <a14:hiddenFill xmlns:a14="http://schemas.microsoft.com/office/drawing/2010/main">
                     <a:solidFill>
                       <a:srgbClr val="FFFFFF"/>
                     </a:solidFill>
@@ -9665,7 +9706,7 @@
               <a:blip r:embed="rId4" cstate="print">
                 <a:extLst>
                   <a:ext uri="{28A0092B-C50C-407E-A947-70E740481C1C}">
-                    <a14:useLocalDpi xmlns="" xmlns:a14="http://schemas.microsoft.com/office/drawing/2010/main" val="0"/>
+                    <a14:useLocalDpi xmlns:a14="http://schemas.microsoft.com/office/drawing/2010/main" val="0"/>
                   </a:ext>
                 </a:extLst>
               </a:blip>
@@ -9685,7 +9726,7 @@
               <a:noFill/>
               <a:extLst>
                 <a:ext uri="{909E8E84-426E-40DD-AFC4-6F175D3DCCD1}">
-                  <a14:hiddenFill xmlns="" xmlns:a14="http://schemas.microsoft.com/office/drawing/2010/main">
+                  <a14:hiddenFill xmlns:a14="http://schemas.microsoft.com/office/drawing/2010/main">
                     <a:solidFill>
                       <a:srgbClr val="FFFFFF"/>
                     </a:solidFill>
@@ -9746,7 +9787,7 @@
             <p:ph idx="1"/>
             <p:extLst>
               <p:ext uri="{D42A27DB-BD31-4B8C-83A1-F6EECF244321}">
-                <p14:modId xmlns="" xmlns:p14="http://schemas.microsoft.com/office/powerpoint/2010/main" val="3126632509"/>
+                <p14:modId xmlns:p14="http://schemas.microsoft.com/office/powerpoint/2010/main" val="3126632509"/>
               </p:ext>
             </p:extLst>
           </p:nvPr>
@@ -10332,7 +10373,7 @@
     </p:spTree>
     <p:extLst>
       <p:ext uri="{BB962C8B-B14F-4D97-AF65-F5344CB8AC3E}">
-        <p14:creationId xmlns="" xmlns:p14="http://schemas.microsoft.com/office/powerpoint/2010/main" val="3918357120"/>
+        <p14:creationId xmlns:p14="http://schemas.microsoft.com/office/powerpoint/2010/main" val="3918357120"/>
       </p:ext>
     </p:extLst>
   </p:cSld>
@@ -10686,7 +10727,7 @@
             <a:blip r:embed="rId2" cstate="print">
               <a:extLst>
                 <a:ext uri="{28A0092B-C50C-407E-A947-70E740481C1C}">
-                  <a14:useLocalDpi xmlns="" xmlns:a14="http://schemas.microsoft.com/office/drawing/2010/main" val="0"/>
+                  <a14:useLocalDpi xmlns:a14="http://schemas.microsoft.com/office/drawing/2010/main" val="0"/>
                 </a:ext>
               </a:extLst>
             </a:blip>
@@ -10706,7 +10747,7 @@
             <a:noFill/>
             <a:extLst>
               <a:ext uri="{909E8E84-426E-40DD-AFC4-6F175D3DCCD1}">
-                <a14:hiddenFill xmlns="" xmlns:a14="http://schemas.microsoft.com/office/drawing/2010/main">
+                <a14:hiddenFill xmlns:a14="http://schemas.microsoft.com/office/drawing/2010/main">
                   <a:solidFill>
                     <a:srgbClr val="FFFFFF"/>
                   </a:solidFill>
@@ -10727,7 +10768,7 @@
             <a:blip r:embed="rId3" cstate="print">
               <a:extLst>
                 <a:ext uri="{28A0092B-C50C-407E-A947-70E740481C1C}">
-                  <a14:useLocalDpi xmlns="" xmlns:a14="http://schemas.microsoft.com/office/drawing/2010/main" val="0"/>
+                  <a14:useLocalDpi xmlns:a14="http://schemas.microsoft.com/office/drawing/2010/main" val="0"/>
                 </a:ext>
               </a:extLst>
             </a:blip>
@@ -10747,7 +10788,7 @@
             <a:noFill/>
             <a:extLst>
               <a:ext uri="{909E8E84-426E-40DD-AFC4-6F175D3DCCD1}">
-                <a14:hiddenFill xmlns="" xmlns:a14="http://schemas.microsoft.com/office/drawing/2010/main">
+                <a14:hiddenFill xmlns:a14="http://schemas.microsoft.com/office/drawing/2010/main">
                   <a:solidFill>
                     <a:srgbClr val="FFFFFF"/>
                   </a:solidFill>
@@ -10768,7 +10809,7 @@
             <a:blip r:embed="rId4" cstate="print">
               <a:extLst>
                 <a:ext uri="{28A0092B-C50C-407E-A947-70E740481C1C}">
-                  <a14:useLocalDpi xmlns="" xmlns:a14="http://schemas.microsoft.com/office/drawing/2010/main" val="0"/>
+                  <a14:useLocalDpi xmlns:a14="http://schemas.microsoft.com/office/drawing/2010/main" val="0"/>
                 </a:ext>
               </a:extLst>
             </a:blip>
@@ -10788,7 +10829,7 @@
             <a:noFill/>
             <a:extLst>
               <a:ext uri="{909E8E84-426E-40DD-AFC4-6F175D3DCCD1}">
-                <a14:hiddenFill xmlns="" xmlns:a14="http://schemas.microsoft.com/office/drawing/2010/main">
+                <a14:hiddenFill xmlns:a14="http://schemas.microsoft.com/office/drawing/2010/main">
                   <a:solidFill>
                     <a:srgbClr val="FFFFFF"/>
                   </a:solidFill>
@@ -10966,7 +11007,7 @@
           <a:blip r:embed="rId3" cstate="print">
             <a:extLst>
               <a:ext uri="{28A0092B-C50C-407E-A947-70E740481C1C}">
-                <a14:useLocalDpi xmlns="" xmlns:a14="http://schemas.microsoft.com/office/drawing/2010/main" val="0"/>
+                <a14:useLocalDpi xmlns:a14="http://schemas.microsoft.com/office/drawing/2010/main" val="0"/>
               </a:ext>
             </a:extLst>
           </a:blip>
@@ -10986,7 +11027,7 @@
           <a:noFill/>
           <a:extLst>
             <a:ext uri="{909E8E84-426E-40DD-AFC4-6F175D3DCCD1}">
-              <a14:hiddenFill xmlns="" xmlns:a14="http://schemas.microsoft.com/office/drawing/2010/main">
+              <a14:hiddenFill xmlns:a14="http://schemas.microsoft.com/office/drawing/2010/main">
                 <a:solidFill>
                   <a:srgbClr val="FFFFFF"/>
                 </a:solidFill>
@@ -11007,7 +11048,7 @@
           <a:blip r:embed="rId4" cstate="print">
             <a:extLst>
               <a:ext uri="{28A0092B-C50C-407E-A947-70E740481C1C}">
-                <a14:useLocalDpi xmlns="" xmlns:a14="http://schemas.microsoft.com/office/drawing/2010/main" val="0"/>
+                <a14:useLocalDpi xmlns:a14="http://schemas.microsoft.com/office/drawing/2010/main" val="0"/>
               </a:ext>
             </a:extLst>
           </a:blip>
@@ -11027,7 +11068,7 @@
           <a:noFill/>
           <a:extLst>
             <a:ext uri="{909E8E84-426E-40DD-AFC4-6F175D3DCCD1}">
-              <a14:hiddenFill xmlns="" xmlns:a14="http://schemas.microsoft.com/office/drawing/2010/main">
+              <a14:hiddenFill xmlns:a14="http://schemas.microsoft.com/office/drawing/2010/main">
                 <a:solidFill>
                   <a:srgbClr val="FFFFFF"/>
                 </a:solidFill>
@@ -11048,7 +11089,7 @@
           <a:blip r:embed="rId5" cstate="print">
             <a:extLst>
               <a:ext uri="{28A0092B-C50C-407E-A947-70E740481C1C}">
-                <a14:useLocalDpi xmlns="" xmlns:a14="http://schemas.microsoft.com/office/drawing/2010/main" val="0"/>
+                <a14:useLocalDpi xmlns:a14="http://schemas.microsoft.com/office/drawing/2010/main" val="0"/>
               </a:ext>
             </a:extLst>
           </a:blip>
@@ -11068,7 +11109,7 @@
           <a:noFill/>
           <a:extLst>
             <a:ext uri="{909E8E84-426E-40DD-AFC4-6F175D3DCCD1}">
-              <a14:hiddenFill xmlns="" xmlns:a14="http://schemas.microsoft.com/office/drawing/2010/main">
+              <a14:hiddenFill xmlns:a14="http://schemas.microsoft.com/office/drawing/2010/main">
                 <a:solidFill>
                   <a:srgbClr val="FFFFFF"/>
                 </a:solidFill>
@@ -11183,7 +11224,7 @@
             <a:blip r:embed="rId6" cstate="print">
               <a:extLst>
                 <a:ext uri="{28A0092B-C50C-407E-A947-70E740481C1C}">
-                  <a14:useLocalDpi xmlns="" xmlns:a14="http://schemas.microsoft.com/office/drawing/2010/main" val="0"/>
+                  <a14:useLocalDpi xmlns:a14="http://schemas.microsoft.com/office/drawing/2010/main" val="0"/>
                 </a:ext>
               </a:extLst>
             </a:blip>
@@ -11203,7 +11244,7 @@
             <a:noFill/>
             <a:extLst>
               <a:ext uri="{909E8E84-426E-40DD-AFC4-6F175D3DCCD1}">
-                <a14:hiddenFill xmlns="" xmlns:a14="http://schemas.microsoft.com/office/drawing/2010/main">
+                <a14:hiddenFill xmlns:a14="http://schemas.microsoft.com/office/drawing/2010/main">
                   <a:solidFill>
                     <a:srgbClr val="FFFFFF"/>
                   </a:solidFill>
@@ -11224,7 +11265,7 @@
             <a:blip r:embed="rId7" cstate="print">
               <a:extLst>
                 <a:ext uri="{28A0092B-C50C-407E-A947-70E740481C1C}">
-                  <a14:useLocalDpi xmlns="" xmlns:a14="http://schemas.microsoft.com/office/drawing/2010/main" val="0"/>
+                  <a14:useLocalDpi xmlns:a14="http://schemas.microsoft.com/office/drawing/2010/main" val="0"/>
                 </a:ext>
               </a:extLst>
             </a:blip>
@@ -11244,7 +11285,7 @@
             <a:noFill/>
             <a:extLst>
               <a:ext uri="{909E8E84-426E-40DD-AFC4-6F175D3DCCD1}">
-                <a14:hiddenFill xmlns="" xmlns:a14="http://schemas.microsoft.com/office/drawing/2010/main">
+                <a14:hiddenFill xmlns:a14="http://schemas.microsoft.com/office/drawing/2010/main">
                   <a:solidFill>
                     <a:srgbClr val="FFFFFF"/>
                   </a:solidFill>
@@ -11265,7 +11306,7 @@
             <a:blip r:embed="rId8" cstate="print">
               <a:extLst>
                 <a:ext uri="{28A0092B-C50C-407E-A947-70E740481C1C}">
-                  <a14:useLocalDpi xmlns="" xmlns:a14="http://schemas.microsoft.com/office/drawing/2010/main" val="0"/>
+                  <a14:useLocalDpi xmlns:a14="http://schemas.microsoft.com/office/drawing/2010/main" val="0"/>
                 </a:ext>
               </a:extLst>
             </a:blip>
@@ -11285,7 +11326,7 @@
             <a:noFill/>
             <a:extLst>
               <a:ext uri="{909E8E84-426E-40DD-AFC4-6F175D3DCCD1}">
-                <a14:hiddenFill xmlns="" xmlns:a14="http://schemas.microsoft.com/office/drawing/2010/main">
+                <a14:hiddenFill xmlns:a14="http://schemas.microsoft.com/office/drawing/2010/main">
                   <a:solidFill>
                     <a:srgbClr val="FFFFFF"/>
                   </a:solidFill>
@@ -11522,7 +11563,7 @@
             <a:blip r:embed="rId2" cstate="print">
               <a:extLst>
                 <a:ext uri="{28A0092B-C50C-407E-A947-70E740481C1C}">
-                  <a14:useLocalDpi xmlns="" xmlns:a14="http://schemas.microsoft.com/office/drawing/2010/main" val="0"/>
+                  <a14:useLocalDpi xmlns:a14="http://schemas.microsoft.com/office/drawing/2010/main" val="0"/>
                 </a:ext>
               </a:extLst>
             </a:blip>
@@ -11542,7 +11583,7 @@
             <a:noFill/>
             <a:extLst>
               <a:ext uri="{909E8E84-426E-40DD-AFC4-6F175D3DCCD1}">
-                <a14:hiddenFill xmlns="" xmlns:a14="http://schemas.microsoft.com/office/drawing/2010/main">
+                <a14:hiddenFill xmlns:a14="http://schemas.microsoft.com/office/drawing/2010/main">
                   <a:solidFill>
                     <a:srgbClr val="FFFFFF"/>
                   </a:solidFill>
@@ -11563,7 +11604,7 @@
             <a:blip r:embed="rId3" cstate="print">
               <a:extLst>
                 <a:ext uri="{28A0092B-C50C-407E-A947-70E740481C1C}">
-                  <a14:useLocalDpi xmlns="" xmlns:a14="http://schemas.microsoft.com/office/drawing/2010/main" val="0"/>
+                  <a14:useLocalDpi xmlns:a14="http://schemas.microsoft.com/office/drawing/2010/main" val="0"/>
                 </a:ext>
               </a:extLst>
             </a:blip>
@@ -11583,7 +11624,7 @@
             <a:noFill/>
             <a:extLst>
               <a:ext uri="{909E8E84-426E-40DD-AFC4-6F175D3DCCD1}">
-                <a14:hiddenFill xmlns="" xmlns:a14="http://schemas.microsoft.com/office/drawing/2010/main">
+                <a14:hiddenFill xmlns:a14="http://schemas.microsoft.com/office/drawing/2010/main">
                   <a:solidFill>
                     <a:srgbClr val="FFFFFF"/>
                   </a:solidFill>
@@ -11604,7 +11645,7 @@
             <a:blip r:embed="rId4" cstate="print">
               <a:extLst>
                 <a:ext uri="{28A0092B-C50C-407E-A947-70E740481C1C}">
-                  <a14:useLocalDpi xmlns="" xmlns:a14="http://schemas.microsoft.com/office/drawing/2010/main" val="0"/>
+                  <a14:useLocalDpi xmlns:a14="http://schemas.microsoft.com/office/drawing/2010/main" val="0"/>
                 </a:ext>
               </a:extLst>
             </a:blip>
@@ -11624,7 +11665,7 @@
             <a:noFill/>
             <a:extLst>
               <a:ext uri="{909E8E84-426E-40DD-AFC4-6F175D3DCCD1}">
-                <a14:hiddenFill xmlns="" xmlns:a14="http://schemas.microsoft.com/office/drawing/2010/main">
+                <a14:hiddenFill xmlns:a14="http://schemas.microsoft.com/office/drawing/2010/main">
                   <a:solidFill>
                     <a:srgbClr val="FFFFFF"/>
                   </a:solidFill>
@@ -11878,7 +11919,7 @@
             <a:blip r:embed="rId2" cstate="print">
               <a:extLst>
                 <a:ext uri="{28A0092B-C50C-407E-A947-70E740481C1C}">
-                  <a14:useLocalDpi xmlns="" xmlns:a14="http://schemas.microsoft.com/office/drawing/2010/main" val="0"/>
+                  <a14:useLocalDpi xmlns:a14="http://schemas.microsoft.com/office/drawing/2010/main" val="0"/>
                 </a:ext>
               </a:extLst>
             </a:blip>
@@ -11898,7 +11939,7 @@
             <a:noFill/>
             <a:extLst>
               <a:ext uri="{909E8E84-426E-40DD-AFC4-6F175D3DCCD1}">
-                <a14:hiddenFill xmlns="" xmlns:a14="http://schemas.microsoft.com/office/drawing/2010/main">
+                <a14:hiddenFill xmlns:a14="http://schemas.microsoft.com/office/drawing/2010/main">
                   <a:solidFill>
                     <a:srgbClr val="FFFFFF"/>
                   </a:solidFill>
@@ -11919,7 +11960,7 @@
             <a:blip r:embed="rId3" cstate="print">
               <a:extLst>
                 <a:ext uri="{28A0092B-C50C-407E-A947-70E740481C1C}">
-                  <a14:useLocalDpi xmlns="" xmlns:a14="http://schemas.microsoft.com/office/drawing/2010/main" val="0"/>
+                  <a14:useLocalDpi xmlns:a14="http://schemas.microsoft.com/office/drawing/2010/main" val="0"/>
                 </a:ext>
               </a:extLst>
             </a:blip>
@@ -11939,7 +11980,7 @@
             <a:noFill/>
             <a:extLst>
               <a:ext uri="{909E8E84-426E-40DD-AFC4-6F175D3DCCD1}">
-                <a14:hiddenFill xmlns="" xmlns:a14="http://schemas.microsoft.com/office/drawing/2010/main">
+                <a14:hiddenFill xmlns:a14="http://schemas.microsoft.com/office/drawing/2010/main">
                   <a:solidFill>
                     <a:srgbClr val="FFFFFF"/>
                   </a:solidFill>
@@ -11960,7 +12001,7 @@
             <a:blip r:embed="rId4" cstate="print">
               <a:extLst>
                 <a:ext uri="{28A0092B-C50C-407E-A947-70E740481C1C}">
-                  <a14:useLocalDpi xmlns="" xmlns:a14="http://schemas.microsoft.com/office/drawing/2010/main" val="0"/>
+                  <a14:useLocalDpi xmlns:a14="http://schemas.microsoft.com/office/drawing/2010/main" val="0"/>
                 </a:ext>
               </a:extLst>
             </a:blip>
@@ -11980,7 +12021,7 @@
             <a:noFill/>
             <a:extLst>
               <a:ext uri="{909E8E84-426E-40DD-AFC4-6F175D3DCCD1}">
-                <a14:hiddenFill xmlns="" xmlns:a14="http://schemas.microsoft.com/office/drawing/2010/main">
+                <a14:hiddenFill xmlns:a14="http://schemas.microsoft.com/office/drawing/2010/main">
                   <a:solidFill>
                     <a:srgbClr val="FFFFFF"/>
                   </a:solidFill>
@@ -14205,7 +14246,7 @@
             <a:blip r:embed="rId3" cstate="print">
               <a:extLst>
                 <a:ext uri="{28A0092B-C50C-407E-A947-70E740481C1C}">
-                  <a14:useLocalDpi xmlns="" xmlns:a14="http://schemas.microsoft.com/office/drawing/2010/main" val="0"/>
+                  <a14:useLocalDpi xmlns:a14="http://schemas.microsoft.com/office/drawing/2010/main" val="0"/>
                 </a:ext>
               </a:extLst>
             </a:blip>
@@ -14225,7 +14266,7 @@
             <a:noFill/>
             <a:extLst>
               <a:ext uri="{909E8E84-426E-40DD-AFC4-6F175D3DCCD1}">
-                <a14:hiddenFill xmlns="" xmlns:a14="http://schemas.microsoft.com/office/drawing/2010/main">
+                <a14:hiddenFill xmlns:a14="http://schemas.microsoft.com/office/drawing/2010/main">
                   <a:solidFill>
                     <a:srgbClr val="FFFFFF"/>
                   </a:solidFill>
@@ -14246,7 +14287,7 @@
             <a:blip r:embed="rId4" cstate="print">
               <a:extLst>
                 <a:ext uri="{28A0092B-C50C-407E-A947-70E740481C1C}">
-                  <a14:useLocalDpi xmlns="" xmlns:a14="http://schemas.microsoft.com/office/drawing/2010/main" val="0"/>
+                  <a14:useLocalDpi xmlns:a14="http://schemas.microsoft.com/office/drawing/2010/main" val="0"/>
                 </a:ext>
               </a:extLst>
             </a:blip>
@@ -14266,7 +14307,7 @@
             <a:noFill/>
             <a:extLst>
               <a:ext uri="{909E8E84-426E-40DD-AFC4-6F175D3DCCD1}">
-                <a14:hiddenFill xmlns="" xmlns:a14="http://schemas.microsoft.com/office/drawing/2010/main">
+                <a14:hiddenFill xmlns:a14="http://schemas.microsoft.com/office/drawing/2010/main">
                   <a:solidFill>
                     <a:srgbClr val="FFFFFF"/>
                   </a:solidFill>
@@ -14287,7 +14328,7 @@
             <a:blip r:embed="rId5" cstate="print">
               <a:extLst>
                 <a:ext uri="{28A0092B-C50C-407E-A947-70E740481C1C}">
-                  <a14:useLocalDpi xmlns="" xmlns:a14="http://schemas.microsoft.com/office/drawing/2010/main" val="0"/>
+                  <a14:useLocalDpi xmlns:a14="http://schemas.microsoft.com/office/drawing/2010/main" val="0"/>
                 </a:ext>
               </a:extLst>
             </a:blip>
@@ -14307,7 +14348,7 @@
             <a:noFill/>
             <a:extLst>
               <a:ext uri="{909E8E84-426E-40DD-AFC4-6F175D3DCCD1}">
-                <a14:hiddenFill xmlns="" xmlns:a14="http://schemas.microsoft.com/office/drawing/2010/main">
+                <a14:hiddenFill xmlns:a14="http://schemas.microsoft.com/office/drawing/2010/main">
                   <a:solidFill>
                     <a:srgbClr val="FFFFFF"/>
                   </a:solidFill>
@@ -14407,7 +14448,7 @@
     </p:spTree>
     <p:extLst>
       <p:ext uri="{BB962C8B-B14F-4D97-AF65-F5344CB8AC3E}">
-        <p14:creationId xmlns="" xmlns:p14="http://schemas.microsoft.com/office/powerpoint/2010/main" val="329827206"/>
+        <p14:creationId xmlns:p14="http://schemas.microsoft.com/office/powerpoint/2010/main" val="329827206"/>
       </p:ext>
     </p:extLst>
   </p:cSld>
@@ -15604,7 +15645,7 @@
             <a:blip r:embed="rId4" cstate="print">
               <a:extLst>
                 <a:ext uri="{28A0092B-C50C-407E-A947-70E740481C1C}">
-                  <a14:useLocalDpi xmlns="" xmlns:a14="http://schemas.microsoft.com/office/drawing/2010/main" val="0"/>
+                  <a14:useLocalDpi xmlns:a14="http://schemas.microsoft.com/office/drawing/2010/main" val="0"/>
                 </a:ext>
               </a:extLst>
             </a:blip>
@@ -15624,7 +15665,7 @@
             <a:noFill/>
             <a:extLst>
               <a:ext uri="{909E8E84-426E-40DD-AFC4-6F175D3DCCD1}">
-                <a14:hiddenFill xmlns="" xmlns:a14="http://schemas.microsoft.com/office/drawing/2010/main">
+                <a14:hiddenFill xmlns:a14="http://schemas.microsoft.com/office/drawing/2010/main">
                   <a:solidFill>
                     <a:srgbClr val="FFFFFF"/>
                   </a:solidFill>
@@ -15645,7 +15686,7 @@
             <a:blip r:embed="rId5" cstate="print">
               <a:extLst>
                 <a:ext uri="{28A0092B-C50C-407E-A947-70E740481C1C}">
-                  <a14:useLocalDpi xmlns="" xmlns:a14="http://schemas.microsoft.com/office/drawing/2010/main" val="0"/>
+                  <a14:useLocalDpi xmlns:a14="http://schemas.microsoft.com/office/drawing/2010/main" val="0"/>
                 </a:ext>
               </a:extLst>
             </a:blip>
@@ -15665,7 +15706,7 @@
             <a:noFill/>
             <a:extLst>
               <a:ext uri="{909E8E84-426E-40DD-AFC4-6F175D3DCCD1}">
-                <a14:hiddenFill xmlns="" xmlns:a14="http://schemas.microsoft.com/office/drawing/2010/main">
+                <a14:hiddenFill xmlns:a14="http://schemas.microsoft.com/office/drawing/2010/main">
                   <a:solidFill>
                     <a:srgbClr val="FFFFFF"/>
                   </a:solidFill>
@@ -15686,7 +15727,7 @@
             <a:blip r:embed="rId6" cstate="print">
               <a:extLst>
                 <a:ext uri="{28A0092B-C50C-407E-A947-70E740481C1C}">
-                  <a14:useLocalDpi xmlns="" xmlns:a14="http://schemas.microsoft.com/office/drawing/2010/main" val="0"/>
+                  <a14:useLocalDpi xmlns:a14="http://schemas.microsoft.com/office/drawing/2010/main" val="0"/>
                 </a:ext>
               </a:extLst>
             </a:blip>
@@ -15706,7 +15747,7 @@
             <a:noFill/>
             <a:extLst>
               <a:ext uri="{909E8E84-426E-40DD-AFC4-6F175D3DCCD1}">
-                <a14:hiddenFill xmlns="" xmlns:a14="http://schemas.microsoft.com/office/drawing/2010/main">
+                <a14:hiddenFill xmlns:a14="http://schemas.microsoft.com/office/drawing/2010/main">
                   <a:solidFill>
                     <a:srgbClr val="FFFFFF"/>
                   </a:solidFill>
@@ -15730,9 +15771,82 @@
         </p:xfrm>
         <a:graphic>
           <a:graphicData uri="http://schemas.openxmlformats.org/presentationml/2006/ole">
-            <p:oleObj spid="_x0000_s14353" name="Ecuación" r:id="rId7" imgW="533169" imgH="431613" progId="Equation.3">
-              <p:embed/>
-            </p:oleObj>
+            <mc:AlternateContent xmlns:mc="http://schemas.openxmlformats.org/markup-compatibility/2006">
+              <mc:Choice xmlns:v="urn:schemas-microsoft-com:vml" Requires="v">
+                <p:oleObj spid="_x0000_s14354" name="Ecuación" r:id="rId7" imgW="533169" imgH="431613" progId="Equation.3">
+                  <p:embed/>
+                </p:oleObj>
+              </mc:Choice>
+              <mc:Fallback>
+                <p:oleObj name="Ecuación" r:id="rId7" imgW="533169" imgH="431613" progId="Equation.3">
+                  <p:embed/>
+                  <p:pic>
+                    <p:nvPicPr>
+                      <p:cNvPr id="0" name="Picture 17"/>
+                      <p:cNvPicPr>
+                        <a:picLocks noChangeAspect="1" noChangeArrowheads="1"/>
+                      </p:cNvPicPr>
+                      <p:nvPr/>
+                    </p:nvPicPr>
+                    <p:blipFill>
+                      <a:blip r:embed="rId8">
+                        <a:extLst>
+                          <a:ext uri="{28A0092B-C50C-407E-A947-70E740481C1C}">
+                            <a14:useLocalDpi xmlns:a14="http://schemas.microsoft.com/office/drawing/2010/main" val="0"/>
+                          </a:ext>
+                        </a:extLst>
+                      </a:blip>
+                      <a:srcRect/>
+                      <a:stretch>
+                        <a:fillRect/>
+                      </a:stretch>
+                    </p:blipFill>
+                    <p:spPr bwMode="auto">
+                      <a:xfrm>
+                        <a:off x="6959302" y="3717032"/>
+                        <a:ext cx="1008112" cy="816091"/>
+                      </a:xfrm>
+                      <a:prstGeom prst="rect">
+                        <a:avLst/>
+                      </a:prstGeom>
+                      <a:noFill/>
+                      <a:ln>
+                        <a:noFill/>
+                      </a:ln>
+                      <a:effectLst/>
+                      <a:extLst>
+                        <a:ext uri="{909E8E84-426E-40DD-AFC4-6F175D3DCCD1}">
+                          <a14:hiddenFill xmlns:a14="http://schemas.microsoft.com/office/drawing/2010/main">
+                            <a:solidFill>
+                              <a:schemeClr val="accent1"/>
+                            </a:solidFill>
+                          </a14:hiddenFill>
+                        </a:ext>
+                        <a:ext uri="{91240B29-F687-4F45-9708-019B960494DF}">
+                          <a14:hiddenLine xmlns:a14="http://schemas.microsoft.com/office/drawing/2010/main" w="9525">
+                            <a:solidFill>
+                              <a:schemeClr val="tx1"/>
+                            </a:solidFill>
+                            <a:miter lim="800000"/>
+                            <a:headEnd/>
+                            <a:tailEnd/>
+                          </a14:hiddenLine>
+                        </a:ext>
+                        <a:ext uri="{AF507438-7753-43E0-B8FC-AC1667EBCBE1}">
+                          <a14:hiddenEffects xmlns:a14="http://schemas.microsoft.com/office/drawing/2010/main">
+                            <a:effectLst>
+                              <a:outerShdw dist="35921" dir="2700000" algn="ctr" rotWithShape="0">
+                                <a:schemeClr val="bg2"/>
+                              </a:outerShdw>
+                            </a:effectLst>
+                          </a14:hiddenEffects>
+                        </a:ext>
+                      </a:extLst>
+                    </p:spPr>
+                  </p:pic>
+                </p:oleObj>
+              </mc:Fallback>
+            </mc:AlternateContent>
           </a:graphicData>
         </a:graphic>
       </p:graphicFrame>
@@ -15852,7 +15966,7 @@
             <a:blip r:embed="rId2" cstate="print">
               <a:extLst>
                 <a:ext uri="{28A0092B-C50C-407E-A947-70E740481C1C}">
-                  <a14:useLocalDpi xmlns="" xmlns:a14="http://schemas.microsoft.com/office/drawing/2010/main" val="0"/>
+                  <a14:useLocalDpi xmlns:a14="http://schemas.microsoft.com/office/drawing/2010/main" val="0"/>
                 </a:ext>
               </a:extLst>
             </a:blip>
@@ -15872,7 +15986,7 @@
             <a:noFill/>
             <a:extLst>
               <a:ext uri="{909E8E84-426E-40DD-AFC4-6F175D3DCCD1}">
-                <a14:hiddenFill xmlns="" xmlns:a14="http://schemas.microsoft.com/office/drawing/2010/main">
+                <a14:hiddenFill xmlns:a14="http://schemas.microsoft.com/office/drawing/2010/main">
                   <a:solidFill>
                     <a:srgbClr val="FFFFFF"/>
                   </a:solidFill>
@@ -15893,7 +16007,7 @@
             <a:blip r:embed="rId3" cstate="print">
               <a:extLst>
                 <a:ext uri="{28A0092B-C50C-407E-A947-70E740481C1C}">
-                  <a14:useLocalDpi xmlns="" xmlns:a14="http://schemas.microsoft.com/office/drawing/2010/main" val="0"/>
+                  <a14:useLocalDpi xmlns:a14="http://schemas.microsoft.com/office/drawing/2010/main" val="0"/>
                 </a:ext>
               </a:extLst>
             </a:blip>
@@ -15913,7 +16027,7 @@
             <a:noFill/>
             <a:extLst>
               <a:ext uri="{909E8E84-426E-40DD-AFC4-6F175D3DCCD1}">
-                <a14:hiddenFill xmlns="" xmlns:a14="http://schemas.microsoft.com/office/drawing/2010/main">
+                <a14:hiddenFill xmlns:a14="http://schemas.microsoft.com/office/drawing/2010/main">
                   <a:solidFill>
                     <a:srgbClr val="FFFFFF"/>
                   </a:solidFill>
@@ -15934,7 +16048,7 @@
             <a:blip r:embed="rId4" cstate="print">
               <a:extLst>
                 <a:ext uri="{28A0092B-C50C-407E-A947-70E740481C1C}">
-                  <a14:useLocalDpi xmlns="" xmlns:a14="http://schemas.microsoft.com/office/drawing/2010/main" val="0"/>
+                  <a14:useLocalDpi xmlns:a14="http://schemas.microsoft.com/office/drawing/2010/main" val="0"/>
                 </a:ext>
               </a:extLst>
             </a:blip>
@@ -15954,7 +16068,7 @@
             <a:noFill/>
             <a:extLst>
               <a:ext uri="{909E8E84-426E-40DD-AFC4-6F175D3DCCD1}">
-                <a14:hiddenFill xmlns="" xmlns:a14="http://schemas.microsoft.com/office/drawing/2010/main">
+                <a14:hiddenFill xmlns:a14="http://schemas.microsoft.com/office/drawing/2010/main">
                   <a:solidFill>
                     <a:srgbClr val="FFFFFF"/>
                   </a:solidFill>

</xml_diff>